<commit_message>
Update Phase 2 - Presentation.pptx
</commit_message>
<xml_diff>
--- a/Phase 2 Docs/Phase 2 - Presentation.pptx
+++ b/Phase 2 Docs/Phase 2 - Presentation.pptx
@@ -5,10 +5,10 @@
     <p:sldMasterId id="2147483648" r:id="rId4"/>
   </p:sldMasterIdLst>
   <p:notesMasterIdLst>
-    <p:notesMasterId r:id="rId20"/>
+    <p:notesMasterId r:id="rId18"/>
   </p:notesMasterIdLst>
   <p:handoutMasterIdLst>
-    <p:handoutMasterId r:id="rId21"/>
+    <p:handoutMasterId r:id="rId19"/>
   </p:handoutMasterIdLst>
   <p:sldIdLst>
     <p:sldId id="2448" r:id="rId5"/>
@@ -17,15 +17,13 @@
     <p:sldId id="2469" r:id="rId8"/>
     <p:sldId id="2470" r:id="rId9"/>
     <p:sldId id="2471" r:id="rId10"/>
-    <p:sldId id="2467" r:id="rId11"/>
-    <p:sldId id="2463" r:id="rId12"/>
-    <p:sldId id="2451" r:id="rId13"/>
-    <p:sldId id="2457" r:id="rId14"/>
-    <p:sldId id="2462" r:id="rId15"/>
-    <p:sldId id="2464" r:id="rId16"/>
-    <p:sldId id="2466" r:id="rId17"/>
-    <p:sldId id="2453" r:id="rId18"/>
-    <p:sldId id="2436" r:id="rId19"/>
+    <p:sldId id="2463" r:id="rId11"/>
+    <p:sldId id="2467" r:id="rId12"/>
+    <p:sldId id="2466" r:id="rId13"/>
+    <p:sldId id="2451" r:id="rId14"/>
+    <p:sldId id="2464" r:id="rId15"/>
+    <p:sldId id="2453" r:id="rId16"/>
+    <p:sldId id="2436" r:id="rId17"/>
   </p:sldIdLst>
   <p:sldSz cx="12192000" cy="6858000"/>
   <p:notesSz cx="6858000" cy="9144000"/>
@@ -5361,12 +5359,343 @@
           <a:chExt cx="0" cy="0"/>
         </a:xfrm>
       </p:grpSpPr>
+      <p:sp>
+        <p:nvSpPr>
+          <p:cNvPr id="6" name="Slide Number Placeholder 5">
+            <a:extLst>
+              <a:ext uri="{FF2B5EF4-FFF2-40B4-BE49-F238E27FC236}">
+                <a16:creationId xmlns:a16="http://schemas.microsoft.com/office/drawing/2014/main" id="{FC6A5C12-E784-444E-B868-DE2AE85742BB}"/>
+              </a:ext>
+            </a:extLst>
+          </p:cNvPr>
+          <p:cNvSpPr>
+            <a:spLocks noGrp="1"/>
+          </p:cNvSpPr>
+          <p:nvPr>
+            <p:ph type="sldNum" sz="quarter" idx="12"/>
+          </p:nvPr>
+        </p:nvSpPr>
+        <p:spPr/>
+        <p:txBody>
+          <a:bodyPr/>
+          <a:lstStyle/>
+          <a:p>
+            <a:fld id="{8C2E478F-E849-4A8C-AF1F-CBCC78A7CBFA}" type="slidenum">
+              <a:rPr lang="en-US" smtClean="0"/>
+              <a:t>10</a:t>
+            </a:fld>
+            <a:endParaRPr lang="en-US" dirty="0"/>
+          </a:p>
+        </p:txBody>
+      </p:sp>
+      <p:sp>
+        <p:nvSpPr>
+          <p:cNvPr id="4" name="Title 2">
+            <a:extLst>
+              <a:ext uri="{FF2B5EF4-FFF2-40B4-BE49-F238E27FC236}">
+                <a16:creationId xmlns:a16="http://schemas.microsoft.com/office/drawing/2014/main" id="{2F8EB875-4267-9B7B-CA4D-2BA5B5FF6E4F}"/>
+              </a:ext>
+            </a:extLst>
+          </p:cNvPr>
+          <p:cNvSpPr txBox="1">
+            <a:spLocks/>
+          </p:cNvSpPr>
+          <p:nvPr/>
+        </p:nvSpPr>
+        <p:spPr>
+          <a:xfrm>
+            <a:off x="6362330" y="446291"/>
+            <a:ext cx="5630887" cy="1661297"/>
+          </a:xfrm>
+          <a:prstGeom prst="rect">
+            <a:avLst/>
+          </a:prstGeom>
+        </p:spPr>
+        <p:txBody>
+          <a:bodyPr vert="horz" lIns="91440" tIns="45720" rIns="91440" bIns="45720" rtlCol="0" anchor="t">
+            <a:normAutofit/>
+          </a:bodyPr>
+          <a:lstStyle>
+            <a:lvl1pPr algn="l" defTabSz="914400" rtl="0" eaLnBrk="1" latinLnBrk="0" hangingPunct="1">
+              <a:lnSpc>
+                <a:spcPct val="100000"/>
+              </a:lnSpc>
+              <a:spcBef>
+                <a:spcPct val="0"/>
+              </a:spcBef>
+              <a:buNone/>
+              <a:defRPr sz="6000" kern="1200" cap="all" spc="300" baseline="0">
+                <a:solidFill>
+                  <a:schemeClr val="tx1"/>
+                </a:solidFill>
+                <a:latin typeface="+mj-lt"/>
+                <a:ea typeface="+mj-ea"/>
+                <a:cs typeface="+mj-cs"/>
+              </a:defRPr>
+            </a:lvl1pPr>
+          </a:lstStyle>
+          <a:p>
+            <a:r>
+              <a:rPr lang="en-US" sz="4500" dirty="0"/>
+              <a:t>x</a:t>
+            </a:r>
+            <a:endParaRPr lang="en-US" sz="3500" dirty="0"/>
+          </a:p>
+        </p:txBody>
+      </p:sp>
+      <p:sp>
+        <p:nvSpPr>
+          <p:cNvPr id="2" name="Content Placeholder 8">
+            <a:extLst>
+              <a:ext uri="{FF2B5EF4-FFF2-40B4-BE49-F238E27FC236}">
+                <a16:creationId xmlns:a16="http://schemas.microsoft.com/office/drawing/2014/main" id="{F8BBD6BA-CA7D-1973-B283-4041FC25B422}"/>
+              </a:ext>
+            </a:extLst>
+          </p:cNvPr>
+          <p:cNvSpPr txBox="1">
+            <a:spLocks/>
+          </p:cNvSpPr>
+          <p:nvPr/>
+        </p:nvSpPr>
+        <p:spPr>
+          <a:xfrm>
+            <a:off x="6362330" y="2517621"/>
+            <a:ext cx="4516707" cy="3859127"/>
+          </a:xfrm>
+          <a:prstGeom prst="rect">
+            <a:avLst/>
+          </a:prstGeom>
+          <a:noFill/>
+        </p:spPr>
+        <p:txBody>
+          <a:bodyPr vert="horz" lIns="91440" tIns="45720" rIns="91440" bIns="45720" rtlCol="0" anchor="t">
+            <a:normAutofit/>
+          </a:bodyPr>
+          <a:lstStyle>
+            <a:lvl1pPr marL="0" indent="0" algn="ctr" defTabSz="914400" rtl="0" eaLnBrk="1" latinLnBrk="0" hangingPunct="1">
+              <a:lnSpc>
+                <a:spcPct val="100000"/>
+              </a:lnSpc>
+              <a:spcBef>
+                <a:spcPts val="1000"/>
+              </a:spcBef>
+              <a:buFont typeface="Arial" panose="020B0604020202020204" pitchFamily="34" charset="0"/>
+              <a:buNone/>
+              <a:defRPr sz="1400" kern="1200" cap="all" spc="600" baseline="0">
+                <a:solidFill>
+                  <a:schemeClr val="bg1"/>
+                </a:solidFill>
+                <a:latin typeface="+mn-lt"/>
+                <a:ea typeface="+mn-ea"/>
+                <a:cs typeface="+mn-cs"/>
+              </a:defRPr>
+            </a:lvl1pPr>
+            <a:lvl2pPr marL="457200" indent="0" algn="l" defTabSz="914400" rtl="0" eaLnBrk="1" latinLnBrk="0" hangingPunct="1">
+              <a:lnSpc>
+                <a:spcPct val="150000"/>
+              </a:lnSpc>
+              <a:spcBef>
+                <a:spcPts val="500"/>
+              </a:spcBef>
+              <a:buFont typeface="Arial" panose="020B0604020202020204" pitchFamily="34" charset="0"/>
+              <a:buNone/>
+              <a:defRPr sz="2000" kern="1200">
+                <a:solidFill>
+                  <a:schemeClr val="tx1">
+                    <a:tint val="75000"/>
+                  </a:schemeClr>
+                </a:solidFill>
+                <a:latin typeface="+mn-lt"/>
+                <a:ea typeface="+mn-ea"/>
+                <a:cs typeface="+mn-cs"/>
+              </a:defRPr>
+            </a:lvl2pPr>
+            <a:lvl3pPr marL="914400" indent="0" algn="l" defTabSz="914400" rtl="0" eaLnBrk="1" latinLnBrk="0" hangingPunct="1">
+              <a:lnSpc>
+                <a:spcPct val="150000"/>
+              </a:lnSpc>
+              <a:spcBef>
+                <a:spcPts val="500"/>
+              </a:spcBef>
+              <a:buFont typeface="Arial" panose="020B0604020202020204" pitchFamily="34" charset="0"/>
+              <a:buNone/>
+              <a:defRPr sz="1800" kern="1200">
+                <a:solidFill>
+                  <a:schemeClr val="tx1">
+                    <a:tint val="75000"/>
+                  </a:schemeClr>
+                </a:solidFill>
+                <a:latin typeface="+mn-lt"/>
+                <a:ea typeface="+mn-ea"/>
+                <a:cs typeface="+mn-cs"/>
+              </a:defRPr>
+            </a:lvl3pPr>
+            <a:lvl4pPr marL="1371600" indent="0" algn="l" defTabSz="914400" rtl="0" eaLnBrk="1" latinLnBrk="0" hangingPunct="1">
+              <a:lnSpc>
+                <a:spcPct val="150000"/>
+              </a:lnSpc>
+              <a:spcBef>
+                <a:spcPts val="500"/>
+              </a:spcBef>
+              <a:buFont typeface="Arial" panose="020B0604020202020204" pitchFamily="34" charset="0"/>
+              <a:buNone/>
+              <a:defRPr sz="1600" kern="1200">
+                <a:solidFill>
+                  <a:schemeClr val="tx1">
+                    <a:tint val="75000"/>
+                  </a:schemeClr>
+                </a:solidFill>
+                <a:latin typeface="+mn-lt"/>
+                <a:ea typeface="+mn-ea"/>
+                <a:cs typeface="+mn-cs"/>
+              </a:defRPr>
+            </a:lvl4pPr>
+            <a:lvl5pPr marL="1828800" indent="0" algn="l" defTabSz="914400" rtl="0" eaLnBrk="1" latinLnBrk="0" hangingPunct="1">
+              <a:lnSpc>
+                <a:spcPct val="150000"/>
+              </a:lnSpc>
+              <a:spcBef>
+                <a:spcPts val="500"/>
+              </a:spcBef>
+              <a:buFont typeface="Arial" panose="020B0604020202020204" pitchFamily="34" charset="0"/>
+              <a:buNone/>
+              <a:defRPr sz="1600" kern="1200">
+                <a:solidFill>
+                  <a:schemeClr val="tx1">
+                    <a:tint val="75000"/>
+                  </a:schemeClr>
+                </a:solidFill>
+                <a:latin typeface="+mn-lt"/>
+                <a:ea typeface="+mn-ea"/>
+                <a:cs typeface="+mn-cs"/>
+              </a:defRPr>
+            </a:lvl5pPr>
+            <a:lvl6pPr marL="2286000" indent="0" algn="l" defTabSz="914400" rtl="0" eaLnBrk="1" latinLnBrk="0" hangingPunct="1">
+              <a:lnSpc>
+                <a:spcPct val="90000"/>
+              </a:lnSpc>
+              <a:spcBef>
+                <a:spcPts val="500"/>
+              </a:spcBef>
+              <a:buFont typeface="Arial" panose="020B0604020202020204" pitchFamily="34" charset="0"/>
+              <a:buNone/>
+              <a:defRPr sz="1600" kern="1200">
+                <a:solidFill>
+                  <a:schemeClr val="tx1">
+                    <a:tint val="75000"/>
+                  </a:schemeClr>
+                </a:solidFill>
+                <a:latin typeface="+mn-lt"/>
+                <a:ea typeface="+mn-ea"/>
+                <a:cs typeface="+mn-cs"/>
+              </a:defRPr>
+            </a:lvl6pPr>
+            <a:lvl7pPr marL="2743200" indent="0" algn="l" defTabSz="914400" rtl="0" eaLnBrk="1" latinLnBrk="0" hangingPunct="1">
+              <a:lnSpc>
+                <a:spcPct val="90000"/>
+              </a:lnSpc>
+              <a:spcBef>
+                <a:spcPts val="500"/>
+              </a:spcBef>
+              <a:buFont typeface="Arial" panose="020B0604020202020204" pitchFamily="34" charset="0"/>
+              <a:buNone/>
+              <a:defRPr sz="1600" kern="1200">
+                <a:solidFill>
+                  <a:schemeClr val="tx1">
+                    <a:tint val="75000"/>
+                  </a:schemeClr>
+                </a:solidFill>
+                <a:latin typeface="+mn-lt"/>
+                <a:ea typeface="+mn-ea"/>
+                <a:cs typeface="+mn-cs"/>
+              </a:defRPr>
+            </a:lvl7pPr>
+            <a:lvl8pPr marL="3200400" indent="0" algn="l" defTabSz="914400" rtl="0" eaLnBrk="1" latinLnBrk="0" hangingPunct="1">
+              <a:lnSpc>
+                <a:spcPct val="90000"/>
+              </a:lnSpc>
+              <a:spcBef>
+                <a:spcPts val="500"/>
+              </a:spcBef>
+              <a:buFont typeface="Arial" panose="020B0604020202020204" pitchFamily="34" charset="0"/>
+              <a:buNone/>
+              <a:defRPr sz="1600" kern="1200">
+                <a:solidFill>
+                  <a:schemeClr val="tx1">
+                    <a:tint val="75000"/>
+                  </a:schemeClr>
+                </a:solidFill>
+                <a:latin typeface="+mn-lt"/>
+                <a:ea typeface="+mn-ea"/>
+                <a:cs typeface="+mn-cs"/>
+              </a:defRPr>
+            </a:lvl8pPr>
+            <a:lvl9pPr marL="3657600" indent="0" algn="l" defTabSz="914400" rtl="0" eaLnBrk="1" latinLnBrk="0" hangingPunct="1">
+              <a:lnSpc>
+                <a:spcPct val="90000"/>
+              </a:lnSpc>
+              <a:spcBef>
+                <a:spcPts val="500"/>
+              </a:spcBef>
+              <a:buFont typeface="Arial" panose="020B0604020202020204" pitchFamily="34" charset="0"/>
+              <a:buNone/>
+              <a:defRPr sz="1600" kern="1200">
+                <a:solidFill>
+                  <a:schemeClr val="tx1">
+                    <a:tint val="75000"/>
+                  </a:schemeClr>
+                </a:solidFill>
+                <a:latin typeface="+mn-lt"/>
+                <a:ea typeface="+mn-ea"/>
+                <a:cs typeface="+mn-cs"/>
+              </a:defRPr>
+            </a:lvl9pPr>
+          </a:lstStyle>
+          <a:p>
+            <a:pPr algn="l">
+              <a:lnSpc>
+                <a:spcPct val="120000"/>
+              </a:lnSpc>
+              <a:spcBef>
+                <a:spcPts val="0"/>
+              </a:spcBef>
+            </a:pPr>
+            <a:r>
+              <a:rPr lang="en-US" sz="2400" cap="none" spc="0" dirty="0">
+                <a:solidFill>
+                  <a:sysClr val="windowText" lastClr="000000"/>
+                </a:solidFill>
+                <a:effectLst/>
+              </a:rPr>
+              <a:t>After a client uploads a picture of their pet, our image recognition will be able to determine what kind of animal it is, then recommend names based off this information and a couple of other factors such as the animal’s coloring.</a:t>
+            </a:r>
+          </a:p>
+        </p:txBody>
+      </p:sp>
+      <p:sp>
+        <p:nvSpPr>
+          <p:cNvPr id="7" name="Picture Placeholder 6">
+            <a:extLst>
+              <a:ext uri="{FF2B5EF4-FFF2-40B4-BE49-F238E27FC236}">
+                <a16:creationId xmlns:a16="http://schemas.microsoft.com/office/drawing/2014/main" id="{BC79F0CB-D8A3-C42E-9E9A-ABCD333E1E55}"/>
+              </a:ext>
+            </a:extLst>
+          </p:cNvPr>
+          <p:cNvSpPr>
+            <a:spLocks noGrp="1"/>
+          </p:cNvSpPr>
+          <p:nvPr>
+            <p:ph type="pic" sz="quarter" idx="13"/>
+          </p:nvPr>
+        </p:nvSpPr>
+        <p:spPr/>
+      </p:sp>
       <p:pic>
         <p:nvPicPr>
-          <p:cNvPr id="9" name="Picture Placeholder 7" descr="abstract image">
-            <a:extLst>
-              <a:ext uri="{FF2B5EF4-FFF2-40B4-BE49-F238E27FC236}">
-                <a16:creationId xmlns:a16="http://schemas.microsoft.com/office/drawing/2014/main" id="{10C261F5-27E5-A8D9-57BF-8DCB0A00F6B1}"/>
+          <p:cNvPr id="13" name="Picture Placeholder 12" descr="close up of computer on top of table against a brick wall">
+            <a:extLst>
+              <a:ext uri="{FF2B5EF4-FFF2-40B4-BE49-F238E27FC236}">
+                <a16:creationId xmlns:a16="http://schemas.microsoft.com/office/drawing/2014/main" id="{90BB9493-60B4-4B89-89CE-E1F8BF6C4D12}"/>
               </a:ext>
             </a:extLst>
           </p:cNvPr>
@@ -5376,8 +5705,7 @@
           <p:nvPr/>
         </p:nvPicPr>
         <p:blipFill rotWithShape="1">
-          <a:blip r:embed="rId2">
-            <a:alphaModFix/>
+          <a:blip r:embed="rId2" cstate="email">
             <a:extLst>
               <a:ext uri="{BEBA8EAE-BF5A-486C-A8C5-ECC9F3942E4B}">
                 <a14:imgProps xmlns:a14="http://schemas.microsoft.com/office/drawing/2010/main">
@@ -5388,75 +5716,115 @@
                   </a14:imgLayer>
                 </a14:imgProps>
               </a:ext>
+              <a:ext uri="{28A0092B-C50C-407E-A947-70E740481C1C}">
+                <a14:useLocalDpi xmlns:a14="http://schemas.microsoft.com/office/drawing/2010/main"/>
+              </a:ext>
             </a:extLst>
           </a:blip>
-          <a:srcRect l="18261" r="36813"/>
+          <a:srcRect l="20370" r="20370"/>
           <a:stretch/>
         </p:blipFill>
         <p:spPr>
           <a:xfrm>
-            <a:off x="-1" y="0"/>
-            <a:ext cx="5477523" cy="6858000"/>
+            <a:off x="0" y="-9922"/>
+            <a:ext cx="6096000" cy="6867922"/>
           </a:xfrm>
-          <a:prstGeom prst="rect">
+          <a:custGeom>
             <a:avLst/>
-          </a:prstGeom>
+            <a:gdLst>
+              <a:gd name="connsiteX0" fmla="*/ 0 w 6096000"/>
+              <a:gd name="connsiteY0" fmla="*/ 0 h 6858000"/>
+              <a:gd name="connsiteX1" fmla="*/ 6096000 w 6096000"/>
+              <a:gd name="connsiteY1" fmla="*/ 0 h 6858000"/>
+              <a:gd name="connsiteX2" fmla="*/ 6096000 w 6096000"/>
+              <a:gd name="connsiteY2" fmla="*/ 6858000 h 6858000"/>
+              <a:gd name="connsiteX3" fmla="*/ 0 w 6096000"/>
+              <a:gd name="connsiteY3" fmla="*/ 6858000 h 6858000"/>
+              <a:gd name="connsiteX4" fmla="*/ 0 w 6096000"/>
+              <a:gd name="connsiteY4" fmla="*/ 0 h 6858000"/>
+              <a:gd name="connsiteX0" fmla="*/ 0 w 6096000"/>
+              <a:gd name="connsiteY0" fmla="*/ 0 h 6858000"/>
+              <a:gd name="connsiteX1" fmla="*/ 6096000 w 6096000"/>
+              <a:gd name="connsiteY1" fmla="*/ 0 h 6858000"/>
+              <a:gd name="connsiteX2" fmla="*/ 4242487 w 6096000"/>
+              <a:gd name="connsiteY2" fmla="*/ 6833286 h 6858000"/>
+              <a:gd name="connsiteX3" fmla="*/ 0 w 6096000"/>
+              <a:gd name="connsiteY3" fmla="*/ 6858000 h 6858000"/>
+              <a:gd name="connsiteX4" fmla="*/ 0 w 6096000"/>
+              <a:gd name="connsiteY4" fmla="*/ 0 h 6858000"/>
+              <a:gd name="connsiteX0" fmla="*/ 0 w 6096000"/>
+              <a:gd name="connsiteY0" fmla="*/ 0 h 6867922"/>
+              <a:gd name="connsiteX1" fmla="*/ 6096000 w 6096000"/>
+              <a:gd name="connsiteY1" fmla="*/ 0 h 6867922"/>
+              <a:gd name="connsiteX2" fmla="*/ 4228633 w 6096000"/>
+              <a:gd name="connsiteY2" fmla="*/ 6867922 h 6867922"/>
+              <a:gd name="connsiteX3" fmla="*/ 0 w 6096000"/>
+              <a:gd name="connsiteY3" fmla="*/ 6858000 h 6867922"/>
+              <a:gd name="connsiteX4" fmla="*/ 0 w 6096000"/>
+              <a:gd name="connsiteY4" fmla="*/ 0 h 6867922"/>
+            </a:gdLst>
+            <a:ahLst/>
+            <a:cxnLst>
+              <a:cxn ang="0">
+                <a:pos x="connsiteX0" y="connsiteY0"/>
+              </a:cxn>
+              <a:cxn ang="0">
+                <a:pos x="connsiteX1" y="connsiteY1"/>
+              </a:cxn>
+              <a:cxn ang="0">
+                <a:pos x="connsiteX2" y="connsiteY2"/>
+              </a:cxn>
+              <a:cxn ang="0">
+                <a:pos x="connsiteX3" y="connsiteY3"/>
+              </a:cxn>
+              <a:cxn ang="0">
+                <a:pos x="connsiteX4" y="connsiteY4"/>
+              </a:cxn>
+            </a:cxnLst>
+            <a:rect l="l" t="t" r="r" b="b"/>
+            <a:pathLst>
+              <a:path w="6096000" h="6867922">
+                <a:moveTo>
+                  <a:pt x="0" y="0"/>
+                </a:moveTo>
+                <a:lnTo>
+                  <a:pt x="6096000" y="0"/>
+                </a:lnTo>
+                <a:lnTo>
+                  <a:pt x="4228633" y="6867922"/>
+                </a:lnTo>
+                <a:lnTo>
+                  <a:pt x="0" y="6858000"/>
+                </a:lnTo>
+                <a:lnTo>
+                  <a:pt x="0" y="0"/>
+                </a:lnTo>
+                <a:close/>
+              </a:path>
+            </a:pathLst>
+          </a:custGeom>
+          <a:effectLst/>
         </p:spPr>
       </p:pic>
       <p:sp>
         <p:nvSpPr>
-          <p:cNvPr id="3" name="Title 2">
-            <a:extLst>
-              <a:ext uri="{FF2B5EF4-FFF2-40B4-BE49-F238E27FC236}">
-                <a16:creationId xmlns:a16="http://schemas.microsoft.com/office/drawing/2014/main" id="{1D24B42B-925B-494C-A986-BD85E8117E1E}"/>
-              </a:ext>
-            </a:extLst>
-          </p:cNvPr>
-          <p:cNvSpPr>
-            <a:spLocks noGrp="1"/>
-          </p:cNvSpPr>
-          <p:nvPr>
-            <p:ph type="title"/>
+          <p:cNvPr id="8" name="Text Placeholder 4">
+            <a:extLst>
+              <a:ext uri="{FF2B5EF4-FFF2-40B4-BE49-F238E27FC236}">
+                <a16:creationId xmlns:a16="http://schemas.microsoft.com/office/drawing/2014/main" id="{8A616E72-8E0A-185C-53F1-14BBDFB16F39}"/>
+              </a:ext>
+            </a:extLst>
+          </p:cNvPr>
+          <p:cNvSpPr>
+            <a:spLocks noGrp="1"/>
+          </p:cNvSpPr>
+          <p:nvPr>
+            <p:ph type="body" idx="1"/>
           </p:nvPr>
         </p:nvSpPr>
         <p:spPr>
           <a:xfrm>
-            <a:off x="6362330" y="411225"/>
-            <a:ext cx="5251450" cy="956373"/>
-          </a:xfrm>
-        </p:spPr>
-        <p:txBody>
-          <a:bodyPr anchor="t">
-            <a:normAutofit/>
-          </a:bodyPr>
-          <a:lstStyle/>
-          <a:p>
-            <a:r>
-              <a:rPr lang="en-US" sz="4800" dirty="0"/>
-              <a:t>x</a:t>
-            </a:r>
-          </a:p>
-        </p:txBody>
-      </p:sp>
-      <p:sp>
-        <p:nvSpPr>
-          <p:cNvPr id="5" name="Text Placeholder 4">
-            <a:extLst>
-              <a:ext uri="{FF2B5EF4-FFF2-40B4-BE49-F238E27FC236}">
-                <a16:creationId xmlns:a16="http://schemas.microsoft.com/office/drawing/2014/main" id="{AF9B872F-6332-408E-9135-B871F0C90C00}"/>
-              </a:ext>
-            </a:extLst>
-          </p:cNvPr>
-          <p:cNvSpPr>
-            <a:spLocks noGrp="1"/>
-          </p:cNvSpPr>
-          <p:nvPr>
-            <p:ph type="body" idx="1"/>
-          </p:nvPr>
-        </p:nvSpPr>
-        <p:spPr>
-          <a:xfrm>
-            <a:off x="6362330" y="2025552"/>
+            <a:off x="6362331" y="1860457"/>
             <a:ext cx="5829669" cy="365125"/>
           </a:xfrm>
         </p:spPr>
@@ -5471,287 +5839,10 @@
           </a:p>
         </p:txBody>
       </p:sp>
-      <p:sp>
-        <p:nvSpPr>
-          <p:cNvPr id="2" name="Slide Number Placeholder 1">
-            <a:extLst>
-              <a:ext uri="{FF2B5EF4-FFF2-40B4-BE49-F238E27FC236}">
-                <a16:creationId xmlns:a16="http://schemas.microsoft.com/office/drawing/2014/main" id="{948DD8A0-BD53-4DBF-949B-0D64D12DADA9}"/>
-              </a:ext>
-            </a:extLst>
-          </p:cNvPr>
-          <p:cNvSpPr>
-            <a:spLocks noGrp="1"/>
-          </p:cNvSpPr>
-          <p:nvPr>
-            <p:ph type="sldNum" sz="quarter" idx="12"/>
-          </p:nvPr>
-        </p:nvSpPr>
-        <p:spPr/>
-        <p:txBody>
-          <a:bodyPr/>
-          <a:lstStyle/>
-          <a:p>
-            <a:fld id="{8C2E478F-E849-4A8C-AF1F-CBCC78A7CBFA}" type="slidenum">
-              <a:rPr lang="en-US" smtClean="0"/>
-              <a:t>10</a:t>
-            </a:fld>
-            <a:endParaRPr lang="en-US" dirty="0"/>
-          </a:p>
-        </p:txBody>
-      </p:sp>
-      <p:sp>
-        <p:nvSpPr>
-          <p:cNvPr id="6" name="Content Placeholder 8">
-            <a:extLst>
-              <a:ext uri="{FF2B5EF4-FFF2-40B4-BE49-F238E27FC236}">
-                <a16:creationId xmlns:a16="http://schemas.microsoft.com/office/drawing/2014/main" id="{3B4F2E0F-78BC-2FE8-4808-2A26179B55EA}"/>
-              </a:ext>
-            </a:extLst>
-          </p:cNvPr>
-          <p:cNvSpPr txBox="1">
-            <a:spLocks/>
-          </p:cNvSpPr>
-          <p:nvPr/>
-        </p:nvSpPr>
-        <p:spPr>
-          <a:xfrm>
-            <a:off x="6362330" y="2574543"/>
-            <a:ext cx="4646246" cy="3038482"/>
-          </a:xfrm>
-          <a:prstGeom prst="rect">
-            <a:avLst/>
-          </a:prstGeom>
-          <a:noFill/>
-        </p:spPr>
-        <p:txBody>
-          <a:bodyPr vert="horz" lIns="91440" tIns="45720" rIns="91440" bIns="45720" rtlCol="0" anchor="t">
-            <a:normAutofit/>
-          </a:bodyPr>
-          <a:lstStyle>
-            <a:defPPr>
-              <a:defRPr lang="en-US"/>
-            </a:defPPr>
-            <a:lvl1pPr indent="0">
-              <a:lnSpc>
-                <a:spcPct val="120000"/>
-              </a:lnSpc>
-              <a:spcBef>
-                <a:spcPts val="0"/>
-              </a:spcBef>
-              <a:buFont typeface="Arial" panose="020B0604020202020204" pitchFamily="34" charset="0"/>
-              <a:buNone/>
-              <a:defRPr sz="2400" cap="none" spc="0" baseline="0">
-                <a:solidFill>
-                  <a:sysClr val="windowText" lastClr="000000"/>
-                </a:solidFill>
-                <a:effectLst/>
-              </a:defRPr>
-            </a:lvl1pPr>
-            <a:lvl2pPr indent="0">
-              <a:lnSpc>
-                <a:spcPct val="150000"/>
-              </a:lnSpc>
-              <a:spcBef>
-                <a:spcPts val="500"/>
-              </a:spcBef>
-              <a:buFont typeface="Arial" panose="020B0604020202020204" pitchFamily="34" charset="0"/>
-              <a:buNone/>
-              <a:defRPr sz="2000">
-                <a:solidFill>
-                  <a:schemeClr val="tx1">
-                    <a:tint val="75000"/>
-                  </a:schemeClr>
-                </a:solidFill>
-              </a:defRPr>
-            </a:lvl2pPr>
-            <a:lvl3pPr indent="0">
-              <a:lnSpc>
-                <a:spcPct val="150000"/>
-              </a:lnSpc>
-              <a:spcBef>
-                <a:spcPts val="500"/>
-              </a:spcBef>
-              <a:buFont typeface="Arial" panose="020B0604020202020204" pitchFamily="34" charset="0"/>
-              <a:buNone/>
-              <a:defRPr>
-                <a:solidFill>
-                  <a:schemeClr val="tx1">
-                    <a:tint val="75000"/>
-                  </a:schemeClr>
-                </a:solidFill>
-              </a:defRPr>
-            </a:lvl3pPr>
-            <a:lvl4pPr indent="0">
-              <a:lnSpc>
-                <a:spcPct val="150000"/>
-              </a:lnSpc>
-              <a:spcBef>
-                <a:spcPts val="500"/>
-              </a:spcBef>
-              <a:buFont typeface="Arial" panose="020B0604020202020204" pitchFamily="34" charset="0"/>
-              <a:buNone/>
-              <a:defRPr sz="1600">
-                <a:solidFill>
-                  <a:schemeClr val="tx1">
-                    <a:tint val="75000"/>
-                  </a:schemeClr>
-                </a:solidFill>
-              </a:defRPr>
-            </a:lvl4pPr>
-            <a:lvl5pPr indent="0">
-              <a:lnSpc>
-                <a:spcPct val="150000"/>
-              </a:lnSpc>
-              <a:spcBef>
-                <a:spcPts val="500"/>
-              </a:spcBef>
-              <a:buFont typeface="Arial" panose="020B0604020202020204" pitchFamily="34" charset="0"/>
-              <a:buNone/>
-              <a:defRPr sz="1600">
-                <a:solidFill>
-                  <a:schemeClr val="tx1">
-                    <a:tint val="75000"/>
-                  </a:schemeClr>
-                </a:solidFill>
-              </a:defRPr>
-            </a:lvl5pPr>
-            <a:lvl6pPr indent="0">
-              <a:lnSpc>
-                <a:spcPct val="90000"/>
-              </a:lnSpc>
-              <a:spcBef>
-                <a:spcPts val="500"/>
-              </a:spcBef>
-              <a:buFont typeface="Arial" panose="020B0604020202020204" pitchFamily="34" charset="0"/>
-              <a:buNone/>
-              <a:defRPr sz="1600">
-                <a:solidFill>
-                  <a:schemeClr val="tx1">
-                    <a:tint val="75000"/>
-                  </a:schemeClr>
-                </a:solidFill>
-              </a:defRPr>
-            </a:lvl6pPr>
-            <a:lvl7pPr indent="0">
-              <a:lnSpc>
-                <a:spcPct val="90000"/>
-              </a:lnSpc>
-              <a:spcBef>
-                <a:spcPts val="500"/>
-              </a:spcBef>
-              <a:buFont typeface="Arial" panose="020B0604020202020204" pitchFamily="34" charset="0"/>
-              <a:buNone/>
-              <a:defRPr sz="1600">
-                <a:solidFill>
-                  <a:schemeClr val="tx1">
-                    <a:tint val="75000"/>
-                  </a:schemeClr>
-                </a:solidFill>
-              </a:defRPr>
-            </a:lvl7pPr>
-            <a:lvl8pPr indent="0">
-              <a:lnSpc>
-                <a:spcPct val="90000"/>
-              </a:lnSpc>
-              <a:spcBef>
-                <a:spcPts val="500"/>
-              </a:spcBef>
-              <a:buFont typeface="Arial" panose="020B0604020202020204" pitchFamily="34" charset="0"/>
-              <a:buNone/>
-              <a:defRPr sz="1600">
-                <a:solidFill>
-                  <a:schemeClr val="tx1">
-                    <a:tint val="75000"/>
-                  </a:schemeClr>
-                </a:solidFill>
-              </a:defRPr>
-            </a:lvl8pPr>
-            <a:lvl9pPr indent="0">
-              <a:lnSpc>
-                <a:spcPct val="90000"/>
-              </a:lnSpc>
-              <a:spcBef>
-                <a:spcPts val="500"/>
-              </a:spcBef>
-              <a:buFont typeface="Arial" panose="020B0604020202020204" pitchFamily="34" charset="0"/>
-              <a:buNone/>
-              <a:defRPr sz="1600">
-                <a:solidFill>
-                  <a:schemeClr val="tx1">
-                    <a:tint val="75000"/>
-                  </a:schemeClr>
-                </a:solidFill>
-              </a:defRPr>
-            </a:lvl9pPr>
-          </a:lstStyle>
-          <a:p>
-            <a:pPr marL="342900" indent="-342900">
-              <a:buFont typeface="Arial" panose="020B0604020202020204" pitchFamily="34" charset="0"/>
-              <a:buChar char="•"/>
-            </a:pPr>
-            <a:r>
-              <a:rPr lang="en-US" dirty="0" err="1"/>
-              <a:t>VSCode</a:t>
-            </a:r>
-            <a:r>
-              <a:rPr lang="en-US" dirty="0"/>
-              <a:t> IDE</a:t>
-            </a:r>
-          </a:p>
-          <a:p>
-            <a:pPr marL="342900" indent="-342900">
-              <a:buFont typeface="Arial" panose="020B0604020202020204" pitchFamily="34" charset="0"/>
-              <a:buChar char="•"/>
-            </a:pPr>
-            <a:r>
-              <a:rPr lang="en-US" dirty="0"/>
-              <a:t>Vue</a:t>
-            </a:r>
-          </a:p>
-          <a:p>
-            <a:pPr marL="342900" indent="-342900">
-              <a:buFont typeface="Arial" panose="020B0604020202020204" pitchFamily="34" charset="0"/>
-              <a:buChar char="•"/>
-            </a:pPr>
-            <a:r>
-              <a:rPr lang="en-US" dirty="0"/>
-              <a:t>HTML</a:t>
-            </a:r>
-          </a:p>
-          <a:p>
-            <a:pPr marL="342900" indent="-342900">
-              <a:buFont typeface="Arial" panose="020B0604020202020204" pitchFamily="34" charset="0"/>
-              <a:buChar char="•"/>
-            </a:pPr>
-            <a:r>
-              <a:rPr lang="en-US" dirty="0"/>
-              <a:t>CSS</a:t>
-            </a:r>
-          </a:p>
-          <a:p>
-            <a:pPr marL="342900" indent="-342900">
-              <a:buFont typeface="Arial" panose="020B0604020202020204" pitchFamily="34" charset="0"/>
-              <a:buChar char="•"/>
-            </a:pPr>
-            <a:r>
-              <a:rPr lang="en-US" dirty="0"/>
-              <a:t>JavaScript</a:t>
-            </a:r>
-          </a:p>
-          <a:p>
-            <a:pPr marL="342900" indent="-342900">
-              <a:buFont typeface="Arial" panose="020B0604020202020204" pitchFamily="34" charset="0"/>
-              <a:buChar char="•"/>
-            </a:pPr>
-            <a:endParaRPr lang="en-US" dirty="0"/>
-          </a:p>
-        </p:txBody>
-      </p:sp>
     </p:spTree>
     <p:extLst>
       <p:ext uri="{BB962C8B-B14F-4D97-AF65-F5344CB8AC3E}">
-        <p14:creationId xmlns:p14="http://schemas.microsoft.com/office/powerpoint/2010/main" val="3164405530"/>
+        <p14:creationId xmlns:p14="http://schemas.microsoft.com/office/powerpoint/2010/main" val="2944765398"/>
       </p:ext>
     </p:extLst>
   </p:cSld>
@@ -5778,482 +5869,6 @@
           <a:chExt cx="0" cy="0"/>
         </a:xfrm>
       </p:grpSpPr>
-      <p:pic>
-        <p:nvPicPr>
-          <p:cNvPr id="8" name="Picture Placeholder 7" descr="group of people at a conference table">
-            <a:extLst>
-              <a:ext uri="{FF2B5EF4-FFF2-40B4-BE49-F238E27FC236}">
-                <a16:creationId xmlns:a16="http://schemas.microsoft.com/office/drawing/2014/main" id="{BB76F5AB-0940-46E1-85F9-6A870D7D04C9}"/>
-              </a:ext>
-            </a:extLst>
-          </p:cNvPr>
-          <p:cNvPicPr>
-            <a:picLocks noGrp="1" noChangeAspect="1"/>
-          </p:cNvPicPr>
-          <p:nvPr>
-            <p:ph type="pic" sz="quarter" idx="13"/>
-          </p:nvPr>
-        </p:nvPicPr>
-        <p:blipFill rotWithShape="1">
-          <a:blip r:embed="rId2">
-            <a:extLst>
-              <a:ext uri="{BEBA8EAE-BF5A-486C-A8C5-ECC9F3942E4B}">
-                <a14:imgProps xmlns:a14="http://schemas.microsoft.com/office/drawing/2010/main">
-                  <a14:imgLayer r:embed="rId3">
-                    <a14:imgEffect>
-                      <a14:saturation sat="0"/>
-                    </a14:imgEffect>
-                  </a14:imgLayer>
-                </a14:imgProps>
-              </a:ext>
-            </a:extLst>
-          </a:blip>
-          <a:srcRect l="20370" r="20370"/>
-          <a:stretch/>
-        </p:blipFill>
-        <p:spPr/>
-      </p:pic>
-      <p:sp>
-        <p:nvSpPr>
-          <p:cNvPr id="7" name="Slide Number Placeholder 6">
-            <a:extLst>
-              <a:ext uri="{FF2B5EF4-FFF2-40B4-BE49-F238E27FC236}">
-                <a16:creationId xmlns:a16="http://schemas.microsoft.com/office/drawing/2014/main" id="{F29F8048-1E86-48F4-B246-D2F8C54B7EB1}"/>
-              </a:ext>
-            </a:extLst>
-          </p:cNvPr>
-          <p:cNvSpPr>
-            <a:spLocks noGrp="1"/>
-          </p:cNvSpPr>
-          <p:nvPr>
-            <p:ph type="sldNum" sz="quarter" idx="12"/>
-          </p:nvPr>
-        </p:nvSpPr>
-        <p:spPr/>
-        <p:txBody>
-          <a:bodyPr/>
-          <a:lstStyle/>
-          <a:p>
-            <a:fld id="{8C2E478F-E849-4A8C-AF1F-CBCC78A7CBFA}" type="slidenum">
-              <a:rPr lang="en-US" smtClean="0"/>
-              <a:pPr/>
-              <a:t>11</a:t>
-            </a:fld>
-            <a:endParaRPr lang="en-US" dirty="0"/>
-          </a:p>
-        </p:txBody>
-      </p:sp>
-      <p:sp>
-        <p:nvSpPr>
-          <p:cNvPr id="4" name="Title 7">
-            <a:extLst>
-              <a:ext uri="{FF2B5EF4-FFF2-40B4-BE49-F238E27FC236}">
-                <a16:creationId xmlns:a16="http://schemas.microsoft.com/office/drawing/2014/main" id="{F2291068-0224-EF6B-2A86-DB0C6B5524C8}"/>
-              </a:ext>
-            </a:extLst>
-          </p:cNvPr>
-          <p:cNvSpPr>
-            <a:spLocks noGrp="1"/>
-          </p:cNvSpPr>
-          <p:nvPr>
-            <p:ph type="title"/>
-          </p:nvPr>
-        </p:nvSpPr>
-        <p:spPr>
-          <a:xfrm>
-            <a:off x="6248399" y="612040"/>
-            <a:ext cx="5897218" cy="884238"/>
-          </a:xfrm>
-        </p:spPr>
-        <p:txBody>
-          <a:bodyPr/>
-          <a:lstStyle/>
-          <a:p>
-            <a:pPr>
-              <a:lnSpc>
-                <a:spcPct val="100000"/>
-              </a:lnSpc>
-              <a:spcBef>
-                <a:spcPts val="0"/>
-              </a:spcBef>
-            </a:pPr>
-            <a:r>
-              <a:rPr lang="en-US" sz="4200" dirty="0"/>
-              <a:t>x</a:t>
-            </a:r>
-            <a:endParaRPr lang="en-US" dirty="0"/>
-          </a:p>
-        </p:txBody>
-      </p:sp>
-      <p:sp>
-        <p:nvSpPr>
-          <p:cNvPr id="6" name="Content Placeholder 8">
-            <a:extLst>
-              <a:ext uri="{FF2B5EF4-FFF2-40B4-BE49-F238E27FC236}">
-                <a16:creationId xmlns:a16="http://schemas.microsoft.com/office/drawing/2014/main" id="{6E51EA16-9204-E269-4012-77C371E99E28}"/>
-              </a:ext>
-            </a:extLst>
-          </p:cNvPr>
-          <p:cNvSpPr txBox="1">
-            <a:spLocks/>
-          </p:cNvSpPr>
-          <p:nvPr/>
-        </p:nvSpPr>
-        <p:spPr>
-          <a:xfrm>
-            <a:off x="6376956" y="2735802"/>
-            <a:ext cx="4516707" cy="3256625"/>
-          </a:xfrm>
-          <a:prstGeom prst="rect">
-            <a:avLst/>
-          </a:prstGeom>
-        </p:spPr>
-        <p:txBody>
-          <a:bodyPr>
-            <a:normAutofit/>
-          </a:bodyPr>
-          <a:lstStyle>
-            <a:lvl1pPr marL="228600" indent="-228600" algn="l" defTabSz="914400" rtl="0" eaLnBrk="1" latinLnBrk="0" hangingPunct="1">
-              <a:lnSpc>
-                <a:spcPct val="150000"/>
-              </a:lnSpc>
-              <a:spcBef>
-                <a:spcPts val="1000"/>
-              </a:spcBef>
-              <a:buFont typeface="Arial" panose="020B0604020202020204" pitchFamily="34" charset="0"/>
-              <a:buChar char="•"/>
-              <a:defRPr sz="1600" kern="1200">
-                <a:solidFill>
-                  <a:schemeClr val="tx1"/>
-                </a:solidFill>
-                <a:latin typeface="+mn-lt"/>
-                <a:ea typeface="+mn-ea"/>
-                <a:cs typeface="+mn-cs"/>
-              </a:defRPr>
-            </a:lvl1pPr>
-            <a:lvl2pPr marL="685800" indent="-228600" algn="l" defTabSz="914400" rtl="0" eaLnBrk="1" latinLnBrk="0" hangingPunct="1">
-              <a:lnSpc>
-                <a:spcPct val="150000"/>
-              </a:lnSpc>
-              <a:spcBef>
-                <a:spcPts val="500"/>
-              </a:spcBef>
-              <a:buFont typeface="Arial" panose="020B0604020202020204" pitchFamily="34" charset="0"/>
-              <a:buChar char="•"/>
-              <a:defRPr sz="1400" kern="1200">
-                <a:solidFill>
-                  <a:schemeClr val="tx1"/>
-                </a:solidFill>
-                <a:latin typeface="+mn-lt"/>
-                <a:ea typeface="+mn-ea"/>
-                <a:cs typeface="+mn-cs"/>
-              </a:defRPr>
-            </a:lvl2pPr>
-            <a:lvl3pPr marL="1143000" indent="-228600" algn="l" defTabSz="914400" rtl="0" eaLnBrk="1" latinLnBrk="0" hangingPunct="1">
-              <a:lnSpc>
-                <a:spcPct val="150000"/>
-              </a:lnSpc>
-              <a:spcBef>
-                <a:spcPts val="500"/>
-              </a:spcBef>
-              <a:buFont typeface="Arial" panose="020B0604020202020204" pitchFamily="34" charset="0"/>
-              <a:buChar char="•"/>
-              <a:defRPr sz="1400" kern="1200">
-                <a:solidFill>
-                  <a:schemeClr val="tx1"/>
-                </a:solidFill>
-                <a:latin typeface="+mn-lt"/>
-                <a:ea typeface="+mn-ea"/>
-                <a:cs typeface="+mn-cs"/>
-              </a:defRPr>
-            </a:lvl3pPr>
-            <a:lvl4pPr marL="1600200" indent="-228600" algn="l" defTabSz="914400" rtl="0" eaLnBrk="1" latinLnBrk="0" hangingPunct="1">
-              <a:lnSpc>
-                <a:spcPct val="150000"/>
-              </a:lnSpc>
-              <a:spcBef>
-                <a:spcPts val="500"/>
-              </a:spcBef>
-              <a:buFont typeface="Arial" panose="020B0604020202020204" pitchFamily="34" charset="0"/>
-              <a:buChar char="•"/>
-              <a:defRPr sz="1200" kern="1200">
-                <a:solidFill>
-                  <a:schemeClr val="tx1"/>
-                </a:solidFill>
-                <a:latin typeface="+mn-lt"/>
-                <a:ea typeface="+mn-ea"/>
-                <a:cs typeface="+mn-cs"/>
-              </a:defRPr>
-            </a:lvl4pPr>
-            <a:lvl5pPr marL="2057400" indent="-228600" algn="l" defTabSz="914400" rtl="0" eaLnBrk="1" latinLnBrk="0" hangingPunct="1">
-              <a:lnSpc>
-                <a:spcPct val="150000"/>
-              </a:lnSpc>
-              <a:spcBef>
-                <a:spcPts val="500"/>
-              </a:spcBef>
-              <a:buFont typeface="Arial" panose="020B0604020202020204" pitchFamily="34" charset="0"/>
-              <a:buChar char="•"/>
-              <a:defRPr sz="1200" kern="1200">
-                <a:solidFill>
-                  <a:schemeClr val="tx1"/>
-                </a:solidFill>
-                <a:latin typeface="+mn-lt"/>
-                <a:ea typeface="+mn-ea"/>
-                <a:cs typeface="+mn-cs"/>
-              </a:defRPr>
-            </a:lvl5pPr>
-            <a:lvl6pPr marL="2514600" indent="-228600" algn="l" defTabSz="914400" rtl="0" eaLnBrk="1" latinLnBrk="0" hangingPunct="1">
-              <a:lnSpc>
-                <a:spcPct val="90000"/>
-              </a:lnSpc>
-              <a:spcBef>
-                <a:spcPts val="500"/>
-              </a:spcBef>
-              <a:buFont typeface="Arial" panose="020B0604020202020204" pitchFamily="34" charset="0"/>
-              <a:buChar char="•"/>
-              <a:defRPr sz="1800" kern="1200">
-                <a:solidFill>
-                  <a:schemeClr val="tx1"/>
-                </a:solidFill>
-                <a:latin typeface="+mn-lt"/>
-                <a:ea typeface="+mn-ea"/>
-                <a:cs typeface="+mn-cs"/>
-              </a:defRPr>
-            </a:lvl6pPr>
-            <a:lvl7pPr marL="2971800" indent="-228600" algn="l" defTabSz="914400" rtl="0" eaLnBrk="1" latinLnBrk="0" hangingPunct="1">
-              <a:lnSpc>
-                <a:spcPct val="90000"/>
-              </a:lnSpc>
-              <a:spcBef>
-                <a:spcPts val="500"/>
-              </a:spcBef>
-              <a:buFont typeface="Arial" panose="020B0604020202020204" pitchFamily="34" charset="0"/>
-              <a:buChar char="•"/>
-              <a:defRPr sz="1800" kern="1200">
-                <a:solidFill>
-                  <a:schemeClr val="tx1"/>
-                </a:solidFill>
-                <a:latin typeface="+mn-lt"/>
-                <a:ea typeface="+mn-ea"/>
-                <a:cs typeface="+mn-cs"/>
-              </a:defRPr>
-            </a:lvl7pPr>
-            <a:lvl8pPr marL="3429000" indent="-228600" algn="l" defTabSz="914400" rtl="0" eaLnBrk="1" latinLnBrk="0" hangingPunct="1">
-              <a:lnSpc>
-                <a:spcPct val="90000"/>
-              </a:lnSpc>
-              <a:spcBef>
-                <a:spcPts val="500"/>
-              </a:spcBef>
-              <a:buFont typeface="Arial" panose="020B0604020202020204" pitchFamily="34" charset="0"/>
-              <a:buChar char="•"/>
-              <a:defRPr sz="1800" kern="1200">
-                <a:solidFill>
-                  <a:schemeClr val="tx1"/>
-                </a:solidFill>
-                <a:latin typeface="+mn-lt"/>
-                <a:ea typeface="+mn-ea"/>
-                <a:cs typeface="+mn-cs"/>
-              </a:defRPr>
-            </a:lvl8pPr>
-            <a:lvl9pPr marL="3886200" indent="-228600" algn="l" defTabSz="914400" rtl="0" eaLnBrk="1" latinLnBrk="0" hangingPunct="1">
-              <a:lnSpc>
-                <a:spcPct val="90000"/>
-              </a:lnSpc>
-              <a:spcBef>
-                <a:spcPts val="500"/>
-              </a:spcBef>
-              <a:buFont typeface="Arial" panose="020B0604020202020204" pitchFamily="34" charset="0"/>
-              <a:buChar char="•"/>
-              <a:defRPr sz="1800" kern="1200">
-                <a:solidFill>
-                  <a:schemeClr val="tx1"/>
-                </a:solidFill>
-                <a:latin typeface="+mn-lt"/>
-                <a:ea typeface="+mn-ea"/>
-                <a:cs typeface="+mn-cs"/>
-              </a:defRPr>
-            </a:lvl9pPr>
-          </a:lstStyle>
-          <a:p>
-            <a:pPr marL="0" indent="0">
-              <a:lnSpc>
-                <a:spcPct val="160000"/>
-              </a:lnSpc>
-              <a:buFont typeface="Arial" panose="020B0604020202020204" pitchFamily="34" charset="0"/>
-              <a:buNone/>
-            </a:pPr>
-            <a:r>
-              <a:rPr lang="en-US" sz="2400" cap="small" spc="50" dirty="0">
-                <a:cs typeface="Biome Light" panose="020B0303030204020804" pitchFamily="34" charset="0"/>
-              </a:rPr>
-              <a:t>x</a:t>
-            </a:r>
-            <a:endParaRPr lang="en-US" sz="2400" cap="small" spc="50" dirty="0"/>
-          </a:p>
-        </p:txBody>
-      </p:sp>
-      <p:sp>
-        <p:nvSpPr>
-          <p:cNvPr id="9" name="Slide Number Placeholder 3">
-            <a:extLst>
-              <a:ext uri="{FF2B5EF4-FFF2-40B4-BE49-F238E27FC236}">
-                <a16:creationId xmlns:a16="http://schemas.microsoft.com/office/drawing/2014/main" id="{D8295A10-673C-C4AC-7BC0-A44FA7E7DDDB}"/>
-              </a:ext>
-            </a:extLst>
-          </p:cNvPr>
-          <p:cNvSpPr txBox="1">
-            <a:spLocks/>
-          </p:cNvSpPr>
-          <p:nvPr/>
-        </p:nvSpPr>
-        <p:spPr>
-          <a:xfrm>
-            <a:off x="11701669" y="6620703"/>
-            <a:ext cx="443948" cy="365125"/>
-          </a:xfrm>
-          <a:prstGeom prst="rect">
-            <a:avLst/>
-          </a:prstGeom>
-        </p:spPr>
-        <p:txBody>
-          <a:bodyPr/>
-          <a:lstStyle>
-            <a:defPPr>
-              <a:defRPr lang="en-US"/>
-            </a:defPPr>
-            <a:lvl1pPr marL="0" algn="l" defTabSz="914400" rtl="0" eaLnBrk="1" latinLnBrk="0" hangingPunct="1">
-              <a:defRPr sz="1800" kern="1200">
-                <a:solidFill>
-                  <a:schemeClr val="tx1"/>
-                </a:solidFill>
-                <a:latin typeface="+mn-lt"/>
-                <a:ea typeface="+mn-ea"/>
-                <a:cs typeface="+mn-cs"/>
-              </a:defRPr>
-            </a:lvl1pPr>
-            <a:lvl2pPr marL="457200" algn="l" defTabSz="914400" rtl="0" eaLnBrk="1" latinLnBrk="0" hangingPunct="1">
-              <a:defRPr sz="1800" kern="1200">
-                <a:solidFill>
-                  <a:schemeClr val="tx1"/>
-                </a:solidFill>
-                <a:latin typeface="+mn-lt"/>
-                <a:ea typeface="+mn-ea"/>
-                <a:cs typeface="+mn-cs"/>
-              </a:defRPr>
-            </a:lvl2pPr>
-            <a:lvl3pPr marL="914400" algn="l" defTabSz="914400" rtl="0" eaLnBrk="1" latinLnBrk="0" hangingPunct="1">
-              <a:defRPr sz="1800" kern="1200">
-                <a:solidFill>
-                  <a:schemeClr val="tx1"/>
-                </a:solidFill>
-                <a:latin typeface="+mn-lt"/>
-                <a:ea typeface="+mn-ea"/>
-                <a:cs typeface="+mn-cs"/>
-              </a:defRPr>
-            </a:lvl3pPr>
-            <a:lvl4pPr marL="1371600" algn="l" defTabSz="914400" rtl="0" eaLnBrk="1" latinLnBrk="0" hangingPunct="1">
-              <a:defRPr sz="1800" kern="1200">
-                <a:solidFill>
-                  <a:schemeClr val="tx1"/>
-                </a:solidFill>
-                <a:latin typeface="+mn-lt"/>
-                <a:ea typeface="+mn-ea"/>
-                <a:cs typeface="+mn-cs"/>
-              </a:defRPr>
-            </a:lvl4pPr>
-            <a:lvl5pPr marL="1828800" algn="l" defTabSz="914400" rtl="0" eaLnBrk="1" latinLnBrk="0" hangingPunct="1">
-              <a:defRPr sz="1800" kern="1200">
-                <a:solidFill>
-                  <a:schemeClr val="tx1"/>
-                </a:solidFill>
-                <a:latin typeface="+mn-lt"/>
-                <a:ea typeface="+mn-ea"/>
-                <a:cs typeface="+mn-cs"/>
-              </a:defRPr>
-            </a:lvl5pPr>
-            <a:lvl6pPr marL="2286000" algn="l" defTabSz="914400" rtl="0" eaLnBrk="1" latinLnBrk="0" hangingPunct="1">
-              <a:defRPr sz="1800" kern="1200">
-                <a:solidFill>
-                  <a:schemeClr val="tx1"/>
-                </a:solidFill>
-                <a:latin typeface="+mn-lt"/>
-                <a:ea typeface="+mn-ea"/>
-                <a:cs typeface="+mn-cs"/>
-              </a:defRPr>
-            </a:lvl6pPr>
-            <a:lvl7pPr marL="2743200" algn="l" defTabSz="914400" rtl="0" eaLnBrk="1" latinLnBrk="0" hangingPunct="1">
-              <a:defRPr sz="1800" kern="1200">
-                <a:solidFill>
-                  <a:schemeClr val="tx1"/>
-                </a:solidFill>
-                <a:latin typeface="+mn-lt"/>
-                <a:ea typeface="+mn-ea"/>
-                <a:cs typeface="+mn-cs"/>
-              </a:defRPr>
-            </a:lvl7pPr>
-            <a:lvl8pPr marL="3200400" algn="l" defTabSz="914400" rtl="0" eaLnBrk="1" latinLnBrk="0" hangingPunct="1">
-              <a:defRPr sz="1800" kern="1200">
-                <a:solidFill>
-                  <a:schemeClr val="tx1"/>
-                </a:solidFill>
-                <a:latin typeface="+mn-lt"/>
-                <a:ea typeface="+mn-ea"/>
-                <a:cs typeface="+mn-cs"/>
-              </a:defRPr>
-            </a:lvl8pPr>
-            <a:lvl9pPr marL="3657600" algn="l" defTabSz="914400" rtl="0" eaLnBrk="1" latinLnBrk="0" hangingPunct="1">
-              <a:defRPr sz="1800" kern="1200">
-                <a:solidFill>
-                  <a:schemeClr val="tx1"/>
-                </a:solidFill>
-                <a:latin typeface="+mn-lt"/>
-                <a:ea typeface="+mn-ea"/>
-                <a:cs typeface="+mn-cs"/>
-              </a:defRPr>
-            </a:lvl9pPr>
-          </a:lstStyle>
-          <a:p>
-            <a:fld id="{8C2E478F-E849-4A8C-AF1F-CBCC78A7CBFA}" type="slidenum">
-              <a:rPr lang="en-US" smtClean="0"/>
-              <a:pPr/>
-              <a:t>11</a:t>
-            </a:fld>
-            <a:endParaRPr lang="en-US" dirty="0"/>
-          </a:p>
-        </p:txBody>
-      </p:sp>
-    </p:spTree>
-    <p:extLst>
-      <p:ext uri="{BB962C8B-B14F-4D97-AF65-F5344CB8AC3E}">
-        <p14:creationId xmlns:p14="http://schemas.microsoft.com/office/powerpoint/2010/main" val="1649098948"/>
-      </p:ext>
-    </p:extLst>
-  </p:cSld>
-  <p:clrMapOvr>
-    <a:masterClrMapping/>
-  </p:clrMapOvr>
-</p:sld>
-</file>
-
-<file path=ppt/slides/slide12.xml><?xml version="1.0" encoding="utf-8"?>
-<p:sld xmlns:a="http://schemas.openxmlformats.org/drawingml/2006/main" xmlns:r="http://schemas.openxmlformats.org/officeDocument/2006/relationships" xmlns:p="http://schemas.openxmlformats.org/presentationml/2006/main">
-  <p:cSld>
-    <p:spTree>
-      <p:nvGrpSpPr>
-        <p:cNvPr id="1" name=""/>
-        <p:cNvGrpSpPr/>
-        <p:nvPr/>
-      </p:nvGrpSpPr>
-      <p:grpSpPr>
-        <a:xfrm>
-          <a:off x="0" y="0"/>
-          <a:ext cx="0" cy="0"/>
-          <a:chOff x="0" y="0"/>
-          <a:chExt cx="0" cy="0"/>
-        </a:xfrm>
-      </p:grpSpPr>
       <p:sp>
         <p:nvSpPr>
           <p:cNvPr id="5" name="Text Placeholder 4">
@@ -6310,7 +5925,7 @@
           <a:p>
             <a:fld id="{8C2E478F-E849-4A8C-AF1F-CBCC78A7CBFA}" type="slidenum">
               <a:rPr lang="en-US" smtClean="0"/>
-              <a:t>12</a:t>
+              <a:t>11</a:t>
             </a:fld>
             <a:endParaRPr lang="en-US" dirty="0"/>
           </a:p>
@@ -6609,414 +6224,7 @@
 </p:sld>
 </file>
 
-<file path=ppt/slides/slide13.xml><?xml version="1.0" encoding="utf-8"?>
-<p:sld xmlns:a="http://schemas.openxmlformats.org/drawingml/2006/main" xmlns:r="http://schemas.openxmlformats.org/officeDocument/2006/relationships" xmlns:p="http://schemas.openxmlformats.org/presentationml/2006/main">
-  <p:cSld>
-    <p:spTree>
-      <p:nvGrpSpPr>
-        <p:cNvPr id="1" name=""/>
-        <p:cNvGrpSpPr/>
-        <p:nvPr/>
-      </p:nvGrpSpPr>
-      <p:grpSpPr>
-        <a:xfrm>
-          <a:off x="0" y="0"/>
-          <a:ext cx="0" cy="0"/>
-          <a:chOff x="0" y="0"/>
-          <a:chExt cx="0" cy="0"/>
-        </a:xfrm>
-      </p:grpSpPr>
-      <p:pic>
-        <p:nvPicPr>
-          <p:cNvPr id="9" name="Picture Placeholder 7" descr="abstract image">
-            <a:extLst>
-              <a:ext uri="{FF2B5EF4-FFF2-40B4-BE49-F238E27FC236}">
-                <a16:creationId xmlns:a16="http://schemas.microsoft.com/office/drawing/2014/main" id="{10C261F5-27E5-A8D9-57BF-8DCB0A00F6B1}"/>
-              </a:ext>
-            </a:extLst>
-          </p:cNvPr>
-          <p:cNvPicPr>
-            <a:picLocks noChangeAspect="1"/>
-          </p:cNvPicPr>
-          <p:nvPr/>
-        </p:nvPicPr>
-        <p:blipFill rotWithShape="1">
-          <a:blip r:embed="rId2">
-            <a:alphaModFix/>
-            <a:extLst>
-              <a:ext uri="{BEBA8EAE-BF5A-486C-A8C5-ECC9F3942E4B}">
-                <a14:imgProps xmlns:a14="http://schemas.microsoft.com/office/drawing/2010/main">
-                  <a14:imgLayer r:embed="rId3">
-                    <a14:imgEffect>
-                      <a14:saturation sat="0"/>
-                    </a14:imgEffect>
-                  </a14:imgLayer>
-                </a14:imgProps>
-              </a:ext>
-            </a:extLst>
-          </a:blip>
-          <a:srcRect l="54869" r="205"/>
-          <a:stretch/>
-        </p:blipFill>
-        <p:spPr>
-          <a:xfrm>
-            <a:off x="-1" y="0"/>
-            <a:ext cx="5477523" cy="6858000"/>
-          </a:xfrm>
-          <a:prstGeom prst="rect">
-            <a:avLst/>
-          </a:prstGeom>
-        </p:spPr>
-      </p:pic>
-      <p:sp>
-        <p:nvSpPr>
-          <p:cNvPr id="3" name="Title 2">
-            <a:extLst>
-              <a:ext uri="{FF2B5EF4-FFF2-40B4-BE49-F238E27FC236}">
-                <a16:creationId xmlns:a16="http://schemas.microsoft.com/office/drawing/2014/main" id="{1D24B42B-925B-494C-A986-BD85E8117E1E}"/>
-              </a:ext>
-            </a:extLst>
-          </p:cNvPr>
-          <p:cNvSpPr>
-            <a:spLocks noGrp="1"/>
-          </p:cNvSpPr>
-          <p:nvPr>
-            <p:ph type="title"/>
-          </p:nvPr>
-        </p:nvSpPr>
-        <p:spPr>
-          <a:xfrm>
-            <a:off x="6362330" y="411225"/>
-            <a:ext cx="5251450" cy="956373"/>
-          </a:xfrm>
-        </p:spPr>
-        <p:txBody>
-          <a:bodyPr anchor="t">
-            <a:normAutofit/>
-          </a:bodyPr>
-          <a:lstStyle/>
-          <a:p>
-            <a:r>
-              <a:rPr lang="en-US" sz="4800" dirty="0"/>
-              <a:t>x</a:t>
-            </a:r>
-          </a:p>
-        </p:txBody>
-      </p:sp>
-      <p:sp>
-        <p:nvSpPr>
-          <p:cNvPr id="5" name="Text Placeholder 4">
-            <a:extLst>
-              <a:ext uri="{FF2B5EF4-FFF2-40B4-BE49-F238E27FC236}">
-                <a16:creationId xmlns:a16="http://schemas.microsoft.com/office/drawing/2014/main" id="{AF9B872F-6332-408E-9135-B871F0C90C00}"/>
-              </a:ext>
-            </a:extLst>
-          </p:cNvPr>
-          <p:cNvSpPr>
-            <a:spLocks noGrp="1"/>
-          </p:cNvSpPr>
-          <p:nvPr>
-            <p:ph type="body" idx="1"/>
-          </p:nvPr>
-        </p:nvSpPr>
-        <p:spPr>
-          <a:xfrm>
-            <a:off x="6362330" y="2025552"/>
-            <a:ext cx="5829669" cy="365125"/>
-          </a:xfrm>
-        </p:spPr>
-        <p:txBody>
-          <a:bodyPr/>
-          <a:lstStyle/>
-          <a:p>
-            <a:r>
-              <a:rPr lang="en-US" spc="300" dirty="0"/>
-              <a:t> </a:t>
-            </a:r>
-          </a:p>
-        </p:txBody>
-      </p:sp>
-      <p:sp>
-        <p:nvSpPr>
-          <p:cNvPr id="2" name="Slide Number Placeholder 1">
-            <a:extLst>
-              <a:ext uri="{FF2B5EF4-FFF2-40B4-BE49-F238E27FC236}">
-                <a16:creationId xmlns:a16="http://schemas.microsoft.com/office/drawing/2014/main" id="{948DD8A0-BD53-4DBF-949B-0D64D12DADA9}"/>
-              </a:ext>
-            </a:extLst>
-          </p:cNvPr>
-          <p:cNvSpPr>
-            <a:spLocks noGrp="1"/>
-          </p:cNvSpPr>
-          <p:nvPr>
-            <p:ph type="sldNum" sz="quarter" idx="12"/>
-          </p:nvPr>
-        </p:nvSpPr>
-        <p:spPr/>
-        <p:txBody>
-          <a:bodyPr/>
-          <a:lstStyle/>
-          <a:p>
-            <a:fld id="{8C2E478F-E849-4A8C-AF1F-CBCC78A7CBFA}" type="slidenum">
-              <a:rPr lang="en-US" smtClean="0"/>
-              <a:t>13</a:t>
-            </a:fld>
-            <a:endParaRPr lang="en-US" dirty="0"/>
-          </a:p>
-        </p:txBody>
-      </p:sp>
-      <p:sp>
-        <p:nvSpPr>
-          <p:cNvPr id="6" name="Content Placeholder 8">
-            <a:extLst>
-              <a:ext uri="{FF2B5EF4-FFF2-40B4-BE49-F238E27FC236}">
-                <a16:creationId xmlns:a16="http://schemas.microsoft.com/office/drawing/2014/main" id="{3B4F2E0F-78BC-2FE8-4808-2A26179B55EA}"/>
-              </a:ext>
-            </a:extLst>
-          </p:cNvPr>
-          <p:cNvSpPr txBox="1">
-            <a:spLocks/>
-          </p:cNvSpPr>
-          <p:nvPr/>
-        </p:nvSpPr>
-        <p:spPr>
-          <a:xfrm>
-            <a:off x="6362330" y="2574543"/>
-            <a:ext cx="4646246" cy="3038482"/>
-          </a:xfrm>
-          <a:prstGeom prst="rect">
-            <a:avLst/>
-          </a:prstGeom>
-          <a:noFill/>
-        </p:spPr>
-        <p:txBody>
-          <a:bodyPr vert="horz" lIns="91440" tIns="45720" rIns="91440" bIns="45720" rtlCol="0" anchor="t">
-            <a:normAutofit/>
-          </a:bodyPr>
-          <a:lstStyle>
-            <a:defPPr>
-              <a:defRPr lang="en-US"/>
-            </a:defPPr>
-            <a:lvl1pPr indent="0">
-              <a:lnSpc>
-                <a:spcPct val="120000"/>
-              </a:lnSpc>
-              <a:spcBef>
-                <a:spcPts val="0"/>
-              </a:spcBef>
-              <a:buFont typeface="Arial" panose="020B0604020202020204" pitchFamily="34" charset="0"/>
-              <a:buNone/>
-              <a:defRPr sz="2400" cap="none" spc="0" baseline="0">
-                <a:solidFill>
-                  <a:sysClr val="windowText" lastClr="000000"/>
-                </a:solidFill>
-                <a:effectLst/>
-              </a:defRPr>
-            </a:lvl1pPr>
-            <a:lvl2pPr indent="0">
-              <a:lnSpc>
-                <a:spcPct val="150000"/>
-              </a:lnSpc>
-              <a:spcBef>
-                <a:spcPts val="500"/>
-              </a:spcBef>
-              <a:buFont typeface="Arial" panose="020B0604020202020204" pitchFamily="34" charset="0"/>
-              <a:buNone/>
-              <a:defRPr sz="2000">
-                <a:solidFill>
-                  <a:schemeClr val="tx1">
-                    <a:tint val="75000"/>
-                  </a:schemeClr>
-                </a:solidFill>
-              </a:defRPr>
-            </a:lvl2pPr>
-            <a:lvl3pPr indent="0">
-              <a:lnSpc>
-                <a:spcPct val="150000"/>
-              </a:lnSpc>
-              <a:spcBef>
-                <a:spcPts val="500"/>
-              </a:spcBef>
-              <a:buFont typeface="Arial" panose="020B0604020202020204" pitchFamily="34" charset="0"/>
-              <a:buNone/>
-              <a:defRPr>
-                <a:solidFill>
-                  <a:schemeClr val="tx1">
-                    <a:tint val="75000"/>
-                  </a:schemeClr>
-                </a:solidFill>
-              </a:defRPr>
-            </a:lvl3pPr>
-            <a:lvl4pPr indent="0">
-              <a:lnSpc>
-                <a:spcPct val="150000"/>
-              </a:lnSpc>
-              <a:spcBef>
-                <a:spcPts val="500"/>
-              </a:spcBef>
-              <a:buFont typeface="Arial" panose="020B0604020202020204" pitchFamily="34" charset="0"/>
-              <a:buNone/>
-              <a:defRPr sz="1600">
-                <a:solidFill>
-                  <a:schemeClr val="tx1">
-                    <a:tint val="75000"/>
-                  </a:schemeClr>
-                </a:solidFill>
-              </a:defRPr>
-            </a:lvl4pPr>
-            <a:lvl5pPr indent="0">
-              <a:lnSpc>
-                <a:spcPct val="150000"/>
-              </a:lnSpc>
-              <a:spcBef>
-                <a:spcPts val="500"/>
-              </a:spcBef>
-              <a:buFont typeface="Arial" panose="020B0604020202020204" pitchFamily="34" charset="0"/>
-              <a:buNone/>
-              <a:defRPr sz="1600">
-                <a:solidFill>
-                  <a:schemeClr val="tx1">
-                    <a:tint val="75000"/>
-                  </a:schemeClr>
-                </a:solidFill>
-              </a:defRPr>
-            </a:lvl5pPr>
-            <a:lvl6pPr indent="0">
-              <a:lnSpc>
-                <a:spcPct val="90000"/>
-              </a:lnSpc>
-              <a:spcBef>
-                <a:spcPts val="500"/>
-              </a:spcBef>
-              <a:buFont typeface="Arial" panose="020B0604020202020204" pitchFamily="34" charset="0"/>
-              <a:buNone/>
-              <a:defRPr sz="1600">
-                <a:solidFill>
-                  <a:schemeClr val="tx1">
-                    <a:tint val="75000"/>
-                  </a:schemeClr>
-                </a:solidFill>
-              </a:defRPr>
-            </a:lvl6pPr>
-            <a:lvl7pPr indent="0">
-              <a:lnSpc>
-                <a:spcPct val="90000"/>
-              </a:lnSpc>
-              <a:spcBef>
-                <a:spcPts val="500"/>
-              </a:spcBef>
-              <a:buFont typeface="Arial" panose="020B0604020202020204" pitchFamily="34" charset="0"/>
-              <a:buNone/>
-              <a:defRPr sz="1600">
-                <a:solidFill>
-                  <a:schemeClr val="tx1">
-                    <a:tint val="75000"/>
-                  </a:schemeClr>
-                </a:solidFill>
-              </a:defRPr>
-            </a:lvl7pPr>
-            <a:lvl8pPr indent="0">
-              <a:lnSpc>
-                <a:spcPct val="90000"/>
-              </a:lnSpc>
-              <a:spcBef>
-                <a:spcPts val="500"/>
-              </a:spcBef>
-              <a:buFont typeface="Arial" panose="020B0604020202020204" pitchFamily="34" charset="0"/>
-              <a:buNone/>
-              <a:defRPr sz="1600">
-                <a:solidFill>
-                  <a:schemeClr val="tx1">
-                    <a:tint val="75000"/>
-                  </a:schemeClr>
-                </a:solidFill>
-              </a:defRPr>
-            </a:lvl8pPr>
-            <a:lvl9pPr indent="0">
-              <a:lnSpc>
-                <a:spcPct val="90000"/>
-              </a:lnSpc>
-              <a:spcBef>
-                <a:spcPts val="500"/>
-              </a:spcBef>
-              <a:buFont typeface="Arial" panose="020B0604020202020204" pitchFamily="34" charset="0"/>
-              <a:buNone/>
-              <a:defRPr sz="1600">
-                <a:solidFill>
-                  <a:schemeClr val="tx1">
-                    <a:tint val="75000"/>
-                  </a:schemeClr>
-                </a:solidFill>
-              </a:defRPr>
-            </a:lvl9pPr>
-          </a:lstStyle>
-          <a:p>
-            <a:pPr marL="342900" indent="-342900">
-              <a:buFont typeface="Arial" panose="020B0604020202020204" pitchFamily="34" charset="0"/>
-              <a:buChar char="•"/>
-            </a:pPr>
-            <a:r>
-              <a:rPr lang="en-US" dirty="0" err="1"/>
-              <a:t>VSCode</a:t>
-            </a:r>
-            <a:r>
-              <a:rPr lang="en-US" dirty="0"/>
-              <a:t> IDE</a:t>
-            </a:r>
-          </a:p>
-          <a:p>
-            <a:pPr marL="342900" indent="-342900">
-              <a:buFont typeface="Arial" panose="020B0604020202020204" pitchFamily="34" charset="0"/>
-              <a:buChar char="•"/>
-            </a:pPr>
-            <a:r>
-              <a:rPr lang="en-US" dirty="0"/>
-              <a:t>Python 3.11.8</a:t>
-            </a:r>
-          </a:p>
-          <a:p>
-            <a:pPr marL="342900" indent="-342900">
-              <a:buFont typeface="Arial" panose="020B0604020202020204" pitchFamily="34" charset="0"/>
-              <a:buChar char="•"/>
-            </a:pPr>
-            <a:r>
-              <a:rPr lang="en-US" dirty="0"/>
-              <a:t>Django</a:t>
-            </a:r>
-          </a:p>
-          <a:p>
-            <a:pPr marL="342900" indent="-342900">
-              <a:buFont typeface="Arial" panose="020B0604020202020204" pitchFamily="34" charset="0"/>
-              <a:buChar char="•"/>
-            </a:pPr>
-            <a:r>
-              <a:rPr lang="en-US" b="0" i="0" dirty="0">
-                <a:solidFill>
-                  <a:srgbClr val="1D1C1D"/>
-                </a:solidFill>
-                <a:effectLst/>
-                <a:latin typeface="Slack-Lato"/>
-              </a:rPr>
-              <a:t>PostgreSQL</a:t>
-            </a:r>
-            <a:endParaRPr lang="en-US" dirty="0"/>
-          </a:p>
-        </p:txBody>
-      </p:sp>
-    </p:spTree>
-    <p:extLst>
-      <p:ext uri="{BB962C8B-B14F-4D97-AF65-F5344CB8AC3E}">
-        <p14:creationId xmlns:p14="http://schemas.microsoft.com/office/powerpoint/2010/main" val="2441627795"/>
-      </p:ext>
-    </p:extLst>
-  </p:cSld>
-  <p:clrMapOvr>
-    <a:masterClrMapping/>
-  </p:clrMapOvr>
-</p:sld>
-</file>
-
-<file path=ppt/slides/slide14.xml><?xml version="1.0" encoding="utf-8"?>
+<file path=ppt/slides/slide12.xml><?xml version="1.0" encoding="utf-8"?>
 <p:sld xmlns:a="http://schemas.openxmlformats.org/drawingml/2006/main" xmlns:r="http://schemas.openxmlformats.org/officeDocument/2006/relationships" xmlns:p="http://schemas.openxmlformats.org/presentationml/2006/main">
   <p:cSld>
     <p:spTree>
@@ -7975,7 +7183,7 @@
           <a:p>
             <a:fld id="{8C2E478F-E849-4A8C-AF1F-CBCC78A7CBFA}" type="slidenum">
               <a:rPr lang="en-US" smtClean="0"/>
-              <a:t>14</a:t>
+              <a:t>12</a:t>
             </a:fld>
             <a:endParaRPr lang="en-US" dirty="0"/>
           </a:p>
@@ -7994,7 +7202,7 @@
 </p:sld>
 </file>
 
-<file path=ppt/slides/slide15.xml><?xml version="1.0" encoding="utf-8"?>
+<file path=ppt/slides/slide13.xml><?xml version="1.0" encoding="utf-8"?>
 <p:sld xmlns:a="http://schemas.openxmlformats.org/drawingml/2006/main" xmlns:r="http://schemas.openxmlformats.org/officeDocument/2006/relationships" xmlns:p="http://schemas.openxmlformats.org/presentationml/2006/main">
   <p:cSld>
     <p:bg>
@@ -8962,6 +8170,499 @@
   <p:cSld>
     <p:spTree>
       <p:nvGrpSpPr>
+        <p:cNvPr id="1" name=""/>
+        <p:cNvGrpSpPr/>
+        <p:nvPr/>
+      </p:nvGrpSpPr>
+      <p:grpSpPr>
+        <a:xfrm>
+          <a:off x="0" y="0"/>
+          <a:ext cx="0" cy="0"/>
+          <a:chOff x="0" y="0"/>
+          <a:chExt cx="0" cy="0"/>
+        </a:xfrm>
+      </p:grpSpPr>
+      <p:sp>
+        <p:nvSpPr>
+          <p:cNvPr id="3" name="Title 2">
+            <a:extLst>
+              <a:ext uri="{FF2B5EF4-FFF2-40B4-BE49-F238E27FC236}">
+                <a16:creationId xmlns:a16="http://schemas.microsoft.com/office/drawing/2014/main" id="{1D24B42B-925B-494C-A986-BD85E8117E1E}"/>
+              </a:ext>
+            </a:extLst>
+          </p:cNvPr>
+          <p:cNvSpPr>
+            <a:spLocks noGrp="1"/>
+          </p:cNvSpPr>
+          <p:nvPr>
+            <p:ph type="title"/>
+          </p:nvPr>
+        </p:nvSpPr>
+        <p:spPr>
+          <a:xfrm>
+            <a:off x="6362331" y="401907"/>
+            <a:ext cx="5251450" cy="1661297"/>
+          </a:xfrm>
+        </p:spPr>
+        <p:txBody>
+          <a:bodyPr anchor="t">
+            <a:normAutofit/>
+          </a:bodyPr>
+          <a:lstStyle/>
+          <a:p>
+            <a:r>
+              <a:rPr lang="en-US" sz="4200" dirty="0"/>
+              <a:t>x</a:t>
+            </a:r>
+            <a:endParaRPr lang="en-US" dirty="0"/>
+          </a:p>
+        </p:txBody>
+      </p:sp>
+      <p:sp>
+        <p:nvSpPr>
+          <p:cNvPr id="5" name="Text Placeholder 4">
+            <a:extLst>
+              <a:ext uri="{FF2B5EF4-FFF2-40B4-BE49-F238E27FC236}">
+                <a16:creationId xmlns:a16="http://schemas.microsoft.com/office/drawing/2014/main" id="{AF9B872F-6332-408E-9135-B871F0C90C00}"/>
+              </a:ext>
+            </a:extLst>
+          </p:cNvPr>
+          <p:cNvSpPr>
+            <a:spLocks noGrp="1"/>
+          </p:cNvSpPr>
+          <p:nvPr>
+            <p:ph type="body" idx="1"/>
+          </p:nvPr>
+        </p:nvSpPr>
+        <p:spPr>
+          <a:xfrm>
+            <a:off x="6362329" y="1822370"/>
+            <a:ext cx="5829669" cy="365125"/>
+          </a:xfrm>
+        </p:spPr>
+        <p:txBody>
+          <a:bodyPr/>
+          <a:lstStyle/>
+          <a:p>
+            <a:r>
+              <a:rPr lang="en-US" spc="300" dirty="0"/>
+              <a:t> </a:t>
+            </a:r>
+          </a:p>
+        </p:txBody>
+      </p:sp>
+      <p:sp>
+        <p:nvSpPr>
+          <p:cNvPr id="2" name="Slide Number Placeholder 1">
+            <a:extLst>
+              <a:ext uri="{FF2B5EF4-FFF2-40B4-BE49-F238E27FC236}">
+                <a16:creationId xmlns:a16="http://schemas.microsoft.com/office/drawing/2014/main" id="{948DD8A0-BD53-4DBF-949B-0D64D12DADA9}"/>
+              </a:ext>
+            </a:extLst>
+          </p:cNvPr>
+          <p:cNvSpPr>
+            <a:spLocks noGrp="1"/>
+          </p:cNvSpPr>
+          <p:nvPr>
+            <p:ph type="sldNum" sz="quarter" idx="12"/>
+          </p:nvPr>
+        </p:nvSpPr>
+        <p:spPr/>
+        <p:txBody>
+          <a:bodyPr/>
+          <a:lstStyle/>
+          <a:p>
+            <a:fld id="{8C2E478F-E849-4A8C-AF1F-CBCC78A7CBFA}" type="slidenum">
+              <a:rPr lang="en-US" smtClean="0"/>
+              <a:t>7</a:t>
+            </a:fld>
+            <a:endParaRPr lang="en-US" dirty="0"/>
+          </a:p>
+        </p:txBody>
+      </p:sp>
+      <p:sp>
+        <p:nvSpPr>
+          <p:cNvPr id="6" name="Content Placeholder 8">
+            <a:extLst>
+              <a:ext uri="{FF2B5EF4-FFF2-40B4-BE49-F238E27FC236}">
+                <a16:creationId xmlns:a16="http://schemas.microsoft.com/office/drawing/2014/main" id="{3B4F2E0F-78BC-2FE8-4808-2A26179B55EA}"/>
+              </a:ext>
+            </a:extLst>
+          </p:cNvPr>
+          <p:cNvSpPr txBox="1">
+            <a:spLocks/>
+          </p:cNvSpPr>
+          <p:nvPr/>
+        </p:nvSpPr>
+        <p:spPr>
+          <a:xfrm>
+            <a:off x="6362330" y="2432483"/>
+            <a:ext cx="5517781" cy="3764132"/>
+          </a:xfrm>
+          <a:prstGeom prst="rect">
+            <a:avLst/>
+          </a:prstGeom>
+          <a:noFill/>
+        </p:spPr>
+        <p:txBody>
+          <a:bodyPr vert="horz" lIns="91440" tIns="45720" rIns="91440" bIns="45720" rtlCol="0" anchor="t">
+            <a:normAutofit fontScale="92500" lnSpcReduction="10000"/>
+          </a:bodyPr>
+          <a:lstStyle>
+            <a:defPPr>
+              <a:defRPr lang="en-US"/>
+            </a:defPPr>
+            <a:lvl1pPr indent="0">
+              <a:lnSpc>
+                <a:spcPct val="120000"/>
+              </a:lnSpc>
+              <a:spcBef>
+                <a:spcPts val="0"/>
+              </a:spcBef>
+              <a:buFont typeface="Arial" panose="020B0604020202020204" pitchFamily="34" charset="0"/>
+              <a:buNone/>
+              <a:defRPr sz="2400" cap="none" spc="0" baseline="0">
+                <a:solidFill>
+                  <a:sysClr val="windowText" lastClr="000000"/>
+                </a:solidFill>
+                <a:effectLst/>
+              </a:defRPr>
+            </a:lvl1pPr>
+            <a:lvl2pPr indent="0">
+              <a:lnSpc>
+                <a:spcPct val="150000"/>
+              </a:lnSpc>
+              <a:spcBef>
+                <a:spcPts val="500"/>
+              </a:spcBef>
+              <a:buFont typeface="Arial" panose="020B0604020202020204" pitchFamily="34" charset="0"/>
+              <a:buNone/>
+              <a:defRPr sz="2000">
+                <a:solidFill>
+                  <a:schemeClr val="tx1">
+                    <a:tint val="75000"/>
+                  </a:schemeClr>
+                </a:solidFill>
+              </a:defRPr>
+            </a:lvl2pPr>
+            <a:lvl3pPr indent="0">
+              <a:lnSpc>
+                <a:spcPct val="150000"/>
+              </a:lnSpc>
+              <a:spcBef>
+                <a:spcPts val="500"/>
+              </a:spcBef>
+              <a:buFont typeface="Arial" panose="020B0604020202020204" pitchFamily="34" charset="0"/>
+              <a:buNone/>
+              <a:defRPr>
+                <a:solidFill>
+                  <a:schemeClr val="tx1">
+                    <a:tint val="75000"/>
+                  </a:schemeClr>
+                </a:solidFill>
+              </a:defRPr>
+            </a:lvl3pPr>
+            <a:lvl4pPr indent="0">
+              <a:lnSpc>
+                <a:spcPct val="150000"/>
+              </a:lnSpc>
+              <a:spcBef>
+                <a:spcPts val="500"/>
+              </a:spcBef>
+              <a:buFont typeface="Arial" panose="020B0604020202020204" pitchFamily="34" charset="0"/>
+              <a:buNone/>
+              <a:defRPr sz="1600">
+                <a:solidFill>
+                  <a:schemeClr val="tx1">
+                    <a:tint val="75000"/>
+                  </a:schemeClr>
+                </a:solidFill>
+              </a:defRPr>
+            </a:lvl4pPr>
+            <a:lvl5pPr indent="0">
+              <a:lnSpc>
+                <a:spcPct val="150000"/>
+              </a:lnSpc>
+              <a:spcBef>
+                <a:spcPts val="500"/>
+              </a:spcBef>
+              <a:buFont typeface="Arial" panose="020B0604020202020204" pitchFamily="34" charset="0"/>
+              <a:buNone/>
+              <a:defRPr sz="1600">
+                <a:solidFill>
+                  <a:schemeClr val="tx1">
+                    <a:tint val="75000"/>
+                  </a:schemeClr>
+                </a:solidFill>
+              </a:defRPr>
+            </a:lvl5pPr>
+            <a:lvl6pPr indent="0">
+              <a:lnSpc>
+                <a:spcPct val="90000"/>
+              </a:lnSpc>
+              <a:spcBef>
+                <a:spcPts val="500"/>
+              </a:spcBef>
+              <a:buFont typeface="Arial" panose="020B0604020202020204" pitchFamily="34" charset="0"/>
+              <a:buNone/>
+              <a:defRPr sz="1600">
+                <a:solidFill>
+                  <a:schemeClr val="tx1">
+                    <a:tint val="75000"/>
+                  </a:schemeClr>
+                </a:solidFill>
+              </a:defRPr>
+            </a:lvl6pPr>
+            <a:lvl7pPr indent="0">
+              <a:lnSpc>
+                <a:spcPct val="90000"/>
+              </a:lnSpc>
+              <a:spcBef>
+                <a:spcPts val="500"/>
+              </a:spcBef>
+              <a:buFont typeface="Arial" panose="020B0604020202020204" pitchFamily="34" charset="0"/>
+              <a:buNone/>
+              <a:defRPr sz="1600">
+                <a:solidFill>
+                  <a:schemeClr val="tx1">
+                    <a:tint val="75000"/>
+                  </a:schemeClr>
+                </a:solidFill>
+              </a:defRPr>
+            </a:lvl7pPr>
+            <a:lvl8pPr indent="0">
+              <a:lnSpc>
+                <a:spcPct val="90000"/>
+              </a:lnSpc>
+              <a:spcBef>
+                <a:spcPts val="500"/>
+              </a:spcBef>
+              <a:buFont typeface="Arial" panose="020B0604020202020204" pitchFamily="34" charset="0"/>
+              <a:buNone/>
+              <a:defRPr sz="1600">
+                <a:solidFill>
+                  <a:schemeClr val="tx1">
+                    <a:tint val="75000"/>
+                  </a:schemeClr>
+                </a:solidFill>
+              </a:defRPr>
+            </a:lvl8pPr>
+            <a:lvl9pPr indent="0">
+              <a:lnSpc>
+                <a:spcPct val="90000"/>
+              </a:lnSpc>
+              <a:spcBef>
+                <a:spcPts val="500"/>
+              </a:spcBef>
+              <a:buFont typeface="Arial" panose="020B0604020202020204" pitchFamily="34" charset="0"/>
+              <a:buNone/>
+              <a:defRPr sz="1600">
+                <a:solidFill>
+                  <a:schemeClr val="tx1">
+                    <a:tint val="75000"/>
+                  </a:schemeClr>
+                </a:solidFill>
+              </a:defRPr>
+            </a:lvl9pPr>
+          </a:lstStyle>
+          <a:p>
+            <a:pPr marL="342900" indent="-342900">
+              <a:spcBef>
+                <a:spcPts val="1200"/>
+              </a:spcBef>
+              <a:buFont typeface="Arial" panose="020B0604020202020204" pitchFamily="34" charset="0"/>
+              <a:buChar char="•"/>
+            </a:pPr>
+            <a:r>
+              <a:rPr lang="en-US" dirty="0"/>
+              <a:t>Landing page with account creation</a:t>
+            </a:r>
+          </a:p>
+          <a:p>
+            <a:pPr marL="342900" indent="-342900">
+              <a:spcBef>
+                <a:spcPts val="1200"/>
+              </a:spcBef>
+              <a:buFont typeface="Arial" panose="020B0604020202020204" pitchFamily="34" charset="0"/>
+              <a:buChar char="•"/>
+            </a:pPr>
+            <a:r>
+              <a:rPr lang="en-US" dirty="0"/>
+              <a:t>Picture upload screen</a:t>
+            </a:r>
+          </a:p>
+          <a:p>
+            <a:pPr marL="342900" indent="-342900">
+              <a:spcBef>
+                <a:spcPts val="1200"/>
+              </a:spcBef>
+              <a:buFont typeface="Arial" panose="020B0604020202020204" pitchFamily="34" charset="0"/>
+              <a:buChar char="•"/>
+            </a:pPr>
+            <a:r>
+              <a:rPr lang="en-US" dirty="0"/>
+              <a:t>Picture recognition response</a:t>
+            </a:r>
+          </a:p>
+          <a:p>
+            <a:pPr marL="342900" indent="-342900">
+              <a:spcBef>
+                <a:spcPts val="1200"/>
+              </a:spcBef>
+              <a:buFont typeface="Arial" panose="020B0604020202020204" pitchFamily="34" charset="0"/>
+              <a:buChar char="•"/>
+            </a:pPr>
+            <a:r>
+              <a:rPr lang="en-US" dirty="0"/>
+              <a:t>Name suggestions from designated databases based on the animal and obvious features</a:t>
+            </a:r>
+          </a:p>
+          <a:p>
+            <a:pPr marL="342900" indent="-342900">
+              <a:spcBef>
+                <a:spcPts val="1200"/>
+              </a:spcBef>
+              <a:buFont typeface="Arial" panose="020B0604020202020204" pitchFamily="34" charset="0"/>
+              <a:buChar char="•"/>
+            </a:pPr>
+            <a:r>
+              <a:rPr lang="en-US" dirty="0"/>
+              <a:t>Ability to save favorite names to account database</a:t>
+            </a:r>
+          </a:p>
+        </p:txBody>
+      </p:sp>
+      <p:pic>
+        <p:nvPicPr>
+          <p:cNvPr id="4" name="Picture Placeholder 7" descr="close up of computer code">
+            <a:extLst>
+              <a:ext uri="{FF2B5EF4-FFF2-40B4-BE49-F238E27FC236}">
+                <a16:creationId xmlns:a16="http://schemas.microsoft.com/office/drawing/2014/main" id="{EFC42499-7A07-6EF5-2A4A-AD93E002BC94}"/>
+              </a:ext>
+            </a:extLst>
+          </p:cNvPr>
+          <p:cNvPicPr>
+            <a:picLocks noChangeAspect="1"/>
+          </p:cNvPicPr>
+          <p:nvPr/>
+        </p:nvPicPr>
+        <p:blipFill rotWithShape="1">
+          <a:blip r:embed="rId2">
+            <a:extLst>
+              <a:ext uri="{BEBA8EAE-BF5A-486C-A8C5-ECC9F3942E4B}">
+                <a14:imgProps xmlns:a14="http://schemas.microsoft.com/office/drawing/2010/main">
+                  <a14:imgLayer r:embed="rId3">
+                    <a14:imgEffect>
+                      <a14:saturation sat="0"/>
+                    </a14:imgEffect>
+                  </a14:imgLayer>
+                </a14:imgProps>
+              </a:ext>
+            </a:extLst>
+          </a:blip>
+          <a:srcRect l="20370" r="20370"/>
+          <a:stretch/>
+        </p:blipFill>
+        <p:spPr>
+          <a:xfrm>
+            <a:off x="0" y="0"/>
+            <a:ext cx="6096000" cy="6867922"/>
+          </a:xfrm>
+          <a:custGeom>
+            <a:avLst/>
+            <a:gdLst>
+              <a:gd name="connsiteX0" fmla="*/ 0 w 6096000"/>
+              <a:gd name="connsiteY0" fmla="*/ 0 h 6858000"/>
+              <a:gd name="connsiteX1" fmla="*/ 6096000 w 6096000"/>
+              <a:gd name="connsiteY1" fmla="*/ 0 h 6858000"/>
+              <a:gd name="connsiteX2" fmla="*/ 6096000 w 6096000"/>
+              <a:gd name="connsiteY2" fmla="*/ 6858000 h 6858000"/>
+              <a:gd name="connsiteX3" fmla="*/ 0 w 6096000"/>
+              <a:gd name="connsiteY3" fmla="*/ 6858000 h 6858000"/>
+              <a:gd name="connsiteX4" fmla="*/ 0 w 6096000"/>
+              <a:gd name="connsiteY4" fmla="*/ 0 h 6858000"/>
+              <a:gd name="connsiteX0" fmla="*/ 0 w 6096000"/>
+              <a:gd name="connsiteY0" fmla="*/ 0 h 6858000"/>
+              <a:gd name="connsiteX1" fmla="*/ 6096000 w 6096000"/>
+              <a:gd name="connsiteY1" fmla="*/ 0 h 6858000"/>
+              <a:gd name="connsiteX2" fmla="*/ 4242487 w 6096000"/>
+              <a:gd name="connsiteY2" fmla="*/ 6833286 h 6858000"/>
+              <a:gd name="connsiteX3" fmla="*/ 0 w 6096000"/>
+              <a:gd name="connsiteY3" fmla="*/ 6858000 h 6858000"/>
+              <a:gd name="connsiteX4" fmla="*/ 0 w 6096000"/>
+              <a:gd name="connsiteY4" fmla="*/ 0 h 6858000"/>
+              <a:gd name="connsiteX0" fmla="*/ 0 w 6096000"/>
+              <a:gd name="connsiteY0" fmla="*/ 0 h 6867922"/>
+              <a:gd name="connsiteX1" fmla="*/ 6096000 w 6096000"/>
+              <a:gd name="connsiteY1" fmla="*/ 0 h 6867922"/>
+              <a:gd name="connsiteX2" fmla="*/ 4228633 w 6096000"/>
+              <a:gd name="connsiteY2" fmla="*/ 6867922 h 6867922"/>
+              <a:gd name="connsiteX3" fmla="*/ 0 w 6096000"/>
+              <a:gd name="connsiteY3" fmla="*/ 6858000 h 6867922"/>
+              <a:gd name="connsiteX4" fmla="*/ 0 w 6096000"/>
+              <a:gd name="connsiteY4" fmla="*/ 0 h 6867922"/>
+            </a:gdLst>
+            <a:ahLst/>
+            <a:cxnLst>
+              <a:cxn ang="0">
+                <a:pos x="connsiteX0" y="connsiteY0"/>
+              </a:cxn>
+              <a:cxn ang="0">
+                <a:pos x="connsiteX1" y="connsiteY1"/>
+              </a:cxn>
+              <a:cxn ang="0">
+                <a:pos x="connsiteX2" y="connsiteY2"/>
+              </a:cxn>
+              <a:cxn ang="0">
+                <a:pos x="connsiteX3" y="connsiteY3"/>
+              </a:cxn>
+              <a:cxn ang="0">
+                <a:pos x="connsiteX4" y="connsiteY4"/>
+              </a:cxn>
+            </a:cxnLst>
+            <a:rect l="l" t="t" r="r" b="b"/>
+            <a:pathLst>
+              <a:path w="6096000" h="6867922">
+                <a:moveTo>
+                  <a:pt x="0" y="0"/>
+                </a:moveTo>
+                <a:lnTo>
+                  <a:pt x="6096000" y="0"/>
+                </a:lnTo>
+                <a:lnTo>
+                  <a:pt x="4228633" y="6867922"/>
+                </a:lnTo>
+                <a:lnTo>
+                  <a:pt x="0" y="6858000"/>
+                </a:lnTo>
+                <a:lnTo>
+                  <a:pt x="0" y="0"/>
+                </a:lnTo>
+                <a:close/>
+              </a:path>
+            </a:pathLst>
+          </a:custGeom>
+          <a:effectLst/>
+        </p:spPr>
+      </p:pic>
+    </p:spTree>
+    <p:extLst>
+      <p:ext uri="{BB962C8B-B14F-4D97-AF65-F5344CB8AC3E}">
+        <p14:creationId xmlns:p14="http://schemas.microsoft.com/office/powerpoint/2010/main" val="4094892012"/>
+      </p:ext>
+    </p:extLst>
+  </p:cSld>
+  <p:clrMapOvr>
+    <a:masterClrMapping/>
+  </p:clrMapOvr>
+</p:sld>
+</file>
+
+<file path=ppt/slides/slide8.xml><?xml version="1.0" encoding="utf-8"?>
+<p:sld xmlns:a="http://schemas.openxmlformats.org/drawingml/2006/main" xmlns:r="http://schemas.openxmlformats.org/officeDocument/2006/relationships" xmlns:p="http://schemas.openxmlformats.org/presentationml/2006/main">
+  <p:cSld>
+    <p:spTree>
+      <p:nvGrpSpPr>
         <p:cNvPr id="1" name="">
           <a:extLst>
             <a:ext uri="{FF2B5EF4-FFF2-40B4-BE49-F238E27FC236}">
@@ -9052,7 +8753,7 @@
           <a:p>
             <a:r>
               <a:rPr lang="en-US" sz="4800" dirty="0"/>
-              <a:t>USER INTERFACE</a:t>
+              <a:t>x</a:t>
             </a:r>
           </a:p>
         </p:txBody>
@@ -9113,7 +8814,7 @@
           <a:p>
             <a:fld id="{8C2E478F-E849-4A8C-AF1F-CBCC78A7CBFA}" type="slidenum">
               <a:rPr lang="en-US" smtClean="0"/>
-              <a:t>7</a:t>
+              <a:t>8</a:t>
             </a:fld>
             <a:endParaRPr lang="en-US" dirty="0"/>
           </a:p>
@@ -9336,7 +9037,7 @@
 </p:sld>
 </file>
 
-<file path=ppt/slides/slide8.xml><?xml version="1.0" encoding="utf-8"?>
+<file path=ppt/slides/slide9.xml><?xml version="1.0" encoding="utf-8"?>
 <p:sld xmlns:a="http://schemas.openxmlformats.org/drawingml/2006/main" xmlns:r="http://schemas.openxmlformats.org/officeDocument/2006/relationships" xmlns:p="http://schemas.openxmlformats.org/presentationml/2006/main">
   <p:cSld>
     <p:spTree>
@@ -9353,26 +9054,68 @@
           <a:chExt cx="0" cy="0"/>
         </a:xfrm>
       </p:grpSpPr>
-      <p:sp>
-        <p:nvSpPr>
-          <p:cNvPr id="3" name="Title 2">
-            <a:extLst>
-              <a:ext uri="{FF2B5EF4-FFF2-40B4-BE49-F238E27FC236}">
-                <a16:creationId xmlns:a16="http://schemas.microsoft.com/office/drawing/2014/main" id="{1D24B42B-925B-494C-A986-BD85E8117E1E}"/>
-              </a:ext>
-            </a:extLst>
-          </p:cNvPr>
-          <p:cNvSpPr>
-            <a:spLocks noGrp="1"/>
-          </p:cNvSpPr>
-          <p:nvPr>
-            <p:ph type="title"/>
-          </p:nvPr>
-        </p:nvSpPr>
+      <p:pic>
+        <p:nvPicPr>
+          <p:cNvPr id="9" name="Picture Placeholder 7" descr="abstract image">
+            <a:extLst>
+              <a:ext uri="{FF2B5EF4-FFF2-40B4-BE49-F238E27FC236}">
+                <a16:creationId xmlns:a16="http://schemas.microsoft.com/office/drawing/2014/main" id="{10C261F5-27E5-A8D9-57BF-8DCB0A00F6B1}"/>
+              </a:ext>
+            </a:extLst>
+          </p:cNvPr>
+          <p:cNvPicPr>
+            <a:picLocks noChangeAspect="1"/>
+          </p:cNvPicPr>
+          <p:nvPr/>
+        </p:nvPicPr>
+        <p:blipFill rotWithShape="1">
+          <a:blip r:embed="rId2">
+            <a:alphaModFix/>
+            <a:extLst>
+              <a:ext uri="{BEBA8EAE-BF5A-486C-A8C5-ECC9F3942E4B}">
+                <a14:imgProps xmlns:a14="http://schemas.microsoft.com/office/drawing/2010/main">
+                  <a14:imgLayer r:embed="rId3">
+                    <a14:imgEffect>
+                      <a14:saturation sat="0"/>
+                    </a14:imgEffect>
+                  </a14:imgLayer>
+                </a14:imgProps>
+              </a:ext>
+            </a:extLst>
+          </a:blip>
+          <a:srcRect l="54869" r="205"/>
+          <a:stretch/>
+        </p:blipFill>
         <p:spPr>
           <a:xfrm>
-            <a:off x="6362331" y="401907"/>
-            <a:ext cx="5251450" cy="1661297"/>
+            <a:off x="-1" y="0"/>
+            <a:ext cx="5477523" cy="6858000"/>
+          </a:xfrm>
+          <a:prstGeom prst="rect">
+            <a:avLst/>
+          </a:prstGeom>
+        </p:spPr>
+      </p:pic>
+      <p:sp>
+        <p:nvSpPr>
+          <p:cNvPr id="3" name="Title 2">
+            <a:extLst>
+              <a:ext uri="{FF2B5EF4-FFF2-40B4-BE49-F238E27FC236}">
+                <a16:creationId xmlns:a16="http://schemas.microsoft.com/office/drawing/2014/main" id="{1D24B42B-925B-494C-A986-BD85E8117E1E}"/>
+              </a:ext>
+            </a:extLst>
+          </p:cNvPr>
+          <p:cNvSpPr>
+            <a:spLocks noGrp="1"/>
+          </p:cNvSpPr>
+          <p:nvPr>
+            <p:ph type="title"/>
+          </p:nvPr>
+        </p:nvSpPr>
+        <p:spPr>
+          <a:xfrm>
+            <a:off x="6362330" y="411225"/>
+            <a:ext cx="5251450" cy="956373"/>
           </a:xfrm>
         </p:spPr>
         <p:txBody>
@@ -9382,10 +9125,9 @@
           <a:lstStyle/>
           <a:p>
             <a:r>
-              <a:rPr lang="en-US" sz="4200" dirty="0"/>
+              <a:rPr lang="en-US" sz="4800" dirty="0"/>
               <a:t>x</a:t>
             </a:r>
-            <a:endParaRPr lang="en-US" dirty="0"/>
           </a:p>
         </p:txBody>
       </p:sp>
@@ -9407,7 +9149,7 @@
         </p:nvSpPr>
         <p:spPr>
           <a:xfrm>
-            <a:off x="6362329" y="1822370"/>
+            <a:off x="6362330" y="2025552"/>
             <a:ext cx="5829669" cy="365125"/>
           </a:xfrm>
         </p:spPr>
@@ -9445,7 +9187,7 @@
           <a:p>
             <a:fld id="{8C2E478F-E849-4A8C-AF1F-CBCC78A7CBFA}" type="slidenum">
               <a:rPr lang="en-US" smtClean="0"/>
-              <a:t>8</a:t>
+              <a:t>9</a:t>
             </a:fld>
             <a:endParaRPr lang="en-US" dirty="0"/>
           </a:p>
@@ -9467,8 +9209,8 @@
         </p:nvSpPr>
         <p:spPr>
           <a:xfrm>
-            <a:off x="6362330" y="2432483"/>
-            <a:ext cx="5517781" cy="3764132"/>
+            <a:off x="6362330" y="2574543"/>
+            <a:ext cx="4646246" cy="3038482"/>
           </a:xfrm>
           <a:prstGeom prst="rect">
             <a:avLst/>
@@ -9477,7 +9219,7 @@
         </p:spPr>
         <p:txBody>
           <a:bodyPr vert="horz" lIns="91440" tIns="45720" rIns="91440" bIns="45720" rtlCol="0" anchor="t">
-            <a:normAutofit fontScale="92500" lnSpcReduction="10000"/>
+            <a:normAutofit/>
           </a:bodyPr>
           <a:lstStyle>
             <a:defPPr>
@@ -9638,698 +9380,61 @@
           </a:lstStyle>
           <a:p>
             <a:pPr marL="342900" indent="-342900">
-              <a:spcBef>
-                <a:spcPts val="1200"/>
-              </a:spcBef>
               <a:buFont typeface="Arial" panose="020B0604020202020204" pitchFamily="34" charset="0"/>
               <a:buChar char="•"/>
             </a:pPr>
             <a:r>
+              <a:rPr lang="en-US" dirty="0" err="1"/>
+              <a:t>VSCode</a:t>
+            </a:r>
+            <a:r>
               <a:rPr lang="en-US" dirty="0"/>
-              <a:t>Landing page with account creation</a:t>
+              <a:t> IDE</a:t>
             </a:r>
           </a:p>
           <a:p>
             <a:pPr marL="342900" indent="-342900">
-              <a:spcBef>
-                <a:spcPts val="1200"/>
-              </a:spcBef>
               <a:buFont typeface="Arial" panose="020B0604020202020204" pitchFamily="34" charset="0"/>
               <a:buChar char="•"/>
             </a:pPr>
             <a:r>
               <a:rPr lang="en-US" dirty="0"/>
-              <a:t>Picture upload screen</a:t>
+              <a:t>Python 3.11.8</a:t>
             </a:r>
           </a:p>
           <a:p>
             <a:pPr marL="342900" indent="-342900">
-              <a:spcBef>
-                <a:spcPts val="1200"/>
-              </a:spcBef>
               <a:buFont typeface="Arial" panose="020B0604020202020204" pitchFamily="34" charset="0"/>
               <a:buChar char="•"/>
             </a:pPr>
             <a:r>
               <a:rPr lang="en-US" dirty="0"/>
-              <a:t>Picture recognition response</a:t>
+              <a:t>Django</a:t>
             </a:r>
           </a:p>
           <a:p>
             <a:pPr marL="342900" indent="-342900">
-              <a:spcBef>
-                <a:spcPts val="1200"/>
-              </a:spcBef>
               <a:buFont typeface="Arial" panose="020B0604020202020204" pitchFamily="34" charset="0"/>
               <a:buChar char="•"/>
             </a:pPr>
             <a:r>
-              <a:rPr lang="en-US" dirty="0"/>
-              <a:t>Name suggestions from designated databases based on the animal and obvious features</a:t>
-            </a:r>
-          </a:p>
-          <a:p>
-            <a:pPr marL="342900" indent="-342900">
-              <a:spcBef>
-                <a:spcPts val="1200"/>
-              </a:spcBef>
-              <a:buFont typeface="Arial" panose="020B0604020202020204" pitchFamily="34" charset="0"/>
-              <a:buChar char="•"/>
-            </a:pPr>
-            <a:r>
-              <a:rPr lang="en-US" dirty="0"/>
-              <a:t>Ability to save favorite names to account database</a:t>
-            </a:r>
-          </a:p>
-        </p:txBody>
-      </p:sp>
-      <p:pic>
-        <p:nvPicPr>
-          <p:cNvPr id="4" name="Picture Placeholder 7" descr="close up of computer code">
-            <a:extLst>
-              <a:ext uri="{FF2B5EF4-FFF2-40B4-BE49-F238E27FC236}">
-                <a16:creationId xmlns:a16="http://schemas.microsoft.com/office/drawing/2014/main" id="{EFC42499-7A07-6EF5-2A4A-AD93E002BC94}"/>
-              </a:ext>
-            </a:extLst>
-          </p:cNvPr>
-          <p:cNvPicPr>
-            <a:picLocks noChangeAspect="1"/>
-          </p:cNvPicPr>
-          <p:nvPr/>
-        </p:nvPicPr>
-        <p:blipFill rotWithShape="1">
-          <a:blip r:embed="rId2">
-            <a:extLst>
-              <a:ext uri="{BEBA8EAE-BF5A-486C-A8C5-ECC9F3942E4B}">
-                <a14:imgProps xmlns:a14="http://schemas.microsoft.com/office/drawing/2010/main">
-                  <a14:imgLayer r:embed="rId3">
-                    <a14:imgEffect>
-                      <a14:saturation sat="0"/>
-                    </a14:imgEffect>
-                  </a14:imgLayer>
-                </a14:imgProps>
-              </a:ext>
-            </a:extLst>
-          </a:blip>
-          <a:srcRect l="20370" r="20370"/>
-          <a:stretch/>
-        </p:blipFill>
-        <p:spPr>
-          <a:xfrm>
-            <a:off x="0" y="0"/>
-            <a:ext cx="6096000" cy="6867922"/>
-          </a:xfrm>
-          <a:custGeom>
-            <a:avLst/>
-            <a:gdLst>
-              <a:gd name="connsiteX0" fmla="*/ 0 w 6096000"/>
-              <a:gd name="connsiteY0" fmla="*/ 0 h 6858000"/>
-              <a:gd name="connsiteX1" fmla="*/ 6096000 w 6096000"/>
-              <a:gd name="connsiteY1" fmla="*/ 0 h 6858000"/>
-              <a:gd name="connsiteX2" fmla="*/ 6096000 w 6096000"/>
-              <a:gd name="connsiteY2" fmla="*/ 6858000 h 6858000"/>
-              <a:gd name="connsiteX3" fmla="*/ 0 w 6096000"/>
-              <a:gd name="connsiteY3" fmla="*/ 6858000 h 6858000"/>
-              <a:gd name="connsiteX4" fmla="*/ 0 w 6096000"/>
-              <a:gd name="connsiteY4" fmla="*/ 0 h 6858000"/>
-              <a:gd name="connsiteX0" fmla="*/ 0 w 6096000"/>
-              <a:gd name="connsiteY0" fmla="*/ 0 h 6858000"/>
-              <a:gd name="connsiteX1" fmla="*/ 6096000 w 6096000"/>
-              <a:gd name="connsiteY1" fmla="*/ 0 h 6858000"/>
-              <a:gd name="connsiteX2" fmla="*/ 4242487 w 6096000"/>
-              <a:gd name="connsiteY2" fmla="*/ 6833286 h 6858000"/>
-              <a:gd name="connsiteX3" fmla="*/ 0 w 6096000"/>
-              <a:gd name="connsiteY3" fmla="*/ 6858000 h 6858000"/>
-              <a:gd name="connsiteX4" fmla="*/ 0 w 6096000"/>
-              <a:gd name="connsiteY4" fmla="*/ 0 h 6858000"/>
-              <a:gd name="connsiteX0" fmla="*/ 0 w 6096000"/>
-              <a:gd name="connsiteY0" fmla="*/ 0 h 6867922"/>
-              <a:gd name="connsiteX1" fmla="*/ 6096000 w 6096000"/>
-              <a:gd name="connsiteY1" fmla="*/ 0 h 6867922"/>
-              <a:gd name="connsiteX2" fmla="*/ 4228633 w 6096000"/>
-              <a:gd name="connsiteY2" fmla="*/ 6867922 h 6867922"/>
-              <a:gd name="connsiteX3" fmla="*/ 0 w 6096000"/>
-              <a:gd name="connsiteY3" fmla="*/ 6858000 h 6867922"/>
-              <a:gd name="connsiteX4" fmla="*/ 0 w 6096000"/>
-              <a:gd name="connsiteY4" fmla="*/ 0 h 6867922"/>
-            </a:gdLst>
-            <a:ahLst/>
-            <a:cxnLst>
-              <a:cxn ang="0">
-                <a:pos x="connsiteX0" y="connsiteY0"/>
-              </a:cxn>
-              <a:cxn ang="0">
-                <a:pos x="connsiteX1" y="connsiteY1"/>
-              </a:cxn>
-              <a:cxn ang="0">
-                <a:pos x="connsiteX2" y="connsiteY2"/>
-              </a:cxn>
-              <a:cxn ang="0">
-                <a:pos x="connsiteX3" y="connsiteY3"/>
-              </a:cxn>
-              <a:cxn ang="0">
-                <a:pos x="connsiteX4" y="connsiteY4"/>
-              </a:cxn>
-            </a:cxnLst>
-            <a:rect l="l" t="t" r="r" b="b"/>
-            <a:pathLst>
-              <a:path w="6096000" h="6867922">
-                <a:moveTo>
-                  <a:pt x="0" y="0"/>
-                </a:moveTo>
-                <a:lnTo>
-                  <a:pt x="6096000" y="0"/>
-                </a:lnTo>
-                <a:lnTo>
-                  <a:pt x="4228633" y="6867922"/>
-                </a:lnTo>
-                <a:lnTo>
-                  <a:pt x="0" y="6858000"/>
-                </a:lnTo>
-                <a:lnTo>
-                  <a:pt x="0" y="0"/>
-                </a:lnTo>
-                <a:close/>
-              </a:path>
-            </a:pathLst>
-          </a:custGeom>
-          <a:effectLst/>
-        </p:spPr>
-      </p:pic>
+              <a:rPr lang="en-US" b="0" i="0" dirty="0">
+                <a:solidFill>
+                  <a:srgbClr val="1D1C1D"/>
+                </a:solidFill>
+                <a:effectLst/>
+                <a:latin typeface="Slack-Lato"/>
+              </a:rPr>
+              <a:t>PostgreSQL</a:t>
+            </a:r>
+            <a:endParaRPr lang="en-US" dirty="0"/>
+          </a:p>
+        </p:txBody>
+      </p:sp>
     </p:spTree>
     <p:extLst>
       <p:ext uri="{BB962C8B-B14F-4D97-AF65-F5344CB8AC3E}">
-        <p14:creationId xmlns:p14="http://schemas.microsoft.com/office/powerpoint/2010/main" val="4094892012"/>
-      </p:ext>
-    </p:extLst>
-  </p:cSld>
-  <p:clrMapOvr>
-    <a:masterClrMapping/>
-  </p:clrMapOvr>
-</p:sld>
-</file>
-
-<file path=ppt/slides/slide9.xml><?xml version="1.0" encoding="utf-8"?>
-<p:sld xmlns:a="http://schemas.openxmlformats.org/drawingml/2006/main" xmlns:r="http://schemas.openxmlformats.org/officeDocument/2006/relationships" xmlns:p="http://schemas.openxmlformats.org/presentationml/2006/main">
-  <p:cSld>
-    <p:spTree>
-      <p:nvGrpSpPr>
-        <p:cNvPr id="1" name=""/>
-        <p:cNvGrpSpPr/>
-        <p:nvPr/>
-      </p:nvGrpSpPr>
-      <p:grpSpPr>
-        <a:xfrm>
-          <a:off x="0" y="0"/>
-          <a:ext cx="0" cy="0"/>
-          <a:chOff x="0" y="0"/>
-          <a:chExt cx="0" cy="0"/>
-        </a:xfrm>
-      </p:grpSpPr>
-      <p:sp>
-        <p:nvSpPr>
-          <p:cNvPr id="6" name="Slide Number Placeholder 5">
-            <a:extLst>
-              <a:ext uri="{FF2B5EF4-FFF2-40B4-BE49-F238E27FC236}">
-                <a16:creationId xmlns:a16="http://schemas.microsoft.com/office/drawing/2014/main" id="{FC6A5C12-E784-444E-B868-DE2AE85742BB}"/>
-              </a:ext>
-            </a:extLst>
-          </p:cNvPr>
-          <p:cNvSpPr>
-            <a:spLocks noGrp="1"/>
-          </p:cNvSpPr>
-          <p:nvPr>
-            <p:ph type="sldNum" sz="quarter" idx="12"/>
-          </p:nvPr>
-        </p:nvSpPr>
-        <p:spPr/>
-        <p:txBody>
-          <a:bodyPr/>
-          <a:lstStyle/>
-          <a:p>
-            <a:fld id="{8C2E478F-E849-4A8C-AF1F-CBCC78A7CBFA}" type="slidenum">
-              <a:rPr lang="en-US" smtClean="0"/>
-              <a:t>9</a:t>
-            </a:fld>
-            <a:endParaRPr lang="en-US" dirty="0"/>
-          </a:p>
-        </p:txBody>
-      </p:sp>
-      <p:sp>
-        <p:nvSpPr>
-          <p:cNvPr id="4" name="Title 2">
-            <a:extLst>
-              <a:ext uri="{FF2B5EF4-FFF2-40B4-BE49-F238E27FC236}">
-                <a16:creationId xmlns:a16="http://schemas.microsoft.com/office/drawing/2014/main" id="{2F8EB875-4267-9B7B-CA4D-2BA5B5FF6E4F}"/>
-              </a:ext>
-            </a:extLst>
-          </p:cNvPr>
-          <p:cNvSpPr txBox="1">
-            <a:spLocks/>
-          </p:cNvSpPr>
-          <p:nvPr/>
-        </p:nvSpPr>
-        <p:spPr>
-          <a:xfrm>
-            <a:off x="6362330" y="446291"/>
-            <a:ext cx="5630887" cy="1661297"/>
-          </a:xfrm>
-          <a:prstGeom prst="rect">
-            <a:avLst/>
-          </a:prstGeom>
-        </p:spPr>
-        <p:txBody>
-          <a:bodyPr vert="horz" lIns="91440" tIns="45720" rIns="91440" bIns="45720" rtlCol="0" anchor="t">
-            <a:normAutofit/>
-          </a:bodyPr>
-          <a:lstStyle>
-            <a:lvl1pPr algn="l" defTabSz="914400" rtl="0" eaLnBrk="1" latinLnBrk="0" hangingPunct="1">
-              <a:lnSpc>
-                <a:spcPct val="100000"/>
-              </a:lnSpc>
-              <a:spcBef>
-                <a:spcPct val="0"/>
-              </a:spcBef>
-              <a:buNone/>
-              <a:defRPr sz="6000" kern="1200" cap="all" spc="300" baseline="0">
-                <a:solidFill>
-                  <a:schemeClr val="tx1"/>
-                </a:solidFill>
-                <a:latin typeface="+mj-lt"/>
-                <a:ea typeface="+mj-ea"/>
-                <a:cs typeface="+mj-cs"/>
-              </a:defRPr>
-            </a:lvl1pPr>
-          </a:lstStyle>
-          <a:p>
-            <a:r>
-              <a:rPr lang="en-US" sz="4500" dirty="0"/>
-              <a:t>x</a:t>
-            </a:r>
-            <a:endParaRPr lang="en-US" sz="3500" dirty="0"/>
-          </a:p>
-        </p:txBody>
-      </p:sp>
-      <p:sp>
-        <p:nvSpPr>
-          <p:cNvPr id="2" name="Content Placeholder 8">
-            <a:extLst>
-              <a:ext uri="{FF2B5EF4-FFF2-40B4-BE49-F238E27FC236}">
-                <a16:creationId xmlns:a16="http://schemas.microsoft.com/office/drawing/2014/main" id="{F8BBD6BA-CA7D-1973-B283-4041FC25B422}"/>
-              </a:ext>
-            </a:extLst>
-          </p:cNvPr>
-          <p:cNvSpPr txBox="1">
-            <a:spLocks/>
-          </p:cNvSpPr>
-          <p:nvPr/>
-        </p:nvSpPr>
-        <p:spPr>
-          <a:xfrm>
-            <a:off x="6362330" y="2517621"/>
-            <a:ext cx="4516707" cy="3859127"/>
-          </a:xfrm>
-          <a:prstGeom prst="rect">
-            <a:avLst/>
-          </a:prstGeom>
-          <a:noFill/>
-        </p:spPr>
-        <p:txBody>
-          <a:bodyPr vert="horz" lIns="91440" tIns="45720" rIns="91440" bIns="45720" rtlCol="0" anchor="t">
-            <a:normAutofit/>
-          </a:bodyPr>
-          <a:lstStyle>
-            <a:lvl1pPr marL="0" indent="0" algn="ctr" defTabSz="914400" rtl="0" eaLnBrk="1" latinLnBrk="0" hangingPunct="1">
-              <a:lnSpc>
-                <a:spcPct val="100000"/>
-              </a:lnSpc>
-              <a:spcBef>
-                <a:spcPts val="1000"/>
-              </a:spcBef>
-              <a:buFont typeface="Arial" panose="020B0604020202020204" pitchFamily="34" charset="0"/>
-              <a:buNone/>
-              <a:defRPr sz="1400" kern="1200" cap="all" spc="600" baseline="0">
-                <a:solidFill>
-                  <a:schemeClr val="bg1"/>
-                </a:solidFill>
-                <a:latin typeface="+mn-lt"/>
-                <a:ea typeface="+mn-ea"/>
-                <a:cs typeface="+mn-cs"/>
-              </a:defRPr>
-            </a:lvl1pPr>
-            <a:lvl2pPr marL="457200" indent="0" algn="l" defTabSz="914400" rtl="0" eaLnBrk="1" latinLnBrk="0" hangingPunct="1">
-              <a:lnSpc>
-                <a:spcPct val="150000"/>
-              </a:lnSpc>
-              <a:spcBef>
-                <a:spcPts val="500"/>
-              </a:spcBef>
-              <a:buFont typeface="Arial" panose="020B0604020202020204" pitchFamily="34" charset="0"/>
-              <a:buNone/>
-              <a:defRPr sz="2000" kern="1200">
-                <a:solidFill>
-                  <a:schemeClr val="tx1">
-                    <a:tint val="75000"/>
-                  </a:schemeClr>
-                </a:solidFill>
-                <a:latin typeface="+mn-lt"/>
-                <a:ea typeface="+mn-ea"/>
-                <a:cs typeface="+mn-cs"/>
-              </a:defRPr>
-            </a:lvl2pPr>
-            <a:lvl3pPr marL="914400" indent="0" algn="l" defTabSz="914400" rtl="0" eaLnBrk="1" latinLnBrk="0" hangingPunct="1">
-              <a:lnSpc>
-                <a:spcPct val="150000"/>
-              </a:lnSpc>
-              <a:spcBef>
-                <a:spcPts val="500"/>
-              </a:spcBef>
-              <a:buFont typeface="Arial" panose="020B0604020202020204" pitchFamily="34" charset="0"/>
-              <a:buNone/>
-              <a:defRPr sz="1800" kern="1200">
-                <a:solidFill>
-                  <a:schemeClr val="tx1">
-                    <a:tint val="75000"/>
-                  </a:schemeClr>
-                </a:solidFill>
-                <a:latin typeface="+mn-lt"/>
-                <a:ea typeface="+mn-ea"/>
-                <a:cs typeface="+mn-cs"/>
-              </a:defRPr>
-            </a:lvl3pPr>
-            <a:lvl4pPr marL="1371600" indent="0" algn="l" defTabSz="914400" rtl="0" eaLnBrk="1" latinLnBrk="0" hangingPunct="1">
-              <a:lnSpc>
-                <a:spcPct val="150000"/>
-              </a:lnSpc>
-              <a:spcBef>
-                <a:spcPts val="500"/>
-              </a:spcBef>
-              <a:buFont typeface="Arial" panose="020B0604020202020204" pitchFamily="34" charset="0"/>
-              <a:buNone/>
-              <a:defRPr sz="1600" kern="1200">
-                <a:solidFill>
-                  <a:schemeClr val="tx1">
-                    <a:tint val="75000"/>
-                  </a:schemeClr>
-                </a:solidFill>
-                <a:latin typeface="+mn-lt"/>
-                <a:ea typeface="+mn-ea"/>
-                <a:cs typeface="+mn-cs"/>
-              </a:defRPr>
-            </a:lvl4pPr>
-            <a:lvl5pPr marL="1828800" indent="0" algn="l" defTabSz="914400" rtl="0" eaLnBrk="1" latinLnBrk="0" hangingPunct="1">
-              <a:lnSpc>
-                <a:spcPct val="150000"/>
-              </a:lnSpc>
-              <a:spcBef>
-                <a:spcPts val="500"/>
-              </a:spcBef>
-              <a:buFont typeface="Arial" panose="020B0604020202020204" pitchFamily="34" charset="0"/>
-              <a:buNone/>
-              <a:defRPr sz="1600" kern="1200">
-                <a:solidFill>
-                  <a:schemeClr val="tx1">
-                    <a:tint val="75000"/>
-                  </a:schemeClr>
-                </a:solidFill>
-                <a:latin typeface="+mn-lt"/>
-                <a:ea typeface="+mn-ea"/>
-                <a:cs typeface="+mn-cs"/>
-              </a:defRPr>
-            </a:lvl5pPr>
-            <a:lvl6pPr marL="2286000" indent="0" algn="l" defTabSz="914400" rtl="0" eaLnBrk="1" latinLnBrk="0" hangingPunct="1">
-              <a:lnSpc>
-                <a:spcPct val="90000"/>
-              </a:lnSpc>
-              <a:spcBef>
-                <a:spcPts val="500"/>
-              </a:spcBef>
-              <a:buFont typeface="Arial" panose="020B0604020202020204" pitchFamily="34" charset="0"/>
-              <a:buNone/>
-              <a:defRPr sz="1600" kern="1200">
-                <a:solidFill>
-                  <a:schemeClr val="tx1">
-                    <a:tint val="75000"/>
-                  </a:schemeClr>
-                </a:solidFill>
-                <a:latin typeface="+mn-lt"/>
-                <a:ea typeface="+mn-ea"/>
-                <a:cs typeface="+mn-cs"/>
-              </a:defRPr>
-            </a:lvl6pPr>
-            <a:lvl7pPr marL="2743200" indent="0" algn="l" defTabSz="914400" rtl="0" eaLnBrk="1" latinLnBrk="0" hangingPunct="1">
-              <a:lnSpc>
-                <a:spcPct val="90000"/>
-              </a:lnSpc>
-              <a:spcBef>
-                <a:spcPts val="500"/>
-              </a:spcBef>
-              <a:buFont typeface="Arial" panose="020B0604020202020204" pitchFamily="34" charset="0"/>
-              <a:buNone/>
-              <a:defRPr sz="1600" kern="1200">
-                <a:solidFill>
-                  <a:schemeClr val="tx1">
-                    <a:tint val="75000"/>
-                  </a:schemeClr>
-                </a:solidFill>
-                <a:latin typeface="+mn-lt"/>
-                <a:ea typeface="+mn-ea"/>
-                <a:cs typeface="+mn-cs"/>
-              </a:defRPr>
-            </a:lvl7pPr>
-            <a:lvl8pPr marL="3200400" indent="0" algn="l" defTabSz="914400" rtl="0" eaLnBrk="1" latinLnBrk="0" hangingPunct="1">
-              <a:lnSpc>
-                <a:spcPct val="90000"/>
-              </a:lnSpc>
-              <a:spcBef>
-                <a:spcPts val="500"/>
-              </a:spcBef>
-              <a:buFont typeface="Arial" panose="020B0604020202020204" pitchFamily="34" charset="0"/>
-              <a:buNone/>
-              <a:defRPr sz="1600" kern="1200">
-                <a:solidFill>
-                  <a:schemeClr val="tx1">
-                    <a:tint val="75000"/>
-                  </a:schemeClr>
-                </a:solidFill>
-                <a:latin typeface="+mn-lt"/>
-                <a:ea typeface="+mn-ea"/>
-                <a:cs typeface="+mn-cs"/>
-              </a:defRPr>
-            </a:lvl8pPr>
-            <a:lvl9pPr marL="3657600" indent="0" algn="l" defTabSz="914400" rtl="0" eaLnBrk="1" latinLnBrk="0" hangingPunct="1">
-              <a:lnSpc>
-                <a:spcPct val="90000"/>
-              </a:lnSpc>
-              <a:spcBef>
-                <a:spcPts val="500"/>
-              </a:spcBef>
-              <a:buFont typeface="Arial" panose="020B0604020202020204" pitchFamily="34" charset="0"/>
-              <a:buNone/>
-              <a:defRPr sz="1600" kern="1200">
-                <a:solidFill>
-                  <a:schemeClr val="tx1">
-                    <a:tint val="75000"/>
-                  </a:schemeClr>
-                </a:solidFill>
-                <a:latin typeface="+mn-lt"/>
-                <a:ea typeface="+mn-ea"/>
-                <a:cs typeface="+mn-cs"/>
-              </a:defRPr>
-            </a:lvl9pPr>
-          </a:lstStyle>
-          <a:p>
-            <a:pPr algn="l">
-              <a:lnSpc>
-                <a:spcPct val="120000"/>
-              </a:lnSpc>
-              <a:spcBef>
-                <a:spcPts val="0"/>
-              </a:spcBef>
-            </a:pPr>
-            <a:r>
-              <a:rPr lang="en-US" sz="2400" cap="none" spc="0" dirty="0">
-                <a:solidFill>
-                  <a:sysClr val="windowText" lastClr="000000"/>
-                </a:solidFill>
-                <a:effectLst/>
-              </a:rPr>
-              <a:t>After a client uploads a picture of their pet, our image recognition will be able to determine what kind of animal it is, then recommend names based off this information and a couple of other factors such as the animal’s coloring.</a:t>
-            </a:r>
-          </a:p>
-        </p:txBody>
-      </p:sp>
-      <p:sp>
-        <p:nvSpPr>
-          <p:cNvPr id="7" name="Picture Placeholder 6">
-            <a:extLst>
-              <a:ext uri="{FF2B5EF4-FFF2-40B4-BE49-F238E27FC236}">
-                <a16:creationId xmlns:a16="http://schemas.microsoft.com/office/drawing/2014/main" id="{BC79F0CB-D8A3-C42E-9E9A-ABCD333E1E55}"/>
-              </a:ext>
-            </a:extLst>
-          </p:cNvPr>
-          <p:cNvSpPr>
-            <a:spLocks noGrp="1"/>
-          </p:cNvSpPr>
-          <p:nvPr>
-            <p:ph type="pic" sz="quarter" idx="13"/>
-          </p:nvPr>
-        </p:nvSpPr>
-        <p:spPr/>
-      </p:sp>
-      <p:pic>
-        <p:nvPicPr>
-          <p:cNvPr id="13" name="Picture Placeholder 12" descr="close up of computer on top of table against a brick wall">
-            <a:extLst>
-              <a:ext uri="{FF2B5EF4-FFF2-40B4-BE49-F238E27FC236}">
-                <a16:creationId xmlns:a16="http://schemas.microsoft.com/office/drawing/2014/main" id="{90BB9493-60B4-4B89-89CE-E1F8BF6C4D12}"/>
-              </a:ext>
-            </a:extLst>
-          </p:cNvPr>
-          <p:cNvPicPr>
-            <a:picLocks noChangeAspect="1"/>
-          </p:cNvPicPr>
-          <p:nvPr/>
-        </p:nvPicPr>
-        <p:blipFill rotWithShape="1">
-          <a:blip r:embed="rId2" cstate="email">
-            <a:extLst>
-              <a:ext uri="{BEBA8EAE-BF5A-486C-A8C5-ECC9F3942E4B}">
-                <a14:imgProps xmlns:a14="http://schemas.microsoft.com/office/drawing/2010/main">
-                  <a14:imgLayer r:embed="rId3">
-                    <a14:imgEffect>
-                      <a14:saturation sat="0"/>
-                    </a14:imgEffect>
-                  </a14:imgLayer>
-                </a14:imgProps>
-              </a:ext>
-              <a:ext uri="{28A0092B-C50C-407E-A947-70E740481C1C}">
-                <a14:useLocalDpi xmlns:a14="http://schemas.microsoft.com/office/drawing/2010/main"/>
-              </a:ext>
-            </a:extLst>
-          </a:blip>
-          <a:srcRect l="20370" r="20370"/>
-          <a:stretch/>
-        </p:blipFill>
-        <p:spPr>
-          <a:xfrm>
-            <a:off x="0" y="-9922"/>
-            <a:ext cx="6096000" cy="6867922"/>
-          </a:xfrm>
-          <a:custGeom>
-            <a:avLst/>
-            <a:gdLst>
-              <a:gd name="connsiteX0" fmla="*/ 0 w 6096000"/>
-              <a:gd name="connsiteY0" fmla="*/ 0 h 6858000"/>
-              <a:gd name="connsiteX1" fmla="*/ 6096000 w 6096000"/>
-              <a:gd name="connsiteY1" fmla="*/ 0 h 6858000"/>
-              <a:gd name="connsiteX2" fmla="*/ 6096000 w 6096000"/>
-              <a:gd name="connsiteY2" fmla="*/ 6858000 h 6858000"/>
-              <a:gd name="connsiteX3" fmla="*/ 0 w 6096000"/>
-              <a:gd name="connsiteY3" fmla="*/ 6858000 h 6858000"/>
-              <a:gd name="connsiteX4" fmla="*/ 0 w 6096000"/>
-              <a:gd name="connsiteY4" fmla="*/ 0 h 6858000"/>
-              <a:gd name="connsiteX0" fmla="*/ 0 w 6096000"/>
-              <a:gd name="connsiteY0" fmla="*/ 0 h 6858000"/>
-              <a:gd name="connsiteX1" fmla="*/ 6096000 w 6096000"/>
-              <a:gd name="connsiteY1" fmla="*/ 0 h 6858000"/>
-              <a:gd name="connsiteX2" fmla="*/ 4242487 w 6096000"/>
-              <a:gd name="connsiteY2" fmla="*/ 6833286 h 6858000"/>
-              <a:gd name="connsiteX3" fmla="*/ 0 w 6096000"/>
-              <a:gd name="connsiteY3" fmla="*/ 6858000 h 6858000"/>
-              <a:gd name="connsiteX4" fmla="*/ 0 w 6096000"/>
-              <a:gd name="connsiteY4" fmla="*/ 0 h 6858000"/>
-              <a:gd name="connsiteX0" fmla="*/ 0 w 6096000"/>
-              <a:gd name="connsiteY0" fmla="*/ 0 h 6867922"/>
-              <a:gd name="connsiteX1" fmla="*/ 6096000 w 6096000"/>
-              <a:gd name="connsiteY1" fmla="*/ 0 h 6867922"/>
-              <a:gd name="connsiteX2" fmla="*/ 4228633 w 6096000"/>
-              <a:gd name="connsiteY2" fmla="*/ 6867922 h 6867922"/>
-              <a:gd name="connsiteX3" fmla="*/ 0 w 6096000"/>
-              <a:gd name="connsiteY3" fmla="*/ 6858000 h 6867922"/>
-              <a:gd name="connsiteX4" fmla="*/ 0 w 6096000"/>
-              <a:gd name="connsiteY4" fmla="*/ 0 h 6867922"/>
-            </a:gdLst>
-            <a:ahLst/>
-            <a:cxnLst>
-              <a:cxn ang="0">
-                <a:pos x="connsiteX0" y="connsiteY0"/>
-              </a:cxn>
-              <a:cxn ang="0">
-                <a:pos x="connsiteX1" y="connsiteY1"/>
-              </a:cxn>
-              <a:cxn ang="0">
-                <a:pos x="connsiteX2" y="connsiteY2"/>
-              </a:cxn>
-              <a:cxn ang="0">
-                <a:pos x="connsiteX3" y="connsiteY3"/>
-              </a:cxn>
-              <a:cxn ang="0">
-                <a:pos x="connsiteX4" y="connsiteY4"/>
-              </a:cxn>
-            </a:cxnLst>
-            <a:rect l="l" t="t" r="r" b="b"/>
-            <a:pathLst>
-              <a:path w="6096000" h="6867922">
-                <a:moveTo>
-                  <a:pt x="0" y="0"/>
-                </a:moveTo>
-                <a:lnTo>
-                  <a:pt x="6096000" y="0"/>
-                </a:lnTo>
-                <a:lnTo>
-                  <a:pt x="4228633" y="6867922"/>
-                </a:lnTo>
-                <a:lnTo>
-                  <a:pt x="0" y="6858000"/>
-                </a:lnTo>
-                <a:lnTo>
-                  <a:pt x="0" y="0"/>
-                </a:lnTo>
-                <a:close/>
-              </a:path>
-            </a:pathLst>
-          </a:custGeom>
-          <a:effectLst/>
-        </p:spPr>
-      </p:pic>
-      <p:sp>
-        <p:nvSpPr>
-          <p:cNvPr id="8" name="Text Placeholder 4">
-            <a:extLst>
-              <a:ext uri="{FF2B5EF4-FFF2-40B4-BE49-F238E27FC236}">
-                <a16:creationId xmlns:a16="http://schemas.microsoft.com/office/drawing/2014/main" id="{8A616E72-8E0A-185C-53F1-14BBDFB16F39}"/>
-              </a:ext>
-            </a:extLst>
-          </p:cNvPr>
-          <p:cNvSpPr>
-            <a:spLocks noGrp="1"/>
-          </p:cNvSpPr>
-          <p:nvPr>
-            <p:ph type="body" idx="1"/>
-          </p:nvPr>
-        </p:nvSpPr>
-        <p:spPr>
-          <a:xfrm>
-            <a:off x="6362331" y="1860457"/>
-            <a:ext cx="5829669" cy="365125"/>
-          </a:xfrm>
-        </p:spPr>
-        <p:txBody>
-          <a:bodyPr/>
-          <a:lstStyle/>
-          <a:p>
-            <a:r>
-              <a:rPr lang="en-US" spc="300" dirty="0"/>
-              <a:t> </a:t>
-            </a:r>
-          </a:p>
-        </p:txBody>
-      </p:sp>
-    </p:spTree>
-    <p:extLst>
-      <p:ext uri="{BB962C8B-B14F-4D97-AF65-F5344CB8AC3E}">
-        <p14:creationId xmlns:p14="http://schemas.microsoft.com/office/powerpoint/2010/main" val="2944765398"/>
+        <p14:creationId xmlns:p14="http://schemas.microsoft.com/office/powerpoint/2010/main" val="2441627795"/>
       </p:ext>
     </p:extLst>
   </p:cSld>
@@ -11225,35 +10330,6 @@
 </file>
 
 <file path=customXml/item1.xml><?xml version="1.0" encoding="utf-8"?>
-<p:properties xmlns:p="http://schemas.microsoft.com/office/2006/metadata/properties" xmlns:xsi="http://www.w3.org/2001/XMLSchema-instance" xmlns:pc="http://schemas.microsoft.com/office/infopath/2007/PartnerControls">
-  <documentManagement>
-    <Status xmlns="71af3243-3dd4-4a8d-8c0d-dd76da1f02a5">Not started</Status>
-    <MediaServiceKeyPoints xmlns="71af3243-3dd4-4a8d-8c0d-dd76da1f02a5" xsi:nil="true"/>
-    <_ip_UnifiedCompliancePolicyUIAction xmlns="http://schemas.microsoft.com/sharepoint/v3" xsi:nil="true"/>
-    <Image xmlns="71af3243-3dd4-4a8d-8c0d-dd76da1f02a5">
-      <Url xsi:nil="true"/>
-      <Description xsi:nil="true"/>
-    </Image>
-    <Background xmlns="71af3243-3dd4-4a8d-8c0d-dd76da1f02a5">false</Background>
-    <_ip_UnifiedCompliancePolicyProperties xmlns="http://schemas.microsoft.com/sharepoint/v3" xsi:nil="true"/>
-    <ImageTagsTaxHTField xmlns="71af3243-3dd4-4a8d-8c0d-dd76da1f02a5">
-      <Terms xmlns="http://schemas.microsoft.com/office/infopath/2007/PartnerControls"/>
-    </ImageTagsTaxHTField>
-    <TaxCatchAll xmlns="230e9df3-be65-4c73-a93b-d1236ebd677e" xsi:nil="true"/>
-  </documentManagement>
-</p:properties>
-</file>
-
-<file path=customXml/item2.xml><?xml version="1.0" encoding="utf-8"?>
-<?mso-contentType ?>
-<FormTemplates xmlns="http://schemas.microsoft.com/sharepoint/v3/contenttype/forms">
-  <Display>DocumentLibraryForm</Display>
-  <Edit>DocumentLibraryForm</Edit>
-  <New>DocumentLibraryForm</New>
-</FormTemplates>
-</file>
-
-<file path=customXml/item3.xml><?xml version="1.0" encoding="utf-8"?>
 <ct:contentTypeSchema xmlns:ct="http://schemas.microsoft.com/office/2006/metadata/contentType" xmlns:ma="http://schemas.microsoft.com/office/2006/metadata/properties/metaAttributes" ct:_="" ma:_="" ma:contentTypeName="Document" ma:contentTypeID="0x01010079F111ED35F8CC479449609E8A0923A6" ma:contentTypeVersion="28" ma:contentTypeDescription="Create a new document." ma:contentTypeScope="" ma:versionID="60f5a4f2d2b0abadcf532d48ebf9cb71">
   <xsd:schema xmlns:xsd="http://www.w3.org/2001/XMLSchema" xmlns:xs="http://www.w3.org/2001/XMLSchema" xmlns:p="http://schemas.microsoft.com/office/2006/metadata/properties" xmlns:ns1="http://schemas.microsoft.com/sharepoint/v3" xmlns:ns2="71af3243-3dd4-4a8d-8c0d-dd76da1f02a5" xmlns:ns3="16c05727-aa75-4e4a-9b5f-8a80a1165891" xmlns:ns4="230e9df3-be65-4c73-a93b-d1236ebd677e" targetNamespace="http://schemas.microsoft.com/office/2006/metadata/properties" ma:root="true" ma:fieldsID="7dd78129e6a1811f84807ad11c651531" ns1:_="" ns2:_="" ns3:_="" ns4:_="">
     <xsd:import namespace="http://schemas.microsoft.com/sharepoint/v3"/>
@@ -11565,27 +10641,36 @@
 </ct:contentTypeSchema>
 </file>
 
-<file path=customXml/itemProps1.xml><?xml version="1.0" encoding="utf-8"?>
-<ds:datastoreItem xmlns:ds="http://schemas.openxmlformats.org/officeDocument/2006/customXml" ds:itemID="{8002A8ED-1331-4C1D-8649-743D7BE164DD}">
-  <ds:schemaRefs>
-    <ds:schemaRef ds:uri="http://schemas.microsoft.com/office/2006/metadata/properties"/>
-    <ds:schemaRef ds:uri="http://schemas.microsoft.com/office/infopath/2007/PartnerControls"/>
-    <ds:schemaRef ds:uri="71af3243-3dd4-4a8d-8c0d-dd76da1f02a5"/>
-    <ds:schemaRef ds:uri="http://schemas.microsoft.com/sharepoint/v3"/>
-    <ds:schemaRef ds:uri="230e9df3-be65-4c73-a93b-d1236ebd677e"/>
-  </ds:schemaRefs>
-</ds:datastoreItem>
+<file path=customXml/item2.xml><?xml version="1.0" encoding="utf-8"?>
+<?mso-contentType ?>
+<FormTemplates xmlns="http://schemas.microsoft.com/sharepoint/v3/contenttype/forms">
+  <Display>DocumentLibraryForm</Display>
+  <Edit>DocumentLibraryForm</Edit>
+  <New>DocumentLibraryForm</New>
+</FormTemplates>
 </file>
 
-<file path=customXml/itemProps2.xml><?xml version="1.0" encoding="utf-8"?>
-<ds:datastoreItem xmlns:ds="http://schemas.openxmlformats.org/officeDocument/2006/customXml" ds:itemID="{99E4EAC9-33DC-4CF0-BA31-C98F61CE4785}">
-  <ds:schemaRefs>
-    <ds:schemaRef ds:uri="http://schemas.microsoft.com/sharepoint/v3/contenttype/forms"/>
-  </ds:schemaRefs>
-</ds:datastoreItem>
+<file path=customXml/item3.xml><?xml version="1.0" encoding="utf-8"?>
+<p:properties xmlns:p="http://schemas.microsoft.com/office/2006/metadata/properties" xmlns:xsi="http://www.w3.org/2001/XMLSchema-instance" xmlns:pc="http://schemas.microsoft.com/office/infopath/2007/PartnerControls">
+  <documentManagement>
+    <Status xmlns="71af3243-3dd4-4a8d-8c0d-dd76da1f02a5">Not started</Status>
+    <MediaServiceKeyPoints xmlns="71af3243-3dd4-4a8d-8c0d-dd76da1f02a5" xsi:nil="true"/>
+    <_ip_UnifiedCompliancePolicyUIAction xmlns="http://schemas.microsoft.com/sharepoint/v3" xsi:nil="true"/>
+    <Image xmlns="71af3243-3dd4-4a8d-8c0d-dd76da1f02a5">
+      <Url xsi:nil="true"/>
+      <Description xsi:nil="true"/>
+    </Image>
+    <Background xmlns="71af3243-3dd4-4a8d-8c0d-dd76da1f02a5">false</Background>
+    <_ip_UnifiedCompliancePolicyProperties xmlns="http://schemas.microsoft.com/sharepoint/v3" xsi:nil="true"/>
+    <ImageTagsTaxHTField xmlns="71af3243-3dd4-4a8d-8c0d-dd76da1f02a5">
+      <Terms xmlns="http://schemas.microsoft.com/office/infopath/2007/PartnerControls"/>
+    </ImageTagsTaxHTField>
+    <TaxCatchAll xmlns="230e9df3-be65-4c73-a93b-d1236ebd677e" xsi:nil="true"/>
+  </documentManagement>
+</p:properties>
 </file>
 
-<file path=customXml/itemProps3.xml><?xml version="1.0" encoding="utf-8"?>
+<file path=customXml/itemProps1.xml><?xml version="1.0" encoding="utf-8"?>
 <ds:datastoreItem xmlns:ds="http://schemas.openxmlformats.org/officeDocument/2006/customXml" ds:itemID="{A3D5DB56-3A71-4638-9571-EE877FD66E96}">
   <ds:schemaRefs>
     <ds:schemaRef ds:uri="http://schemas.microsoft.com/office/2006/metadata/contentType"/>
@@ -11606,6 +10691,26 @@
 </ds:datastoreItem>
 </file>
 
+<file path=customXml/itemProps2.xml><?xml version="1.0" encoding="utf-8"?>
+<ds:datastoreItem xmlns:ds="http://schemas.openxmlformats.org/officeDocument/2006/customXml" ds:itemID="{99E4EAC9-33DC-4CF0-BA31-C98F61CE4785}">
+  <ds:schemaRefs>
+    <ds:schemaRef ds:uri="http://schemas.microsoft.com/sharepoint/v3/contenttype/forms"/>
+  </ds:schemaRefs>
+</ds:datastoreItem>
+</file>
+
+<file path=customXml/itemProps3.xml><?xml version="1.0" encoding="utf-8"?>
+<ds:datastoreItem xmlns:ds="http://schemas.openxmlformats.org/officeDocument/2006/customXml" ds:itemID="{8002A8ED-1331-4C1D-8649-743D7BE164DD}">
+  <ds:schemaRefs>
+    <ds:schemaRef ds:uri="http://schemas.microsoft.com/office/2006/metadata/properties"/>
+    <ds:schemaRef ds:uri="http://schemas.microsoft.com/office/infopath/2007/PartnerControls"/>
+    <ds:schemaRef ds:uri="71af3243-3dd4-4a8d-8c0d-dd76da1f02a5"/>
+    <ds:schemaRef ds:uri="http://schemas.microsoft.com/sharepoint/v3"/>
+    <ds:schemaRef ds:uri="230e9df3-be65-4c73-a93b-d1236ebd677e"/>
+  </ds:schemaRefs>
+</ds:datastoreItem>
+</file>
+
 <file path=docMetadata/LabelInfo.xml><?xml version="1.0" encoding="utf-8"?>
 <clbl:labelList xmlns:clbl="http://schemas.microsoft.com/office/2020/mipLabelMetadata"/>
 </file>
</xml_diff>

<commit_message>
Added pictures and information to slideshow
</commit_message>
<xml_diff>
--- a/Phase 2 Docs/Phase 2 - Presentation.pptx
+++ b/Phase 2 Docs/Phase 2 - Presentation.pptx
@@ -5,25 +5,27 @@
     <p:sldMasterId id="2147483648" r:id="rId4"/>
   </p:sldMasterIdLst>
   <p:notesMasterIdLst>
-    <p:notesMasterId r:id="rId18"/>
+    <p:notesMasterId r:id="rId20"/>
   </p:notesMasterIdLst>
   <p:handoutMasterIdLst>
-    <p:handoutMasterId r:id="rId19"/>
+    <p:handoutMasterId r:id="rId21"/>
   </p:handoutMasterIdLst>
   <p:sldIdLst>
     <p:sldId id="2448" r:id="rId5"/>
     <p:sldId id="259" r:id="rId6"/>
-    <p:sldId id="2468" r:id="rId7"/>
-    <p:sldId id="2469" r:id="rId8"/>
-    <p:sldId id="2470" r:id="rId9"/>
-    <p:sldId id="2471" r:id="rId10"/>
-    <p:sldId id="2463" r:id="rId11"/>
-    <p:sldId id="2467" r:id="rId12"/>
+    <p:sldId id="2472" r:id="rId7"/>
+    <p:sldId id="2468" r:id="rId8"/>
+    <p:sldId id="2469" r:id="rId9"/>
+    <p:sldId id="2470" r:id="rId10"/>
+    <p:sldId id="2471" r:id="rId11"/>
+    <p:sldId id="2463" r:id="rId12"/>
     <p:sldId id="2466" r:id="rId13"/>
-    <p:sldId id="2451" r:id="rId14"/>
-    <p:sldId id="2464" r:id="rId15"/>
-    <p:sldId id="2453" r:id="rId16"/>
-    <p:sldId id="2436" r:id="rId17"/>
+    <p:sldId id="2464" r:id="rId14"/>
+    <p:sldId id="2451" r:id="rId15"/>
+    <p:sldId id="2467" r:id="rId16"/>
+    <p:sldId id="2473" r:id="rId17"/>
+    <p:sldId id="2453" r:id="rId18"/>
+    <p:sldId id="2436" r:id="rId19"/>
   </p:sldIdLst>
   <p:sldSz cx="12192000" cy="6858000"/>
   <p:notesSz cx="6858000" cy="9144000"/>
@@ -243,7 +245,7 @@
           <a:p>
             <a:fld id="{966D5B4E-BF3E-3B45-A4BA-D6C3B92870D7}" type="datetimeFigureOut">
               <a:rPr lang="en-US" smtClean="0"/>
-              <a:t>2/26/2024</a:t>
+              <a:t>2/28/2024</a:t>
             </a:fld>
             <a:endParaRPr lang="en-US" dirty="0"/>
           </a:p>
@@ -420,7 +422,7 @@
           <a:p>
             <a:fld id="{F5A8621B-8C8E-49BA-8772-41D0FE75A082}" type="datetimeFigureOut">
               <a:rPr lang="en-US" smtClean="0"/>
-              <a:t>2/26/2024</a:t>
+              <a:t>2/28/2024</a:t>
             </a:fld>
             <a:endParaRPr lang="en-US" dirty="0"/>
           </a:p>
@@ -5361,10 +5363,43 @@
       </p:grpSpPr>
       <p:sp>
         <p:nvSpPr>
-          <p:cNvPr id="6" name="Slide Number Placeholder 5">
-            <a:extLst>
-              <a:ext uri="{FF2B5EF4-FFF2-40B4-BE49-F238E27FC236}">
-                <a16:creationId xmlns:a16="http://schemas.microsoft.com/office/drawing/2014/main" id="{FC6A5C12-E784-444E-B868-DE2AE85742BB}"/>
+          <p:cNvPr id="5" name="Text Placeholder 4">
+            <a:extLst>
+              <a:ext uri="{FF2B5EF4-FFF2-40B4-BE49-F238E27FC236}">
+                <a16:creationId xmlns:a16="http://schemas.microsoft.com/office/drawing/2014/main" id="{AF9B872F-6332-408E-9135-B871F0C90C00}"/>
+              </a:ext>
+            </a:extLst>
+          </p:cNvPr>
+          <p:cNvSpPr>
+            <a:spLocks noGrp="1"/>
+          </p:cNvSpPr>
+          <p:nvPr>
+            <p:ph type="body" idx="1"/>
+          </p:nvPr>
+        </p:nvSpPr>
+        <p:spPr>
+          <a:xfrm>
+            <a:off x="6169980" y="5940605"/>
+            <a:ext cx="6022019" cy="365125"/>
+          </a:xfrm>
+        </p:spPr>
+        <p:txBody>
+          <a:bodyPr/>
+          <a:lstStyle/>
+          <a:p>
+            <a:r>
+              <a:rPr lang="en-US" spc="300" dirty="0"/>
+              <a:t> </a:t>
+            </a:r>
+          </a:p>
+        </p:txBody>
+      </p:sp>
+      <p:sp>
+        <p:nvSpPr>
+          <p:cNvPr id="2" name="Slide Number Placeholder 1">
+            <a:extLst>
+              <a:ext uri="{FF2B5EF4-FFF2-40B4-BE49-F238E27FC236}">
+                <a16:creationId xmlns:a16="http://schemas.microsoft.com/office/drawing/2014/main" id="{948DD8A0-BD53-4DBF-949B-0D64D12DADA9}"/>
               </a:ext>
             </a:extLst>
           </p:cNvPr>
@@ -5383,6 +5418,331 @@
             <a:fld id="{8C2E478F-E849-4A8C-AF1F-CBCC78A7CBFA}" type="slidenum">
               <a:rPr lang="en-US" smtClean="0"/>
               <a:t>10</a:t>
+            </a:fld>
+            <a:endParaRPr lang="en-US" dirty="0"/>
+          </a:p>
+        </p:txBody>
+      </p:sp>
+      <p:pic>
+        <p:nvPicPr>
+          <p:cNvPr id="4" name="Picture Placeholder 5" descr="person staring at blueprints on a brick wall">
+            <a:extLst>
+              <a:ext uri="{FF2B5EF4-FFF2-40B4-BE49-F238E27FC236}">
+                <a16:creationId xmlns:a16="http://schemas.microsoft.com/office/drawing/2014/main" id="{A290E82F-CF8E-78AC-4042-A00C42CC919A}"/>
+              </a:ext>
+            </a:extLst>
+          </p:cNvPr>
+          <p:cNvPicPr>
+            <a:picLocks noChangeAspect="1"/>
+          </p:cNvPicPr>
+          <p:nvPr/>
+        </p:nvPicPr>
+        <p:blipFill rotWithShape="1">
+          <a:blip r:embed="rId2">
+            <a:extLst>
+              <a:ext uri="{BEBA8EAE-BF5A-486C-A8C5-ECC9F3942E4B}">
+                <a14:imgProps xmlns:a14="http://schemas.microsoft.com/office/drawing/2010/main">
+                  <a14:imgLayer r:embed="rId3">
+                    <a14:imgEffect>
+                      <a14:saturation sat="0"/>
+                    </a14:imgEffect>
+                  </a14:imgLayer>
+                </a14:imgProps>
+              </a:ext>
+            </a:extLst>
+          </a:blip>
+          <a:srcRect l="23552" t="1" r="23880" b="327"/>
+          <a:stretch/>
+        </p:blipFill>
+        <p:spPr>
+          <a:xfrm>
+            <a:off x="0" y="0"/>
+            <a:ext cx="5416550" cy="6858000"/>
+          </a:xfrm>
+          <a:prstGeom prst="rect">
+            <a:avLst/>
+          </a:prstGeom>
+        </p:spPr>
+      </p:pic>
+      <p:sp>
+        <p:nvSpPr>
+          <p:cNvPr id="10" name="Title 1">
+            <a:extLst>
+              <a:ext uri="{FF2B5EF4-FFF2-40B4-BE49-F238E27FC236}">
+                <a16:creationId xmlns:a16="http://schemas.microsoft.com/office/drawing/2014/main" id="{9A2FAB6D-1E67-AD6D-D1AB-C04147A1D343}"/>
+              </a:ext>
+            </a:extLst>
+          </p:cNvPr>
+          <p:cNvSpPr>
+            <a:spLocks noGrp="1"/>
+          </p:cNvSpPr>
+          <p:nvPr>
+            <p:ph type="title"/>
+          </p:nvPr>
+        </p:nvSpPr>
+        <p:spPr>
+          <a:xfrm>
+            <a:off x="6095999" y="612037"/>
+            <a:ext cx="5897218" cy="884238"/>
+          </a:xfrm>
+        </p:spPr>
+        <p:txBody>
+          <a:bodyPr/>
+          <a:lstStyle/>
+          <a:p>
+            <a:pPr>
+              <a:lnSpc>
+                <a:spcPct val="100000"/>
+              </a:lnSpc>
+              <a:spcBef>
+                <a:spcPts val="0"/>
+              </a:spcBef>
+            </a:pPr>
+            <a:r>
+              <a:rPr lang="en-US" sz="4200" dirty="0"/>
+              <a:t>x</a:t>
+            </a:r>
+          </a:p>
+        </p:txBody>
+      </p:sp>
+      <p:sp>
+        <p:nvSpPr>
+          <p:cNvPr id="11" name="Content Placeholder 13">
+            <a:extLst>
+              <a:ext uri="{FF2B5EF4-FFF2-40B4-BE49-F238E27FC236}">
+                <a16:creationId xmlns:a16="http://schemas.microsoft.com/office/drawing/2014/main" id="{5D13124E-A576-A643-0305-072644813EB5}"/>
+              </a:ext>
+            </a:extLst>
+          </p:cNvPr>
+          <p:cNvSpPr txBox="1">
+            <a:spLocks/>
+          </p:cNvSpPr>
+          <p:nvPr/>
+        </p:nvSpPr>
+        <p:spPr>
+          <a:xfrm>
+            <a:off x="6169980" y="1660945"/>
+            <a:ext cx="5595299" cy="4208346"/>
+          </a:xfrm>
+          <a:prstGeom prst="rect">
+            <a:avLst/>
+          </a:prstGeom>
+        </p:spPr>
+        <p:txBody>
+          <a:bodyPr vert="horz" lIns="91440" tIns="45720" rIns="91440" bIns="45720" rtlCol="0">
+            <a:normAutofit/>
+          </a:bodyPr>
+          <a:lstStyle>
+            <a:lvl1pPr marR="0" lvl="0" indent="0" fontAlgn="auto">
+              <a:lnSpc>
+                <a:spcPct val="100000"/>
+              </a:lnSpc>
+              <a:spcBef>
+                <a:spcPts val="1000"/>
+              </a:spcBef>
+              <a:spcAft>
+                <a:spcPts val="0"/>
+              </a:spcAft>
+              <a:buClrTx/>
+              <a:buSzTx/>
+              <a:buFont typeface="Arial" panose="020B0604020202020204" pitchFamily="34" charset="0"/>
+              <a:buNone/>
+              <a:tabLst/>
+              <a:defRPr sz="2000" spc="300">
+                <a:cs typeface="Biome Light" panose="020B0303030204020804" pitchFamily="34" charset="0"/>
+              </a:defRPr>
+            </a:lvl1pPr>
+            <a:lvl2pPr marL="685800" lvl="1" indent="-228600">
+              <a:lnSpc>
+                <a:spcPct val="150000"/>
+              </a:lnSpc>
+              <a:spcBef>
+                <a:spcPts val="500"/>
+              </a:spcBef>
+              <a:buFont typeface="Arial" panose="020B0604020202020204" pitchFamily="34" charset="0"/>
+              <a:buChar char="•"/>
+              <a:defRPr sz="2000"/>
+            </a:lvl2pPr>
+            <a:lvl3pPr marL="1143000" indent="-228600">
+              <a:lnSpc>
+                <a:spcPct val="150000"/>
+              </a:lnSpc>
+              <a:spcBef>
+                <a:spcPts val="500"/>
+              </a:spcBef>
+              <a:buFont typeface="Arial" panose="020B0604020202020204" pitchFamily="34" charset="0"/>
+              <a:buChar char="•"/>
+              <a:defRPr sz="1400"/>
+            </a:lvl3pPr>
+            <a:lvl4pPr marL="1600200" indent="-228600">
+              <a:lnSpc>
+                <a:spcPct val="150000"/>
+              </a:lnSpc>
+              <a:spcBef>
+                <a:spcPts val="500"/>
+              </a:spcBef>
+              <a:buFont typeface="Arial" panose="020B0604020202020204" pitchFamily="34" charset="0"/>
+              <a:buChar char="•"/>
+              <a:defRPr sz="1200"/>
+            </a:lvl4pPr>
+            <a:lvl5pPr marL="2057400" indent="-228600">
+              <a:lnSpc>
+                <a:spcPct val="150000"/>
+              </a:lnSpc>
+              <a:spcBef>
+                <a:spcPts val="500"/>
+              </a:spcBef>
+              <a:buFont typeface="Arial" panose="020B0604020202020204" pitchFamily="34" charset="0"/>
+              <a:buChar char="•"/>
+              <a:defRPr sz="1200"/>
+            </a:lvl5pPr>
+            <a:lvl6pPr marL="2514600" indent="-228600">
+              <a:lnSpc>
+                <a:spcPct val="90000"/>
+              </a:lnSpc>
+              <a:spcBef>
+                <a:spcPts val="500"/>
+              </a:spcBef>
+              <a:buFont typeface="Arial" panose="020B0604020202020204" pitchFamily="34" charset="0"/>
+              <a:buChar char="•"/>
+            </a:lvl6pPr>
+            <a:lvl7pPr marL="2971800" indent="-228600">
+              <a:lnSpc>
+                <a:spcPct val="90000"/>
+              </a:lnSpc>
+              <a:spcBef>
+                <a:spcPts val="500"/>
+              </a:spcBef>
+              <a:buFont typeface="Arial" panose="020B0604020202020204" pitchFamily="34" charset="0"/>
+              <a:buChar char="•"/>
+            </a:lvl7pPr>
+            <a:lvl8pPr marL="3429000" indent="-228600">
+              <a:lnSpc>
+                <a:spcPct val="90000"/>
+              </a:lnSpc>
+              <a:spcBef>
+                <a:spcPts val="500"/>
+              </a:spcBef>
+              <a:buFont typeface="Arial" panose="020B0604020202020204" pitchFamily="34" charset="0"/>
+              <a:buChar char="•"/>
+            </a:lvl8pPr>
+            <a:lvl9pPr marL="3886200" indent="-228600">
+              <a:lnSpc>
+                <a:spcPct val="90000"/>
+              </a:lnSpc>
+              <a:spcBef>
+                <a:spcPts val="500"/>
+              </a:spcBef>
+              <a:buFont typeface="Arial" panose="020B0604020202020204" pitchFamily="34" charset="0"/>
+              <a:buChar char="•"/>
+            </a:lvl9pPr>
+          </a:lstStyle>
+          <a:p>
+            <a:r>
+              <a:rPr lang="en-US" spc="0" dirty="0"/>
+              <a:t>CURRENTLY RESEARCHING</a:t>
+            </a:r>
+          </a:p>
+          <a:p>
+            <a:pPr>
+              <a:lnSpc>
+                <a:spcPct val="150000"/>
+              </a:lnSpc>
+            </a:pPr>
+            <a:r>
+              <a:rPr lang="en-US" spc="0" dirty="0">
+                <a:cs typeface="+mn-cs"/>
+              </a:rPr>
+              <a:t>We need an API for animal photo recognition, here’s what we are looking at possibly implementing:</a:t>
+            </a:r>
+          </a:p>
+          <a:p>
+            <a:pPr lvl="1"/>
+            <a:r>
+              <a:rPr lang="en-US" dirty="0"/>
+              <a:t>Google Login API</a:t>
+            </a:r>
+          </a:p>
+          <a:p>
+            <a:pPr lvl="2"/>
+            <a:r>
+              <a:rPr lang="en-US" dirty="0"/>
+              <a:t>Use Google Account to login to website</a:t>
+            </a:r>
+          </a:p>
+          <a:p>
+            <a:pPr lvl="1"/>
+            <a:r>
+              <a:rPr lang="en-US" dirty="0"/>
+              <a:t>Microsoft Azure AI API</a:t>
+            </a:r>
+          </a:p>
+          <a:p>
+            <a:pPr lvl="2"/>
+            <a:r>
+              <a:rPr lang="en-US" dirty="0"/>
+              <a:t>Uses Microsoft Azure AI to recognize image and return tag</a:t>
+            </a:r>
+          </a:p>
+          <a:p>
+            <a:endParaRPr lang="en-US" spc="0" dirty="0"/>
+          </a:p>
+        </p:txBody>
+      </p:sp>
+    </p:spTree>
+    <p:extLst>
+      <p:ext uri="{BB962C8B-B14F-4D97-AF65-F5344CB8AC3E}">
+        <p14:creationId xmlns:p14="http://schemas.microsoft.com/office/powerpoint/2010/main" val="440829756"/>
+      </p:ext>
+    </p:extLst>
+  </p:cSld>
+  <p:clrMapOvr>
+    <a:masterClrMapping/>
+  </p:clrMapOvr>
+</p:sld>
+</file>
+
+<file path=ppt/slides/slide11.xml><?xml version="1.0" encoding="utf-8"?>
+<p:sld xmlns:a="http://schemas.openxmlformats.org/drawingml/2006/main" xmlns:r="http://schemas.openxmlformats.org/officeDocument/2006/relationships" xmlns:p="http://schemas.openxmlformats.org/presentationml/2006/main">
+  <p:cSld>
+    <p:spTree>
+      <p:nvGrpSpPr>
+        <p:cNvPr id="1" name=""/>
+        <p:cNvGrpSpPr/>
+        <p:nvPr/>
+      </p:nvGrpSpPr>
+      <p:grpSpPr>
+        <a:xfrm>
+          <a:off x="0" y="0"/>
+          <a:ext cx="0" cy="0"/>
+          <a:chOff x="0" y="0"/>
+          <a:chExt cx="0" cy="0"/>
+        </a:xfrm>
+      </p:grpSpPr>
+      <p:sp>
+        <p:nvSpPr>
+          <p:cNvPr id="6" name="Slide Number Placeholder 5">
+            <a:extLst>
+              <a:ext uri="{FF2B5EF4-FFF2-40B4-BE49-F238E27FC236}">
+                <a16:creationId xmlns:a16="http://schemas.microsoft.com/office/drawing/2014/main" id="{FC6A5C12-E784-444E-B868-DE2AE85742BB}"/>
+              </a:ext>
+            </a:extLst>
+          </p:cNvPr>
+          <p:cNvSpPr>
+            <a:spLocks noGrp="1"/>
+          </p:cNvSpPr>
+          <p:nvPr>
+            <p:ph type="sldNum" sz="quarter" idx="12"/>
+          </p:nvPr>
+        </p:nvSpPr>
+        <p:spPr/>
+        <p:txBody>
+          <a:bodyPr/>
+          <a:lstStyle/>
+          <a:p>
+            <a:fld id="{8C2E478F-E849-4A8C-AF1F-CBCC78A7CBFA}" type="slidenum">
+              <a:rPr lang="en-US" smtClean="0"/>
+              <a:t>11</a:t>
             </a:fld>
             <a:endParaRPr lang="en-US" dirty="0"/>
           </a:p>
@@ -5689,6 +6049,13 @@
           </p:nvPr>
         </p:nvSpPr>
         <p:spPr/>
+        <p:txBody>
+          <a:bodyPr/>
+          <a:lstStyle/>
+          <a:p>
+            <a:endParaRPr lang="en-US"/>
+          </a:p>
+        </p:txBody>
       </p:sp>
       <p:pic>
         <p:nvPicPr>
@@ -5852,12 +6219,18 @@
 </p:sld>
 </file>
 
-<file path=ppt/slides/slide11.xml><?xml version="1.0" encoding="utf-8"?>
+<file path=ppt/slides/slide12.xml><?xml version="1.0" encoding="utf-8"?>
 <p:sld xmlns:a="http://schemas.openxmlformats.org/drawingml/2006/main" xmlns:r="http://schemas.openxmlformats.org/officeDocument/2006/relationships" xmlns:p="http://schemas.openxmlformats.org/presentationml/2006/main">
   <p:cSld>
     <p:spTree>
       <p:nvGrpSpPr>
-        <p:cNvPr id="1" name=""/>
+        <p:cNvPr id="1" name="">
+          <a:extLst>
+            <a:ext uri="{FF2B5EF4-FFF2-40B4-BE49-F238E27FC236}">
+              <a16:creationId xmlns:a16="http://schemas.microsoft.com/office/drawing/2014/main" id="{896357A5-30E7-CACA-2709-93DCF9540AF7}"/>
+            </a:ext>
+          </a:extLst>
+        </p:cNvPr>
         <p:cNvGrpSpPr/>
         <p:nvPr/>
       </p:nvGrpSpPr>
@@ -5869,74 +6242,12 @@
           <a:chExt cx="0" cy="0"/>
         </a:xfrm>
       </p:grpSpPr>
-      <p:sp>
-        <p:nvSpPr>
-          <p:cNvPr id="5" name="Text Placeholder 4">
-            <a:extLst>
-              <a:ext uri="{FF2B5EF4-FFF2-40B4-BE49-F238E27FC236}">
-                <a16:creationId xmlns:a16="http://schemas.microsoft.com/office/drawing/2014/main" id="{AF9B872F-6332-408E-9135-B871F0C90C00}"/>
-              </a:ext>
-            </a:extLst>
-          </p:cNvPr>
-          <p:cNvSpPr>
-            <a:spLocks noGrp="1"/>
-          </p:cNvSpPr>
-          <p:nvPr>
-            <p:ph type="body" idx="1"/>
-          </p:nvPr>
-        </p:nvSpPr>
-        <p:spPr>
-          <a:xfrm>
-            <a:off x="6169980" y="5940605"/>
-            <a:ext cx="6022019" cy="365125"/>
-          </a:xfrm>
-        </p:spPr>
-        <p:txBody>
-          <a:bodyPr/>
-          <a:lstStyle/>
-          <a:p>
-            <a:r>
-              <a:rPr lang="en-US" spc="300" dirty="0"/>
-              <a:t> </a:t>
-            </a:r>
-          </a:p>
-        </p:txBody>
-      </p:sp>
-      <p:sp>
-        <p:nvSpPr>
-          <p:cNvPr id="2" name="Slide Number Placeholder 1">
-            <a:extLst>
-              <a:ext uri="{FF2B5EF4-FFF2-40B4-BE49-F238E27FC236}">
-                <a16:creationId xmlns:a16="http://schemas.microsoft.com/office/drawing/2014/main" id="{948DD8A0-BD53-4DBF-949B-0D64D12DADA9}"/>
-              </a:ext>
-            </a:extLst>
-          </p:cNvPr>
-          <p:cNvSpPr>
-            <a:spLocks noGrp="1"/>
-          </p:cNvSpPr>
-          <p:nvPr>
-            <p:ph type="sldNum" sz="quarter" idx="12"/>
-          </p:nvPr>
-        </p:nvSpPr>
-        <p:spPr/>
-        <p:txBody>
-          <a:bodyPr/>
-          <a:lstStyle/>
-          <a:p>
-            <a:fld id="{8C2E478F-E849-4A8C-AF1F-CBCC78A7CBFA}" type="slidenum">
-              <a:rPr lang="en-US" smtClean="0"/>
-              <a:t>11</a:t>
-            </a:fld>
-            <a:endParaRPr lang="en-US" dirty="0"/>
-          </a:p>
-        </p:txBody>
-      </p:sp>
       <p:pic>
         <p:nvPicPr>
-          <p:cNvPr id="4" name="Picture Placeholder 5" descr="person staring at blueprints on a brick wall">
-            <a:extLst>
-              <a:ext uri="{FF2B5EF4-FFF2-40B4-BE49-F238E27FC236}">
-                <a16:creationId xmlns:a16="http://schemas.microsoft.com/office/drawing/2014/main" id="{A290E82F-CF8E-78AC-4042-A00C42CC919A}"/>
+          <p:cNvPr id="9" name="Picture Placeholder 7" descr="abstract image">
+            <a:extLst>
+              <a:ext uri="{FF2B5EF4-FFF2-40B4-BE49-F238E27FC236}">
+                <a16:creationId xmlns:a16="http://schemas.microsoft.com/office/drawing/2014/main" id="{5C3FB363-C41E-01DF-5DF7-4C7B1F8A89FC}"/>
               </a:ext>
             </a:extLst>
           </p:cNvPr>
@@ -5947,6 +6258,7 @@
         </p:nvPicPr>
         <p:blipFill rotWithShape="1">
           <a:blip r:embed="rId2">
+            <a:alphaModFix/>
             <a:extLst>
               <a:ext uri="{BEBA8EAE-BF5A-486C-A8C5-ECC9F3942E4B}">
                 <a14:imgProps xmlns:a14="http://schemas.microsoft.com/office/drawing/2010/main">
@@ -5959,13 +6271,13 @@
               </a:ext>
             </a:extLst>
           </a:blip>
-          <a:srcRect l="23552" t="1" r="23880" b="327"/>
+          <a:srcRect l="18261" r="36813"/>
           <a:stretch/>
         </p:blipFill>
         <p:spPr>
           <a:xfrm>
-            <a:off x="0" y="0"/>
-            <a:ext cx="5416550" cy="6858000"/>
+            <a:off x="-1" y="0"/>
+            <a:ext cx="5477523" cy="6858000"/>
           </a:xfrm>
           <a:prstGeom prst="rect">
             <a:avLst/>
@@ -5974,10 +6286,10 @@
       </p:pic>
       <p:sp>
         <p:nvSpPr>
-          <p:cNvPr id="10" name="Title 1">
-            <a:extLst>
-              <a:ext uri="{FF2B5EF4-FFF2-40B4-BE49-F238E27FC236}">
-                <a16:creationId xmlns:a16="http://schemas.microsoft.com/office/drawing/2014/main" id="{9A2FAB6D-1E67-AD6D-D1AB-C04147A1D343}"/>
+          <p:cNvPr id="3" name="Title 2">
+            <a:extLst>
+              <a:ext uri="{FF2B5EF4-FFF2-40B4-BE49-F238E27FC236}">
+                <a16:creationId xmlns:a16="http://schemas.microsoft.com/office/drawing/2014/main" id="{AF5B7F56-DA07-310F-2F5E-594FAE5F324D}"/>
               </a:ext>
             </a:extLst>
           </p:cNvPr>
@@ -5990,77 +6302,134 @@
         </p:nvSpPr>
         <p:spPr>
           <a:xfrm>
-            <a:off x="6095999" y="612037"/>
-            <a:ext cx="5897218" cy="884238"/>
+            <a:off x="6362330" y="411225"/>
+            <a:ext cx="5251450" cy="956373"/>
           </a:xfrm>
         </p:spPr>
         <p:txBody>
+          <a:bodyPr anchor="t">
+            <a:normAutofit fontScale="90000"/>
+          </a:bodyPr>
+          <a:lstStyle/>
+          <a:p>
+            <a:r>
+              <a:rPr lang="en-US" sz="4800" dirty="0"/>
+              <a:t>Implemented Queries</a:t>
+            </a:r>
+          </a:p>
+        </p:txBody>
+      </p:sp>
+      <p:sp>
+        <p:nvSpPr>
+          <p:cNvPr id="5" name="Text Placeholder 4">
+            <a:extLst>
+              <a:ext uri="{FF2B5EF4-FFF2-40B4-BE49-F238E27FC236}">
+                <a16:creationId xmlns:a16="http://schemas.microsoft.com/office/drawing/2014/main" id="{AEBF041D-D309-7AB4-AF34-B9636AF39DDF}"/>
+              </a:ext>
+            </a:extLst>
+          </p:cNvPr>
+          <p:cNvSpPr>
+            <a:spLocks noGrp="1"/>
+          </p:cNvSpPr>
+          <p:nvPr>
+            <p:ph type="body" idx="1"/>
+          </p:nvPr>
+        </p:nvSpPr>
+        <p:spPr>
+          <a:xfrm>
+            <a:off x="6362330" y="2025552"/>
+            <a:ext cx="5829669" cy="365125"/>
+          </a:xfrm>
+        </p:spPr>
+        <p:txBody>
           <a:bodyPr/>
           <a:lstStyle/>
           <a:p>
-            <a:pPr>
+            <a:r>
+              <a:rPr lang="en-US" spc="300" dirty="0"/>
+              <a:t> </a:t>
+            </a:r>
+          </a:p>
+        </p:txBody>
+      </p:sp>
+      <p:sp>
+        <p:nvSpPr>
+          <p:cNvPr id="2" name="Slide Number Placeholder 1">
+            <a:extLst>
+              <a:ext uri="{FF2B5EF4-FFF2-40B4-BE49-F238E27FC236}">
+                <a16:creationId xmlns:a16="http://schemas.microsoft.com/office/drawing/2014/main" id="{AA91C46B-0405-BC26-B64A-218461638CE6}"/>
+              </a:ext>
+            </a:extLst>
+          </p:cNvPr>
+          <p:cNvSpPr>
+            <a:spLocks noGrp="1"/>
+          </p:cNvSpPr>
+          <p:nvPr>
+            <p:ph type="sldNum" sz="quarter" idx="12"/>
+          </p:nvPr>
+        </p:nvSpPr>
+        <p:spPr/>
+        <p:txBody>
+          <a:bodyPr/>
+          <a:lstStyle/>
+          <a:p>
+            <a:fld id="{8C2E478F-E849-4A8C-AF1F-CBCC78A7CBFA}" type="slidenum">
+              <a:rPr lang="en-US" smtClean="0"/>
+              <a:t>12</a:t>
+            </a:fld>
+            <a:endParaRPr lang="en-US" dirty="0"/>
+          </a:p>
+        </p:txBody>
+      </p:sp>
+      <p:sp>
+        <p:nvSpPr>
+          <p:cNvPr id="6" name="Content Placeholder 8">
+            <a:extLst>
+              <a:ext uri="{FF2B5EF4-FFF2-40B4-BE49-F238E27FC236}">
+                <a16:creationId xmlns:a16="http://schemas.microsoft.com/office/drawing/2014/main" id="{BDEA54F7-AC68-3AA7-82ED-71F2213BDAB1}"/>
+              </a:ext>
+            </a:extLst>
+          </p:cNvPr>
+          <p:cNvSpPr txBox="1">
+            <a:spLocks/>
+          </p:cNvSpPr>
+          <p:nvPr/>
+        </p:nvSpPr>
+        <p:spPr>
+          <a:xfrm>
+            <a:off x="6362330" y="2574543"/>
+            <a:ext cx="4646246" cy="3893760"/>
+          </a:xfrm>
+          <a:prstGeom prst="rect">
+            <a:avLst/>
+          </a:prstGeom>
+          <a:noFill/>
+        </p:spPr>
+        <p:txBody>
+          <a:bodyPr vert="horz" lIns="91440" tIns="45720" rIns="91440" bIns="45720" rtlCol="0" anchor="t">
+            <a:normAutofit fontScale="70000" lnSpcReduction="20000"/>
+          </a:bodyPr>
+          <a:lstStyle>
+            <a:defPPr>
+              <a:defRPr lang="en-US"/>
+            </a:defPPr>
+            <a:lvl1pPr indent="0">
               <a:lnSpc>
-                <a:spcPct val="100000"/>
+                <a:spcPct val="120000"/>
               </a:lnSpc>
               <a:spcBef>
                 <a:spcPts val="0"/>
               </a:spcBef>
-            </a:pPr>
-            <a:r>
-              <a:rPr lang="en-US" sz="4200" dirty="0"/>
-              <a:t>x</a:t>
-            </a:r>
-          </a:p>
-        </p:txBody>
-      </p:sp>
-      <p:sp>
-        <p:nvSpPr>
-          <p:cNvPr id="11" name="Content Placeholder 13">
-            <a:extLst>
-              <a:ext uri="{FF2B5EF4-FFF2-40B4-BE49-F238E27FC236}">
-                <a16:creationId xmlns:a16="http://schemas.microsoft.com/office/drawing/2014/main" id="{5D13124E-A576-A643-0305-072644813EB5}"/>
-              </a:ext>
-            </a:extLst>
-          </p:cNvPr>
-          <p:cNvSpPr txBox="1">
-            <a:spLocks/>
-          </p:cNvSpPr>
-          <p:nvPr/>
-        </p:nvSpPr>
-        <p:spPr>
-          <a:xfrm>
-            <a:off x="6169980" y="1660945"/>
-            <a:ext cx="5595299" cy="4208346"/>
-          </a:xfrm>
-          <a:prstGeom prst="rect">
-            <a:avLst/>
-          </a:prstGeom>
-        </p:spPr>
-        <p:txBody>
-          <a:bodyPr vert="horz" lIns="91440" tIns="45720" rIns="91440" bIns="45720" rtlCol="0">
-            <a:normAutofit/>
-          </a:bodyPr>
-          <a:lstStyle>
-            <a:lvl1pPr marR="0" lvl="0" indent="0" fontAlgn="auto">
-              <a:lnSpc>
-                <a:spcPct val="100000"/>
-              </a:lnSpc>
-              <a:spcBef>
-                <a:spcPts val="1000"/>
-              </a:spcBef>
-              <a:spcAft>
-                <a:spcPts val="0"/>
-              </a:spcAft>
-              <a:buClrTx/>
-              <a:buSzTx/>
               <a:buFont typeface="Arial" panose="020B0604020202020204" pitchFamily="34" charset="0"/>
               <a:buNone/>
-              <a:tabLst/>
-              <a:defRPr sz="2000" spc="300">
-                <a:cs typeface="Biome Light" panose="020B0303030204020804" pitchFamily="34" charset="0"/>
+              <a:defRPr sz="2400" cap="none" spc="0" baseline="0">
+                <a:solidFill>
+                  <a:sysClr val="windowText" lastClr="000000"/>
+                </a:solidFill>
+                <a:effectLst/>
               </a:defRPr>
             </a:lvl1pPr>
-            <a:lvl2pPr marL="685800" lvl="1" indent="-228600">
+            <a:lvl2pPr indent="0">
               <a:lnSpc>
                 <a:spcPct val="150000"/>
               </a:lnSpc>
@@ -6068,10 +6437,16 @@
                 <a:spcPts val="500"/>
               </a:spcBef>
               <a:buFont typeface="Arial" panose="020B0604020202020204" pitchFamily="34" charset="0"/>
-              <a:buChar char="•"/>
-              <a:defRPr sz="2000"/>
+              <a:buNone/>
+              <a:defRPr sz="2000">
+                <a:solidFill>
+                  <a:schemeClr val="tx1">
+                    <a:tint val="75000"/>
+                  </a:schemeClr>
+                </a:solidFill>
+              </a:defRPr>
             </a:lvl2pPr>
-            <a:lvl3pPr marL="1143000" indent="-228600">
+            <a:lvl3pPr indent="0">
               <a:lnSpc>
                 <a:spcPct val="150000"/>
               </a:lnSpc>
@@ -6079,10 +6454,16 @@
                 <a:spcPts val="500"/>
               </a:spcBef>
               <a:buFont typeface="Arial" panose="020B0604020202020204" pitchFamily="34" charset="0"/>
-              <a:buChar char="•"/>
-              <a:defRPr sz="1400"/>
+              <a:buNone/>
+              <a:defRPr>
+                <a:solidFill>
+                  <a:schemeClr val="tx1">
+                    <a:tint val="75000"/>
+                  </a:schemeClr>
+                </a:solidFill>
+              </a:defRPr>
             </a:lvl3pPr>
-            <a:lvl4pPr marL="1600200" indent="-228600">
+            <a:lvl4pPr indent="0">
               <a:lnSpc>
                 <a:spcPct val="150000"/>
               </a:lnSpc>
@@ -6090,10 +6471,16 @@
                 <a:spcPts val="500"/>
               </a:spcBef>
               <a:buFont typeface="Arial" panose="020B0604020202020204" pitchFamily="34" charset="0"/>
-              <a:buChar char="•"/>
-              <a:defRPr sz="1200"/>
+              <a:buNone/>
+              <a:defRPr sz="1600">
+                <a:solidFill>
+                  <a:schemeClr val="tx1">
+                    <a:tint val="75000"/>
+                  </a:schemeClr>
+                </a:solidFill>
+              </a:defRPr>
             </a:lvl4pPr>
-            <a:lvl5pPr marL="2057400" indent="-228600">
+            <a:lvl5pPr indent="0">
               <a:lnSpc>
                 <a:spcPct val="150000"/>
               </a:lnSpc>
@@ -6101,10 +6488,16 @@
                 <a:spcPts val="500"/>
               </a:spcBef>
               <a:buFont typeface="Arial" panose="020B0604020202020204" pitchFamily="34" charset="0"/>
-              <a:buChar char="•"/>
-              <a:defRPr sz="1200"/>
+              <a:buNone/>
+              <a:defRPr sz="1600">
+                <a:solidFill>
+                  <a:schemeClr val="tx1">
+                    <a:tint val="75000"/>
+                  </a:schemeClr>
+                </a:solidFill>
+              </a:defRPr>
             </a:lvl5pPr>
-            <a:lvl6pPr marL="2514600" indent="-228600">
+            <a:lvl6pPr indent="0">
               <a:lnSpc>
                 <a:spcPct val="90000"/>
               </a:lnSpc>
@@ -6112,9 +6505,16 @@
                 <a:spcPts val="500"/>
               </a:spcBef>
               <a:buFont typeface="Arial" panose="020B0604020202020204" pitchFamily="34" charset="0"/>
-              <a:buChar char="•"/>
+              <a:buNone/>
+              <a:defRPr sz="1600">
+                <a:solidFill>
+                  <a:schemeClr val="tx1">
+                    <a:tint val="75000"/>
+                  </a:schemeClr>
+                </a:solidFill>
+              </a:defRPr>
             </a:lvl6pPr>
-            <a:lvl7pPr marL="2971800" indent="-228600">
+            <a:lvl7pPr indent="0">
               <a:lnSpc>
                 <a:spcPct val="90000"/>
               </a:lnSpc>
@@ -6122,9 +6522,16 @@
                 <a:spcPts val="500"/>
               </a:spcBef>
               <a:buFont typeface="Arial" panose="020B0604020202020204" pitchFamily="34" charset="0"/>
-              <a:buChar char="•"/>
+              <a:buNone/>
+              <a:defRPr sz="1600">
+                <a:solidFill>
+                  <a:schemeClr val="tx1">
+                    <a:tint val="75000"/>
+                  </a:schemeClr>
+                </a:solidFill>
+              </a:defRPr>
             </a:lvl7pPr>
-            <a:lvl8pPr marL="3429000" indent="-228600">
+            <a:lvl8pPr indent="0">
               <a:lnSpc>
                 <a:spcPct val="90000"/>
               </a:lnSpc>
@@ -6132,9 +6539,16 @@
                 <a:spcPts val="500"/>
               </a:spcBef>
               <a:buFont typeface="Arial" panose="020B0604020202020204" pitchFamily="34" charset="0"/>
-              <a:buChar char="•"/>
+              <a:buNone/>
+              <a:defRPr sz="1600">
+                <a:solidFill>
+                  <a:schemeClr val="tx1">
+                    <a:tint val="75000"/>
+                  </a:schemeClr>
+                </a:solidFill>
+              </a:defRPr>
             </a:lvl8pPr>
-            <a:lvl9pPr marL="3886200" indent="-228600">
+            <a:lvl9pPr indent="0">
               <a:lnSpc>
                 <a:spcPct val="90000"/>
               </a:lnSpc>
@@ -6142,79 +6556,109 @@
                 <a:spcPts val="500"/>
               </a:spcBef>
               <a:buFont typeface="Arial" panose="020B0604020202020204" pitchFamily="34" charset="0"/>
-              <a:buChar char="•"/>
+              <a:buNone/>
+              <a:defRPr sz="1600">
+                <a:solidFill>
+                  <a:schemeClr val="tx1">
+                    <a:tint val="75000"/>
+                  </a:schemeClr>
+                </a:solidFill>
+              </a:defRPr>
             </a:lvl9pPr>
           </a:lstStyle>
           <a:p>
-            <a:r>
-              <a:rPr lang="en-US" spc="0" dirty="0"/>
-              <a:t>CURRENTLY RESEARCHING</a:t>
-            </a:r>
-          </a:p>
-          <a:p>
-            <a:pPr>
-              <a:lnSpc>
-                <a:spcPct val="150000"/>
-              </a:lnSpc>
+            <a:pPr marL="342900" indent="-342900">
+              <a:buFont typeface="Arial" panose="020B0604020202020204" pitchFamily="34" charset="0"/>
+              <a:buChar char="•"/>
             </a:pPr>
             <a:r>
-              <a:rPr lang="en-US" spc="0" dirty="0">
-                <a:cs typeface="+mn-cs"/>
-              </a:rPr>
-              <a:t>We need an API for animal photo recognition, here’s what we are looking at possibly implementing:</a:t>
-            </a:r>
-          </a:p>
-          <a:p>
-            <a:pPr lvl="1"/>
-            <a:r>
               <a:rPr lang="en-US" dirty="0"/>
-              <a:t>Amazon </a:t>
-            </a:r>
-            <a:r>
-              <a:rPr lang="en-US" dirty="0" err="1"/>
-              <a:t>Rekognition</a:t>
-            </a:r>
+              <a:t>Django’s authentication library</a:t>
+            </a:r>
+          </a:p>
+          <a:p>
+            <a:pPr marL="800100" lvl="1" indent="-342900">
+              <a:buFont typeface="Arial" panose="020B0604020202020204" pitchFamily="34" charset="0"/>
+              <a:buChar char="•"/>
+            </a:pPr>
+            <a:r>
+              <a:rPr lang="en-US" dirty="0"/>
+              <a:t>Retrieves user from database</a:t>
+            </a:r>
+          </a:p>
+          <a:p>
+            <a:pPr marL="800100" lvl="1" indent="-342900">
+              <a:buFont typeface="Arial" panose="020B0604020202020204" pitchFamily="34" charset="0"/>
+              <a:buChar char="•"/>
+            </a:pPr>
+            <a:r>
+              <a:rPr lang="en-US" dirty="0"/>
+              <a:t>Verifies password is correct</a:t>
+            </a:r>
+          </a:p>
+          <a:p>
+            <a:pPr marL="800100" lvl="1" indent="-342900">
+              <a:buFont typeface="Arial" panose="020B0604020202020204" pitchFamily="34" charset="0"/>
+              <a:buChar char="•"/>
+            </a:pPr>
+            <a:r>
+              <a:rPr lang="en-US" dirty="0"/>
+              <a:t>Return user from database </a:t>
+            </a:r>
+          </a:p>
+          <a:p>
+            <a:pPr marL="342900" indent="-342900">
+              <a:buFont typeface="Arial" panose="020B0604020202020204" pitchFamily="34" charset="0"/>
+              <a:buChar char="•"/>
+            </a:pPr>
+            <a:r>
+              <a:rPr lang="en-US" dirty="0"/>
+              <a:t> Google Authentication Queries</a:t>
+            </a:r>
+          </a:p>
+          <a:p>
+            <a:pPr marL="800100" lvl="1" indent="-342900">
+              <a:buFont typeface="Arial" panose="020B0604020202020204" pitchFamily="34" charset="0"/>
+              <a:buChar char="•"/>
+            </a:pPr>
+            <a:r>
+              <a:rPr lang="en-US" dirty="0"/>
+              <a:t>Start by Django sending request to Google server</a:t>
+            </a:r>
+          </a:p>
+          <a:p>
+            <a:pPr marL="800100" lvl="1" indent="-342900">
+              <a:buFont typeface="Arial" panose="020B0604020202020204" pitchFamily="34" charset="0"/>
+              <a:buChar char="•"/>
+            </a:pPr>
+            <a:r>
+              <a:rPr lang="en-US" dirty="0"/>
+              <a:t>Google generates authentication token, which is validated by Django</a:t>
+            </a:r>
+          </a:p>
+          <a:p>
+            <a:pPr marL="800100" lvl="1" indent="-342900">
+              <a:buFont typeface="Arial" panose="020B0604020202020204" pitchFamily="34" charset="0"/>
+              <a:buChar char="•"/>
+            </a:pPr>
+            <a:r>
+              <a:rPr lang="en-US" dirty="0"/>
+              <a:t>Once verified, Django sends request for user information</a:t>
+            </a:r>
+          </a:p>
+          <a:p>
+            <a:pPr marL="342900" indent="-342900">
+              <a:buFont typeface="Arial" panose="020B0604020202020204" pitchFamily="34" charset="0"/>
+              <a:buChar char="•"/>
+            </a:pPr>
             <a:endParaRPr lang="en-US" dirty="0"/>
-          </a:p>
-          <a:p>
-            <a:pPr lvl="1"/>
-            <a:r>
-              <a:rPr lang="en-US" dirty="0" err="1"/>
-              <a:t>Imagga</a:t>
-            </a:r>
-            <a:endParaRPr lang="en-US" dirty="0"/>
-          </a:p>
-          <a:p>
-            <a:pPr lvl="1"/>
-            <a:r>
-              <a:rPr lang="en-US" dirty="0"/>
-              <a:t>The Dog API</a:t>
-            </a:r>
-          </a:p>
-          <a:p>
-            <a:pPr lvl="1"/>
-            <a:r>
-              <a:rPr lang="en-US" dirty="0"/>
-              <a:t>Vision AI</a:t>
-            </a:r>
-          </a:p>
-          <a:p>
-            <a:pPr lvl="1"/>
-            <a:r>
-              <a:rPr lang="en-US" dirty="0" err="1"/>
-              <a:t>KerasCV</a:t>
-            </a:r>
-            <a:endParaRPr lang="en-US" dirty="0"/>
-          </a:p>
-          <a:p>
-            <a:endParaRPr lang="en-US" spc="0" dirty="0"/>
           </a:p>
         </p:txBody>
       </p:sp>
     </p:spTree>
     <p:extLst>
       <p:ext uri="{BB962C8B-B14F-4D97-AF65-F5344CB8AC3E}">
-        <p14:creationId xmlns:p14="http://schemas.microsoft.com/office/powerpoint/2010/main" val="440829756"/>
+        <p14:creationId xmlns:p14="http://schemas.microsoft.com/office/powerpoint/2010/main" val="2790229447"/>
       </p:ext>
     </p:extLst>
   </p:cSld>
@@ -6224,7 +6668,399 @@
 </p:sld>
 </file>
 
-<file path=ppt/slides/slide12.xml><?xml version="1.0" encoding="utf-8"?>
+<file path=ppt/slides/slide13.xml><?xml version="1.0" encoding="utf-8"?>
+<p:sld xmlns:a="http://schemas.openxmlformats.org/drawingml/2006/main" xmlns:r="http://schemas.openxmlformats.org/officeDocument/2006/relationships" xmlns:p="http://schemas.openxmlformats.org/presentationml/2006/main">
+  <p:cSld>
+    <p:spTree>
+      <p:nvGrpSpPr>
+        <p:cNvPr id="1" name="">
+          <a:extLst>
+            <a:ext uri="{FF2B5EF4-FFF2-40B4-BE49-F238E27FC236}">
+              <a16:creationId xmlns:a16="http://schemas.microsoft.com/office/drawing/2014/main" id="{C9B2A81C-D788-C998-192F-A41C724B6A67}"/>
+            </a:ext>
+          </a:extLst>
+        </p:cNvPr>
+        <p:cNvGrpSpPr/>
+        <p:nvPr/>
+      </p:nvGrpSpPr>
+      <p:grpSpPr>
+        <a:xfrm>
+          <a:off x="0" y="0"/>
+          <a:ext cx="0" cy="0"/>
+          <a:chOff x="0" y="0"/>
+          <a:chExt cx="0" cy="0"/>
+        </a:xfrm>
+      </p:grpSpPr>
+      <p:pic>
+        <p:nvPicPr>
+          <p:cNvPr id="9" name="Picture Placeholder 7" descr="abstract image">
+            <a:extLst>
+              <a:ext uri="{FF2B5EF4-FFF2-40B4-BE49-F238E27FC236}">
+                <a16:creationId xmlns:a16="http://schemas.microsoft.com/office/drawing/2014/main" id="{C17AFBF1-09E9-E506-28F0-063FCE5485AC}"/>
+              </a:ext>
+            </a:extLst>
+          </p:cNvPr>
+          <p:cNvPicPr>
+            <a:picLocks noChangeAspect="1"/>
+          </p:cNvPicPr>
+          <p:nvPr/>
+        </p:nvPicPr>
+        <p:blipFill rotWithShape="1">
+          <a:blip r:embed="rId2">
+            <a:alphaModFix/>
+            <a:extLst>
+              <a:ext uri="{BEBA8EAE-BF5A-486C-A8C5-ECC9F3942E4B}">
+                <a14:imgProps xmlns:a14="http://schemas.microsoft.com/office/drawing/2010/main">
+                  <a14:imgLayer r:embed="rId3">
+                    <a14:imgEffect>
+                      <a14:saturation sat="0"/>
+                    </a14:imgEffect>
+                  </a14:imgLayer>
+                </a14:imgProps>
+              </a:ext>
+            </a:extLst>
+          </a:blip>
+          <a:srcRect l="18261" r="36813"/>
+          <a:stretch/>
+        </p:blipFill>
+        <p:spPr>
+          <a:xfrm>
+            <a:off x="-1" y="0"/>
+            <a:ext cx="5477523" cy="6858000"/>
+          </a:xfrm>
+          <a:prstGeom prst="rect">
+            <a:avLst/>
+          </a:prstGeom>
+        </p:spPr>
+      </p:pic>
+      <p:sp>
+        <p:nvSpPr>
+          <p:cNvPr id="3" name="Title 2">
+            <a:extLst>
+              <a:ext uri="{FF2B5EF4-FFF2-40B4-BE49-F238E27FC236}">
+                <a16:creationId xmlns:a16="http://schemas.microsoft.com/office/drawing/2014/main" id="{10B9BBDD-D331-85ED-463F-3F4621836CD7}"/>
+              </a:ext>
+            </a:extLst>
+          </p:cNvPr>
+          <p:cNvSpPr>
+            <a:spLocks noGrp="1"/>
+          </p:cNvSpPr>
+          <p:nvPr>
+            <p:ph type="title"/>
+          </p:nvPr>
+        </p:nvSpPr>
+        <p:spPr>
+          <a:xfrm>
+            <a:off x="6362330" y="411225"/>
+            <a:ext cx="5251450" cy="956373"/>
+          </a:xfrm>
+        </p:spPr>
+        <p:txBody>
+          <a:bodyPr anchor="t">
+            <a:normAutofit/>
+          </a:bodyPr>
+          <a:lstStyle/>
+          <a:p>
+            <a:r>
+              <a:rPr lang="en-US" sz="4800" dirty="0"/>
+              <a:t>Future Queries</a:t>
+            </a:r>
+          </a:p>
+        </p:txBody>
+      </p:sp>
+      <p:sp>
+        <p:nvSpPr>
+          <p:cNvPr id="5" name="Text Placeholder 4">
+            <a:extLst>
+              <a:ext uri="{FF2B5EF4-FFF2-40B4-BE49-F238E27FC236}">
+                <a16:creationId xmlns:a16="http://schemas.microsoft.com/office/drawing/2014/main" id="{695C81AB-CBB5-D778-A045-9AEE956D1B30}"/>
+              </a:ext>
+            </a:extLst>
+          </p:cNvPr>
+          <p:cNvSpPr>
+            <a:spLocks noGrp="1"/>
+          </p:cNvSpPr>
+          <p:nvPr>
+            <p:ph type="body" idx="1"/>
+          </p:nvPr>
+        </p:nvSpPr>
+        <p:spPr>
+          <a:xfrm>
+            <a:off x="6362330" y="2025552"/>
+            <a:ext cx="5829669" cy="365125"/>
+          </a:xfrm>
+        </p:spPr>
+        <p:txBody>
+          <a:bodyPr/>
+          <a:lstStyle/>
+          <a:p>
+            <a:r>
+              <a:rPr lang="en-US" spc="300" dirty="0"/>
+              <a:t> </a:t>
+            </a:r>
+          </a:p>
+        </p:txBody>
+      </p:sp>
+      <p:sp>
+        <p:nvSpPr>
+          <p:cNvPr id="2" name="Slide Number Placeholder 1">
+            <a:extLst>
+              <a:ext uri="{FF2B5EF4-FFF2-40B4-BE49-F238E27FC236}">
+                <a16:creationId xmlns:a16="http://schemas.microsoft.com/office/drawing/2014/main" id="{A935E9FD-7EEB-4447-F64D-1F1FA53F6076}"/>
+              </a:ext>
+            </a:extLst>
+          </p:cNvPr>
+          <p:cNvSpPr>
+            <a:spLocks noGrp="1"/>
+          </p:cNvSpPr>
+          <p:nvPr>
+            <p:ph type="sldNum" sz="quarter" idx="12"/>
+          </p:nvPr>
+        </p:nvSpPr>
+        <p:spPr/>
+        <p:txBody>
+          <a:bodyPr/>
+          <a:lstStyle/>
+          <a:p>
+            <a:fld id="{8C2E478F-E849-4A8C-AF1F-CBCC78A7CBFA}" type="slidenum">
+              <a:rPr lang="en-US" smtClean="0"/>
+              <a:t>13</a:t>
+            </a:fld>
+            <a:endParaRPr lang="en-US" dirty="0"/>
+          </a:p>
+        </p:txBody>
+      </p:sp>
+      <p:sp>
+        <p:nvSpPr>
+          <p:cNvPr id="6" name="Content Placeholder 8">
+            <a:extLst>
+              <a:ext uri="{FF2B5EF4-FFF2-40B4-BE49-F238E27FC236}">
+                <a16:creationId xmlns:a16="http://schemas.microsoft.com/office/drawing/2014/main" id="{2C4FFE33-5032-FC7C-2B9D-D3529A288765}"/>
+              </a:ext>
+            </a:extLst>
+          </p:cNvPr>
+          <p:cNvSpPr txBox="1">
+            <a:spLocks/>
+          </p:cNvSpPr>
+          <p:nvPr/>
+        </p:nvSpPr>
+        <p:spPr>
+          <a:xfrm>
+            <a:off x="6362330" y="2574543"/>
+            <a:ext cx="4646246" cy="3893760"/>
+          </a:xfrm>
+          <a:prstGeom prst="rect">
+            <a:avLst/>
+          </a:prstGeom>
+          <a:noFill/>
+        </p:spPr>
+        <p:txBody>
+          <a:bodyPr vert="horz" lIns="91440" tIns="45720" rIns="91440" bIns="45720" rtlCol="0" anchor="t">
+            <a:normAutofit/>
+          </a:bodyPr>
+          <a:lstStyle>
+            <a:defPPr>
+              <a:defRPr lang="en-US"/>
+            </a:defPPr>
+            <a:lvl1pPr indent="0">
+              <a:lnSpc>
+                <a:spcPct val="120000"/>
+              </a:lnSpc>
+              <a:spcBef>
+                <a:spcPts val="0"/>
+              </a:spcBef>
+              <a:buFont typeface="Arial" panose="020B0604020202020204" pitchFamily="34" charset="0"/>
+              <a:buNone/>
+              <a:defRPr sz="2400" cap="none" spc="0" baseline="0">
+                <a:solidFill>
+                  <a:sysClr val="windowText" lastClr="000000"/>
+                </a:solidFill>
+                <a:effectLst/>
+              </a:defRPr>
+            </a:lvl1pPr>
+            <a:lvl2pPr indent="0">
+              <a:lnSpc>
+                <a:spcPct val="150000"/>
+              </a:lnSpc>
+              <a:spcBef>
+                <a:spcPts val="500"/>
+              </a:spcBef>
+              <a:buFont typeface="Arial" panose="020B0604020202020204" pitchFamily="34" charset="0"/>
+              <a:buNone/>
+              <a:defRPr sz="2000">
+                <a:solidFill>
+                  <a:schemeClr val="tx1">
+                    <a:tint val="75000"/>
+                  </a:schemeClr>
+                </a:solidFill>
+              </a:defRPr>
+            </a:lvl2pPr>
+            <a:lvl3pPr indent="0">
+              <a:lnSpc>
+                <a:spcPct val="150000"/>
+              </a:lnSpc>
+              <a:spcBef>
+                <a:spcPts val="500"/>
+              </a:spcBef>
+              <a:buFont typeface="Arial" panose="020B0604020202020204" pitchFamily="34" charset="0"/>
+              <a:buNone/>
+              <a:defRPr>
+                <a:solidFill>
+                  <a:schemeClr val="tx1">
+                    <a:tint val="75000"/>
+                  </a:schemeClr>
+                </a:solidFill>
+              </a:defRPr>
+            </a:lvl3pPr>
+            <a:lvl4pPr indent="0">
+              <a:lnSpc>
+                <a:spcPct val="150000"/>
+              </a:lnSpc>
+              <a:spcBef>
+                <a:spcPts val="500"/>
+              </a:spcBef>
+              <a:buFont typeface="Arial" panose="020B0604020202020204" pitchFamily="34" charset="0"/>
+              <a:buNone/>
+              <a:defRPr sz="1600">
+                <a:solidFill>
+                  <a:schemeClr val="tx1">
+                    <a:tint val="75000"/>
+                  </a:schemeClr>
+                </a:solidFill>
+              </a:defRPr>
+            </a:lvl4pPr>
+            <a:lvl5pPr indent="0">
+              <a:lnSpc>
+                <a:spcPct val="150000"/>
+              </a:lnSpc>
+              <a:spcBef>
+                <a:spcPts val="500"/>
+              </a:spcBef>
+              <a:buFont typeface="Arial" panose="020B0604020202020204" pitchFamily="34" charset="0"/>
+              <a:buNone/>
+              <a:defRPr sz="1600">
+                <a:solidFill>
+                  <a:schemeClr val="tx1">
+                    <a:tint val="75000"/>
+                  </a:schemeClr>
+                </a:solidFill>
+              </a:defRPr>
+            </a:lvl5pPr>
+            <a:lvl6pPr indent="0">
+              <a:lnSpc>
+                <a:spcPct val="90000"/>
+              </a:lnSpc>
+              <a:spcBef>
+                <a:spcPts val="500"/>
+              </a:spcBef>
+              <a:buFont typeface="Arial" panose="020B0604020202020204" pitchFamily="34" charset="0"/>
+              <a:buNone/>
+              <a:defRPr sz="1600">
+                <a:solidFill>
+                  <a:schemeClr val="tx1">
+                    <a:tint val="75000"/>
+                  </a:schemeClr>
+                </a:solidFill>
+              </a:defRPr>
+            </a:lvl6pPr>
+            <a:lvl7pPr indent="0">
+              <a:lnSpc>
+                <a:spcPct val="90000"/>
+              </a:lnSpc>
+              <a:spcBef>
+                <a:spcPts val="500"/>
+              </a:spcBef>
+              <a:buFont typeface="Arial" panose="020B0604020202020204" pitchFamily="34" charset="0"/>
+              <a:buNone/>
+              <a:defRPr sz="1600">
+                <a:solidFill>
+                  <a:schemeClr val="tx1">
+                    <a:tint val="75000"/>
+                  </a:schemeClr>
+                </a:solidFill>
+              </a:defRPr>
+            </a:lvl7pPr>
+            <a:lvl8pPr indent="0">
+              <a:lnSpc>
+                <a:spcPct val="90000"/>
+              </a:lnSpc>
+              <a:spcBef>
+                <a:spcPts val="500"/>
+              </a:spcBef>
+              <a:buFont typeface="Arial" panose="020B0604020202020204" pitchFamily="34" charset="0"/>
+              <a:buNone/>
+              <a:defRPr sz="1600">
+                <a:solidFill>
+                  <a:schemeClr val="tx1">
+                    <a:tint val="75000"/>
+                  </a:schemeClr>
+                </a:solidFill>
+              </a:defRPr>
+            </a:lvl8pPr>
+            <a:lvl9pPr indent="0">
+              <a:lnSpc>
+                <a:spcPct val="90000"/>
+              </a:lnSpc>
+              <a:spcBef>
+                <a:spcPts val="500"/>
+              </a:spcBef>
+              <a:buFont typeface="Arial" panose="020B0604020202020204" pitchFamily="34" charset="0"/>
+              <a:buNone/>
+              <a:defRPr sz="1600">
+                <a:solidFill>
+                  <a:schemeClr val="tx1">
+                    <a:tint val="75000"/>
+                  </a:schemeClr>
+                </a:solidFill>
+              </a:defRPr>
+            </a:lvl9pPr>
+          </a:lstStyle>
+          <a:p>
+            <a:pPr marL="342900" indent="-342900">
+              <a:buFont typeface="Arial" panose="020B0604020202020204" pitchFamily="34" charset="0"/>
+              <a:buChar char="•"/>
+            </a:pPr>
+            <a:r>
+              <a:rPr lang="en-US" dirty="0"/>
+              <a:t>Django provides Object-Relational-Mapping system</a:t>
+            </a:r>
+          </a:p>
+          <a:p>
+            <a:pPr marL="800100" lvl="1" indent="-342900">
+              <a:buFont typeface="Arial" panose="020B0604020202020204" pitchFamily="34" charset="0"/>
+              <a:buChar char="•"/>
+            </a:pPr>
+            <a:r>
+              <a:rPr lang="en-US" dirty="0"/>
+              <a:t>Use CRUD operations to interact with database</a:t>
+            </a:r>
+          </a:p>
+          <a:p>
+            <a:pPr marL="800100" lvl="1" indent="-342900">
+              <a:buFont typeface="Arial" panose="020B0604020202020204" pitchFamily="34" charset="0"/>
+              <a:buChar char="•"/>
+            </a:pPr>
+            <a:r>
+              <a:rPr lang="en-US" dirty="0"/>
+              <a:t>Retrieving animal names, filtering names based on attributes, creating a list of favorited names</a:t>
+            </a:r>
+          </a:p>
+        </p:txBody>
+      </p:sp>
+    </p:spTree>
+    <p:extLst>
+      <p:ext uri="{BB962C8B-B14F-4D97-AF65-F5344CB8AC3E}">
+        <p14:creationId xmlns:p14="http://schemas.microsoft.com/office/powerpoint/2010/main" val="2816746736"/>
+      </p:ext>
+    </p:extLst>
+  </p:cSld>
+  <p:clrMapOvr>
+    <a:masterClrMapping/>
+  </p:clrMapOvr>
+</p:sld>
+</file>
+
+<file path=ppt/slides/slide14.xml><?xml version="1.0" encoding="utf-8"?>
 <p:sld xmlns:a="http://schemas.openxmlformats.org/drawingml/2006/main" xmlns:r="http://schemas.openxmlformats.org/officeDocument/2006/relationships" xmlns:p="http://schemas.openxmlformats.org/presentationml/2006/main">
   <p:cSld>
     <p:spTree>
@@ -7183,7 +8019,7 @@
           <a:p>
             <a:fld id="{8C2E478F-E849-4A8C-AF1F-CBCC78A7CBFA}" type="slidenum">
               <a:rPr lang="en-US" smtClean="0"/>
-              <a:t>12</a:t>
+              <a:t>14</a:t>
             </a:fld>
             <a:endParaRPr lang="en-US" dirty="0"/>
           </a:p>
@@ -7202,7 +8038,7 @@
 </p:sld>
 </file>
 
-<file path=ppt/slides/slide13.xml><?xml version="1.0" encoding="utf-8"?>
+<file path=ppt/slides/slide15.xml><?xml version="1.0" encoding="utf-8"?>
 <p:sld xmlns:a="http://schemas.openxmlformats.org/drawingml/2006/main" xmlns:r="http://schemas.openxmlformats.org/officeDocument/2006/relationships" xmlns:p="http://schemas.openxmlformats.org/presentationml/2006/main">
   <p:cSld>
     <p:bg>
@@ -7590,6 +8426,372 @@
   <p:cSld>
     <p:spTree>
       <p:nvGrpSpPr>
+        <p:cNvPr id="1" name="">
+          <a:extLst>
+            <a:ext uri="{FF2B5EF4-FFF2-40B4-BE49-F238E27FC236}">
+              <a16:creationId xmlns:a16="http://schemas.microsoft.com/office/drawing/2014/main" id="{C5F00FA0-CE09-82DB-0E84-8CB701D36D0B}"/>
+            </a:ext>
+          </a:extLst>
+        </p:cNvPr>
+        <p:cNvGrpSpPr/>
+        <p:nvPr/>
+      </p:nvGrpSpPr>
+      <p:grpSpPr>
+        <a:xfrm>
+          <a:off x="0" y="0"/>
+          <a:ext cx="0" cy="0"/>
+          <a:chOff x="0" y="0"/>
+          <a:chExt cx="0" cy="0"/>
+        </a:xfrm>
+      </p:grpSpPr>
+      <p:pic>
+        <p:nvPicPr>
+          <p:cNvPr id="9" name="Picture Placeholder 7">
+            <a:extLst>
+              <a:ext uri="{FF2B5EF4-FFF2-40B4-BE49-F238E27FC236}">
+                <a16:creationId xmlns:a16="http://schemas.microsoft.com/office/drawing/2014/main" id="{4A0EB61E-4604-76AF-6122-43154C0DE16E}"/>
+              </a:ext>
+            </a:extLst>
+          </p:cNvPr>
+          <p:cNvPicPr>
+            <a:picLocks noChangeAspect="1"/>
+          </p:cNvPicPr>
+          <p:nvPr/>
+        </p:nvPicPr>
+        <p:blipFill>
+          <a:blip r:embed="rId2"/>
+          <a:srcRect l="7453" r="7453"/>
+          <a:stretch/>
+        </p:blipFill>
+        <p:spPr>
+          <a:xfrm>
+            <a:off x="-1" y="0"/>
+            <a:ext cx="7854044" cy="6858000"/>
+          </a:xfrm>
+          <a:prstGeom prst="rect">
+            <a:avLst/>
+          </a:prstGeom>
+        </p:spPr>
+      </p:pic>
+      <p:sp>
+        <p:nvSpPr>
+          <p:cNvPr id="3" name="Title 2">
+            <a:extLst>
+              <a:ext uri="{FF2B5EF4-FFF2-40B4-BE49-F238E27FC236}">
+                <a16:creationId xmlns:a16="http://schemas.microsoft.com/office/drawing/2014/main" id="{E01A69BC-07A2-0CF1-85EC-F5A48B575F66}"/>
+              </a:ext>
+            </a:extLst>
+          </p:cNvPr>
+          <p:cNvSpPr>
+            <a:spLocks noGrp="1"/>
+          </p:cNvSpPr>
+          <p:nvPr>
+            <p:ph type="title"/>
+          </p:nvPr>
+        </p:nvSpPr>
+        <p:spPr>
+          <a:xfrm>
+            <a:off x="8124389" y="122305"/>
+            <a:ext cx="3489391" cy="926727"/>
+          </a:xfrm>
+        </p:spPr>
+        <p:txBody>
+          <a:bodyPr anchor="t">
+            <a:noAutofit/>
+          </a:bodyPr>
+          <a:lstStyle/>
+          <a:p>
+            <a:r>
+              <a:rPr lang="en-US" sz="2800" dirty="0"/>
+              <a:t>System Architecture and Data Flow Diagram</a:t>
+            </a:r>
+          </a:p>
+        </p:txBody>
+      </p:sp>
+      <p:sp>
+        <p:nvSpPr>
+          <p:cNvPr id="5" name="Text Placeholder 4">
+            <a:extLst>
+              <a:ext uri="{FF2B5EF4-FFF2-40B4-BE49-F238E27FC236}">
+                <a16:creationId xmlns:a16="http://schemas.microsoft.com/office/drawing/2014/main" id="{1244510D-2A24-56C7-72E5-5AF8CE5C6AA4}"/>
+              </a:ext>
+            </a:extLst>
+          </p:cNvPr>
+          <p:cNvSpPr>
+            <a:spLocks noGrp="1"/>
+          </p:cNvSpPr>
+          <p:nvPr>
+            <p:ph type="body" idx="1"/>
+          </p:nvPr>
+        </p:nvSpPr>
+        <p:spPr>
+          <a:xfrm>
+            <a:off x="7854043" y="2025552"/>
+            <a:ext cx="4337956" cy="365125"/>
+          </a:xfrm>
+        </p:spPr>
+        <p:txBody>
+          <a:bodyPr/>
+          <a:lstStyle/>
+          <a:p>
+            <a:r>
+              <a:rPr lang="en-US" spc="300" dirty="0"/>
+              <a:t> </a:t>
+            </a:r>
+          </a:p>
+        </p:txBody>
+      </p:sp>
+      <p:sp>
+        <p:nvSpPr>
+          <p:cNvPr id="2" name="Slide Number Placeholder 1">
+            <a:extLst>
+              <a:ext uri="{FF2B5EF4-FFF2-40B4-BE49-F238E27FC236}">
+                <a16:creationId xmlns:a16="http://schemas.microsoft.com/office/drawing/2014/main" id="{03ABC444-5746-6521-B1B2-E817C1C43FA3}"/>
+              </a:ext>
+            </a:extLst>
+          </p:cNvPr>
+          <p:cNvSpPr>
+            <a:spLocks noGrp="1"/>
+          </p:cNvSpPr>
+          <p:nvPr>
+            <p:ph type="sldNum" sz="quarter" idx="12"/>
+          </p:nvPr>
+        </p:nvSpPr>
+        <p:spPr/>
+        <p:txBody>
+          <a:bodyPr/>
+          <a:lstStyle/>
+          <a:p>
+            <a:fld id="{8C2E478F-E849-4A8C-AF1F-CBCC78A7CBFA}" type="slidenum">
+              <a:rPr lang="en-US" smtClean="0"/>
+              <a:t>3</a:t>
+            </a:fld>
+            <a:endParaRPr lang="en-US" dirty="0"/>
+          </a:p>
+        </p:txBody>
+      </p:sp>
+      <p:sp>
+        <p:nvSpPr>
+          <p:cNvPr id="6" name="Content Placeholder 8">
+            <a:extLst>
+              <a:ext uri="{FF2B5EF4-FFF2-40B4-BE49-F238E27FC236}">
+                <a16:creationId xmlns:a16="http://schemas.microsoft.com/office/drawing/2014/main" id="{5FC7A675-593D-8903-B510-BEAAC666B4DA}"/>
+              </a:ext>
+            </a:extLst>
+          </p:cNvPr>
+          <p:cNvSpPr txBox="1">
+            <a:spLocks/>
+          </p:cNvSpPr>
+          <p:nvPr/>
+        </p:nvSpPr>
+        <p:spPr>
+          <a:xfrm>
+            <a:off x="8124389" y="2710543"/>
+            <a:ext cx="3154533" cy="3098425"/>
+          </a:xfrm>
+          <a:prstGeom prst="rect">
+            <a:avLst/>
+          </a:prstGeom>
+          <a:noFill/>
+        </p:spPr>
+        <p:txBody>
+          <a:bodyPr vert="horz" lIns="91440" tIns="45720" rIns="91440" bIns="45720" rtlCol="0" anchor="t">
+            <a:normAutofit/>
+          </a:bodyPr>
+          <a:lstStyle>
+            <a:defPPr>
+              <a:defRPr lang="en-US"/>
+            </a:defPPr>
+            <a:lvl1pPr indent="0">
+              <a:lnSpc>
+                <a:spcPct val="120000"/>
+              </a:lnSpc>
+              <a:spcBef>
+                <a:spcPts val="0"/>
+              </a:spcBef>
+              <a:buFont typeface="Arial" panose="020B0604020202020204" pitchFamily="34" charset="0"/>
+              <a:buNone/>
+              <a:defRPr sz="2400" cap="none" spc="0" baseline="0">
+                <a:solidFill>
+                  <a:sysClr val="windowText" lastClr="000000"/>
+                </a:solidFill>
+                <a:effectLst/>
+              </a:defRPr>
+            </a:lvl1pPr>
+            <a:lvl2pPr indent="0">
+              <a:lnSpc>
+                <a:spcPct val="150000"/>
+              </a:lnSpc>
+              <a:spcBef>
+                <a:spcPts val="500"/>
+              </a:spcBef>
+              <a:buFont typeface="Arial" panose="020B0604020202020204" pitchFamily="34" charset="0"/>
+              <a:buNone/>
+              <a:defRPr sz="2000">
+                <a:solidFill>
+                  <a:schemeClr val="tx1">
+                    <a:tint val="75000"/>
+                  </a:schemeClr>
+                </a:solidFill>
+              </a:defRPr>
+            </a:lvl2pPr>
+            <a:lvl3pPr indent="0">
+              <a:lnSpc>
+                <a:spcPct val="150000"/>
+              </a:lnSpc>
+              <a:spcBef>
+                <a:spcPts val="500"/>
+              </a:spcBef>
+              <a:buFont typeface="Arial" panose="020B0604020202020204" pitchFamily="34" charset="0"/>
+              <a:buNone/>
+              <a:defRPr>
+                <a:solidFill>
+                  <a:schemeClr val="tx1">
+                    <a:tint val="75000"/>
+                  </a:schemeClr>
+                </a:solidFill>
+              </a:defRPr>
+            </a:lvl3pPr>
+            <a:lvl4pPr indent="0">
+              <a:lnSpc>
+                <a:spcPct val="150000"/>
+              </a:lnSpc>
+              <a:spcBef>
+                <a:spcPts val="500"/>
+              </a:spcBef>
+              <a:buFont typeface="Arial" panose="020B0604020202020204" pitchFamily="34" charset="0"/>
+              <a:buNone/>
+              <a:defRPr sz="1600">
+                <a:solidFill>
+                  <a:schemeClr val="tx1">
+                    <a:tint val="75000"/>
+                  </a:schemeClr>
+                </a:solidFill>
+              </a:defRPr>
+            </a:lvl4pPr>
+            <a:lvl5pPr indent="0">
+              <a:lnSpc>
+                <a:spcPct val="150000"/>
+              </a:lnSpc>
+              <a:spcBef>
+                <a:spcPts val="500"/>
+              </a:spcBef>
+              <a:buFont typeface="Arial" panose="020B0604020202020204" pitchFamily="34" charset="0"/>
+              <a:buNone/>
+              <a:defRPr sz="1600">
+                <a:solidFill>
+                  <a:schemeClr val="tx1">
+                    <a:tint val="75000"/>
+                  </a:schemeClr>
+                </a:solidFill>
+              </a:defRPr>
+            </a:lvl5pPr>
+            <a:lvl6pPr indent="0">
+              <a:lnSpc>
+                <a:spcPct val="90000"/>
+              </a:lnSpc>
+              <a:spcBef>
+                <a:spcPts val="500"/>
+              </a:spcBef>
+              <a:buFont typeface="Arial" panose="020B0604020202020204" pitchFamily="34" charset="0"/>
+              <a:buNone/>
+              <a:defRPr sz="1600">
+                <a:solidFill>
+                  <a:schemeClr val="tx1">
+                    <a:tint val="75000"/>
+                  </a:schemeClr>
+                </a:solidFill>
+              </a:defRPr>
+            </a:lvl6pPr>
+            <a:lvl7pPr indent="0">
+              <a:lnSpc>
+                <a:spcPct val="90000"/>
+              </a:lnSpc>
+              <a:spcBef>
+                <a:spcPts val="500"/>
+              </a:spcBef>
+              <a:buFont typeface="Arial" panose="020B0604020202020204" pitchFamily="34" charset="0"/>
+              <a:buNone/>
+              <a:defRPr sz="1600">
+                <a:solidFill>
+                  <a:schemeClr val="tx1">
+                    <a:tint val="75000"/>
+                  </a:schemeClr>
+                </a:solidFill>
+              </a:defRPr>
+            </a:lvl7pPr>
+            <a:lvl8pPr indent="0">
+              <a:lnSpc>
+                <a:spcPct val="90000"/>
+              </a:lnSpc>
+              <a:spcBef>
+                <a:spcPts val="500"/>
+              </a:spcBef>
+              <a:buFont typeface="Arial" panose="020B0604020202020204" pitchFamily="34" charset="0"/>
+              <a:buNone/>
+              <a:defRPr sz="1600">
+                <a:solidFill>
+                  <a:schemeClr val="tx1">
+                    <a:tint val="75000"/>
+                  </a:schemeClr>
+                </a:solidFill>
+              </a:defRPr>
+            </a:lvl8pPr>
+            <a:lvl9pPr indent="0">
+              <a:lnSpc>
+                <a:spcPct val="90000"/>
+              </a:lnSpc>
+              <a:spcBef>
+                <a:spcPts val="500"/>
+              </a:spcBef>
+              <a:buFont typeface="Arial" panose="020B0604020202020204" pitchFamily="34" charset="0"/>
+              <a:buNone/>
+              <a:defRPr sz="1600">
+                <a:solidFill>
+                  <a:schemeClr val="tx1">
+                    <a:tint val="75000"/>
+                  </a:schemeClr>
+                </a:solidFill>
+              </a:defRPr>
+            </a:lvl9pPr>
+          </a:lstStyle>
+          <a:p>
+            <a:pPr marL="342900" indent="-342900">
+              <a:buFont typeface="Arial" panose="020B0604020202020204" pitchFamily="34" charset="0"/>
+              <a:buChar char="•"/>
+            </a:pPr>
+            <a:r>
+              <a:rPr lang="en-US" dirty="0"/>
+              <a:t>High level view at the different pages and data flows of our app.</a:t>
+            </a:r>
+          </a:p>
+          <a:p>
+            <a:pPr marL="342900" indent="-342900">
+              <a:buFont typeface="Arial" panose="020B0604020202020204" pitchFamily="34" charset="0"/>
+              <a:buChar char="•"/>
+            </a:pPr>
+            <a:endParaRPr lang="en-US" dirty="0"/>
+          </a:p>
+        </p:txBody>
+      </p:sp>
+    </p:spTree>
+    <p:extLst>
+      <p:ext uri="{BB962C8B-B14F-4D97-AF65-F5344CB8AC3E}">
+        <p14:creationId xmlns:p14="http://schemas.microsoft.com/office/powerpoint/2010/main" val="263783346"/>
+      </p:ext>
+    </p:extLst>
+  </p:cSld>
+  <p:clrMapOvr>
+    <a:masterClrMapping/>
+  </p:clrMapOvr>
+</p:sld>
+</file>
+
+<file path=ppt/slides/slide4.xml><?xml version="1.0" encoding="utf-8"?>
+<p:sld xmlns:a="http://schemas.openxmlformats.org/drawingml/2006/main" xmlns:r="http://schemas.openxmlformats.org/officeDocument/2006/relationships" xmlns:p="http://schemas.openxmlformats.org/presentationml/2006/main">
+  <p:cSld>
+    <p:spTree>
+      <p:nvGrpSpPr>
         <p:cNvPr id="1" name=""/>
         <p:cNvGrpSpPr/>
         <p:nvPr/>
@@ -7602,24 +8804,34 @@
           <a:chExt cx="0" cy="0"/>
         </a:xfrm>
       </p:grpSpPr>
-      <p:sp>
-        <p:nvSpPr>
-          <p:cNvPr id="7" name="Picture Placeholder 6">
-            <a:extLst>
-              <a:ext uri="{FF2B5EF4-FFF2-40B4-BE49-F238E27FC236}">
-                <a16:creationId xmlns:a16="http://schemas.microsoft.com/office/drawing/2014/main" id="{4FB43030-9DB6-072D-95DC-CEFDA0058500}"/>
-              </a:ext>
-            </a:extLst>
-          </p:cNvPr>
-          <p:cNvSpPr>
-            <a:spLocks noGrp="1"/>
-          </p:cNvSpPr>
+      <p:pic>
+        <p:nvPicPr>
+          <p:cNvPr id="3" name="Picture Placeholder 2" descr="A screenshot of a computer&#10;&#10;Description automatically generated">
+            <a:extLst>
+              <a:ext uri="{FF2B5EF4-FFF2-40B4-BE49-F238E27FC236}">
+                <a16:creationId xmlns:a16="http://schemas.microsoft.com/office/drawing/2014/main" id="{55ABDE32-A7BD-7D54-85BD-901EE45C173F}"/>
+              </a:ext>
+            </a:extLst>
+          </p:cNvPr>
+          <p:cNvPicPr>
+            <a:picLocks noGrp="1" noChangeAspect="1"/>
+          </p:cNvPicPr>
           <p:nvPr>
             <p:ph type="pic" sz="quarter" idx="14"/>
           </p:nvPr>
-        </p:nvSpPr>
-        <p:spPr/>
-      </p:sp>
+        </p:nvPicPr>
+        <p:blipFill rotWithShape="1">
+          <a:blip r:embed="rId2"/>
+          <a:srcRect l="27786" t="11343" r="27786"/>
+          <a:stretch/>
+        </p:blipFill>
+        <p:spPr>
+          <a:xfrm>
+            <a:off x="0" y="777922"/>
+            <a:ext cx="5416550" cy="6080078"/>
+          </a:xfrm>
+        </p:spPr>
+      </p:pic>
       <p:sp>
         <p:nvSpPr>
           <p:cNvPr id="4" name="Slide Number Placeholder 3">
@@ -7643,7 +8855,7 @@
           <a:p>
             <a:fld id="{819D3A82-D293-4907-9B25-3B6254918E46}" type="slidenum">
               <a:rPr lang="en-US" smtClean="0"/>
-              <a:t>3</a:t>
+              <a:t>4</a:t>
             </a:fld>
             <a:endParaRPr lang="en-US"/>
           </a:p>
@@ -7733,7 +8945,7 @@
 </p:sld>
 </file>
 
-<file path=ppt/slides/slide4.xml><?xml version="1.0" encoding="utf-8"?>
+<file path=ppt/slides/slide5.xml><?xml version="1.0" encoding="utf-8"?>
 <p:sld xmlns:a="http://schemas.openxmlformats.org/drawingml/2006/main" xmlns:r="http://schemas.openxmlformats.org/officeDocument/2006/relationships" xmlns:p="http://schemas.openxmlformats.org/presentationml/2006/main">
   <p:cSld>
     <p:spTree>
@@ -7756,24 +8968,31 @@
           <a:chExt cx="0" cy="0"/>
         </a:xfrm>
       </p:grpSpPr>
-      <p:sp>
-        <p:nvSpPr>
-          <p:cNvPr id="7" name="Picture Placeholder 6">
-            <a:extLst>
-              <a:ext uri="{FF2B5EF4-FFF2-40B4-BE49-F238E27FC236}">
-                <a16:creationId xmlns:a16="http://schemas.microsoft.com/office/drawing/2014/main" id="{BD76637A-34EB-D07B-25A9-0A6ED9728F67}"/>
-              </a:ext>
-            </a:extLst>
-          </p:cNvPr>
-          <p:cNvSpPr>
-            <a:spLocks noGrp="1"/>
-          </p:cNvSpPr>
+      <p:pic>
+        <p:nvPicPr>
+          <p:cNvPr id="3" name="Picture Placeholder 2" descr="A computer screen shot of a computer screen&#10;&#10;Description automatically generated">
+            <a:extLst>
+              <a:ext uri="{FF2B5EF4-FFF2-40B4-BE49-F238E27FC236}">
+                <a16:creationId xmlns:a16="http://schemas.microsoft.com/office/drawing/2014/main" id="{357F7275-9335-5902-A322-7641D2F18812}"/>
+              </a:ext>
+            </a:extLst>
+          </p:cNvPr>
+          <p:cNvPicPr>
+            <a:picLocks noGrp="1" noChangeAspect="1"/>
+          </p:cNvPicPr>
           <p:nvPr>
             <p:ph type="pic" sz="quarter" idx="14"/>
           </p:nvPr>
-        </p:nvSpPr>
+        </p:nvPicPr>
+        <p:blipFill>
+          <a:blip r:embed="rId2"/>
+          <a:srcRect l="27786" r="27786"/>
+          <a:stretch>
+            <a:fillRect/>
+          </a:stretch>
+        </p:blipFill>
         <p:spPr/>
-      </p:sp>
+      </p:pic>
       <p:sp>
         <p:nvSpPr>
           <p:cNvPr id="4" name="Slide Number Placeholder 3">
@@ -7797,7 +9016,7 @@
           <a:p>
             <a:fld id="{819D3A82-D293-4907-9B25-3B6254918E46}" type="slidenum">
               <a:rPr lang="en-US" smtClean="0"/>
-              <a:t>4</a:t>
+              <a:t>5</a:t>
             </a:fld>
             <a:endParaRPr lang="en-US"/>
           </a:p>
@@ -7826,8 +9045,23 @@
           <a:p>
             <a:r>
               <a:rPr lang="en-US" dirty="0"/>
-              <a:t>In order to receive pet name suggestions a user will need to upload a picture of their pet</a:t>
-            </a:r>
+              <a:t>In order to receive pet name suggestions a user will need to login to their account</a:t>
+            </a:r>
+          </a:p>
+          <a:p>
+            <a:r>
+              <a:rPr lang="en-US" dirty="0"/>
+              <a:t>In order to save names, user must be logged in</a:t>
+            </a:r>
+          </a:p>
+          <a:p>
+            <a:r>
+              <a:rPr lang="en-US" dirty="0"/>
+              <a:t>Use either Google Account or create account credentials</a:t>
+            </a:r>
+          </a:p>
+          <a:p>
+            <a:endParaRPr lang="en-US" dirty="0"/>
           </a:p>
           <a:p>
             <a:endParaRPr lang="en-US" dirty="0"/>
@@ -7857,7 +9091,7 @@
           <a:p>
             <a:r>
               <a:rPr lang="en-US" dirty="0"/>
-              <a:t>Upload a pet pic</a:t>
+              <a:t>Login Page</a:t>
             </a:r>
           </a:p>
         </p:txBody>
@@ -7875,7 +9109,7 @@
 </p:sld>
 </file>
 
-<file path=ppt/slides/slide5.xml><?xml version="1.0" encoding="utf-8"?>
+<file path=ppt/slides/slide6.xml><?xml version="1.0" encoding="utf-8"?>
 <p:sld xmlns:a="http://schemas.openxmlformats.org/drawingml/2006/main" xmlns:r="http://schemas.openxmlformats.org/officeDocument/2006/relationships" xmlns:p="http://schemas.openxmlformats.org/presentationml/2006/main">
   <p:cSld>
     <p:spTree>
@@ -7898,24 +9132,31 @@
           <a:chExt cx="0" cy="0"/>
         </a:xfrm>
       </p:grpSpPr>
-      <p:sp>
-        <p:nvSpPr>
-          <p:cNvPr id="7" name="Picture Placeholder 6">
-            <a:extLst>
-              <a:ext uri="{FF2B5EF4-FFF2-40B4-BE49-F238E27FC236}">
-                <a16:creationId xmlns:a16="http://schemas.microsoft.com/office/drawing/2014/main" id="{EB89DDE0-0E6A-B6F6-09CA-D37395E5938F}"/>
-              </a:ext>
-            </a:extLst>
-          </p:cNvPr>
-          <p:cNvSpPr>
-            <a:spLocks noGrp="1"/>
-          </p:cNvSpPr>
+      <p:pic>
+        <p:nvPicPr>
+          <p:cNvPr id="3" name="Picture Placeholder 2" descr="A computer screen shot of a computer&#10;&#10;Description automatically generated">
+            <a:extLst>
+              <a:ext uri="{FF2B5EF4-FFF2-40B4-BE49-F238E27FC236}">
+                <a16:creationId xmlns:a16="http://schemas.microsoft.com/office/drawing/2014/main" id="{FADC1EAB-8470-28E6-D19F-1A7351C7637A}"/>
+              </a:ext>
+            </a:extLst>
+          </p:cNvPr>
+          <p:cNvPicPr>
+            <a:picLocks noGrp="1" noChangeAspect="1"/>
+          </p:cNvPicPr>
           <p:nvPr>
             <p:ph type="pic" sz="quarter" idx="14"/>
           </p:nvPr>
-        </p:nvSpPr>
+        </p:nvPicPr>
+        <p:blipFill>
+          <a:blip r:embed="rId2"/>
+          <a:srcRect l="27786" r="27786"/>
+          <a:stretch>
+            <a:fillRect/>
+          </a:stretch>
+        </p:blipFill>
         <p:spPr/>
-      </p:sp>
+      </p:pic>
       <p:sp>
         <p:nvSpPr>
           <p:cNvPr id="4" name="Slide Number Placeholder 3">
@@ -7939,7 +9180,7 @@
           <a:p>
             <a:fld id="{819D3A82-D293-4907-9B25-3B6254918E46}" type="slidenum">
               <a:rPr lang="en-US" smtClean="0"/>
-              <a:t>5</a:t>
+              <a:t>6</a:t>
             </a:fld>
             <a:endParaRPr lang="en-US"/>
           </a:p>
@@ -7968,7 +9209,19 @@
           <a:p>
             <a:r>
               <a:rPr lang="en-US" dirty="0"/>
-              <a:t>A list of suggestions is returned</a:t>
+              <a:t>Uses Django Authentication Form</a:t>
+            </a:r>
+          </a:p>
+          <a:p>
+            <a:r>
+              <a:rPr lang="en-US" dirty="0"/>
+              <a:t>Checks if username is in user, if password is valid, if passwords match</a:t>
+            </a:r>
+          </a:p>
+          <a:p>
+            <a:r>
+              <a:rPr lang="en-US" dirty="0"/>
+              <a:t>Redirects to login page upon successful creation</a:t>
             </a:r>
           </a:p>
           <a:p>
@@ -7999,7 +9252,7 @@
           <a:p>
             <a:r>
               <a:rPr lang="en-US" dirty="0"/>
-              <a:t>Pet name suggestion page</a:t>
+              <a:t>Signup Page</a:t>
             </a:r>
           </a:p>
         </p:txBody>
@@ -8017,7 +9270,7 @@
 </p:sld>
 </file>
 
-<file path=ppt/slides/slide6.xml><?xml version="1.0" encoding="utf-8"?>
+<file path=ppt/slides/slide7.xml><?xml version="1.0" encoding="utf-8"?>
 <p:sld xmlns:a="http://schemas.openxmlformats.org/drawingml/2006/main" xmlns:r="http://schemas.openxmlformats.org/officeDocument/2006/relationships" xmlns:p="http://schemas.openxmlformats.org/presentationml/2006/main">
   <p:cSld>
     <p:spTree>
@@ -8057,31 +9310,38 @@
           </p:nvPr>
         </p:nvSpPr>
         <p:spPr/>
-      </p:sp>
-      <p:sp>
-        <p:nvSpPr>
-          <p:cNvPr id="4" name="Slide Number Placeholder 3">
-            <a:extLst>
-              <a:ext uri="{FF2B5EF4-FFF2-40B4-BE49-F238E27FC236}">
-                <a16:creationId xmlns:a16="http://schemas.microsoft.com/office/drawing/2014/main" id="{5D7FE657-8379-19C5-DACA-6DAF5B3F02BC}"/>
-              </a:ext>
-            </a:extLst>
-          </p:cNvPr>
-          <p:cNvSpPr>
-            <a:spLocks noGrp="1"/>
-          </p:cNvSpPr>
-          <p:nvPr>
-            <p:ph type="sldNum" sz="quarter" idx="4"/>
-          </p:nvPr>
-        </p:nvSpPr>
-        <p:spPr/>
         <p:txBody>
           <a:bodyPr/>
           <a:lstStyle/>
           <a:p>
+            <a:endParaRPr lang="en-US"/>
+          </a:p>
+        </p:txBody>
+      </p:sp>
+      <p:sp>
+        <p:nvSpPr>
+          <p:cNvPr id="4" name="Slide Number Placeholder 3">
+            <a:extLst>
+              <a:ext uri="{FF2B5EF4-FFF2-40B4-BE49-F238E27FC236}">
+                <a16:creationId xmlns:a16="http://schemas.microsoft.com/office/drawing/2014/main" id="{5D7FE657-8379-19C5-DACA-6DAF5B3F02BC}"/>
+              </a:ext>
+            </a:extLst>
+          </p:cNvPr>
+          <p:cNvSpPr>
+            <a:spLocks noGrp="1"/>
+          </p:cNvSpPr>
+          <p:nvPr>
+            <p:ph type="sldNum" sz="quarter" idx="4"/>
+          </p:nvPr>
+        </p:nvSpPr>
+        <p:spPr/>
+        <p:txBody>
+          <a:bodyPr/>
+          <a:lstStyle/>
+          <a:p>
             <a:fld id="{819D3A82-D293-4907-9B25-3B6254918E46}" type="slidenum">
               <a:rPr lang="en-US" smtClean="0"/>
-              <a:t>6</a:t>
+              <a:t>7</a:t>
             </a:fld>
             <a:endParaRPr lang="en-US"/>
           </a:p>
@@ -8110,14 +9370,25 @@
           <a:p>
             <a:r>
               <a:rPr lang="en-US" dirty="0"/>
-              <a:t>If any name suggestions are saved they will be here</a:t>
-            </a:r>
-          </a:p>
-          <a:p>
+              <a:t>Choose Google account to link to </a:t>
+            </a:r>
+            <a:r>
+              <a:rPr lang="en-US" dirty="0" err="1"/>
+              <a:t>PetNamer</a:t>
+            </a:r>
             <a:r>
               <a:rPr lang="en-US" dirty="0"/>
-              <a:t>The ability to update your account is also here</a:t>
-            </a:r>
+              <a:t> app</a:t>
+            </a:r>
+          </a:p>
+          <a:p>
+            <a:r>
+              <a:rPr lang="en-US" dirty="0"/>
+              <a:t>Will use email and name to create account</a:t>
+            </a:r>
+          </a:p>
+          <a:p>
+            <a:endParaRPr lang="en-US" dirty="0"/>
           </a:p>
           <a:p>
             <a:endParaRPr lang="en-US" dirty="0"/>
@@ -8147,7 +9418,7 @@
           <a:p>
             <a:r>
               <a:rPr lang="en-US" dirty="0"/>
-              <a:t>Account page </a:t>
+              <a:t>Google Login</a:t>
             </a:r>
           </a:p>
         </p:txBody>
@@ -8165,7 +9436,7 @@
 </p:sld>
 </file>
 
-<file path=ppt/slides/slide7.xml><?xml version="1.0" encoding="utf-8"?>
+<file path=ppt/slides/slide8.xml><?xml version="1.0" encoding="utf-8"?>
 <p:sld xmlns:a="http://schemas.openxmlformats.org/drawingml/2006/main" xmlns:r="http://schemas.openxmlformats.org/officeDocument/2006/relationships" xmlns:p="http://schemas.openxmlformats.org/presentationml/2006/main">
   <p:cSld>
     <p:spTree>
@@ -8274,7 +9545,7 @@
           <a:p>
             <a:fld id="{8C2E478F-E849-4A8C-AF1F-CBCC78A7CBFA}" type="slidenum">
               <a:rPr lang="en-US" smtClean="0"/>
-              <a:t>7</a:t>
+              <a:t>8</a:t>
             </a:fld>
             <a:endParaRPr lang="en-US" dirty="0"/>
           </a:p>
@@ -8658,18 +9929,12 @@
 </p:sld>
 </file>
 
-<file path=ppt/slides/slide8.xml><?xml version="1.0" encoding="utf-8"?>
+<file path=ppt/slides/slide9.xml><?xml version="1.0" encoding="utf-8"?>
 <p:sld xmlns:a="http://schemas.openxmlformats.org/drawingml/2006/main" xmlns:r="http://schemas.openxmlformats.org/officeDocument/2006/relationships" xmlns:p="http://schemas.openxmlformats.org/presentationml/2006/main">
   <p:cSld>
     <p:spTree>
       <p:nvGrpSpPr>
-        <p:cNvPr id="1" name="">
-          <a:extLst>
-            <a:ext uri="{FF2B5EF4-FFF2-40B4-BE49-F238E27FC236}">
-              <a16:creationId xmlns:a16="http://schemas.microsoft.com/office/drawing/2014/main" id="{896357A5-30E7-CACA-2709-93DCF9540AF7}"/>
-            </a:ext>
-          </a:extLst>
-        </p:cNvPr>
+        <p:cNvPr id="1" name=""/>
         <p:cNvGrpSpPr/>
         <p:nvPr/>
       </p:nvGrpSpPr>
@@ -8686,7 +9951,7 @@
           <p:cNvPr id="9" name="Picture Placeholder 7" descr="abstract image">
             <a:extLst>
               <a:ext uri="{FF2B5EF4-FFF2-40B4-BE49-F238E27FC236}">
-                <a16:creationId xmlns:a16="http://schemas.microsoft.com/office/drawing/2014/main" id="{5C3FB363-C41E-01DF-5DF7-4C7B1F8A89FC}"/>
+                <a16:creationId xmlns:a16="http://schemas.microsoft.com/office/drawing/2014/main" id="{10C261F5-27E5-A8D9-57BF-8DCB0A00F6B1}"/>
               </a:ext>
             </a:extLst>
           </p:cNvPr>
@@ -8710,7 +9975,7 @@
               </a:ext>
             </a:extLst>
           </a:blip>
-          <a:srcRect l="18261" r="36813"/>
+          <a:srcRect l="54869" r="205"/>
           <a:stretch/>
         </p:blipFill>
         <p:spPr>
@@ -8728,7 +9993,7 @@
           <p:cNvPr id="3" name="Title 2">
             <a:extLst>
               <a:ext uri="{FF2B5EF4-FFF2-40B4-BE49-F238E27FC236}">
-                <a16:creationId xmlns:a16="http://schemas.microsoft.com/office/drawing/2014/main" id="{AF5B7F56-DA07-310F-2F5E-594FAE5F324D}"/>
+                <a16:creationId xmlns:a16="http://schemas.microsoft.com/office/drawing/2014/main" id="{1D24B42B-925B-494C-A986-BD85E8117E1E}"/>
               </a:ext>
             </a:extLst>
           </p:cNvPr>
@@ -8753,7 +10018,7 @@
           <a:p>
             <a:r>
               <a:rPr lang="en-US" sz="4800" dirty="0"/>
-              <a:t>x</a:t>
+              <a:t>Technology</a:t>
             </a:r>
           </a:p>
         </p:txBody>
@@ -8763,7 +10028,7 @@
           <p:cNvPr id="5" name="Text Placeholder 4">
             <a:extLst>
               <a:ext uri="{FF2B5EF4-FFF2-40B4-BE49-F238E27FC236}">
-                <a16:creationId xmlns:a16="http://schemas.microsoft.com/office/drawing/2014/main" id="{AEBF041D-D309-7AB4-AF34-B9636AF39DDF}"/>
+                <a16:creationId xmlns:a16="http://schemas.microsoft.com/office/drawing/2014/main" id="{AF9B872F-6332-408E-9135-B871F0C90C00}"/>
               </a:ext>
             </a:extLst>
           </p:cNvPr>
@@ -8796,7 +10061,7 @@
           <p:cNvPr id="2" name="Slide Number Placeholder 1">
             <a:extLst>
               <a:ext uri="{FF2B5EF4-FFF2-40B4-BE49-F238E27FC236}">
-                <a16:creationId xmlns:a16="http://schemas.microsoft.com/office/drawing/2014/main" id="{AA91C46B-0405-BC26-B64A-218461638CE6}"/>
+                <a16:creationId xmlns:a16="http://schemas.microsoft.com/office/drawing/2014/main" id="{948DD8A0-BD53-4DBF-949B-0D64D12DADA9}"/>
               </a:ext>
             </a:extLst>
           </p:cNvPr>
@@ -8814,7 +10079,7 @@
           <a:p>
             <a:fld id="{8C2E478F-E849-4A8C-AF1F-CBCC78A7CBFA}" type="slidenum">
               <a:rPr lang="en-US" smtClean="0"/>
-              <a:t>8</a:t>
+              <a:t>9</a:t>
             </a:fld>
             <a:endParaRPr lang="en-US" dirty="0"/>
           </a:p>
@@ -8825,7 +10090,7 @@
           <p:cNvPr id="6" name="Content Placeholder 8">
             <a:extLst>
               <a:ext uri="{FF2B5EF4-FFF2-40B4-BE49-F238E27FC236}">
-                <a16:creationId xmlns:a16="http://schemas.microsoft.com/office/drawing/2014/main" id="{BDEA54F7-AC68-3AA7-82ED-71F2213BDAB1}"/>
+                <a16:creationId xmlns:a16="http://schemas.microsoft.com/office/drawing/2014/main" id="{3B4F2E0F-78BC-2FE8-4808-2A26179B55EA}"/>
               </a:ext>
             </a:extLst>
           </p:cNvPr>
@@ -9011,379 +10276,6 @@
               <a:buChar char="•"/>
             </a:pPr>
             <a:r>
-              <a:rPr lang="en-US" dirty="0"/>
-              <a:t>X</a:t>
-            </a:r>
-          </a:p>
-          <a:p>
-            <a:pPr marL="342900" indent="-342900">
-              <a:buFont typeface="Arial" panose="020B0604020202020204" pitchFamily="34" charset="0"/>
-              <a:buChar char="•"/>
-            </a:pPr>
-            <a:endParaRPr lang="en-US" dirty="0"/>
-          </a:p>
-        </p:txBody>
-      </p:sp>
-    </p:spTree>
-    <p:extLst>
-      <p:ext uri="{BB962C8B-B14F-4D97-AF65-F5344CB8AC3E}">
-        <p14:creationId xmlns:p14="http://schemas.microsoft.com/office/powerpoint/2010/main" val="2790229447"/>
-      </p:ext>
-    </p:extLst>
-  </p:cSld>
-  <p:clrMapOvr>
-    <a:masterClrMapping/>
-  </p:clrMapOvr>
-</p:sld>
-</file>
-
-<file path=ppt/slides/slide9.xml><?xml version="1.0" encoding="utf-8"?>
-<p:sld xmlns:a="http://schemas.openxmlformats.org/drawingml/2006/main" xmlns:r="http://schemas.openxmlformats.org/officeDocument/2006/relationships" xmlns:p="http://schemas.openxmlformats.org/presentationml/2006/main">
-  <p:cSld>
-    <p:spTree>
-      <p:nvGrpSpPr>
-        <p:cNvPr id="1" name=""/>
-        <p:cNvGrpSpPr/>
-        <p:nvPr/>
-      </p:nvGrpSpPr>
-      <p:grpSpPr>
-        <a:xfrm>
-          <a:off x="0" y="0"/>
-          <a:ext cx="0" cy="0"/>
-          <a:chOff x="0" y="0"/>
-          <a:chExt cx="0" cy="0"/>
-        </a:xfrm>
-      </p:grpSpPr>
-      <p:pic>
-        <p:nvPicPr>
-          <p:cNvPr id="9" name="Picture Placeholder 7" descr="abstract image">
-            <a:extLst>
-              <a:ext uri="{FF2B5EF4-FFF2-40B4-BE49-F238E27FC236}">
-                <a16:creationId xmlns:a16="http://schemas.microsoft.com/office/drawing/2014/main" id="{10C261F5-27E5-A8D9-57BF-8DCB0A00F6B1}"/>
-              </a:ext>
-            </a:extLst>
-          </p:cNvPr>
-          <p:cNvPicPr>
-            <a:picLocks noChangeAspect="1"/>
-          </p:cNvPicPr>
-          <p:nvPr/>
-        </p:nvPicPr>
-        <p:blipFill rotWithShape="1">
-          <a:blip r:embed="rId2">
-            <a:alphaModFix/>
-            <a:extLst>
-              <a:ext uri="{BEBA8EAE-BF5A-486C-A8C5-ECC9F3942E4B}">
-                <a14:imgProps xmlns:a14="http://schemas.microsoft.com/office/drawing/2010/main">
-                  <a14:imgLayer r:embed="rId3">
-                    <a14:imgEffect>
-                      <a14:saturation sat="0"/>
-                    </a14:imgEffect>
-                  </a14:imgLayer>
-                </a14:imgProps>
-              </a:ext>
-            </a:extLst>
-          </a:blip>
-          <a:srcRect l="54869" r="205"/>
-          <a:stretch/>
-        </p:blipFill>
-        <p:spPr>
-          <a:xfrm>
-            <a:off x="-1" y="0"/>
-            <a:ext cx="5477523" cy="6858000"/>
-          </a:xfrm>
-          <a:prstGeom prst="rect">
-            <a:avLst/>
-          </a:prstGeom>
-        </p:spPr>
-      </p:pic>
-      <p:sp>
-        <p:nvSpPr>
-          <p:cNvPr id="3" name="Title 2">
-            <a:extLst>
-              <a:ext uri="{FF2B5EF4-FFF2-40B4-BE49-F238E27FC236}">
-                <a16:creationId xmlns:a16="http://schemas.microsoft.com/office/drawing/2014/main" id="{1D24B42B-925B-494C-A986-BD85E8117E1E}"/>
-              </a:ext>
-            </a:extLst>
-          </p:cNvPr>
-          <p:cNvSpPr>
-            <a:spLocks noGrp="1"/>
-          </p:cNvSpPr>
-          <p:nvPr>
-            <p:ph type="title"/>
-          </p:nvPr>
-        </p:nvSpPr>
-        <p:spPr>
-          <a:xfrm>
-            <a:off x="6362330" y="411225"/>
-            <a:ext cx="5251450" cy="956373"/>
-          </a:xfrm>
-        </p:spPr>
-        <p:txBody>
-          <a:bodyPr anchor="t">
-            <a:normAutofit/>
-          </a:bodyPr>
-          <a:lstStyle/>
-          <a:p>
-            <a:r>
-              <a:rPr lang="en-US" sz="4800" dirty="0"/>
-              <a:t>x</a:t>
-            </a:r>
-          </a:p>
-        </p:txBody>
-      </p:sp>
-      <p:sp>
-        <p:nvSpPr>
-          <p:cNvPr id="5" name="Text Placeholder 4">
-            <a:extLst>
-              <a:ext uri="{FF2B5EF4-FFF2-40B4-BE49-F238E27FC236}">
-                <a16:creationId xmlns:a16="http://schemas.microsoft.com/office/drawing/2014/main" id="{AF9B872F-6332-408E-9135-B871F0C90C00}"/>
-              </a:ext>
-            </a:extLst>
-          </p:cNvPr>
-          <p:cNvSpPr>
-            <a:spLocks noGrp="1"/>
-          </p:cNvSpPr>
-          <p:nvPr>
-            <p:ph type="body" idx="1"/>
-          </p:nvPr>
-        </p:nvSpPr>
-        <p:spPr>
-          <a:xfrm>
-            <a:off x="6362330" y="2025552"/>
-            <a:ext cx="5829669" cy="365125"/>
-          </a:xfrm>
-        </p:spPr>
-        <p:txBody>
-          <a:bodyPr/>
-          <a:lstStyle/>
-          <a:p>
-            <a:r>
-              <a:rPr lang="en-US" spc="300" dirty="0"/>
-              <a:t> </a:t>
-            </a:r>
-          </a:p>
-        </p:txBody>
-      </p:sp>
-      <p:sp>
-        <p:nvSpPr>
-          <p:cNvPr id="2" name="Slide Number Placeholder 1">
-            <a:extLst>
-              <a:ext uri="{FF2B5EF4-FFF2-40B4-BE49-F238E27FC236}">
-                <a16:creationId xmlns:a16="http://schemas.microsoft.com/office/drawing/2014/main" id="{948DD8A0-BD53-4DBF-949B-0D64D12DADA9}"/>
-              </a:ext>
-            </a:extLst>
-          </p:cNvPr>
-          <p:cNvSpPr>
-            <a:spLocks noGrp="1"/>
-          </p:cNvSpPr>
-          <p:nvPr>
-            <p:ph type="sldNum" sz="quarter" idx="12"/>
-          </p:nvPr>
-        </p:nvSpPr>
-        <p:spPr/>
-        <p:txBody>
-          <a:bodyPr/>
-          <a:lstStyle/>
-          <a:p>
-            <a:fld id="{8C2E478F-E849-4A8C-AF1F-CBCC78A7CBFA}" type="slidenum">
-              <a:rPr lang="en-US" smtClean="0"/>
-              <a:t>9</a:t>
-            </a:fld>
-            <a:endParaRPr lang="en-US" dirty="0"/>
-          </a:p>
-        </p:txBody>
-      </p:sp>
-      <p:sp>
-        <p:nvSpPr>
-          <p:cNvPr id="6" name="Content Placeholder 8">
-            <a:extLst>
-              <a:ext uri="{FF2B5EF4-FFF2-40B4-BE49-F238E27FC236}">
-                <a16:creationId xmlns:a16="http://schemas.microsoft.com/office/drawing/2014/main" id="{3B4F2E0F-78BC-2FE8-4808-2A26179B55EA}"/>
-              </a:ext>
-            </a:extLst>
-          </p:cNvPr>
-          <p:cNvSpPr txBox="1">
-            <a:spLocks/>
-          </p:cNvSpPr>
-          <p:nvPr/>
-        </p:nvSpPr>
-        <p:spPr>
-          <a:xfrm>
-            <a:off x="6362330" y="2574543"/>
-            <a:ext cx="4646246" cy="3038482"/>
-          </a:xfrm>
-          <a:prstGeom prst="rect">
-            <a:avLst/>
-          </a:prstGeom>
-          <a:noFill/>
-        </p:spPr>
-        <p:txBody>
-          <a:bodyPr vert="horz" lIns="91440" tIns="45720" rIns="91440" bIns="45720" rtlCol="0" anchor="t">
-            <a:normAutofit/>
-          </a:bodyPr>
-          <a:lstStyle>
-            <a:defPPr>
-              <a:defRPr lang="en-US"/>
-            </a:defPPr>
-            <a:lvl1pPr indent="0">
-              <a:lnSpc>
-                <a:spcPct val="120000"/>
-              </a:lnSpc>
-              <a:spcBef>
-                <a:spcPts val="0"/>
-              </a:spcBef>
-              <a:buFont typeface="Arial" panose="020B0604020202020204" pitchFamily="34" charset="0"/>
-              <a:buNone/>
-              <a:defRPr sz="2400" cap="none" spc="0" baseline="0">
-                <a:solidFill>
-                  <a:sysClr val="windowText" lastClr="000000"/>
-                </a:solidFill>
-                <a:effectLst/>
-              </a:defRPr>
-            </a:lvl1pPr>
-            <a:lvl2pPr indent="0">
-              <a:lnSpc>
-                <a:spcPct val="150000"/>
-              </a:lnSpc>
-              <a:spcBef>
-                <a:spcPts val="500"/>
-              </a:spcBef>
-              <a:buFont typeface="Arial" panose="020B0604020202020204" pitchFamily="34" charset="0"/>
-              <a:buNone/>
-              <a:defRPr sz="2000">
-                <a:solidFill>
-                  <a:schemeClr val="tx1">
-                    <a:tint val="75000"/>
-                  </a:schemeClr>
-                </a:solidFill>
-              </a:defRPr>
-            </a:lvl2pPr>
-            <a:lvl3pPr indent="0">
-              <a:lnSpc>
-                <a:spcPct val="150000"/>
-              </a:lnSpc>
-              <a:spcBef>
-                <a:spcPts val="500"/>
-              </a:spcBef>
-              <a:buFont typeface="Arial" panose="020B0604020202020204" pitchFamily="34" charset="0"/>
-              <a:buNone/>
-              <a:defRPr>
-                <a:solidFill>
-                  <a:schemeClr val="tx1">
-                    <a:tint val="75000"/>
-                  </a:schemeClr>
-                </a:solidFill>
-              </a:defRPr>
-            </a:lvl3pPr>
-            <a:lvl4pPr indent="0">
-              <a:lnSpc>
-                <a:spcPct val="150000"/>
-              </a:lnSpc>
-              <a:spcBef>
-                <a:spcPts val="500"/>
-              </a:spcBef>
-              <a:buFont typeface="Arial" panose="020B0604020202020204" pitchFamily="34" charset="0"/>
-              <a:buNone/>
-              <a:defRPr sz="1600">
-                <a:solidFill>
-                  <a:schemeClr val="tx1">
-                    <a:tint val="75000"/>
-                  </a:schemeClr>
-                </a:solidFill>
-              </a:defRPr>
-            </a:lvl4pPr>
-            <a:lvl5pPr indent="0">
-              <a:lnSpc>
-                <a:spcPct val="150000"/>
-              </a:lnSpc>
-              <a:spcBef>
-                <a:spcPts val="500"/>
-              </a:spcBef>
-              <a:buFont typeface="Arial" panose="020B0604020202020204" pitchFamily="34" charset="0"/>
-              <a:buNone/>
-              <a:defRPr sz="1600">
-                <a:solidFill>
-                  <a:schemeClr val="tx1">
-                    <a:tint val="75000"/>
-                  </a:schemeClr>
-                </a:solidFill>
-              </a:defRPr>
-            </a:lvl5pPr>
-            <a:lvl6pPr indent="0">
-              <a:lnSpc>
-                <a:spcPct val="90000"/>
-              </a:lnSpc>
-              <a:spcBef>
-                <a:spcPts val="500"/>
-              </a:spcBef>
-              <a:buFont typeface="Arial" panose="020B0604020202020204" pitchFamily="34" charset="0"/>
-              <a:buNone/>
-              <a:defRPr sz="1600">
-                <a:solidFill>
-                  <a:schemeClr val="tx1">
-                    <a:tint val="75000"/>
-                  </a:schemeClr>
-                </a:solidFill>
-              </a:defRPr>
-            </a:lvl6pPr>
-            <a:lvl7pPr indent="0">
-              <a:lnSpc>
-                <a:spcPct val="90000"/>
-              </a:lnSpc>
-              <a:spcBef>
-                <a:spcPts val="500"/>
-              </a:spcBef>
-              <a:buFont typeface="Arial" panose="020B0604020202020204" pitchFamily="34" charset="0"/>
-              <a:buNone/>
-              <a:defRPr sz="1600">
-                <a:solidFill>
-                  <a:schemeClr val="tx1">
-                    <a:tint val="75000"/>
-                  </a:schemeClr>
-                </a:solidFill>
-              </a:defRPr>
-            </a:lvl7pPr>
-            <a:lvl8pPr indent="0">
-              <a:lnSpc>
-                <a:spcPct val="90000"/>
-              </a:lnSpc>
-              <a:spcBef>
-                <a:spcPts val="500"/>
-              </a:spcBef>
-              <a:buFont typeface="Arial" panose="020B0604020202020204" pitchFamily="34" charset="0"/>
-              <a:buNone/>
-              <a:defRPr sz="1600">
-                <a:solidFill>
-                  <a:schemeClr val="tx1">
-                    <a:tint val="75000"/>
-                  </a:schemeClr>
-                </a:solidFill>
-              </a:defRPr>
-            </a:lvl8pPr>
-            <a:lvl9pPr indent="0">
-              <a:lnSpc>
-                <a:spcPct val="90000"/>
-              </a:lnSpc>
-              <a:spcBef>
-                <a:spcPts val="500"/>
-              </a:spcBef>
-              <a:buFont typeface="Arial" panose="020B0604020202020204" pitchFamily="34" charset="0"/>
-              <a:buNone/>
-              <a:defRPr sz="1600">
-                <a:solidFill>
-                  <a:schemeClr val="tx1">
-                    <a:tint val="75000"/>
-                  </a:schemeClr>
-                </a:solidFill>
-              </a:defRPr>
-            </a:lvl9pPr>
-          </a:lstStyle>
-          <a:p>
-            <a:pPr marL="342900" indent="-342900">
-              <a:buFont typeface="Arial" panose="020B0604020202020204" pitchFamily="34" charset="0"/>
-              <a:buChar char="•"/>
-            </a:pPr>
-            <a:r>
               <a:rPr lang="en-US" dirty="0" err="1"/>
               <a:t>VSCode</a:t>
             </a:r>
@@ -9425,7 +10317,31 @@
                 <a:effectLst/>
                 <a:latin typeface="Slack-Lato"/>
               </a:rPr>
-              <a:t>PostgreSQL</a:t>
+              <a:t>SQLite</a:t>
+            </a:r>
+          </a:p>
+          <a:p>
+            <a:pPr marL="342900" indent="-342900">
+              <a:buFont typeface="Arial" panose="020B0604020202020204" pitchFamily="34" charset="0"/>
+              <a:buChar char="•"/>
+            </a:pPr>
+            <a:r>
+              <a:rPr lang="en-US" dirty="0" err="1">
+                <a:solidFill>
+                  <a:srgbClr val="1D1C1D"/>
+                </a:solidFill>
+                <a:latin typeface="Slack-Lato"/>
+              </a:rPr>
+              <a:t>Dbeaver</a:t>
+            </a:r>
+            <a:r>
+              <a:rPr lang="en-US" dirty="0">
+                <a:solidFill>
+                  <a:srgbClr val="1D1C1D"/>
+                </a:solidFill>
+                <a:latin typeface="Slack-Lato"/>
+              </a:rPr>
+              <a:t> (for viewing database tables) </a:t>
             </a:r>
             <a:endParaRPr lang="en-US" dirty="0"/>
           </a:p>
@@ -10330,6 +11246,15 @@
 </file>
 
 <file path=customXml/item1.xml><?xml version="1.0" encoding="utf-8"?>
+<?mso-contentType ?>
+<FormTemplates xmlns="http://schemas.microsoft.com/sharepoint/v3/contenttype/forms">
+  <Display>DocumentLibraryForm</Display>
+  <Edit>DocumentLibraryForm</Edit>
+  <New>DocumentLibraryForm</New>
+</FormTemplates>
+</file>
+
+<file path=customXml/item2.xml><?xml version="1.0" encoding="utf-8"?>
 <ct:contentTypeSchema xmlns:ct="http://schemas.microsoft.com/office/2006/metadata/contentType" xmlns:ma="http://schemas.microsoft.com/office/2006/metadata/properties/metaAttributes" ct:_="" ma:_="" ma:contentTypeName="Document" ma:contentTypeID="0x01010079F111ED35F8CC479449609E8A0923A6" ma:contentTypeVersion="28" ma:contentTypeDescription="Create a new document." ma:contentTypeScope="" ma:versionID="60f5a4f2d2b0abadcf532d48ebf9cb71">
   <xsd:schema xmlns:xsd="http://www.w3.org/2001/XMLSchema" xmlns:xs="http://www.w3.org/2001/XMLSchema" xmlns:p="http://schemas.microsoft.com/office/2006/metadata/properties" xmlns:ns1="http://schemas.microsoft.com/sharepoint/v3" xmlns:ns2="71af3243-3dd4-4a8d-8c0d-dd76da1f02a5" xmlns:ns3="16c05727-aa75-4e4a-9b5f-8a80a1165891" xmlns:ns4="230e9df3-be65-4c73-a93b-d1236ebd677e" targetNamespace="http://schemas.microsoft.com/office/2006/metadata/properties" ma:root="true" ma:fieldsID="7dd78129e6a1811f84807ad11c651531" ns1:_="" ns2:_="" ns3:_="" ns4:_="">
     <xsd:import namespace="http://schemas.microsoft.com/sharepoint/v3"/>
@@ -10641,15 +11566,6 @@
 </ct:contentTypeSchema>
 </file>
 
-<file path=customXml/item2.xml><?xml version="1.0" encoding="utf-8"?>
-<?mso-contentType ?>
-<FormTemplates xmlns="http://schemas.microsoft.com/sharepoint/v3/contenttype/forms">
-  <Display>DocumentLibraryForm</Display>
-  <Edit>DocumentLibraryForm</Edit>
-  <New>DocumentLibraryForm</New>
-</FormTemplates>
-</file>
-
 <file path=customXml/item3.xml><?xml version="1.0" encoding="utf-8"?>
 <p:properties xmlns:p="http://schemas.microsoft.com/office/2006/metadata/properties" xmlns:xsi="http://www.w3.org/2001/XMLSchema-instance" xmlns:pc="http://schemas.microsoft.com/office/infopath/2007/PartnerControls">
   <documentManagement>
@@ -10671,6 +11587,14 @@
 </file>
 
 <file path=customXml/itemProps1.xml><?xml version="1.0" encoding="utf-8"?>
+<ds:datastoreItem xmlns:ds="http://schemas.openxmlformats.org/officeDocument/2006/customXml" ds:itemID="{99E4EAC9-33DC-4CF0-BA31-C98F61CE4785}">
+  <ds:schemaRefs>
+    <ds:schemaRef ds:uri="http://schemas.microsoft.com/sharepoint/v3/contenttype/forms"/>
+  </ds:schemaRefs>
+</ds:datastoreItem>
+</file>
+
+<file path=customXml/itemProps2.xml><?xml version="1.0" encoding="utf-8"?>
 <ds:datastoreItem xmlns:ds="http://schemas.openxmlformats.org/officeDocument/2006/customXml" ds:itemID="{A3D5DB56-3A71-4638-9571-EE877FD66E96}">
   <ds:schemaRefs>
     <ds:schemaRef ds:uri="http://schemas.microsoft.com/office/2006/metadata/contentType"/>
@@ -10691,14 +11615,6 @@
 </ds:datastoreItem>
 </file>
 
-<file path=customXml/itemProps2.xml><?xml version="1.0" encoding="utf-8"?>
-<ds:datastoreItem xmlns:ds="http://schemas.openxmlformats.org/officeDocument/2006/customXml" ds:itemID="{99E4EAC9-33DC-4CF0-BA31-C98F61CE4785}">
-  <ds:schemaRefs>
-    <ds:schemaRef ds:uri="http://schemas.microsoft.com/sharepoint/v3/contenttype/forms"/>
-  </ds:schemaRefs>
-</ds:datastoreItem>
-</file>
-
 <file path=customXml/itemProps3.xml><?xml version="1.0" encoding="utf-8"?>
 <ds:datastoreItem xmlns:ds="http://schemas.openxmlformats.org/officeDocument/2006/customXml" ds:itemID="{8002A8ED-1331-4C1D-8649-743D7BE164DD}">
   <ds:schemaRefs>

</xml_diff>

<commit_message>
added pictures/information to slides
</commit_message>
<xml_diff>
--- a/Phase 2 Docs/Phase 2 - Presentation.pptx
+++ b/Phase 2 Docs/Phase 2 - Presentation.pptx
@@ -245,7 +245,7 @@
           <a:p>
             <a:fld id="{966D5B4E-BF3E-3B45-A4BA-D6C3B92870D7}" type="datetimeFigureOut">
               <a:rPr lang="en-US" smtClean="0"/>
-              <a:t>2/28/2024</a:t>
+              <a:t>2/29/2024</a:t>
             </a:fld>
             <a:endParaRPr lang="en-US" dirty="0"/>
           </a:p>
@@ -338,6 +338,240 @@
   </p:cSld>
   <p:clrMap bg1="lt1" tx1="dk1" bg2="lt2" tx2="dk2" accent1="accent1" accent2="accent2" accent3="accent3" accent4="accent4" accent5="accent5" accent6="accent6" hlink="hlink" folHlink="folHlink"/>
 </p:handoutMaster>
+</file>
+
+<file path=ppt/ink/ink1.xml><?xml version="1.0" encoding="utf-8"?>
+<inkml:ink xmlns:inkml="http://www.w3.org/2003/InkML">
+  <inkml:definitions>
+    <inkml:context xml:id="ctx0">
+      <inkml:inkSource xml:id="inkSrc0">
+        <inkml:traceFormat>
+          <inkml:channel name="X" type="integer" min="-2.14748E9" max="2.14748E9" units="cm"/>
+          <inkml:channel name="Y" type="integer" min="-2.14748E9" max="2.14748E9" units="cm"/>
+        </inkml:traceFormat>
+        <inkml:channelProperties>
+          <inkml:channelProperty channel="X" name="resolution" value="1000" units="1/cm"/>
+          <inkml:channelProperty channel="Y" name="resolution" value="1000" units="1/cm"/>
+        </inkml:channelProperties>
+      </inkml:inkSource>
+      <inkml:timestamp xml:id="ts0" timeString="2024-02-29T10:37:20.980"/>
+    </inkml:context>
+    <inkml:brush xml:id="br0">
+      <inkml:brushProperty name="width" value="0.35" units="cm"/>
+      <inkml:brushProperty name="height" value="0.35" units="cm"/>
+      <inkml:brushProperty name="ignorePressure" value="1"/>
+    </inkml:brush>
+  </inkml:definitions>
+  <inkml:trace contextRef="#ctx0" brushRef="#br0">0 0,'2715'0,"-2621"0</inkml:trace>
+</inkml:ink>
+</file>
+
+<file path=ppt/ink/ink2.xml><?xml version="1.0" encoding="utf-8"?>
+<inkml:ink xmlns:inkml="http://www.w3.org/2003/InkML">
+  <inkml:definitions>
+    <inkml:context xml:id="ctx0">
+      <inkml:inkSource xml:id="inkSrc0">
+        <inkml:traceFormat>
+          <inkml:channel name="X" type="integer" min="-2.14748E9" max="2.14748E9" units="cm"/>
+          <inkml:channel name="Y" type="integer" min="-2.14748E9" max="2.14748E9" units="cm"/>
+        </inkml:traceFormat>
+        <inkml:channelProperties>
+          <inkml:channelProperty channel="X" name="resolution" value="1000" units="1/cm"/>
+          <inkml:channelProperty channel="Y" name="resolution" value="1000" units="1/cm"/>
+        </inkml:channelProperties>
+      </inkml:inkSource>
+      <inkml:timestamp xml:id="ts0" timeString="2024-02-29T10:37:30.486"/>
+    </inkml:context>
+    <inkml:brush xml:id="br0">
+      <inkml:brushProperty name="width" value="0.35" units="cm"/>
+      <inkml:brushProperty name="height" value="0.35" units="cm"/>
+      <inkml:brushProperty name="ignorePressure" value="1"/>
+    </inkml:brush>
+  </inkml:definitions>
+  <inkml:trace contextRef="#ctx0" brushRef="#br0">1 1,'1719'0,"-1685"0</inkml:trace>
+</inkml:ink>
+</file>
+
+<file path=ppt/ink/ink3.xml><?xml version="1.0" encoding="utf-8"?>
+<inkml:ink xmlns:inkml="http://www.w3.org/2003/InkML">
+  <inkml:definitions>
+    <inkml:context xml:id="ctx0">
+      <inkml:inkSource xml:id="inkSrc0">
+        <inkml:traceFormat>
+          <inkml:channel name="X" type="integer" min="-2.14748E9" max="2.14748E9" units="cm"/>
+          <inkml:channel name="Y" type="integer" min="-2.14748E9" max="2.14748E9" units="cm"/>
+        </inkml:traceFormat>
+        <inkml:channelProperties>
+          <inkml:channelProperty channel="X" name="resolution" value="1000" units="1/cm"/>
+          <inkml:channelProperty channel="Y" name="resolution" value="1000" units="1/cm"/>
+        </inkml:channelProperties>
+      </inkml:inkSource>
+      <inkml:timestamp xml:id="ts0" timeString="2024-02-29T10:37:45.324"/>
+    </inkml:context>
+    <inkml:brush xml:id="br0">
+      <inkml:brushProperty name="width" value="0.35" units="cm"/>
+      <inkml:brushProperty name="height" value="0.35" units="cm"/>
+      <inkml:brushProperty name="ignorePressure" value="1"/>
+    </inkml:brush>
+  </inkml:definitions>
+  <inkml:trace contextRef="#ctx0" brushRef="#br0">1 0,'3794'0,"-3760"0</inkml:trace>
+</inkml:ink>
+</file>
+
+<file path=ppt/ink/ink4.xml><?xml version="1.0" encoding="utf-8"?>
+<inkml:ink xmlns:inkml="http://www.w3.org/2003/InkML">
+  <inkml:definitions>
+    <inkml:context xml:id="ctx0">
+      <inkml:inkSource xml:id="inkSrc0">
+        <inkml:traceFormat>
+          <inkml:channel name="X" type="integer" min="-2.14748E9" max="2.14748E9" units="cm"/>
+          <inkml:channel name="Y" type="integer" min="-2.14748E9" max="2.14748E9" units="cm"/>
+        </inkml:traceFormat>
+        <inkml:channelProperties>
+          <inkml:channelProperty channel="X" name="resolution" value="1000" units="1/cm"/>
+          <inkml:channelProperty channel="Y" name="resolution" value="1000" units="1/cm"/>
+        </inkml:channelProperties>
+      </inkml:inkSource>
+      <inkml:timestamp xml:id="ts0" timeString="2024-02-29T10:37:49.604"/>
+    </inkml:context>
+    <inkml:brush xml:id="br0">
+      <inkml:brushProperty name="width" value="0.35" units="cm"/>
+      <inkml:brushProperty name="height" value="0.35" units="cm"/>
+      <inkml:brushProperty name="ignorePressure" value="1"/>
+    </inkml:brush>
+  </inkml:definitions>
+  <inkml:trace contextRef="#ctx0" brushRef="#br0">0 1,'4003'0,"-3957"0</inkml:trace>
+</inkml:ink>
+</file>
+
+<file path=ppt/ink/ink5.xml><?xml version="1.0" encoding="utf-8"?>
+<inkml:ink xmlns:inkml="http://www.w3.org/2003/InkML">
+  <inkml:definitions>
+    <inkml:context xml:id="ctx0">
+      <inkml:inkSource xml:id="inkSrc0">
+        <inkml:traceFormat>
+          <inkml:channel name="X" type="integer" min="-2.14748E9" max="2.14748E9" units="cm"/>
+          <inkml:channel name="Y" type="integer" min="-2.14748E9" max="2.14748E9" units="cm"/>
+        </inkml:traceFormat>
+        <inkml:channelProperties>
+          <inkml:channelProperty channel="X" name="resolution" value="1000" units="1/cm"/>
+          <inkml:channelProperty channel="Y" name="resolution" value="1000" units="1/cm"/>
+        </inkml:channelProperties>
+      </inkml:inkSource>
+      <inkml:timestamp xml:id="ts0" timeString="2024-02-29T10:37:38.993"/>
+    </inkml:context>
+    <inkml:brush xml:id="br0">
+      <inkml:brushProperty name="width" value="0.35" units="cm"/>
+      <inkml:brushProperty name="height" value="0.35" units="cm"/>
+      <inkml:brushProperty name="ignorePressure" value="1"/>
+    </inkml:brush>
+  </inkml:definitions>
+  <inkml:trace contextRef="#ctx0" brushRef="#br0">1 1,'0'0</inkml:trace>
+</inkml:ink>
+</file>
+
+<file path=ppt/ink/ink6.xml><?xml version="1.0" encoding="utf-8"?>
+<inkml:ink xmlns:inkml="http://www.w3.org/2003/InkML">
+  <inkml:definitions>
+    <inkml:context xml:id="ctx0">
+      <inkml:inkSource xml:id="inkSrc0">
+        <inkml:traceFormat>
+          <inkml:channel name="X" type="integer" min="-2.14748E9" max="2.14748E9" units="cm"/>
+          <inkml:channel name="Y" type="integer" min="-2.14748E9" max="2.14748E9" units="cm"/>
+        </inkml:traceFormat>
+        <inkml:channelProperties>
+          <inkml:channelProperty channel="X" name="resolution" value="1000" units="1/cm"/>
+          <inkml:channelProperty channel="Y" name="resolution" value="1000" units="1/cm"/>
+        </inkml:channelProperties>
+      </inkml:inkSource>
+      <inkml:timestamp xml:id="ts0" timeString="2024-02-29T10:37:41.492"/>
+    </inkml:context>
+    <inkml:brush xml:id="br0">
+      <inkml:brushProperty name="width" value="0.35" units="cm"/>
+      <inkml:brushProperty name="height" value="0.35" units="cm"/>
+      <inkml:brushProperty name="ignorePressure" value="1"/>
+    </inkml:brush>
+  </inkml:definitions>
+  <inkml:trace contextRef="#ctx0" brushRef="#br0">1 1,'3623'0,"-3578"0</inkml:trace>
+</inkml:ink>
+</file>
+
+<file path=ppt/ink/ink7.xml><?xml version="1.0" encoding="utf-8"?>
+<inkml:ink xmlns:inkml="http://www.w3.org/2003/InkML">
+  <inkml:definitions>
+    <inkml:context xml:id="ctx0">
+      <inkml:inkSource xml:id="inkSrc0">
+        <inkml:traceFormat>
+          <inkml:channel name="X" type="integer" min="-2.14748E9" max="2.14748E9" units="cm"/>
+          <inkml:channel name="Y" type="integer" min="-2.14748E9" max="2.14748E9" units="cm"/>
+        </inkml:traceFormat>
+        <inkml:channelProperties>
+          <inkml:channelProperty channel="X" name="resolution" value="1000" units="1/cm"/>
+          <inkml:channelProperty channel="Y" name="resolution" value="1000" units="1/cm"/>
+        </inkml:channelProperties>
+      </inkml:inkSource>
+      <inkml:timestamp xml:id="ts0" timeString="2024-02-29T10:37:55.195"/>
+    </inkml:context>
+    <inkml:brush xml:id="br0">
+      <inkml:brushProperty name="width" value="0.35" units="cm"/>
+      <inkml:brushProperty name="height" value="0.35" units="cm"/>
+      <inkml:brushProperty name="ignorePressure" value="1"/>
+    </inkml:brush>
+  </inkml:definitions>
+  <inkml:trace contextRef="#ctx0" brushRef="#br0">0 1,'4206'0,"-4182"0</inkml:trace>
+</inkml:ink>
+</file>
+
+<file path=ppt/ink/ink8.xml><?xml version="1.0" encoding="utf-8"?>
+<inkml:ink xmlns:inkml="http://www.w3.org/2003/InkML">
+  <inkml:definitions>
+    <inkml:context xml:id="ctx0">
+      <inkml:inkSource xml:id="inkSrc0">
+        <inkml:traceFormat>
+          <inkml:channel name="X" type="integer" min="-2.14748E9" max="2.14748E9" units="cm"/>
+          <inkml:channel name="Y" type="integer" min="-2.14748E9" max="2.14748E9" units="cm"/>
+        </inkml:traceFormat>
+        <inkml:channelProperties>
+          <inkml:channelProperty channel="X" name="resolution" value="1000" units="1/cm"/>
+          <inkml:channelProperty channel="Y" name="resolution" value="1000" units="1/cm"/>
+        </inkml:channelProperties>
+      </inkml:inkSource>
+      <inkml:timestamp xml:id="ts0" timeString="2024-02-29T10:38:01.860"/>
+    </inkml:context>
+    <inkml:brush xml:id="br0">
+      <inkml:brushProperty name="width" value="0.35" units="cm"/>
+      <inkml:brushProperty name="height" value="0.35" units="cm"/>
+      <inkml:brushProperty name="ignorePressure" value="1"/>
+    </inkml:brush>
+  </inkml:definitions>
+  <inkml:trace contextRef="#ctx0" brushRef="#br0">0 0,'4182'0,"-4148"0</inkml:trace>
+</inkml:ink>
+</file>
+
+<file path=ppt/ink/ink9.xml><?xml version="1.0" encoding="utf-8"?>
+<inkml:ink xmlns:inkml="http://www.w3.org/2003/InkML">
+  <inkml:definitions>
+    <inkml:context xml:id="ctx0">
+      <inkml:inkSource xml:id="inkSrc0">
+        <inkml:traceFormat>
+          <inkml:channel name="X" type="integer" min="-2.14748E9" max="2.14748E9" units="cm"/>
+          <inkml:channel name="Y" type="integer" min="-2.14748E9" max="2.14748E9" units="cm"/>
+        </inkml:traceFormat>
+        <inkml:channelProperties>
+          <inkml:channelProperty channel="X" name="resolution" value="1000" units="1/cm"/>
+          <inkml:channelProperty channel="Y" name="resolution" value="1000" units="1/cm"/>
+        </inkml:channelProperties>
+      </inkml:inkSource>
+      <inkml:timestamp xml:id="ts0" timeString="2024-02-29T10:38:09.447"/>
+    </inkml:context>
+    <inkml:brush xml:id="br0">
+      <inkml:brushProperty name="width" value="0.35" units="cm"/>
+      <inkml:brushProperty name="height" value="0.35" units="cm"/>
+      <inkml:brushProperty name="ignorePressure" value="1"/>
+    </inkml:brush>
+  </inkml:definitions>
+  <inkml:trace contextRef="#ctx0" brushRef="#br0">1 1,'2582'0,"-2549"0</inkml:trace>
+</inkml:ink>
 </file>
 
 <file path=ppt/notesMasters/notesMaster1.xml><?xml version="1.0" encoding="utf-8"?>
@@ -422,7 +656,7 @@
           <a:p>
             <a:fld id="{F5A8621B-8C8E-49BA-8772-41D0FE75A082}" type="datetimeFigureOut">
               <a:rPr lang="en-US" smtClean="0"/>
-              <a:t>2/28/2024</a:t>
+              <a:t>2/29/2024</a:t>
             </a:fld>
             <a:endParaRPr lang="en-US" dirty="0"/>
           </a:p>
@@ -9293,31 +9527,37 @@
           <a:chExt cx="0" cy="0"/>
         </a:xfrm>
       </p:grpSpPr>
-      <p:sp>
-        <p:nvSpPr>
-          <p:cNvPr id="7" name="Picture Placeholder 6">
-            <a:extLst>
-              <a:ext uri="{FF2B5EF4-FFF2-40B4-BE49-F238E27FC236}">
-                <a16:creationId xmlns:a16="http://schemas.microsoft.com/office/drawing/2014/main" id="{7CEF6080-FD27-1AAE-87EE-E58DCD6CE489}"/>
-              </a:ext>
-            </a:extLst>
-          </p:cNvPr>
-          <p:cNvSpPr>
-            <a:spLocks noGrp="1"/>
-          </p:cNvSpPr>
+      <p:pic>
+        <p:nvPicPr>
+          <p:cNvPr id="3" name="Picture Placeholder 2">
+            <a:extLst>
+              <a:ext uri="{FF2B5EF4-FFF2-40B4-BE49-F238E27FC236}">
+                <a16:creationId xmlns:a16="http://schemas.microsoft.com/office/drawing/2014/main" id="{BB7D641B-1561-0418-4F14-6EF9F0152FDC}"/>
+              </a:ext>
+            </a:extLst>
+          </p:cNvPr>
+          <p:cNvPicPr>
+            <a:picLocks noGrp="1" noChangeAspect="1"/>
+          </p:cNvPicPr>
           <p:nvPr>
             <p:ph type="pic" sz="quarter" idx="14"/>
           </p:nvPr>
-        </p:nvSpPr>
-        <p:spPr/>
-        <p:txBody>
-          <a:bodyPr/>
-          <a:lstStyle/>
-          <a:p>
-            <a:endParaRPr lang="en-US"/>
-          </a:p>
-        </p:txBody>
-      </p:sp>
+        </p:nvPicPr>
+        <p:blipFill rotWithShape="1">
+          <a:blip r:embed="rId2"/>
+          <a:srcRect l="19832" t="11122" r="19832"/>
+          <a:stretch/>
+        </p:blipFill>
+        <p:spPr>
+          <a:xfrm>
+            <a:off x="198783" y="337624"/>
+            <a:ext cx="5669280" cy="6182751"/>
+          </a:xfrm>
+          <a:prstGeom prst="rect">
+            <a:avLst/>
+          </a:prstGeom>
+        </p:spPr>
+      </p:pic>
       <p:sp>
         <p:nvSpPr>
           <p:cNvPr id="4" name="Slide Number Placeholder 3">
@@ -9411,7 +9651,12 @@
             <p:ph type="title"/>
           </p:nvPr>
         </p:nvSpPr>
-        <p:spPr/>
+        <p:spPr>
+          <a:xfrm>
+            <a:off x="6000465" y="407320"/>
+            <a:ext cx="5897218" cy="884238"/>
+          </a:xfrm>
+        </p:spPr>
         <p:txBody>
           <a:bodyPr/>
           <a:lstStyle/>
@@ -9423,6 +9668,486 @@
           </a:p>
         </p:txBody>
       </p:sp>
+      <mc:AlternateContent xmlns:mc="http://schemas.openxmlformats.org/markup-compatibility/2006">
+        <mc:Choice xmlns:p14="http://schemas.microsoft.com/office/powerpoint/2010/main" Requires="p14">
+          <p:contentPart p14:bwMode="auto" r:id="rId3">
+            <p14:nvContentPartPr>
+              <p14:cNvPr id="9" name="Ink 8">
+                <a:extLst>
+                  <a:ext uri="{FF2B5EF4-FFF2-40B4-BE49-F238E27FC236}">
+                    <a16:creationId xmlns:a16="http://schemas.microsoft.com/office/drawing/2014/main" id="{8AB6F95B-9B5D-ECF2-AFEA-78BC897B3F49}"/>
+                  </a:ext>
+                </a:extLst>
+              </p14:cNvPr>
+              <p14:cNvContentPartPr/>
+              <p14:nvPr/>
+            </p14:nvContentPartPr>
+            <p14:xfrm>
+              <a:off x="3362095" y="2958148"/>
+              <a:ext cx="1011600" cy="360"/>
+            </p14:xfrm>
+          </p:contentPart>
+        </mc:Choice>
+        <mc:Fallback>
+          <p:pic>
+            <p:nvPicPr>
+              <p:cNvPr id="9" name="Ink 8">
+                <a:extLst>
+                  <a:ext uri="{FF2B5EF4-FFF2-40B4-BE49-F238E27FC236}">
+                    <a16:creationId xmlns:a16="http://schemas.microsoft.com/office/drawing/2014/main" id="{8AB6F95B-9B5D-ECF2-AFEA-78BC897B3F49}"/>
+                  </a:ext>
+                </a:extLst>
+              </p:cNvPr>
+              <p:cNvPicPr/>
+              <p:nvPr/>
+            </p:nvPicPr>
+            <p:blipFill>
+              <a:blip r:embed="rId4"/>
+              <a:stretch>
+                <a:fillRect/>
+              </a:stretch>
+            </p:blipFill>
+            <p:spPr>
+              <a:xfrm>
+                <a:off x="3299095" y="2895148"/>
+                <a:ext cx="1137240" cy="126000"/>
+              </a:xfrm>
+              <a:prstGeom prst="rect">
+                <a:avLst/>
+              </a:prstGeom>
+            </p:spPr>
+          </p:pic>
+        </mc:Fallback>
+      </mc:AlternateContent>
+      <mc:AlternateContent xmlns:mc="http://schemas.openxmlformats.org/markup-compatibility/2006">
+        <mc:Choice xmlns:p14="http://schemas.microsoft.com/office/powerpoint/2010/main" Requires="p14">
+          <p:contentPart p14:bwMode="auto" r:id="rId5">
+            <p14:nvContentPartPr>
+              <p14:cNvPr id="10" name="Ink 9">
+                <a:extLst>
+                  <a:ext uri="{FF2B5EF4-FFF2-40B4-BE49-F238E27FC236}">
+                    <a16:creationId xmlns:a16="http://schemas.microsoft.com/office/drawing/2014/main" id="{8236EFF7-CB2D-141E-D0B3-DABCC078268C}"/>
+                  </a:ext>
+                </a:extLst>
+              </p14:cNvPr>
+              <p14:cNvContentPartPr/>
+              <p14:nvPr/>
+            </p14:nvContentPartPr>
+            <p14:xfrm>
+              <a:off x="3348055" y="3422188"/>
+              <a:ext cx="631440" cy="360"/>
+            </p14:xfrm>
+          </p:contentPart>
+        </mc:Choice>
+        <mc:Fallback>
+          <p:pic>
+            <p:nvPicPr>
+              <p:cNvPr id="10" name="Ink 9">
+                <a:extLst>
+                  <a:ext uri="{FF2B5EF4-FFF2-40B4-BE49-F238E27FC236}">
+                    <a16:creationId xmlns:a16="http://schemas.microsoft.com/office/drawing/2014/main" id="{8236EFF7-CB2D-141E-D0B3-DABCC078268C}"/>
+                  </a:ext>
+                </a:extLst>
+              </p:cNvPr>
+              <p:cNvPicPr/>
+              <p:nvPr/>
+            </p:nvPicPr>
+            <p:blipFill>
+              <a:blip r:embed="rId6"/>
+              <a:stretch>
+                <a:fillRect/>
+              </a:stretch>
+            </p:blipFill>
+            <p:spPr>
+              <a:xfrm>
+                <a:off x="3285415" y="3359548"/>
+                <a:ext cx="757080" cy="126000"/>
+              </a:xfrm>
+              <a:prstGeom prst="rect">
+                <a:avLst/>
+              </a:prstGeom>
+            </p:spPr>
+          </p:pic>
+        </mc:Fallback>
+      </mc:AlternateContent>
+      <mc:AlternateContent xmlns:mc="http://schemas.openxmlformats.org/markup-compatibility/2006">
+        <mc:Choice xmlns:p14="http://schemas.microsoft.com/office/powerpoint/2010/main" Requires="p14">
+          <p:contentPart p14:bwMode="auto" r:id="rId7">
+            <p14:nvContentPartPr>
+              <p14:cNvPr id="14" name="Ink 13">
+                <a:extLst>
+                  <a:ext uri="{FF2B5EF4-FFF2-40B4-BE49-F238E27FC236}">
+                    <a16:creationId xmlns:a16="http://schemas.microsoft.com/office/drawing/2014/main" id="{1A2CA15E-79C1-7DF0-6FB1-7326C327617F}"/>
+                  </a:ext>
+                </a:extLst>
+              </p14:cNvPr>
+              <p14:cNvContentPartPr/>
+              <p14:nvPr/>
+            </p14:nvContentPartPr>
+            <p14:xfrm>
+              <a:off x="3150775" y="2901988"/>
+              <a:ext cx="1378440" cy="360"/>
+            </p14:xfrm>
+          </p:contentPart>
+        </mc:Choice>
+        <mc:Fallback>
+          <p:pic>
+            <p:nvPicPr>
+              <p:cNvPr id="14" name="Ink 13">
+                <a:extLst>
+                  <a:ext uri="{FF2B5EF4-FFF2-40B4-BE49-F238E27FC236}">
+                    <a16:creationId xmlns:a16="http://schemas.microsoft.com/office/drawing/2014/main" id="{1A2CA15E-79C1-7DF0-6FB1-7326C327617F}"/>
+                  </a:ext>
+                </a:extLst>
+              </p:cNvPr>
+              <p:cNvPicPr/>
+              <p:nvPr/>
+            </p:nvPicPr>
+            <p:blipFill>
+              <a:blip r:embed="rId8"/>
+              <a:stretch>
+                <a:fillRect/>
+              </a:stretch>
+            </p:blipFill>
+            <p:spPr>
+              <a:xfrm>
+                <a:off x="3088135" y="2838988"/>
+                <a:ext cx="1504080" cy="126000"/>
+              </a:xfrm>
+              <a:prstGeom prst="rect">
+                <a:avLst/>
+              </a:prstGeom>
+            </p:spPr>
+          </p:pic>
+        </mc:Fallback>
+      </mc:AlternateContent>
+      <mc:AlternateContent xmlns:mc="http://schemas.openxmlformats.org/markup-compatibility/2006">
+        <mc:Choice xmlns:p14="http://schemas.microsoft.com/office/powerpoint/2010/main" Requires="p14">
+          <p:contentPart p14:bwMode="auto" r:id="rId9">
+            <p14:nvContentPartPr>
+              <p14:cNvPr id="15" name="Ink 14">
+                <a:extLst>
+                  <a:ext uri="{FF2B5EF4-FFF2-40B4-BE49-F238E27FC236}">
+                    <a16:creationId xmlns:a16="http://schemas.microsoft.com/office/drawing/2014/main" id="{C0451767-FEA0-130C-59F4-7B7BA951F09D}"/>
+                  </a:ext>
+                </a:extLst>
+              </p14:cNvPr>
+              <p14:cNvContentPartPr/>
+              <p14:nvPr/>
+            </p14:nvContentPartPr>
+            <p14:xfrm>
+              <a:off x="3137095" y="2789308"/>
+              <a:ext cx="1457640" cy="360"/>
+            </p14:xfrm>
+          </p:contentPart>
+        </mc:Choice>
+        <mc:Fallback>
+          <p:pic>
+            <p:nvPicPr>
+              <p:cNvPr id="15" name="Ink 14">
+                <a:extLst>
+                  <a:ext uri="{FF2B5EF4-FFF2-40B4-BE49-F238E27FC236}">
+                    <a16:creationId xmlns:a16="http://schemas.microsoft.com/office/drawing/2014/main" id="{C0451767-FEA0-130C-59F4-7B7BA951F09D}"/>
+                  </a:ext>
+                </a:extLst>
+              </p:cNvPr>
+              <p:cNvPicPr/>
+              <p:nvPr/>
+            </p:nvPicPr>
+            <p:blipFill>
+              <a:blip r:embed="rId10"/>
+              <a:stretch>
+                <a:fillRect/>
+              </a:stretch>
+            </p:blipFill>
+            <p:spPr>
+              <a:xfrm>
+                <a:off x="3074095" y="2726668"/>
+                <a:ext cx="1583280" cy="126000"/>
+              </a:xfrm>
+              <a:prstGeom prst="rect">
+                <a:avLst/>
+              </a:prstGeom>
+            </p:spPr>
+          </p:pic>
+        </mc:Fallback>
+      </mc:AlternateContent>
+      <p:grpSp>
+        <p:nvGrpSpPr>
+          <p:cNvPr id="17" name="Group 16">
+            <a:extLst>
+              <a:ext uri="{FF2B5EF4-FFF2-40B4-BE49-F238E27FC236}">
+                <a16:creationId xmlns:a16="http://schemas.microsoft.com/office/drawing/2014/main" id="{36FA8B52-1B56-C267-0523-74C8665D74B3}"/>
+              </a:ext>
+            </a:extLst>
+          </p:cNvPr>
+          <p:cNvGrpSpPr/>
+          <p:nvPr/>
+        </p:nvGrpSpPr>
+        <p:grpSpPr>
+          <a:xfrm>
+            <a:off x="3109015" y="2986228"/>
+            <a:ext cx="1523160" cy="42480"/>
+            <a:chOff x="3109015" y="2986228"/>
+            <a:chExt cx="1523160" cy="42480"/>
+          </a:xfrm>
+        </p:grpSpPr>
+        <mc:AlternateContent xmlns:mc="http://schemas.openxmlformats.org/markup-compatibility/2006">
+          <mc:Choice xmlns:p14="http://schemas.microsoft.com/office/powerpoint/2010/main" Requires="p14">
+            <p:contentPart p14:bwMode="auto" r:id="rId11">
+              <p14:nvContentPartPr>
+                <p14:cNvPr id="11" name="Ink 10">
+                  <a:extLst>
+                    <a:ext uri="{FF2B5EF4-FFF2-40B4-BE49-F238E27FC236}">
+                      <a16:creationId xmlns:a16="http://schemas.microsoft.com/office/drawing/2014/main" id="{E81B5462-A8A3-4DA2-B032-2FD607338990}"/>
+                    </a:ext>
+                  </a:extLst>
+                </p14:cNvPr>
+                <p14:cNvContentPartPr/>
+                <p14:nvPr/>
+              </p14:nvContentPartPr>
+              <p14:xfrm>
+                <a:off x="3165175" y="3028348"/>
+                <a:ext cx="360" cy="360"/>
+              </p14:xfrm>
+            </p:contentPart>
+          </mc:Choice>
+          <mc:Fallback>
+            <p:pic>
+              <p:nvPicPr>
+                <p:cNvPr id="11" name="Ink 10">
+                  <a:extLst>
+                    <a:ext uri="{FF2B5EF4-FFF2-40B4-BE49-F238E27FC236}">
+                      <a16:creationId xmlns:a16="http://schemas.microsoft.com/office/drawing/2014/main" id="{E81B5462-A8A3-4DA2-B032-2FD607338990}"/>
+                    </a:ext>
+                  </a:extLst>
+                </p:cNvPr>
+                <p:cNvPicPr/>
+                <p:nvPr/>
+              </p:nvPicPr>
+              <p:blipFill>
+                <a:blip r:embed="rId12"/>
+                <a:stretch>
+                  <a:fillRect/>
+                </a:stretch>
+              </p:blipFill>
+              <p:spPr>
+                <a:xfrm>
+                  <a:off x="3102535" y="2965708"/>
+                  <a:ext cx="126000" cy="126000"/>
+                </a:xfrm>
+                <a:prstGeom prst="rect">
+                  <a:avLst/>
+                </a:prstGeom>
+              </p:spPr>
+            </p:pic>
+          </mc:Fallback>
+        </mc:AlternateContent>
+        <mc:AlternateContent xmlns:mc="http://schemas.openxmlformats.org/markup-compatibility/2006">
+          <mc:Choice xmlns:p14="http://schemas.microsoft.com/office/powerpoint/2010/main" Requires="p14">
+            <p:contentPart p14:bwMode="auto" r:id="rId13">
+              <p14:nvContentPartPr>
+                <p14:cNvPr id="12" name="Ink 11">
+                  <a:extLst>
+                    <a:ext uri="{FF2B5EF4-FFF2-40B4-BE49-F238E27FC236}">
+                      <a16:creationId xmlns:a16="http://schemas.microsoft.com/office/drawing/2014/main" id="{237249C2-0F8E-0B5B-E865-595E28F79401}"/>
+                    </a:ext>
+                  </a:extLst>
+                </p14:cNvPr>
+                <p14:cNvContentPartPr/>
+                <p14:nvPr/>
+              </p14:nvContentPartPr>
+              <p14:xfrm>
+                <a:off x="3178855" y="3028348"/>
+                <a:ext cx="1320840" cy="360"/>
+              </p14:xfrm>
+            </p:contentPart>
+          </mc:Choice>
+          <mc:Fallback>
+            <p:pic>
+              <p:nvPicPr>
+                <p:cNvPr id="12" name="Ink 11">
+                  <a:extLst>
+                    <a:ext uri="{FF2B5EF4-FFF2-40B4-BE49-F238E27FC236}">
+                      <a16:creationId xmlns:a16="http://schemas.microsoft.com/office/drawing/2014/main" id="{237249C2-0F8E-0B5B-E865-595E28F79401}"/>
+                    </a:ext>
+                  </a:extLst>
+                </p:cNvPr>
+                <p:cNvPicPr/>
+                <p:nvPr/>
+              </p:nvPicPr>
+              <p:blipFill>
+                <a:blip r:embed="rId14"/>
+                <a:stretch>
+                  <a:fillRect/>
+                </a:stretch>
+              </p:blipFill>
+              <p:spPr>
+                <a:xfrm>
+                  <a:off x="3116215" y="2965708"/>
+                  <a:ext cx="1446480" cy="126000"/>
+                </a:xfrm>
+                <a:prstGeom prst="rect">
+                  <a:avLst/>
+                </a:prstGeom>
+              </p:spPr>
+            </p:pic>
+          </mc:Fallback>
+        </mc:AlternateContent>
+        <mc:AlternateContent xmlns:mc="http://schemas.openxmlformats.org/markup-compatibility/2006">
+          <mc:Choice xmlns:p14="http://schemas.microsoft.com/office/powerpoint/2010/main" Requires="p14">
+            <p:contentPart p14:bwMode="auto" r:id="rId15">
+              <p14:nvContentPartPr>
+                <p14:cNvPr id="16" name="Ink 15">
+                  <a:extLst>
+                    <a:ext uri="{FF2B5EF4-FFF2-40B4-BE49-F238E27FC236}">
+                      <a16:creationId xmlns:a16="http://schemas.microsoft.com/office/drawing/2014/main" id="{66A8DA5D-BE5D-94C1-DC45-FADFBDE02981}"/>
+                    </a:ext>
+                  </a:extLst>
+                </p14:cNvPr>
+                <p14:cNvContentPartPr/>
+                <p14:nvPr/>
+              </p14:nvContentPartPr>
+              <p14:xfrm>
+                <a:off x="3109015" y="2986228"/>
+                <a:ext cx="1523160" cy="360"/>
+              </p14:xfrm>
+            </p:contentPart>
+          </mc:Choice>
+          <mc:Fallback>
+            <p:pic>
+              <p:nvPicPr>
+                <p:cNvPr id="16" name="Ink 15">
+                  <a:extLst>
+                    <a:ext uri="{FF2B5EF4-FFF2-40B4-BE49-F238E27FC236}">
+                      <a16:creationId xmlns:a16="http://schemas.microsoft.com/office/drawing/2014/main" id="{66A8DA5D-BE5D-94C1-DC45-FADFBDE02981}"/>
+                    </a:ext>
+                  </a:extLst>
+                </p:cNvPr>
+                <p:cNvPicPr/>
+                <p:nvPr/>
+              </p:nvPicPr>
+              <p:blipFill>
+                <a:blip r:embed="rId16"/>
+                <a:stretch>
+                  <a:fillRect/>
+                </a:stretch>
+              </p:blipFill>
+              <p:spPr>
+                <a:xfrm>
+                  <a:off x="3046015" y="2923588"/>
+                  <a:ext cx="1648800" cy="126000"/>
+                </a:xfrm>
+                <a:prstGeom prst="rect">
+                  <a:avLst/>
+                </a:prstGeom>
+              </p:spPr>
+            </p:pic>
+          </mc:Fallback>
+        </mc:AlternateContent>
+      </p:grpSp>
+      <mc:AlternateContent xmlns:mc="http://schemas.openxmlformats.org/markup-compatibility/2006">
+        <mc:Choice xmlns:p14="http://schemas.microsoft.com/office/powerpoint/2010/main" Requires="p14">
+          <p:contentPart p14:bwMode="auto" r:id="rId17">
+            <p14:nvContentPartPr>
+              <p14:cNvPr id="18" name="Ink 17">
+                <a:extLst>
+                  <a:ext uri="{FF2B5EF4-FFF2-40B4-BE49-F238E27FC236}">
+                    <a16:creationId xmlns:a16="http://schemas.microsoft.com/office/drawing/2014/main" id="{9E22F79A-1701-0AEF-8D84-E0FB208B7205}"/>
+                  </a:ext>
+                </a:extLst>
+              </p14:cNvPr>
+              <p14:cNvContentPartPr/>
+              <p14:nvPr/>
+            </p14:nvContentPartPr>
+            <p14:xfrm>
+              <a:off x="3109015" y="2887948"/>
+              <a:ext cx="1517760" cy="360"/>
+            </p14:xfrm>
+          </p:contentPart>
+        </mc:Choice>
+        <mc:Fallback>
+          <p:pic>
+            <p:nvPicPr>
+              <p:cNvPr id="18" name="Ink 17">
+                <a:extLst>
+                  <a:ext uri="{FF2B5EF4-FFF2-40B4-BE49-F238E27FC236}">
+                    <a16:creationId xmlns:a16="http://schemas.microsoft.com/office/drawing/2014/main" id="{9E22F79A-1701-0AEF-8D84-E0FB208B7205}"/>
+                  </a:ext>
+                </a:extLst>
+              </p:cNvPr>
+              <p:cNvPicPr/>
+              <p:nvPr/>
+            </p:nvPicPr>
+            <p:blipFill>
+              <a:blip r:embed="rId18"/>
+              <a:stretch>
+                <a:fillRect/>
+              </a:stretch>
+            </p:blipFill>
+            <p:spPr>
+              <a:xfrm>
+                <a:off x="3046015" y="2824948"/>
+                <a:ext cx="1643400" cy="126000"/>
+              </a:xfrm>
+              <a:prstGeom prst="rect">
+                <a:avLst/>
+              </a:prstGeom>
+            </p:spPr>
+          </p:pic>
+        </mc:Fallback>
+      </mc:AlternateContent>
+      <mc:AlternateContent xmlns:mc="http://schemas.openxmlformats.org/markup-compatibility/2006">
+        <mc:Choice xmlns:p14="http://schemas.microsoft.com/office/powerpoint/2010/main" Requires="p14">
+          <p:contentPart p14:bwMode="auto" r:id="rId19">
+            <p14:nvContentPartPr>
+              <p14:cNvPr id="19" name="Ink 18">
+                <a:extLst>
+                  <a:ext uri="{FF2B5EF4-FFF2-40B4-BE49-F238E27FC236}">
+                    <a16:creationId xmlns:a16="http://schemas.microsoft.com/office/drawing/2014/main" id="{C347B492-78E1-11B1-C1B5-1F7C76345EDE}"/>
+                  </a:ext>
+                </a:extLst>
+              </p14:cNvPr>
+              <p14:cNvContentPartPr/>
+              <p14:nvPr/>
+            </p14:nvContentPartPr>
+            <p14:xfrm>
+              <a:off x="3333655" y="3900628"/>
+              <a:ext cx="941760" cy="360"/>
+            </p14:xfrm>
+          </p:contentPart>
+        </mc:Choice>
+        <mc:Fallback>
+          <p:pic>
+            <p:nvPicPr>
+              <p:cNvPr id="19" name="Ink 18">
+                <a:extLst>
+                  <a:ext uri="{FF2B5EF4-FFF2-40B4-BE49-F238E27FC236}">
+                    <a16:creationId xmlns:a16="http://schemas.microsoft.com/office/drawing/2014/main" id="{C347B492-78E1-11B1-C1B5-1F7C76345EDE}"/>
+                  </a:ext>
+                </a:extLst>
+              </p:cNvPr>
+              <p:cNvPicPr/>
+              <p:nvPr/>
+            </p:nvPicPr>
+            <p:blipFill>
+              <a:blip r:embed="rId20"/>
+              <a:stretch>
+                <a:fillRect/>
+              </a:stretch>
+            </p:blipFill>
+            <p:spPr>
+              <a:xfrm>
+                <a:off x="3271015" y="3837988"/>
+                <a:ext cx="1067400" cy="126000"/>
+              </a:xfrm>
+              <a:prstGeom prst="rect">
+                <a:avLst/>
+              </a:prstGeom>
+            </p:spPr>
+          </p:pic>
+        </mc:Fallback>
+      </mc:AlternateContent>
     </p:spTree>
     <p:extLst>
       <p:ext uri="{BB962C8B-B14F-4D97-AF65-F5344CB8AC3E}">
@@ -11246,15 +11971,6 @@
 </file>
 
 <file path=customXml/item1.xml><?xml version="1.0" encoding="utf-8"?>
-<?mso-contentType ?>
-<FormTemplates xmlns="http://schemas.microsoft.com/sharepoint/v3/contenttype/forms">
-  <Display>DocumentLibraryForm</Display>
-  <Edit>DocumentLibraryForm</Edit>
-  <New>DocumentLibraryForm</New>
-</FormTemplates>
-</file>
-
-<file path=customXml/item2.xml><?xml version="1.0" encoding="utf-8"?>
 <ct:contentTypeSchema xmlns:ct="http://schemas.microsoft.com/office/2006/metadata/contentType" xmlns:ma="http://schemas.microsoft.com/office/2006/metadata/properties/metaAttributes" ct:_="" ma:_="" ma:contentTypeName="Document" ma:contentTypeID="0x01010079F111ED35F8CC479449609E8A0923A6" ma:contentTypeVersion="28" ma:contentTypeDescription="Create a new document." ma:contentTypeScope="" ma:versionID="60f5a4f2d2b0abadcf532d48ebf9cb71">
   <xsd:schema xmlns:xsd="http://www.w3.org/2001/XMLSchema" xmlns:xs="http://www.w3.org/2001/XMLSchema" xmlns:p="http://schemas.microsoft.com/office/2006/metadata/properties" xmlns:ns1="http://schemas.microsoft.com/sharepoint/v3" xmlns:ns2="71af3243-3dd4-4a8d-8c0d-dd76da1f02a5" xmlns:ns3="16c05727-aa75-4e4a-9b5f-8a80a1165891" xmlns:ns4="230e9df3-be65-4c73-a93b-d1236ebd677e" targetNamespace="http://schemas.microsoft.com/office/2006/metadata/properties" ma:root="true" ma:fieldsID="7dd78129e6a1811f84807ad11c651531" ns1:_="" ns2:_="" ns3:_="" ns4:_="">
     <xsd:import namespace="http://schemas.microsoft.com/sharepoint/v3"/>
@@ -11566,6 +12282,15 @@
 </ct:contentTypeSchema>
 </file>
 
+<file path=customXml/item2.xml><?xml version="1.0" encoding="utf-8"?>
+<?mso-contentType ?>
+<FormTemplates xmlns="http://schemas.microsoft.com/sharepoint/v3/contenttype/forms">
+  <Display>DocumentLibraryForm</Display>
+  <Edit>DocumentLibraryForm</Edit>
+  <New>DocumentLibraryForm</New>
+</FormTemplates>
+</file>
+
 <file path=customXml/item3.xml><?xml version="1.0" encoding="utf-8"?>
 <p:properties xmlns:p="http://schemas.microsoft.com/office/2006/metadata/properties" xmlns:xsi="http://www.w3.org/2001/XMLSchema-instance" xmlns:pc="http://schemas.microsoft.com/office/infopath/2007/PartnerControls">
   <documentManagement>
@@ -11587,14 +12312,6 @@
 </file>
 
 <file path=customXml/itemProps1.xml><?xml version="1.0" encoding="utf-8"?>
-<ds:datastoreItem xmlns:ds="http://schemas.openxmlformats.org/officeDocument/2006/customXml" ds:itemID="{99E4EAC9-33DC-4CF0-BA31-C98F61CE4785}">
-  <ds:schemaRefs>
-    <ds:schemaRef ds:uri="http://schemas.microsoft.com/sharepoint/v3/contenttype/forms"/>
-  </ds:schemaRefs>
-</ds:datastoreItem>
-</file>
-
-<file path=customXml/itemProps2.xml><?xml version="1.0" encoding="utf-8"?>
 <ds:datastoreItem xmlns:ds="http://schemas.openxmlformats.org/officeDocument/2006/customXml" ds:itemID="{A3D5DB56-3A71-4638-9571-EE877FD66E96}">
   <ds:schemaRefs>
     <ds:schemaRef ds:uri="http://schemas.microsoft.com/office/2006/metadata/contentType"/>
@@ -11615,6 +12332,14 @@
 </ds:datastoreItem>
 </file>
 
+<file path=customXml/itemProps2.xml><?xml version="1.0" encoding="utf-8"?>
+<ds:datastoreItem xmlns:ds="http://schemas.openxmlformats.org/officeDocument/2006/customXml" ds:itemID="{99E4EAC9-33DC-4CF0-BA31-C98F61CE4785}">
+  <ds:schemaRefs>
+    <ds:schemaRef ds:uri="http://schemas.microsoft.com/sharepoint/v3/contenttype/forms"/>
+  </ds:schemaRefs>
+</ds:datastoreItem>
+</file>
+
 <file path=customXml/itemProps3.xml><?xml version="1.0" encoding="utf-8"?>
 <ds:datastoreItem xmlns:ds="http://schemas.openxmlformats.org/officeDocument/2006/customXml" ds:itemID="{8002A8ED-1331-4C1D-8649-743D7BE164DD}">
   <ds:schemaRefs>

</xml_diff>

<commit_message>
Updated Phase 2 presentation
</commit_message>
<xml_diff>
--- a/Phase 2 Docs/Phase 2 - Presentation.pptx
+++ b/Phase 2 Docs/Phase 2 - Presentation.pptx
@@ -245,7 +245,7 @@
           <a:p>
             <a:fld id="{966D5B4E-BF3E-3B45-A4BA-D6C3B92870D7}" type="datetimeFigureOut">
               <a:rPr lang="en-US" smtClean="0"/>
-              <a:t>2/29/2024</a:t>
+              <a:t>3/2/2024</a:t>
             </a:fld>
             <a:endParaRPr lang="en-US" dirty="0"/>
           </a:p>
@@ -656,7 +656,7 @@
           <a:p>
             <a:fld id="{F5A8621B-8C8E-49BA-8772-41D0FE75A082}" type="datetimeFigureOut">
               <a:rPr lang="en-US" smtClean="0"/>
-              <a:t>2/29/2024</a:t>
+              <a:t>3/2/2024</a:t>
             </a:fld>
             <a:endParaRPr lang="en-US" dirty="0"/>
           </a:p>
@@ -8456,7 +8456,7 @@
         </p:nvSpPr>
         <p:spPr>
           <a:xfrm>
-            <a:off x="6415596" y="341643"/>
+            <a:off x="6415596" y="536954"/>
             <a:ext cx="5251450" cy="1661297"/>
           </a:xfrm>
         </p:spPr>
@@ -8474,14 +8474,7 @@
             </a:pPr>
             <a:r>
               <a:rPr lang="en-US" sz="4000" dirty="0"/>
-              <a:t>Catch phrase</a:t>
-            </a:r>
-            <a:br>
-              <a:rPr lang="en-US" sz="4000" dirty="0"/>
-            </a:br>
-            <a:r>
-              <a:rPr lang="en-US" sz="4000" dirty="0"/>
-              <a:t>(in matt’s code)</a:t>
+              <a:t>“We're not to blame for your pet's bad name”</a:t>
             </a:r>
           </a:p>
         </p:txBody>
@@ -8504,7 +8497,7 @@
         </p:nvSpPr>
         <p:spPr>
           <a:xfrm>
-            <a:off x="6297819" y="2240305"/>
+            <a:off x="6297819" y="2435616"/>
             <a:ext cx="5251450" cy="365125"/>
           </a:xfrm>
         </p:spPr>
@@ -8566,13 +8559,13 @@
         </p:nvSpPr>
         <p:spPr>
           <a:xfrm>
-            <a:off x="6297817" y="2842795"/>
+            <a:off x="6297817" y="3038106"/>
             <a:ext cx="5251451" cy="3388143"/>
           </a:xfrm>
         </p:spPr>
         <p:txBody>
           <a:bodyPr>
-            <a:normAutofit/>
+            <a:normAutofit fontScale="92500" lnSpcReduction="10000"/>
           </a:bodyPr>
           <a:lstStyle/>
           <a:p>
@@ -8583,7 +8576,7 @@
               <a:buNone/>
             </a:pPr>
             <a:r>
-              <a:rPr lang="en-US" sz="2400" cap="small" spc="50" dirty="0">
+              <a:rPr lang="en-US" sz="2800" cap="small" spc="50" dirty="0">
                 <a:cs typeface="Biome Light" panose="020B0303030204020804" pitchFamily="34" charset="0"/>
               </a:rPr>
               <a:t>Would you like help picking a name for your pet? </a:t>
@@ -8597,7 +8590,7 @@
               <a:buNone/>
             </a:pPr>
             <a:r>
-              <a:rPr lang="en-US" sz="2400" cap="small" spc="50" dirty="0">
+              <a:rPr lang="en-US" sz="2800" cap="small" spc="50" dirty="0">
                 <a:cs typeface="Biome Light" panose="020B0303030204020804" pitchFamily="34" charset="0"/>
               </a:rPr>
               <a:t>Simply upload a picture and we’ll recommend a few different names for you!</a:t>
@@ -8607,13 +8600,13 @@
             <a:pPr marL="0" indent="0">
               <a:buNone/>
             </a:pPr>
-            <a:endParaRPr lang="en-US" sz="2400" cap="small" spc="50" dirty="0"/>
+            <a:endParaRPr lang="en-US" sz="2800" cap="small" spc="50" dirty="0"/>
           </a:p>
           <a:p>
             <a:pPr marL="0" indent="0">
               <a:buNone/>
             </a:pPr>
-            <a:endParaRPr lang="en-US" sz="2400" cap="small" spc="50" dirty="0"/>
+            <a:endParaRPr lang="en-US" sz="2800" cap="small" spc="50" dirty="0"/>
           </a:p>
         </p:txBody>
       </p:sp>
@@ -9668,8 +9661,8 @@
           </a:p>
         </p:txBody>
       </p:sp>
-      <mc:AlternateContent xmlns:mc="http://schemas.openxmlformats.org/markup-compatibility/2006">
-        <mc:Choice xmlns:p14="http://schemas.microsoft.com/office/powerpoint/2010/main" Requires="p14">
+      <mc:AlternateContent xmlns:mc="http://schemas.openxmlformats.org/markup-compatibility/2006" xmlns:p14="http://schemas.microsoft.com/office/powerpoint/2010/main">
+        <mc:Choice Requires="p14">
           <p:contentPart p14:bwMode="auto" r:id="rId3">
             <p14:nvContentPartPr>
               <p14:cNvPr id="9" name="Ink 8">
@@ -9688,7 +9681,7 @@
             </p14:xfrm>
           </p:contentPart>
         </mc:Choice>
-        <mc:Fallback>
+        <mc:Fallback xmlns="">
           <p:pic>
             <p:nvPicPr>
               <p:cNvPr id="9" name="Ink 8">
@@ -9719,8 +9712,8 @@
           </p:pic>
         </mc:Fallback>
       </mc:AlternateContent>
-      <mc:AlternateContent xmlns:mc="http://schemas.openxmlformats.org/markup-compatibility/2006">
-        <mc:Choice xmlns:p14="http://schemas.microsoft.com/office/powerpoint/2010/main" Requires="p14">
+      <mc:AlternateContent xmlns:mc="http://schemas.openxmlformats.org/markup-compatibility/2006" xmlns:p14="http://schemas.microsoft.com/office/powerpoint/2010/main">
+        <mc:Choice Requires="p14">
           <p:contentPart p14:bwMode="auto" r:id="rId5">
             <p14:nvContentPartPr>
               <p14:cNvPr id="10" name="Ink 9">
@@ -9739,7 +9732,7 @@
             </p14:xfrm>
           </p:contentPart>
         </mc:Choice>
-        <mc:Fallback>
+        <mc:Fallback xmlns="">
           <p:pic>
             <p:nvPicPr>
               <p:cNvPr id="10" name="Ink 9">
@@ -9770,8 +9763,8 @@
           </p:pic>
         </mc:Fallback>
       </mc:AlternateContent>
-      <mc:AlternateContent xmlns:mc="http://schemas.openxmlformats.org/markup-compatibility/2006">
-        <mc:Choice xmlns:p14="http://schemas.microsoft.com/office/powerpoint/2010/main" Requires="p14">
+      <mc:AlternateContent xmlns:mc="http://schemas.openxmlformats.org/markup-compatibility/2006" xmlns:p14="http://schemas.microsoft.com/office/powerpoint/2010/main">
+        <mc:Choice Requires="p14">
           <p:contentPart p14:bwMode="auto" r:id="rId7">
             <p14:nvContentPartPr>
               <p14:cNvPr id="14" name="Ink 13">
@@ -9790,7 +9783,7 @@
             </p14:xfrm>
           </p:contentPart>
         </mc:Choice>
-        <mc:Fallback>
+        <mc:Fallback xmlns="">
           <p:pic>
             <p:nvPicPr>
               <p:cNvPr id="14" name="Ink 13">
@@ -9821,8 +9814,8 @@
           </p:pic>
         </mc:Fallback>
       </mc:AlternateContent>
-      <mc:AlternateContent xmlns:mc="http://schemas.openxmlformats.org/markup-compatibility/2006">
-        <mc:Choice xmlns:p14="http://schemas.microsoft.com/office/powerpoint/2010/main" Requires="p14">
+      <mc:AlternateContent xmlns:mc="http://schemas.openxmlformats.org/markup-compatibility/2006" xmlns:p14="http://schemas.microsoft.com/office/powerpoint/2010/main">
+        <mc:Choice Requires="p14">
           <p:contentPart p14:bwMode="auto" r:id="rId9">
             <p14:nvContentPartPr>
               <p14:cNvPr id="15" name="Ink 14">
@@ -9841,7 +9834,7 @@
             </p14:xfrm>
           </p:contentPart>
         </mc:Choice>
-        <mc:Fallback>
+        <mc:Fallback xmlns="">
           <p:pic>
             <p:nvPicPr>
               <p:cNvPr id="15" name="Ink 14">
@@ -9892,8 +9885,8 @@
             <a:chExt cx="1523160" cy="42480"/>
           </a:xfrm>
         </p:grpSpPr>
-        <mc:AlternateContent xmlns:mc="http://schemas.openxmlformats.org/markup-compatibility/2006">
-          <mc:Choice xmlns:p14="http://schemas.microsoft.com/office/powerpoint/2010/main" Requires="p14">
+        <mc:AlternateContent xmlns:mc="http://schemas.openxmlformats.org/markup-compatibility/2006" xmlns:p14="http://schemas.microsoft.com/office/powerpoint/2010/main">
+          <mc:Choice Requires="p14">
             <p:contentPart p14:bwMode="auto" r:id="rId11">
               <p14:nvContentPartPr>
                 <p14:cNvPr id="11" name="Ink 10">
@@ -9912,7 +9905,7 @@
               </p14:xfrm>
             </p:contentPart>
           </mc:Choice>
-          <mc:Fallback>
+          <mc:Fallback xmlns="">
             <p:pic>
               <p:nvPicPr>
                 <p:cNvPr id="11" name="Ink 10">
@@ -9943,8 +9936,8 @@
             </p:pic>
           </mc:Fallback>
         </mc:AlternateContent>
-        <mc:AlternateContent xmlns:mc="http://schemas.openxmlformats.org/markup-compatibility/2006">
-          <mc:Choice xmlns:p14="http://schemas.microsoft.com/office/powerpoint/2010/main" Requires="p14">
+        <mc:AlternateContent xmlns:mc="http://schemas.openxmlformats.org/markup-compatibility/2006" xmlns:p14="http://schemas.microsoft.com/office/powerpoint/2010/main">
+          <mc:Choice Requires="p14">
             <p:contentPart p14:bwMode="auto" r:id="rId13">
               <p14:nvContentPartPr>
                 <p14:cNvPr id="12" name="Ink 11">
@@ -9963,7 +9956,7 @@
               </p14:xfrm>
             </p:contentPart>
           </mc:Choice>
-          <mc:Fallback>
+          <mc:Fallback xmlns="">
             <p:pic>
               <p:nvPicPr>
                 <p:cNvPr id="12" name="Ink 11">
@@ -9994,8 +9987,8 @@
             </p:pic>
           </mc:Fallback>
         </mc:AlternateContent>
-        <mc:AlternateContent xmlns:mc="http://schemas.openxmlformats.org/markup-compatibility/2006">
-          <mc:Choice xmlns:p14="http://schemas.microsoft.com/office/powerpoint/2010/main" Requires="p14">
+        <mc:AlternateContent xmlns:mc="http://schemas.openxmlformats.org/markup-compatibility/2006" xmlns:p14="http://schemas.microsoft.com/office/powerpoint/2010/main">
+          <mc:Choice Requires="p14">
             <p:contentPart p14:bwMode="auto" r:id="rId15">
               <p14:nvContentPartPr>
                 <p14:cNvPr id="16" name="Ink 15">
@@ -10014,7 +10007,7 @@
               </p14:xfrm>
             </p:contentPart>
           </mc:Choice>
-          <mc:Fallback>
+          <mc:Fallback xmlns="">
             <p:pic>
               <p:nvPicPr>
                 <p:cNvPr id="16" name="Ink 15">
@@ -10046,8 +10039,8 @@
           </mc:Fallback>
         </mc:AlternateContent>
       </p:grpSp>
-      <mc:AlternateContent xmlns:mc="http://schemas.openxmlformats.org/markup-compatibility/2006">
-        <mc:Choice xmlns:p14="http://schemas.microsoft.com/office/powerpoint/2010/main" Requires="p14">
+      <mc:AlternateContent xmlns:mc="http://schemas.openxmlformats.org/markup-compatibility/2006" xmlns:p14="http://schemas.microsoft.com/office/powerpoint/2010/main">
+        <mc:Choice Requires="p14">
           <p:contentPart p14:bwMode="auto" r:id="rId17">
             <p14:nvContentPartPr>
               <p14:cNvPr id="18" name="Ink 17">
@@ -10066,7 +10059,7 @@
             </p14:xfrm>
           </p:contentPart>
         </mc:Choice>
-        <mc:Fallback>
+        <mc:Fallback xmlns="">
           <p:pic>
             <p:nvPicPr>
               <p:cNvPr id="18" name="Ink 17">
@@ -10097,8 +10090,8 @@
           </p:pic>
         </mc:Fallback>
       </mc:AlternateContent>
-      <mc:AlternateContent xmlns:mc="http://schemas.openxmlformats.org/markup-compatibility/2006">
-        <mc:Choice xmlns:p14="http://schemas.microsoft.com/office/powerpoint/2010/main" Requires="p14">
+      <mc:AlternateContent xmlns:mc="http://schemas.openxmlformats.org/markup-compatibility/2006" xmlns:p14="http://schemas.microsoft.com/office/powerpoint/2010/main">
+        <mc:Choice Requires="p14">
           <p:contentPart p14:bwMode="auto" r:id="rId19">
             <p14:nvContentPartPr>
               <p14:cNvPr id="19" name="Ink 18">
@@ -10117,7 +10110,7 @@
             </p14:xfrm>
           </p:contentPart>
         </mc:Choice>
-        <mc:Fallback>
+        <mc:Fallback xmlns="">
           <p:pic>
             <p:nvPicPr>
               <p:cNvPr id="19" name="Ink 18">
@@ -10208,7 +10201,7 @@
           <a:p>
             <a:r>
               <a:rPr lang="en-US" sz="4200" dirty="0"/>
-              <a:t>x</a:t>
+              <a:t>Overview</a:t>
             </a:r>
             <a:endParaRPr lang="en-US" dirty="0"/>
           </a:p>
@@ -11971,6 +11964,26 @@
 </file>
 
 <file path=customXml/item1.xml><?xml version="1.0" encoding="utf-8"?>
+<p:properties xmlns:p="http://schemas.microsoft.com/office/2006/metadata/properties" xmlns:xsi="http://www.w3.org/2001/XMLSchema-instance" xmlns:pc="http://schemas.microsoft.com/office/infopath/2007/PartnerControls">
+  <documentManagement>
+    <Status xmlns="71af3243-3dd4-4a8d-8c0d-dd76da1f02a5">Not started</Status>
+    <MediaServiceKeyPoints xmlns="71af3243-3dd4-4a8d-8c0d-dd76da1f02a5" xsi:nil="true"/>
+    <_ip_UnifiedCompliancePolicyUIAction xmlns="http://schemas.microsoft.com/sharepoint/v3" xsi:nil="true"/>
+    <Image xmlns="71af3243-3dd4-4a8d-8c0d-dd76da1f02a5">
+      <Url xsi:nil="true"/>
+      <Description xsi:nil="true"/>
+    </Image>
+    <Background xmlns="71af3243-3dd4-4a8d-8c0d-dd76da1f02a5">false</Background>
+    <_ip_UnifiedCompliancePolicyProperties xmlns="http://schemas.microsoft.com/sharepoint/v3" xsi:nil="true"/>
+    <ImageTagsTaxHTField xmlns="71af3243-3dd4-4a8d-8c0d-dd76da1f02a5">
+      <Terms xmlns="http://schemas.microsoft.com/office/infopath/2007/PartnerControls"/>
+    </ImageTagsTaxHTField>
+    <TaxCatchAll xmlns="230e9df3-be65-4c73-a93b-d1236ebd677e" xsi:nil="true"/>
+  </documentManagement>
+</p:properties>
+</file>
+
+<file path=customXml/item2.xml><?xml version="1.0" encoding="utf-8"?>
 <ct:contentTypeSchema xmlns:ct="http://schemas.microsoft.com/office/2006/metadata/contentType" xmlns:ma="http://schemas.microsoft.com/office/2006/metadata/properties/metaAttributes" ct:_="" ma:_="" ma:contentTypeName="Document" ma:contentTypeID="0x01010079F111ED35F8CC479449609E8A0923A6" ma:contentTypeVersion="28" ma:contentTypeDescription="Create a new document." ma:contentTypeScope="" ma:versionID="60f5a4f2d2b0abadcf532d48ebf9cb71">
   <xsd:schema xmlns:xsd="http://www.w3.org/2001/XMLSchema" xmlns:xs="http://www.w3.org/2001/XMLSchema" xmlns:p="http://schemas.microsoft.com/office/2006/metadata/properties" xmlns:ns1="http://schemas.microsoft.com/sharepoint/v3" xmlns:ns2="71af3243-3dd4-4a8d-8c0d-dd76da1f02a5" xmlns:ns3="16c05727-aa75-4e4a-9b5f-8a80a1165891" xmlns:ns4="230e9df3-be65-4c73-a93b-d1236ebd677e" targetNamespace="http://schemas.microsoft.com/office/2006/metadata/properties" ma:root="true" ma:fieldsID="7dd78129e6a1811f84807ad11c651531" ns1:_="" ns2:_="" ns3:_="" ns4:_="">
     <xsd:import namespace="http://schemas.microsoft.com/sharepoint/v3"/>
@@ -12282,7 +12295,7 @@
 </ct:contentTypeSchema>
 </file>
 
-<file path=customXml/item2.xml><?xml version="1.0" encoding="utf-8"?>
+<file path=customXml/item3.xml><?xml version="1.0" encoding="utf-8"?>
 <?mso-contentType ?>
 <FormTemplates xmlns="http://schemas.microsoft.com/sharepoint/v3/contenttype/forms">
   <Display>DocumentLibraryForm</Display>
@@ -12291,27 +12304,19 @@
 </FormTemplates>
 </file>
 
-<file path=customXml/item3.xml><?xml version="1.0" encoding="utf-8"?>
-<p:properties xmlns:p="http://schemas.microsoft.com/office/2006/metadata/properties" xmlns:xsi="http://www.w3.org/2001/XMLSchema-instance" xmlns:pc="http://schemas.microsoft.com/office/infopath/2007/PartnerControls">
-  <documentManagement>
-    <Status xmlns="71af3243-3dd4-4a8d-8c0d-dd76da1f02a5">Not started</Status>
-    <MediaServiceKeyPoints xmlns="71af3243-3dd4-4a8d-8c0d-dd76da1f02a5" xsi:nil="true"/>
-    <_ip_UnifiedCompliancePolicyUIAction xmlns="http://schemas.microsoft.com/sharepoint/v3" xsi:nil="true"/>
-    <Image xmlns="71af3243-3dd4-4a8d-8c0d-dd76da1f02a5">
-      <Url xsi:nil="true"/>
-      <Description xsi:nil="true"/>
-    </Image>
-    <Background xmlns="71af3243-3dd4-4a8d-8c0d-dd76da1f02a5">false</Background>
-    <_ip_UnifiedCompliancePolicyProperties xmlns="http://schemas.microsoft.com/sharepoint/v3" xsi:nil="true"/>
-    <ImageTagsTaxHTField xmlns="71af3243-3dd4-4a8d-8c0d-dd76da1f02a5">
-      <Terms xmlns="http://schemas.microsoft.com/office/infopath/2007/PartnerControls"/>
-    </ImageTagsTaxHTField>
-    <TaxCatchAll xmlns="230e9df3-be65-4c73-a93b-d1236ebd677e" xsi:nil="true"/>
-  </documentManagement>
-</p:properties>
+<file path=customXml/itemProps1.xml><?xml version="1.0" encoding="utf-8"?>
+<ds:datastoreItem xmlns:ds="http://schemas.openxmlformats.org/officeDocument/2006/customXml" ds:itemID="{8002A8ED-1331-4C1D-8649-743D7BE164DD}">
+  <ds:schemaRefs>
+    <ds:schemaRef ds:uri="http://schemas.microsoft.com/office/2006/metadata/properties"/>
+    <ds:schemaRef ds:uri="http://schemas.microsoft.com/office/infopath/2007/PartnerControls"/>
+    <ds:schemaRef ds:uri="71af3243-3dd4-4a8d-8c0d-dd76da1f02a5"/>
+    <ds:schemaRef ds:uri="http://schemas.microsoft.com/sharepoint/v3"/>
+    <ds:schemaRef ds:uri="230e9df3-be65-4c73-a93b-d1236ebd677e"/>
+  </ds:schemaRefs>
+</ds:datastoreItem>
 </file>
 
-<file path=customXml/itemProps1.xml><?xml version="1.0" encoding="utf-8"?>
+<file path=customXml/itemProps2.xml><?xml version="1.0" encoding="utf-8"?>
 <ds:datastoreItem xmlns:ds="http://schemas.openxmlformats.org/officeDocument/2006/customXml" ds:itemID="{A3D5DB56-3A71-4638-9571-EE877FD66E96}">
   <ds:schemaRefs>
     <ds:schemaRef ds:uri="http://schemas.microsoft.com/office/2006/metadata/contentType"/>
@@ -12332,7 +12337,7 @@
 </ds:datastoreItem>
 </file>
 
-<file path=customXml/itemProps2.xml><?xml version="1.0" encoding="utf-8"?>
+<file path=customXml/itemProps3.xml><?xml version="1.0" encoding="utf-8"?>
 <ds:datastoreItem xmlns:ds="http://schemas.openxmlformats.org/officeDocument/2006/customXml" ds:itemID="{99E4EAC9-33DC-4CF0-BA31-C98F61CE4785}">
   <ds:schemaRefs>
     <ds:schemaRef ds:uri="http://schemas.microsoft.com/sharepoint/v3/contenttype/forms"/>
@@ -12340,18 +12345,6 @@
 </ds:datastoreItem>
 </file>
 
-<file path=customXml/itemProps3.xml><?xml version="1.0" encoding="utf-8"?>
-<ds:datastoreItem xmlns:ds="http://schemas.openxmlformats.org/officeDocument/2006/customXml" ds:itemID="{8002A8ED-1331-4C1D-8649-743D7BE164DD}">
-  <ds:schemaRefs>
-    <ds:schemaRef ds:uri="http://schemas.microsoft.com/office/2006/metadata/properties"/>
-    <ds:schemaRef ds:uri="http://schemas.microsoft.com/office/infopath/2007/PartnerControls"/>
-    <ds:schemaRef ds:uri="71af3243-3dd4-4a8d-8c0d-dd76da1f02a5"/>
-    <ds:schemaRef ds:uri="http://schemas.microsoft.com/sharepoint/v3"/>
-    <ds:schemaRef ds:uri="230e9df3-be65-4c73-a93b-d1236ebd677e"/>
-  </ds:schemaRefs>
-</ds:datastoreItem>
-</file>
-
 <file path=docMetadata/LabelInfo.xml><?xml version="1.0" encoding="utf-8"?>
 <clbl:labelList xmlns:clbl="http://schemas.microsoft.com/office/2020/mipLabelMetadata"/>
 </file>
</xml_diff>

<commit_message>
Added home page screenshot
</commit_message>
<xml_diff>
--- a/Phase 2 Docs/Phase 2 - Presentation.pptx
+++ b/Phase 2 Docs/Phase 2 - Presentation.pptx
@@ -5,10 +5,10 @@
     <p:sldMasterId id="2147483648" r:id="rId4"/>
   </p:sldMasterIdLst>
   <p:notesMasterIdLst>
-    <p:notesMasterId r:id="rId20"/>
+    <p:notesMasterId r:id="rId21"/>
   </p:notesMasterIdLst>
   <p:handoutMasterIdLst>
-    <p:handoutMasterId r:id="rId21"/>
+    <p:handoutMasterId r:id="rId22"/>
   </p:handoutMasterIdLst>
   <p:sldIdLst>
     <p:sldId id="2448" r:id="rId5"/>
@@ -18,14 +18,15 @@
     <p:sldId id="2469" r:id="rId9"/>
     <p:sldId id="2470" r:id="rId10"/>
     <p:sldId id="2471" r:id="rId11"/>
-    <p:sldId id="2463" r:id="rId12"/>
-    <p:sldId id="2466" r:id="rId13"/>
-    <p:sldId id="2464" r:id="rId14"/>
-    <p:sldId id="2451" r:id="rId15"/>
-    <p:sldId id="2467" r:id="rId16"/>
-    <p:sldId id="2473" r:id="rId17"/>
-    <p:sldId id="2453" r:id="rId18"/>
-    <p:sldId id="2436" r:id="rId19"/>
+    <p:sldId id="2474" r:id="rId12"/>
+    <p:sldId id="2463" r:id="rId13"/>
+    <p:sldId id="2466" r:id="rId14"/>
+    <p:sldId id="2464" r:id="rId15"/>
+    <p:sldId id="2451" r:id="rId16"/>
+    <p:sldId id="2467" r:id="rId17"/>
+    <p:sldId id="2473" r:id="rId18"/>
+    <p:sldId id="2453" r:id="rId19"/>
+    <p:sldId id="2436" r:id="rId20"/>
   </p:sldIdLst>
   <p:sldSz cx="12192000" cy="6858000"/>
   <p:notesSz cx="6858000" cy="9144000"/>
@@ -245,7 +246,7 @@
           <a:p>
             <a:fld id="{966D5B4E-BF3E-3B45-A4BA-D6C3B92870D7}" type="datetimeFigureOut">
               <a:rPr lang="en-US" smtClean="0"/>
-              <a:t>2/29/2024</a:t>
+              <a:t>3/5/2024</a:t>
             </a:fld>
             <a:endParaRPr lang="en-US" dirty="0"/>
           </a:p>
@@ -656,7 +657,7 @@
           <a:p>
             <a:fld id="{F5A8621B-8C8E-49BA-8772-41D0FE75A082}" type="datetimeFigureOut">
               <a:rPr lang="en-US" smtClean="0"/>
-              <a:t>2/29/2024</a:t>
+              <a:t>3/5/2024</a:t>
             </a:fld>
             <a:endParaRPr lang="en-US" dirty="0"/>
           </a:p>
@@ -5595,6 +5596,437 @@
           <a:chExt cx="0" cy="0"/>
         </a:xfrm>
       </p:grpSpPr>
+      <p:pic>
+        <p:nvPicPr>
+          <p:cNvPr id="9" name="Picture Placeholder 7" descr="abstract image">
+            <a:extLst>
+              <a:ext uri="{FF2B5EF4-FFF2-40B4-BE49-F238E27FC236}">
+                <a16:creationId xmlns:a16="http://schemas.microsoft.com/office/drawing/2014/main" id="{10C261F5-27E5-A8D9-57BF-8DCB0A00F6B1}"/>
+              </a:ext>
+            </a:extLst>
+          </p:cNvPr>
+          <p:cNvPicPr>
+            <a:picLocks noChangeAspect="1"/>
+          </p:cNvPicPr>
+          <p:nvPr/>
+        </p:nvPicPr>
+        <p:blipFill rotWithShape="1">
+          <a:blip r:embed="rId2">
+            <a:alphaModFix/>
+            <a:extLst>
+              <a:ext uri="{BEBA8EAE-BF5A-486C-A8C5-ECC9F3942E4B}">
+                <a14:imgProps xmlns:a14="http://schemas.microsoft.com/office/drawing/2010/main">
+                  <a14:imgLayer r:embed="rId3">
+                    <a14:imgEffect>
+                      <a14:saturation sat="0"/>
+                    </a14:imgEffect>
+                  </a14:imgLayer>
+                </a14:imgProps>
+              </a:ext>
+            </a:extLst>
+          </a:blip>
+          <a:srcRect l="54869" r="205"/>
+          <a:stretch/>
+        </p:blipFill>
+        <p:spPr>
+          <a:xfrm>
+            <a:off x="-1" y="0"/>
+            <a:ext cx="5477523" cy="6858000"/>
+          </a:xfrm>
+          <a:prstGeom prst="rect">
+            <a:avLst/>
+          </a:prstGeom>
+        </p:spPr>
+      </p:pic>
+      <p:sp>
+        <p:nvSpPr>
+          <p:cNvPr id="3" name="Title 2">
+            <a:extLst>
+              <a:ext uri="{FF2B5EF4-FFF2-40B4-BE49-F238E27FC236}">
+                <a16:creationId xmlns:a16="http://schemas.microsoft.com/office/drawing/2014/main" id="{1D24B42B-925B-494C-A986-BD85E8117E1E}"/>
+              </a:ext>
+            </a:extLst>
+          </p:cNvPr>
+          <p:cNvSpPr>
+            <a:spLocks noGrp="1"/>
+          </p:cNvSpPr>
+          <p:nvPr>
+            <p:ph type="title"/>
+          </p:nvPr>
+        </p:nvSpPr>
+        <p:spPr>
+          <a:xfrm>
+            <a:off x="6362330" y="411225"/>
+            <a:ext cx="5251450" cy="956373"/>
+          </a:xfrm>
+        </p:spPr>
+        <p:txBody>
+          <a:bodyPr anchor="t">
+            <a:normAutofit/>
+          </a:bodyPr>
+          <a:lstStyle/>
+          <a:p>
+            <a:r>
+              <a:rPr lang="en-US" sz="4800" dirty="0"/>
+              <a:t>Technology</a:t>
+            </a:r>
+          </a:p>
+        </p:txBody>
+      </p:sp>
+      <p:sp>
+        <p:nvSpPr>
+          <p:cNvPr id="5" name="Text Placeholder 4">
+            <a:extLst>
+              <a:ext uri="{FF2B5EF4-FFF2-40B4-BE49-F238E27FC236}">
+                <a16:creationId xmlns:a16="http://schemas.microsoft.com/office/drawing/2014/main" id="{AF9B872F-6332-408E-9135-B871F0C90C00}"/>
+              </a:ext>
+            </a:extLst>
+          </p:cNvPr>
+          <p:cNvSpPr>
+            <a:spLocks noGrp="1"/>
+          </p:cNvSpPr>
+          <p:nvPr>
+            <p:ph type="body" idx="1"/>
+          </p:nvPr>
+        </p:nvSpPr>
+        <p:spPr>
+          <a:xfrm>
+            <a:off x="6362330" y="2025552"/>
+            <a:ext cx="5829669" cy="365125"/>
+          </a:xfrm>
+        </p:spPr>
+        <p:txBody>
+          <a:bodyPr/>
+          <a:lstStyle/>
+          <a:p>
+            <a:r>
+              <a:rPr lang="en-US" spc="300" dirty="0"/>
+              <a:t> </a:t>
+            </a:r>
+          </a:p>
+        </p:txBody>
+      </p:sp>
+      <p:sp>
+        <p:nvSpPr>
+          <p:cNvPr id="2" name="Slide Number Placeholder 1">
+            <a:extLst>
+              <a:ext uri="{FF2B5EF4-FFF2-40B4-BE49-F238E27FC236}">
+                <a16:creationId xmlns:a16="http://schemas.microsoft.com/office/drawing/2014/main" id="{948DD8A0-BD53-4DBF-949B-0D64D12DADA9}"/>
+              </a:ext>
+            </a:extLst>
+          </p:cNvPr>
+          <p:cNvSpPr>
+            <a:spLocks noGrp="1"/>
+          </p:cNvSpPr>
+          <p:nvPr>
+            <p:ph type="sldNum" sz="quarter" idx="12"/>
+          </p:nvPr>
+        </p:nvSpPr>
+        <p:spPr/>
+        <p:txBody>
+          <a:bodyPr/>
+          <a:lstStyle/>
+          <a:p>
+            <a:fld id="{8C2E478F-E849-4A8C-AF1F-CBCC78A7CBFA}" type="slidenum">
+              <a:rPr lang="en-US" smtClean="0"/>
+              <a:t>10</a:t>
+            </a:fld>
+            <a:endParaRPr lang="en-US" dirty="0"/>
+          </a:p>
+        </p:txBody>
+      </p:sp>
+      <p:sp>
+        <p:nvSpPr>
+          <p:cNvPr id="6" name="Content Placeholder 8">
+            <a:extLst>
+              <a:ext uri="{FF2B5EF4-FFF2-40B4-BE49-F238E27FC236}">
+                <a16:creationId xmlns:a16="http://schemas.microsoft.com/office/drawing/2014/main" id="{3B4F2E0F-78BC-2FE8-4808-2A26179B55EA}"/>
+              </a:ext>
+            </a:extLst>
+          </p:cNvPr>
+          <p:cNvSpPr txBox="1">
+            <a:spLocks/>
+          </p:cNvSpPr>
+          <p:nvPr/>
+        </p:nvSpPr>
+        <p:spPr>
+          <a:xfrm>
+            <a:off x="6362330" y="2574543"/>
+            <a:ext cx="4646246" cy="3038482"/>
+          </a:xfrm>
+          <a:prstGeom prst="rect">
+            <a:avLst/>
+          </a:prstGeom>
+          <a:noFill/>
+        </p:spPr>
+        <p:txBody>
+          <a:bodyPr vert="horz" lIns="91440" tIns="45720" rIns="91440" bIns="45720" rtlCol="0" anchor="t">
+            <a:normAutofit/>
+          </a:bodyPr>
+          <a:lstStyle>
+            <a:defPPr>
+              <a:defRPr lang="en-US"/>
+            </a:defPPr>
+            <a:lvl1pPr indent="0">
+              <a:lnSpc>
+                <a:spcPct val="120000"/>
+              </a:lnSpc>
+              <a:spcBef>
+                <a:spcPts val="0"/>
+              </a:spcBef>
+              <a:buFont typeface="Arial" panose="020B0604020202020204" pitchFamily="34" charset="0"/>
+              <a:buNone/>
+              <a:defRPr sz="2400" cap="none" spc="0" baseline="0">
+                <a:solidFill>
+                  <a:sysClr val="windowText" lastClr="000000"/>
+                </a:solidFill>
+                <a:effectLst/>
+              </a:defRPr>
+            </a:lvl1pPr>
+            <a:lvl2pPr indent="0">
+              <a:lnSpc>
+                <a:spcPct val="150000"/>
+              </a:lnSpc>
+              <a:spcBef>
+                <a:spcPts val="500"/>
+              </a:spcBef>
+              <a:buFont typeface="Arial" panose="020B0604020202020204" pitchFamily="34" charset="0"/>
+              <a:buNone/>
+              <a:defRPr sz="2000">
+                <a:solidFill>
+                  <a:schemeClr val="tx1">
+                    <a:tint val="75000"/>
+                  </a:schemeClr>
+                </a:solidFill>
+              </a:defRPr>
+            </a:lvl2pPr>
+            <a:lvl3pPr indent="0">
+              <a:lnSpc>
+                <a:spcPct val="150000"/>
+              </a:lnSpc>
+              <a:spcBef>
+                <a:spcPts val="500"/>
+              </a:spcBef>
+              <a:buFont typeface="Arial" panose="020B0604020202020204" pitchFamily="34" charset="0"/>
+              <a:buNone/>
+              <a:defRPr>
+                <a:solidFill>
+                  <a:schemeClr val="tx1">
+                    <a:tint val="75000"/>
+                  </a:schemeClr>
+                </a:solidFill>
+              </a:defRPr>
+            </a:lvl3pPr>
+            <a:lvl4pPr indent="0">
+              <a:lnSpc>
+                <a:spcPct val="150000"/>
+              </a:lnSpc>
+              <a:spcBef>
+                <a:spcPts val="500"/>
+              </a:spcBef>
+              <a:buFont typeface="Arial" panose="020B0604020202020204" pitchFamily="34" charset="0"/>
+              <a:buNone/>
+              <a:defRPr sz="1600">
+                <a:solidFill>
+                  <a:schemeClr val="tx1">
+                    <a:tint val="75000"/>
+                  </a:schemeClr>
+                </a:solidFill>
+              </a:defRPr>
+            </a:lvl4pPr>
+            <a:lvl5pPr indent="0">
+              <a:lnSpc>
+                <a:spcPct val="150000"/>
+              </a:lnSpc>
+              <a:spcBef>
+                <a:spcPts val="500"/>
+              </a:spcBef>
+              <a:buFont typeface="Arial" panose="020B0604020202020204" pitchFamily="34" charset="0"/>
+              <a:buNone/>
+              <a:defRPr sz="1600">
+                <a:solidFill>
+                  <a:schemeClr val="tx1">
+                    <a:tint val="75000"/>
+                  </a:schemeClr>
+                </a:solidFill>
+              </a:defRPr>
+            </a:lvl5pPr>
+            <a:lvl6pPr indent="0">
+              <a:lnSpc>
+                <a:spcPct val="90000"/>
+              </a:lnSpc>
+              <a:spcBef>
+                <a:spcPts val="500"/>
+              </a:spcBef>
+              <a:buFont typeface="Arial" panose="020B0604020202020204" pitchFamily="34" charset="0"/>
+              <a:buNone/>
+              <a:defRPr sz="1600">
+                <a:solidFill>
+                  <a:schemeClr val="tx1">
+                    <a:tint val="75000"/>
+                  </a:schemeClr>
+                </a:solidFill>
+              </a:defRPr>
+            </a:lvl6pPr>
+            <a:lvl7pPr indent="0">
+              <a:lnSpc>
+                <a:spcPct val="90000"/>
+              </a:lnSpc>
+              <a:spcBef>
+                <a:spcPts val="500"/>
+              </a:spcBef>
+              <a:buFont typeface="Arial" panose="020B0604020202020204" pitchFamily="34" charset="0"/>
+              <a:buNone/>
+              <a:defRPr sz="1600">
+                <a:solidFill>
+                  <a:schemeClr val="tx1">
+                    <a:tint val="75000"/>
+                  </a:schemeClr>
+                </a:solidFill>
+              </a:defRPr>
+            </a:lvl7pPr>
+            <a:lvl8pPr indent="0">
+              <a:lnSpc>
+                <a:spcPct val="90000"/>
+              </a:lnSpc>
+              <a:spcBef>
+                <a:spcPts val="500"/>
+              </a:spcBef>
+              <a:buFont typeface="Arial" panose="020B0604020202020204" pitchFamily="34" charset="0"/>
+              <a:buNone/>
+              <a:defRPr sz="1600">
+                <a:solidFill>
+                  <a:schemeClr val="tx1">
+                    <a:tint val="75000"/>
+                  </a:schemeClr>
+                </a:solidFill>
+              </a:defRPr>
+            </a:lvl8pPr>
+            <a:lvl9pPr indent="0">
+              <a:lnSpc>
+                <a:spcPct val="90000"/>
+              </a:lnSpc>
+              <a:spcBef>
+                <a:spcPts val="500"/>
+              </a:spcBef>
+              <a:buFont typeface="Arial" panose="020B0604020202020204" pitchFamily="34" charset="0"/>
+              <a:buNone/>
+              <a:defRPr sz="1600">
+                <a:solidFill>
+                  <a:schemeClr val="tx1">
+                    <a:tint val="75000"/>
+                  </a:schemeClr>
+                </a:solidFill>
+              </a:defRPr>
+            </a:lvl9pPr>
+          </a:lstStyle>
+          <a:p>
+            <a:pPr marL="342900" indent="-342900">
+              <a:buFont typeface="Arial" panose="020B0604020202020204" pitchFamily="34" charset="0"/>
+              <a:buChar char="•"/>
+            </a:pPr>
+            <a:r>
+              <a:rPr lang="en-US" dirty="0" err="1"/>
+              <a:t>VSCode</a:t>
+            </a:r>
+            <a:r>
+              <a:rPr lang="en-US" dirty="0"/>
+              <a:t> IDE</a:t>
+            </a:r>
+          </a:p>
+          <a:p>
+            <a:pPr marL="342900" indent="-342900">
+              <a:buFont typeface="Arial" panose="020B0604020202020204" pitchFamily="34" charset="0"/>
+              <a:buChar char="•"/>
+            </a:pPr>
+            <a:r>
+              <a:rPr lang="en-US" dirty="0"/>
+              <a:t>Python 3.11.8</a:t>
+            </a:r>
+          </a:p>
+          <a:p>
+            <a:pPr marL="342900" indent="-342900">
+              <a:buFont typeface="Arial" panose="020B0604020202020204" pitchFamily="34" charset="0"/>
+              <a:buChar char="•"/>
+            </a:pPr>
+            <a:r>
+              <a:rPr lang="en-US" dirty="0"/>
+              <a:t>Django</a:t>
+            </a:r>
+          </a:p>
+          <a:p>
+            <a:pPr marL="342900" indent="-342900">
+              <a:buFont typeface="Arial" panose="020B0604020202020204" pitchFamily="34" charset="0"/>
+              <a:buChar char="•"/>
+            </a:pPr>
+            <a:r>
+              <a:rPr lang="en-US" b="0" i="0" dirty="0">
+                <a:solidFill>
+                  <a:srgbClr val="1D1C1D"/>
+                </a:solidFill>
+                <a:effectLst/>
+                <a:latin typeface="Slack-Lato"/>
+              </a:rPr>
+              <a:t>SQLite</a:t>
+            </a:r>
+          </a:p>
+          <a:p>
+            <a:pPr marL="342900" indent="-342900">
+              <a:buFont typeface="Arial" panose="020B0604020202020204" pitchFamily="34" charset="0"/>
+              <a:buChar char="•"/>
+            </a:pPr>
+            <a:r>
+              <a:rPr lang="en-US" dirty="0" err="1">
+                <a:solidFill>
+                  <a:srgbClr val="1D1C1D"/>
+                </a:solidFill>
+                <a:latin typeface="Slack-Lato"/>
+              </a:rPr>
+              <a:t>Dbeaver</a:t>
+            </a:r>
+            <a:r>
+              <a:rPr lang="en-US" dirty="0">
+                <a:solidFill>
+                  <a:srgbClr val="1D1C1D"/>
+                </a:solidFill>
+                <a:latin typeface="Slack-Lato"/>
+              </a:rPr>
+              <a:t> (for viewing database tables) </a:t>
+            </a:r>
+            <a:endParaRPr lang="en-US" dirty="0"/>
+          </a:p>
+        </p:txBody>
+      </p:sp>
+    </p:spTree>
+    <p:extLst>
+      <p:ext uri="{BB962C8B-B14F-4D97-AF65-F5344CB8AC3E}">
+        <p14:creationId xmlns:p14="http://schemas.microsoft.com/office/powerpoint/2010/main" val="2441627795"/>
+      </p:ext>
+    </p:extLst>
+  </p:cSld>
+  <p:clrMapOvr>
+    <a:masterClrMapping/>
+  </p:clrMapOvr>
+</p:sld>
+</file>
+
+<file path=ppt/slides/slide11.xml><?xml version="1.0" encoding="utf-8"?>
+<p:sld xmlns:a="http://schemas.openxmlformats.org/drawingml/2006/main" xmlns:r="http://schemas.openxmlformats.org/officeDocument/2006/relationships" xmlns:p="http://schemas.openxmlformats.org/presentationml/2006/main">
+  <p:cSld>
+    <p:spTree>
+      <p:nvGrpSpPr>
+        <p:cNvPr id="1" name=""/>
+        <p:cNvGrpSpPr/>
+        <p:nvPr/>
+      </p:nvGrpSpPr>
+      <p:grpSpPr>
+        <a:xfrm>
+          <a:off x="0" y="0"/>
+          <a:ext cx="0" cy="0"/>
+          <a:chOff x="0" y="0"/>
+          <a:chExt cx="0" cy="0"/>
+        </a:xfrm>
+      </p:grpSpPr>
       <p:sp>
         <p:nvSpPr>
           <p:cNvPr id="5" name="Text Placeholder 4">
@@ -5651,7 +6083,7 @@
           <a:p>
             <a:fld id="{8C2E478F-E849-4A8C-AF1F-CBCC78A7CBFA}" type="slidenum">
               <a:rPr lang="en-US" smtClean="0"/>
-              <a:t>10</a:t>
+              <a:t>11</a:t>
             </a:fld>
             <a:endParaRPr lang="en-US" dirty="0"/>
           </a:p>
@@ -5936,7 +6368,7 @@
 </p:sld>
 </file>
 
-<file path=ppt/slides/slide11.xml><?xml version="1.0" encoding="utf-8"?>
+<file path=ppt/slides/slide12.xml><?xml version="1.0" encoding="utf-8"?>
 <p:sld xmlns:a="http://schemas.openxmlformats.org/drawingml/2006/main" xmlns:r="http://schemas.openxmlformats.org/officeDocument/2006/relationships" xmlns:p="http://schemas.openxmlformats.org/presentationml/2006/main">
   <p:cSld>
     <p:spTree>
@@ -5976,7 +6408,7 @@
           <a:p>
             <a:fld id="{8C2E478F-E849-4A8C-AF1F-CBCC78A7CBFA}" type="slidenum">
               <a:rPr lang="en-US" smtClean="0"/>
-              <a:t>11</a:t>
+              <a:t>12</a:t>
             </a:fld>
             <a:endParaRPr lang="en-US" dirty="0"/>
           </a:p>
@@ -6453,7 +6885,7 @@
 </p:sld>
 </file>
 
-<file path=ppt/slides/slide12.xml><?xml version="1.0" encoding="utf-8"?>
+<file path=ppt/slides/slide13.xml><?xml version="1.0" encoding="utf-8"?>
 <p:sld xmlns:a="http://schemas.openxmlformats.org/drawingml/2006/main" xmlns:r="http://schemas.openxmlformats.org/officeDocument/2006/relationships" xmlns:p="http://schemas.openxmlformats.org/presentationml/2006/main">
   <p:cSld>
     <p:spTree>
@@ -6609,7 +7041,7 @@
           <a:p>
             <a:fld id="{8C2E478F-E849-4A8C-AF1F-CBCC78A7CBFA}" type="slidenum">
               <a:rPr lang="en-US" smtClean="0"/>
-              <a:t>12</a:t>
+              <a:t>13</a:t>
             </a:fld>
             <a:endParaRPr lang="en-US" dirty="0"/>
           </a:p>
@@ -6902,7 +7334,7 @@
 </p:sld>
 </file>
 
-<file path=ppt/slides/slide13.xml><?xml version="1.0" encoding="utf-8"?>
+<file path=ppt/slides/slide14.xml><?xml version="1.0" encoding="utf-8"?>
 <p:sld xmlns:a="http://schemas.openxmlformats.org/drawingml/2006/main" xmlns:r="http://schemas.openxmlformats.org/officeDocument/2006/relationships" xmlns:p="http://schemas.openxmlformats.org/presentationml/2006/main">
   <p:cSld>
     <p:spTree>
@@ -7058,7 +7490,7 @@
           <a:p>
             <a:fld id="{8C2E478F-E849-4A8C-AF1F-CBCC78A7CBFA}" type="slidenum">
               <a:rPr lang="en-US" smtClean="0"/>
-              <a:t>13</a:t>
+              <a:t>14</a:t>
             </a:fld>
             <a:endParaRPr lang="en-US" dirty="0"/>
           </a:p>
@@ -7294,7 +7726,7 @@
 </p:sld>
 </file>
 
-<file path=ppt/slides/slide14.xml><?xml version="1.0" encoding="utf-8"?>
+<file path=ppt/slides/slide15.xml><?xml version="1.0" encoding="utf-8"?>
 <p:sld xmlns:a="http://schemas.openxmlformats.org/drawingml/2006/main" xmlns:r="http://schemas.openxmlformats.org/officeDocument/2006/relationships" xmlns:p="http://schemas.openxmlformats.org/presentationml/2006/main">
   <p:cSld>
     <p:spTree>
@@ -8253,7 +8685,7 @@
           <a:p>
             <a:fld id="{8C2E478F-E849-4A8C-AF1F-CBCC78A7CBFA}" type="slidenum">
               <a:rPr lang="en-US" smtClean="0"/>
-              <a:t>14</a:t>
+              <a:t>15</a:t>
             </a:fld>
             <a:endParaRPr lang="en-US" dirty="0"/>
           </a:p>
@@ -8272,7 +8704,7 @@
 </p:sld>
 </file>
 
-<file path=ppt/slides/slide15.xml><?xml version="1.0" encoding="utf-8"?>
+<file path=ppt/slides/slide16.xml><?xml version="1.0" encoding="utf-8"?>
 <p:sld xmlns:a="http://schemas.openxmlformats.org/drawingml/2006/main" xmlns:r="http://schemas.openxmlformats.org/officeDocument/2006/relationships" xmlns:p="http://schemas.openxmlformats.org/presentationml/2006/main">
   <p:cSld>
     <p:bg>
@@ -9668,8 +10100,8 @@
           </a:p>
         </p:txBody>
       </p:sp>
-      <mc:AlternateContent xmlns:mc="http://schemas.openxmlformats.org/markup-compatibility/2006">
-        <mc:Choice xmlns:p14="http://schemas.microsoft.com/office/powerpoint/2010/main" Requires="p14">
+      <mc:AlternateContent xmlns:mc="http://schemas.openxmlformats.org/markup-compatibility/2006" xmlns:p14="http://schemas.microsoft.com/office/powerpoint/2010/main">
+        <mc:Choice Requires="p14">
           <p:contentPart p14:bwMode="auto" r:id="rId3">
             <p14:nvContentPartPr>
               <p14:cNvPr id="9" name="Ink 8">
@@ -9688,7 +10120,7 @@
             </p14:xfrm>
           </p:contentPart>
         </mc:Choice>
-        <mc:Fallback>
+        <mc:Fallback xmlns="">
           <p:pic>
             <p:nvPicPr>
               <p:cNvPr id="9" name="Ink 8">
@@ -9719,8 +10151,8 @@
           </p:pic>
         </mc:Fallback>
       </mc:AlternateContent>
-      <mc:AlternateContent xmlns:mc="http://schemas.openxmlformats.org/markup-compatibility/2006">
-        <mc:Choice xmlns:p14="http://schemas.microsoft.com/office/powerpoint/2010/main" Requires="p14">
+      <mc:AlternateContent xmlns:mc="http://schemas.openxmlformats.org/markup-compatibility/2006" xmlns:p14="http://schemas.microsoft.com/office/powerpoint/2010/main">
+        <mc:Choice Requires="p14">
           <p:contentPart p14:bwMode="auto" r:id="rId5">
             <p14:nvContentPartPr>
               <p14:cNvPr id="10" name="Ink 9">
@@ -9739,7 +10171,7 @@
             </p14:xfrm>
           </p:contentPart>
         </mc:Choice>
-        <mc:Fallback>
+        <mc:Fallback xmlns="">
           <p:pic>
             <p:nvPicPr>
               <p:cNvPr id="10" name="Ink 9">
@@ -9770,8 +10202,8 @@
           </p:pic>
         </mc:Fallback>
       </mc:AlternateContent>
-      <mc:AlternateContent xmlns:mc="http://schemas.openxmlformats.org/markup-compatibility/2006">
-        <mc:Choice xmlns:p14="http://schemas.microsoft.com/office/powerpoint/2010/main" Requires="p14">
+      <mc:AlternateContent xmlns:mc="http://schemas.openxmlformats.org/markup-compatibility/2006" xmlns:p14="http://schemas.microsoft.com/office/powerpoint/2010/main">
+        <mc:Choice Requires="p14">
           <p:contentPart p14:bwMode="auto" r:id="rId7">
             <p14:nvContentPartPr>
               <p14:cNvPr id="14" name="Ink 13">
@@ -9790,7 +10222,7 @@
             </p14:xfrm>
           </p:contentPart>
         </mc:Choice>
-        <mc:Fallback>
+        <mc:Fallback xmlns="">
           <p:pic>
             <p:nvPicPr>
               <p:cNvPr id="14" name="Ink 13">
@@ -9821,8 +10253,8 @@
           </p:pic>
         </mc:Fallback>
       </mc:AlternateContent>
-      <mc:AlternateContent xmlns:mc="http://schemas.openxmlformats.org/markup-compatibility/2006">
-        <mc:Choice xmlns:p14="http://schemas.microsoft.com/office/powerpoint/2010/main" Requires="p14">
+      <mc:AlternateContent xmlns:mc="http://schemas.openxmlformats.org/markup-compatibility/2006" xmlns:p14="http://schemas.microsoft.com/office/powerpoint/2010/main">
+        <mc:Choice Requires="p14">
           <p:contentPart p14:bwMode="auto" r:id="rId9">
             <p14:nvContentPartPr>
               <p14:cNvPr id="15" name="Ink 14">
@@ -9841,7 +10273,7 @@
             </p14:xfrm>
           </p:contentPart>
         </mc:Choice>
-        <mc:Fallback>
+        <mc:Fallback xmlns="">
           <p:pic>
             <p:nvPicPr>
               <p:cNvPr id="15" name="Ink 14">
@@ -9892,8 +10324,8 @@
             <a:chExt cx="1523160" cy="42480"/>
           </a:xfrm>
         </p:grpSpPr>
-        <mc:AlternateContent xmlns:mc="http://schemas.openxmlformats.org/markup-compatibility/2006">
-          <mc:Choice xmlns:p14="http://schemas.microsoft.com/office/powerpoint/2010/main" Requires="p14">
+        <mc:AlternateContent xmlns:mc="http://schemas.openxmlformats.org/markup-compatibility/2006" xmlns:p14="http://schemas.microsoft.com/office/powerpoint/2010/main">
+          <mc:Choice Requires="p14">
             <p:contentPart p14:bwMode="auto" r:id="rId11">
               <p14:nvContentPartPr>
                 <p14:cNvPr id="11" name="Ink 10">
@@ -9912,7 +10344,7 @@
               </p14:xfrm>
             </p:contentPart>
           </mc:Choice>
-          <mc:Fallback>
+          <mc:Fallback xmlns="">
             <p:pic>
               <p:nvPicPr>
                 <p:cNvPr id="11" name="Ink 10">
@@ -9943,8 +10375,8 @@
             </p:pic>
           </mc:Fallback>
         </mc:AlternateContent>
-        <mc:AlternateContent xmlns:mc="http://schemas.openxmlformats.org/markup-compatibility/2006">
-          <mc:Choice xmlns:p14="http://schemas.microsoft.com/office/powerpoint/2010/main" Requires="p14">
+        <mc:AlternateContent xmlns:mc="http://schemas.openxmlformats.org/markup-compatibility/2006" xmlns:p14="http://schemas.microsoft.com/office/powerpoint/2010/main">
+          <mc:Choice Requires="p14">
             <p:contentPart p14:bwMode="auto" r:id="rId13">
               <p14:nvContentPartPr>
                 <p14:cNvPr id="12" name="Ink 11">
@@ -9963,7 +10395,7 @@
               </p14:xfrm>
             </p:contentPart>
           </mc:Choice>
-          <mc:Fallback>
+          <mc:Fallback xmlns="">
             <p:pic>
               <p:nvPicPr>
                 <p:cNvPr id="12" name="Ink 11">
@@ -9994,8 +10426,8 @@
             </p:pic>
           </mc:Fallback>
         </mc:AlternateContent>
-        <mc:AlternateContent xmlns:mc="http://schemas.openxmlformats.org/markup-compatibility/2006">
-          <mc:Choice xmlns:p14="http://schemas.microsoft.com/office/powerpoint/2010/main" Requires="p14">
+        <mc:AlternateContent xmlns:mc="http://schemas.openxmlformats.org/markup-compatibility/2006" xmlns:p14="http://schemas.microsoft.com/office/powerpoint/2010/main">
+          <mc:Choice Requires="p14">
             <p:contentPart p14:bwMode="auto" r:id="rId15">
               <p14:nvContentPartPr>
                 <p14:cNvPr id="16" name="Ink 15">
@@ -10014,7 +10446,7 @@
               </p14:xfrm>
             </p:contentPart>
           </mc:Choice>
-          <mc:Fallback>
+          <mc:Fallback xmlns="">
             <p:pic>
               <p:nvPicPr>
                 <p:cNvPr id="16" name="Ink 15">
@@ -10046,8 +10478,8 @@
           </mc:Fallback>
         </mc:AlternateContent>
       </p:grpSp>
-      <mc:AlternateContent xmlns:mc="http://schemas.openxmlformats.org/markup-compatibility/2006">
-        <mc:Choice xmlns:p14="http://schemas.microsoft.com/office/powerpoint/2010/main" Requires="p14">
+      <mc:AlternateContent xmlns:mc="http://schemas.openxmlformats.org/markup-compatibility/2006" xmlns:p14="http://schemas.microsoft.com/office/powerpoint/2010/main">
+        <mc:Choice Requires="p14">
           <p:contentPart p14:bwMode="auto" r:id="rId17">
             <p14:nvContentPartPr>
               <p14:cNvPr id="18" name="Ink 17">
@@ -10066,7 +10498,7 @@
             </p14:xfrm>
           </p:contentPart>
         </mc:Choice>
-        <mc:Fallback>
+        <mc:Fallback xmlns="">
           <p:pic>
             <p:nvPicPr>
               <p:cNvPr id="18" name="Ink 17">
@@ -10097,8 +10529,8 @@
           </p:pic>
         </mc:Fallback>
       </mc:AlternateContent>
-      <mc:AlternateContent xmlns:mc="http://schemas.openxmlformats.org/markup-compatibility/2006">
-        <mc:Choice xmlns:p14="http://schemas.microsoft.com/office/powerpoint/2010/main" Requires="p14">
+      <mc:AlternateContent xmlns:mc="http://schemas.openxmlformats.org/markup-compatibility/2006" xmlns:p14="http://schemas.microsoft.com/office/powerpoint/2010/main">
+        <mc:Choice Requires="p14">
           <p:contentPart p14:bwMode="auto" r:id="rId19">
             <p14:nvContentPartPr>
               <p14:cNvPr id="19" name="Ink 18">
@@ -10117,7 +10549,7 @@
             </p14:xfrm>
           </p:contentPart>
         </mc:Choice>
-        <mc:Fallback>
+        <mc:Fallback xmlns="">
           <p:pic>
             <p:nvPicPr>
               <p:cNvPr id="19" name="Ink 18">
@@ -10166,6 +10598,185 @@
   <p:cSld>
     <p:spTree>
       <p:nvGrpSpPr>
+        <p:cNvPr id="1" name="">
+          <a:extLst>
+            <a:ext uri="{FF2B5EF4-FFF2-40B4-BE49-F238E27FC236}">
+              <a16:creationId xmlns:a16="http://schemas.microsoft.com/office/drawing/2014/main" id="{B985BD57-F3EB-28BD-65C8-04BCFC9F83AE}"/>
+            </a:ext>
+          </a:extLst>
+        </p:cNvPr>
+        <p:cNvGrpSpPr/>
+        <p:nvPr/>
+      </p:nvGrpSpPr>
+      <p:grpSpPr>
+        <a:xfrm>
+          <a:off x="0" y="0"/>
+          <a:ext cx="0" cy="0"/>
+          <a:chOff x="0" y="0"/>
+          <a:chExt cx="0" cy="0"/>
+        </a:xfrm>
+      </p:grpSpPr>
+      <p:pic>
+        <p:nvPicPr>
+          <p:cNvPr id="3" name="Picture Placeholder 2">
+            <a:extLst>
+              <a:ext uri="{FF2B5EF4-FFF2-40B4-BE49-F238E27FC236}">
+                <a16:creationId xmlns:a16="http://schemas.microsoft.com/office/drawing/2014/main" id="{3A310403-C338-B3EA-47A9-8964B7741E48}"/>
+              </a:ext>
+            </a:extLst>
+          </p:cNvPr>
+          <p:cNvPicPr>
+            <a:picLocks noGrp="1" noChangeAspect="1"/>
+          </p:cNvPicPr>
+          <p:nvPr>
+            <p:ph type="pic" sz="quarter" idx="14"/>
+          </p:nvPr>
+        </p:nvPicPr>
+        <p:blipFill rotWithShape="1">
+          <a:blip r:embed="rId2"/>
+          <a:srcRect l="8488" t="10257" r="17782"/>
+          <a:stretch/>
+        </p:blipFill>
+        <p:spPr>
+          <a:xfrm>
+            <a:off x="0" y="0"/>
+            <a:ext cx="5416550" cy="6858000"/>
+          </a:xfrm>
+        </p:spPr>
+      </p:pic>
+      <p:sp>
+        <p:nvSpPr>
+          <p:cNvPr id="4" name="Slide Number Placeholder 3">
+            <a:extLst>
+              <a:ext uri="{FF2B5EF4-FFF2-40B4-BE49-F238E27FC236}">
+                <a16:creationId xmlns:a16="http://schemas.microsoft.com/office/drawing/2014/main" id="{4778571F-E358-6D86-4C9C-AF8D01C793C1}"/>
+              </a:ext>
+            </a:extLst>
+          </p:cNvPr>
+          <p:cNvSpPr>
+            <a:spLocks noGrp="1"/>
+          </p:cNvSpPr>
+          <p:nvPr>
+            <p:ph type="sldNum" sz="quarter" idx="4"/>
+          </p:nvPr>
+        </p:nvSpPr>
+        <p:spPr/>
+        <p:txBody>
+          <a:bodyPr/>
+          <a:lstStyle/>
+          <a:p>
+            <a:fld id="{819D3A82-D293-4907-9B25-3B6254918E46}" type="slidenum">
+              <a:rPr lang="en-US" smtClean="0"/>
+              <a:t>8</a:t>
+            </a:fld>
+            <a:endParaRPr lang="en-US"/>
+          </a:p>
+        </p:txBody>
+      </p:sp>
+      <p:sp>
+        <p:nvSpPr>
+          <p:cNvPr id="6" name="Content Placeholder 5">
+            <a:extLst>
+              <a:ext uri="{FF2B5EF4-FFF2-40B4-BE49-F238E27FC236}">
+                <a16:creationId xmlns:a16="http://schemas.microsoft.com/office/drawing/2014/main" id="{E8C9D08E-7AF8-9086-0B73-AEC1BEAFFCD4}"/>
+              </a:ext>
+            </a:extLst>
+          </p:cNvPr>
+          <p:cNvSpPr>
+            <a:spLocks noGrp="1"/>
+          </p:cNvSpPr>
+          <p:nvPr>
+            <p:ph idx="1"/>
+          </p:nvPr>
+        </p:nvSpPr>
+        <p:spPr/>
+        <p:txBody>
+          <a:bodyPr/>
+          <a:lstStyle/>
+          <a:p>
+            <a:r>
+              <a:rPr lang="en-US" dirty="0"/>
+              <a:t>Different links for the different functions users can do</a:t>
+            </a:r>
+          </a:p>
+          <a:p>
+            <a:pPr lvl="1"/>
+            <a:r>
+              <a:rPr lang="en-US" dirty="0"/>
+              <a:t>Upload a picture to be recognized</a:t>
+            </a:r>
+          </a:p>
+          <a:p>
+            <a:pPr lvl="1"/>
+            <a:r>
+              <a:rPr lang="en-US" dirty="0"/>
+              <a:t>View names that the user has saved as favorites</a:t>
+            </a:r>
+          </a:p>
+          <a:p>
+            <a:pPr lvl="1"/>
+            <a:r>
+              <a:rPr lang="en-US" dirty="0"/>
+              <a:t>Delete and Update Account</a:t>
+            </a:r>
+          </a:p>
+          <a:p>
+            <a:pPr marL="0" indent="0">
+              <a:buNone/>
+            </a:pPr>
+            <a:endParaRPr lang="en-US" dirty="0"/>
+          </a:p>
+          <a:p>
+            <a:endParaRPr lang="en-US" dirty="0"/>
+          </a:p>
+        </p:txBody>
+      </p:sp>
+      <p:sp>
+        <p:nvSpPr>
+          <p:cNvPr id="5" name="Title 4">
+            <a:extLst>
+              <a:ext uri="{FF2B5EF4-FFF2-40B4-BE49-F238E27FC236}">
+                <a16:creationId xmlns:a16="http://schemas.microsoft.com/office/drawing/2014/main" id="{AA7980AD-D949-FA12-91E4-3105A4E6A465}"/>
+              </a:ext>
+            </a:extLst>
+          </p:cNvPr>
+          <p:cNvSpPr>
+            <a:spLocks noGrp="1"/>
+          </p:cNvSpPr>
+          <p:nvPr>
+            <p:ph type="title"/>
+          </p:nvPr>
+        </p:nvSpPr>
+        <p:spPr/>
+        <p:txBody>
+          <a:bodyPr/>
+          <a:lstStyle/>
+          <a:p>
+            <a:r>
+              <a:rPr lang="en-US" dirty="0"/>
+              <a:t>Authenticated Home </a:t>
+            </a:r>
+          </a:p>
+        </p:txBody>
+      </p:sp>
+    </p:spTree>
+    <p:extLst>
+      <p:ext uri="{BB962C8B-B14F-4D97-AF65-F5344CB8AC3E}">
+        <p14:creationId xmlns:p14="http://schemas.microsoft.com/office/powerpoint/2010/main" val="2894545000"/>
+      </p:ext>
+    </p:extLst>
+  </p:cSld>
+  <p:clrMapOvr>
+    <a:masterClrMapping/>
+  </p:clrMapOvr>
+</p:sld>
+</file>
+
+<file path=ppt/slides/slide9.xml><?xml version="1.0" encoding="utf-8"?>
+<p:sld xmlns:a="http://schemas.openxmlformats.org/drawingml/2006/main" xmlns:r="http://schemas.openxmlformats.org/officeDocument/2006/relationships" xmlns:p="http://schemas.openxmlformats.org/presentationml/2006/main">
+  <p:cSld>
+    <p:spTree>
+      <p:nvGrpSpPr>
         <p:cNvPr id="1" name=""/>
         <p:cNvGrpSpPr/>
         <p:nvPr/>
@@ -10270,7 +10881,7 @@
           <a:p>
             <a:fld id="{8C2E478F-E849-4A8C-AF1F-CBCC78A7CBFA}" type="slidenum">
               <a:rPr lang="en-US" smtClean="0"/>
-              <a:t>8</a:t>
+              <a:t>9</a:t>
             </a:fld>
             <a:endParaRPr lang="en-US" dirty="0"/>
           </a:p>
@@ -10645,437 +11256,6 @@
     <p:extLst>
       <p:ext uri="{BB962C8B-B14F-4D97-AF65-F5344CB8AC3E}">
         <p14:creationId xmlns:p14="http://schemas.microsoft.com/office/powerpoint/2010/main" val="4094892012"/>
-      </p:ext>
-    </p:extLst>
-  </p:cSld>
-  <p:clrMapOvr>
-    <a:masterClrMapping/>
-  </p:clrMapOvr>
-</p:sld>
-</file>
-
-<file path=ppt/slides/slide9.xml><?xml version="1.0" encoding="utf-8"?>
-<p:sld xmlns:a="http://schemas.openxmlformats.org/drawingml/2006/main" xmlns:r="http://schemas.openxmlformats.org/officeDocument/2006/relationships" xmlns:p="http://schemas.openxmlformats.org/presentationml/2006/main">
-  <p:cSld>
-    <p:spTree>
-      <p:nvGrpSpPr>
-        <p:cNvPr id="1" name=""/>
-        <p:cNvGrpSpPr/>
-        <p:nvPr/>
-      </p:nvGrpSpPr>
-      <p:grpSpPr>
-        <a:xfrm>
-          <a:off x="0" y="0"/>
-          <a:ext cx="0" cy="0"/>
-          <a:chOff x="0" y="0"/>
-          <a:chExt cx="0" cy="0"/>
-        </a:xfrm>
-      </p:grpSpPr>
-      <p:pic>
-        <p:nvPicPr>
-          <p:cNvPr id="9" name="Picture Placeholder 7" descr="abstract image">
-            <a:extLst>
-              <a:ext uri="{FF2B5EF4-FFF2-40B4-BE49-F238E27FC236}">
-                <a16:creationId xmlns:a16="http://schemas.microsoft.com/office/drawing/2014/main" id="{10C261F5-27E5-A8D9-57BF-8DCB0A00F6B1}"/>
-              </a:ext>
-            </a:extLst>
-          </p:cNvPr>
-          <p:cNvPicPr>
-            <a:picLocks noChangeAspect="1"/>
-          </p:cNvPicPr>
-          <p:nvPr/>
-        </p:nvPicPr>
-        <p:blipFill rotWithShape="1">
-          <a:blip r:embed="rId2">
-            <a:alphaModFix/>
-            <a:extLst>
-              <a:ext uri="{BEBA8EAE-BF5A-486C-A8C5-ECC9F3942E4B}">
-                <a14:imgProps xmlns:a14="http://schemas.microsoft.com/office/drawing/2010/main">
-                  <a14:imgLayer r:embed="rId3">
-                    <a14:imgEffect>
-                      <a14:saturation sat="0"/>
-                    </a14:imgEffect>
-                  </a14:imgLayer>
-                </a14:imgProps>
-              </a:ext>
-            </a:extLst>
-          </a:blip>
-          <a:srcRect l="54869" r="205"/>
-          <a:stretch/>
-        </p:blipFill>
-        <p:spPr>
-          <a:xfrm>
-            <a:off x="-1" y="0"/>
-            <a:ext cx="5477523" cy="6858000"/>
-          </a:xfrm>
-          <a:prstGeom prst="rect">
-            <a:avLst/>
-          </a:prstGeom>
-        </p:spPr>
-      </p:pic>
-      <p:sp>
-        <p:nvSpPr>
-          <p:cNvPr id="3" name="Title 2">
-            <a:extLst>
-              <a:ext uri="{FF2B5EF4-FFF2-40B4-BE49-F238E27FC236}">
-                <a16:creationId xmlns:a16="http://schemas.microsoft.com/office/drawing/2014/main" id="{1D24B42B-925B-494C-A986-BD85E8117E1E}"/>
-              </a:ext>
-            </a:extLst>
-          </p:cNvPr>
-          <p:cNvSpPr>
-            <a:spLocks noGrp="1"/>
-          </p:cNvSpPr>
-          <p:nvPr>
-            <p:ph type="title"/>
-          </p:nvPr>
-        </p:nvSpPr>
-        <p:spPr>
-          <a:xfrm>
-            <a:off x="6362330" y="411225"/>
-            <a:ext cx="5251450" cy="956373"/>
-          </a:xfrm>
-        </p:spPr>
-        <p:txBody>
-          <a:bodyPr anchor="t">
-            <a:normAutofit/>
-          </a:bodyPr>
-          <a:lstStyle/>
-          <a:p>
-            <a:r>
-              <a:rPr lang="en-US" sz="4800" dirty="0"/>
-              <a:t>Technology</a:t>
-            </a:r>
-          </a:p>
-        </p:txBody>
-      </p:sp>
-      <p:sp>
-        <p:nvSpPr>
-          <p:cNvPr id="5" name="Text Placeholder 4">
-            <a:extLst>
-              <a:ext uri="{FF2B5EF4-FFF2-40B4-BE49-F238E27FC236}">
-                <a16:creationId xmlns:a16="http://schemas.microsoft.com/office/drawing/2014/main" id="{AF9B872F-6332-408E-9135-B871F0C90C00}"/>
-              </a:ext>
-            </a:extLst>
-          </p:cNvPr>
-          <p:cNvSpPr>
-            <a:spLocks noGrp="1"/>
-          </p:cNvSpPr>
-          <p:nvPr>
-            <p:ph type="body" idx="1"/>
-          </p:nvPr>
-        </p:nvSpPr>
-        <p:spPr>
-          <a:xfrm>
-            <a:off x="6362330" y="2025552"/>
-            <a:ext cx="5829669" cy="365125"/>
-          </a:xfrm>
-        </p:spPr>
-        <p:txBody>
-          <a:bodyPr/>
-          <a:lstStyle/>
-          <a:p>
-            <a:r>
-              <a:rPr lang="en-US" spc="300" dirty="0"/>
-              <a:t> </a:t>
-            </a:r>
-          </a:p>
-        </p:txBody>
-      </p:sp>
-      <p:sp>
-        <p:nvSpPr>
-          <p:cNvPr id="2" name="Slide Number Placeholder 1">
-            <a:extLst>
-              <a:ext uri="{FF2B5EF4-FFF2-40B4-BE49-F238E27FC236}">
-                <a16:creationId xmlns:a16="http://schemas.microsoft.com/office/drawing/2014/main" id="{948DD8A0-BD53-4DBF-949B-0D64D12DADA9}"/>
-              </a:ext>
-            </a:extLst>
-          </p:cNvPr>
-          <p:cNvSpPr>
-            <a:spLocks noGrp="1"/>
-          </p:cNvSpPr>
-          <p:nvPr>
-            <p:ph type="sldNum" sz="quarter" idx="12"/>
-          </p:nvPr>
-        </p:nvSpPr>
-        <p:spPr/>
-        <p:txBody>
-          <a:bodyPr/>
-          <a:lstStyle/>
-          <a:p>
-            <a:fld id="{8C2E478F-E849-4A8C-AF1F-CBCC78A7CBFA}" type="slidenum">
-              <a:rPr lang="en-US" smtClean="0"/>
-              <a:t>9</a:t>
-            </a:fld>
-            <a:endParaRPr lang="en-US" dirty="0"/>
-          </a:p>
-        </p:txBody>
-      </p:sp>
-      <p:sp>
-        <p:nvSpPr>
-          <p:cNvPr id="6" name="Content Placeholder 8">
-            <a:extLst>
-              <a:ext uri="{FF2B5EF4-FFF2-40B4-BE49-F238E27FC236}">
-                <a16:creationId xmlns:a16="http://schemas.microsoft.com/office/drawing/2014/main" id="{3B4F2E0F-78BC-2FE8-4808-2A26179B55EA}"/>
-              </a:ext>
-            </a:extLst>
-          </p:cNvPr>
-          <p:cNvSpPr txBox="1">
-            <a:spLocks/>
-          </p:cNvSpPr>
-          <p:nvPr/>
-        </p:nvSpPr>
-        <p:spPr>
-          <a:xfrm>
-            <a:off x="6362330" y="2574543"/>
-            <a:ext cx="4646246" cy="3038482"/>
-          </a:xfrm>
-          <a:prstGeom prst="rect">
-            <a:avLst/>
-          </a:prstGeom>
-          <a:noFill/>
-        </p:spPr>
-        <p:txBody>
-          <a:bodyPr vert="horz" lIns="91440" tIns="45720" rIns="91440" bIns="45720" rtlCol="0" anchor="t">
-            <a:normAutofit/>
-          </a:bodyPr>
-          <a:lstStyle>
-            <a:defPPr>
-              <a:defRPr lang="en-US"/>
-            </a:defPPr>
-            <a:lvl1pPr indent="0">
-              <a:lnSpc>
-                <a:spcPct val="120000"/>
-              </a:lnSpc>
-              <a:spcBef>
-                <a:spcPts val="0"/>
-              </a:spcBef>
-              <a:buFont typeface="Arial" panose="020B0604020202020204" pitchFamily="34" charset="0"/>
-              <a:buNone/>
-              <a:defRPr sz="2400" cap="none" spc="0" baseline="0">
-                <a:solidFill>
-                  <a:sysClr val="windowText" lastClr="000000"/>
-                </a:solidFill>
-                <a:effectLst/>
-              </a:defRPr>
-            </a:lvl1pPr>
-            <a:lvl2pPr indent="0">
-              <a:lnSpc>
-                <a:spcPct val="150000"/>
-              </a:lnSpc>
-              <a:spcBef>
-                <a:spcPts val="500"/>
-              </a:spcBef>
-              <a:buFont typeface="Arial" panose="020B0604020202020204" pitchFamily="34" charset="0"/>
-              <a:buNone/>
-              <a:defRPr sz="2000">
-                <a:solidFill>
-                  <a:schemeClr val="tx1">
-                    <a:tint val="75000"/>
-                  </a:schemeClr>
-                </a:solidFill>
-              </a:defRPr>
-            </a:lvl2pPr>
-            <a:lvl3pPr indent="0">
-              <a:lnSpc>
-                <a:spcPct val="150000"/>
-              </a:lnSpc>
-              <a:spcBef>
-                <a:spcPts val="500"/>
-              </a:spcBef>
-              <a:buFont typeface="Arial" panose="020B0604020202020204" pitchFamily="34" charset="0"/>
-              <a:buNone/>
-              <a:defRPr>
-                <a:solidFill>
-                  <a:schemeClr val="tx1">
-                    <a:tint val="75000"/>
-                  </a:schemeClr>
-                </a:solidFill>
-              </a:defRPr>
-            </a:lvl3pPr>
-            <a:lvl4pPr indent="0">
-              <a:lnSpc>
-                <a:spcPct val="150000"/>
-              </a:lnSpc>
-              <a:spcBef>
-                <a:spcPts val="500"/>
-              </a:spcBef>
-              <a:buFont typeface="Arial" panose="020B0604020202020204" pitchFamily="34" charset="0"/>
-              <a:buNone/>
-              <a:defRPr sz="1600">
-                <a:solidFill>
-                  <a:schemeClr val="tx1">
-                    <a:tint val="75000"/>
-                  </a:schemeClr>
-                </a:solidFill>
-              </a:defRPr>
-            </a:lvl4pPr>
-            <a:lvl5pPr indent="0">
-              <a:lnSpc>
-                <a:spcPct val="150000"/>
-              </a:lnSpc>
-              <a:spcBef>
-                <a:spcPts val="500"/>
-              </a:spcBef>
-              <a:buFont typeface="Arial" panose="020B0604020202020204" pitchFamily="34" charset="0"/>
-              <a:buNone/>
-              <a:defRPr sz="1600">
-                <a:solidFill>
-                  <a:schemeClr val="tx1">
-                    <a:tint val="75000"/>
-                  </a:schemeClr>
-                </a:solidFill>
-              </a:defRPr>
-            </a:lvl5pPr>
-            <a:lvl6pPr indent="0">
-              <a:lnSpc>
-                <a:spcPct val="90000"/>
-              </a:lnSpc>
-              <a:spcBef>
-                <a:spcPts val="500"/>
-              </a:spcBef>
-              <a:buFont typeface="Arial" panose="020B0604020202020204" pitchFamily="34" charset="0"/>
-              <a:buNone/>
-              <a:defRPr sz="1600">
-                <a:solidFill>
-                  <a:schemeClr val="tx1">
-                    <a:tint val="75000"/>
-                  </a:schemeClr>
-                </a:solidFill>
-              </a:defRPr>
-            </a:lvl6pPr>
-            <a:lvl7pPr indent="0">
-              <a:lnSpc>
-                <a:spcPct val="90000"/>
-              </a:lnSpc>
-              <a:spcBef>
-                <a:spcPts val="500"/>
-              </a:spcBef>
-              <a:buFont typeface="Arial" panose="020B0604020202020204" pitchFamily="34" charset="0"/>
-              <a:buNone/>
-              <a:defRPr sz="1600">
-                <a:solidFill>
-                  <a:schemeClr val="tx1">
-                    <a:tint val="75000"/>
-                  </a:schemeClr>
-                </a:solidFill>
-              </a:defRPr>
-            </a:lvl7pPr>
-            <a:lvl8pPr indent="0">
-              <a:lnSpc>
-                <a:spcPct val="90000"/>
-              </a:lnSpc>
-              <a:spcBef>
-                <a:spcPts val="500"/>
-              </a:spcBef>
-              <a:buFont typeface="Arial" panose="020B0604020202020204" pitchFamily="34" charset="0"/>
-              <a:buNone/>
-              <a:defRPr sz="1600">
-                <a:solidFill>
-                  <a:schemeClr val="tx1">
-                    <a:tint val="75000"/>
-                  </a:schemeClr>
-                </a:solidFill>
-              </a:defRPr>
-            </a:lvl8pPr>
-            <a:lvl9pPr indent="0">
-              <a:lnSpc>
-                <a:spcPct val="90000"/>
-              </a:lnSpc>
-              <a:spcBef>
-                <a:spcPts val="500"/>
-              </a:spcBef>
-              <a:buFont typeface="Arial" panose="020B0604020202020204" pitchFamily="34" charset="0"/>
-              <a:buNone/>
-              <a:defRPr sz="1600">
-                <a:solidFill>
-                  <a:schemeClr val="tx1">
-                    <a:tint val="75000"/>
-                  </a:schemeClr>
-                </a:solidFill>
-              </a:defRPr>
-            </a:lvl9pPr>
-          </a:lstStyle>
-          <a:p>
-            <a:pPr marL="342900" indent="-342900">
-              <a:buFont typeface="Arial" panose="020B0604020202020204" pitchFamily="34" charset="0"/>
-              <a:buChar char="•"/>
-            </a:pPr>
-            <a:r>
-              <a:rPr lang="en-US" dirty="0" err="1"/>
-              <a:t>VSCode</a:t>
-            </a:r>
-            <a:r>
-              <a:rPr lang="en-US" dirty="0"/>
-              <a:t> IDE</a:t>
-            </a:r>
-          </a:p>
-          <a:p>
-            <a:pPr marL="342900" indent="-342900">
-              <a:buFont typeface="Arial" panose="020B0604020202020204" pitchFamily="34" charset="0"/>
-              <a:buChar char="•"/>
-            </a:pPr>
-            <a:r>
-              <a:rPr lang="en-US" dirty="0"/>
-              <a:t>Python 3.11.8</a:t>
-            </a:r>
-          </a:p>
-          <a:p>
-            <a:pPr marL="342900" indent="-342900">
-              <a:buFont typeface="Arial" panose="020B0604020202020204" pitchFamily="34" charset="0"/>
-              <a:buChar char="•"/>
-            </a:pPr>
-            <a:r>
-              <a:rPr lang="en-US" dirty="0"/>
-              <a:t>Django</a:t>
-            </a:r>
-          </a:p>
-          <a:p>
-            <a:pPr marL="342900" indent="-342900">
-              <a:buFont typeface="Arial" panose="020B0604020202020204" pitchFamily="34" charset="0"/>
-              <a:buChar char="•"/>
-            </a:pPr>
-            <a:r>
-              <a:rPr lang="en-US" b="0" i="0" dirty="0">
-                <a:solidFill>
-                  <a:srgbClr val="1D1C1D"/>
-                </a:solidFill>
-                <a:effectLst/>
-                <a:latin typeface="Slack-Lato"/>
-              </a:rPr>
-              <a:t>SQLite</a:t>
-            </a:r>
-          </a:p>
-          <a:p>
-            <a:pPr marL="342900" indent="-342900">
-              <a:buFont typeface="Arial" panose="020B0604020202020204" pitchFamily="34" charset="0"/>
-              <a:buChar char="•"/>
-            </a:pPr>
-            <a:r>
-              <a:rPr lang="en-US" dirty="0" err="1">
-                <a:solidFill>
-                  <a:srgbClr val="1D1C1D"/>
-                </a:solidFill>
-                <a:latin typeface="Slack-Lato"/>
-              </a:rPr>
-              <a:t>Dbeaver</a:t>
-            </a:r>
-            <a:r>
-              <a:rPr lang="en-US" dirty="0">
-                <a:solidFill>
-                  <a:srgbClr val="1D1C1D"/>
-                </a:solidFill>
-                <a:latin typeface="Slack-Lato"/>
-              </a:rPr>
-              <a:t> (for viewing database tables) </a:t>
-            </a:r>
-            <a:endParaRPr lang="en-US" dirty="0"/>
-          </a:p>
-        </p:txBody>
-      </p:sp>
-    </p:spTree>
-    <p:extLst>
-      <p:ext uri="{BB962C8B-B14F-4D97-AF65-F5344CB8AC3E}">
-        <p14:creationId xmlns:p14="http://schemas.microsoft.com/office/powerpoint/2010/main" val="2441627795"/>
       </p:ext>
     </p:extLst>
   </p:cSld>
@@ -11971,6 +12151,15 @@
 </file>
 
 <file path=customXml/item1.xml><?xml version="1.0" encoding="utf-8"?>
+<?mso-contentType ?>
+<FormTemplates xmlns="http://schemas.microsoft.com/sharepoint/v3/contenttype/forms">
+  <Display>DocumentLibraryForm</Display>
+  <Edit>DocumentLibraryForm</Edit>
+  <New>DocumentLibraryForm</New>
+</FormTemplates>
+</file>
+
+<file path=customXml/item2.xml><?xml version="1.0" encoding="utf-8"?>
 <ct:contentTypeSchema xmlns:ct="http://schemas.microsoft.com/office/2006/metadata/contentType" xmlns:ma="http://schemas.microsoft.com/office/2006/metadata/properties/metaAttributes" ct:_="" ma:_="" ma:contentTypeName="Document" ma:contentTypeID="0x01010079F111ED35F8CC479449609E8A0923A6" ma:contentTypeVersion="28" ma:contentTypeDescription="Create a new document." ma:contentTypeScope="" ma:versionID="60f5a4f2d2b0abadcf532d48ebf9cb71">
   <xsd:schema xmlns:xsd="http://www.w3.org/2001/XMLSchema" xmlns:xs="http://www.w3.org/2001/XMLSchema" xmlns:p="http://schemas.microsoft.com/office/2006/metadata/properties" xmlns:ns1="http://schemas.microsoft.com/sharepoint/v3" xmlns:ns2="71af3243-3dd4-4a8d-8c0d-dd76da1f02a5" xmlns:ns3="16c05727-aa75-4e4a-9b5f-8a80a1165891" xmlns:ns4="230e9df3-be65-4c73-a93b-d1236ebd677e" targetNamespace="http://schemas.microsoft.com/office/2006/metadata/properties" ma:root="true" ma:fieldsID="7dd78129e6a1811f84807ad11c651531" ns1:_="" ns2:_="" ns3:_="" ns4:_="">
     <xsd:import namespace="http://schemas.microsoft.com/sharepoint/v3"/>
@@ -12282,15 +12471,6 @@
 </ct:contentTypeSchema>
 </file>
 
-<file path=customXml/item2.xml><?xml version="1.0" encoding="utf-8"?>
-<?mso-contentType ?>
-<FormTemplates xmlns="http://schemas.microsoft.com/sharepoint/v3/contenttype/forms">
-  <Display>DocumentLibraryForm</Display>
-  <Edit>DocumentLibraryForm</Edit>
-  <New>DocumentLibraryForm</New>
-</FormTemplates>
-</file>
-
 <file path=customXml/item3.xml><?xml version="1.0" encoding="utf-8"?>
 <p:properties xmlns:p="http://schemas.microsoft.com/office/2006/metadata/properties" xmlns:xsi="http://www.w3.org/2001/XMLSchema-instance" xmlns:pc="http://schemas.microsoft.com/office/infopath/2007/PartnerControls">
   <documentManagement>
@@ -12312,6 +12492,14 @@
 </file>
 
 <file path=customXml/itemProps1.xml><?xml version="1.0" encoding="utf-8"?>
+<ds:datastoreItem xmlns:ds="http://schemas.openxmlformats.org/officeDocument/2006/customXml" ds:itemID="{99E4EAC9-33DC-4CF0-BA31-C98F61CE4785}">
+  <ds:schemaRefs>
+    <ds:schemaRef ds:uri="http://schemas.microsoft.com/sharepoint/v3/contenttype/forms"/>
+  </ds:schemaRefs>
+</ds:datastoreItem>
+</file>
+
+<file path=customXml/itemProps2.xml><?xml version="1.0" encoding="utf-8"?>
 <ds:datastoreItem xmlns:ds="http://schemas.openxmlformats.org/officeDocument/2006/customXml" ds:itemID="{A3D5DB56-3A71-4638-9571-EE877FD66E96}">
   <ds:schemaRefs>
     <ds:schemaRef ds:uri="http://schemas.microsoft.com/office/2006/metadata/contentType"/>
@@ -12332,14 +12520,6 @@
 </ds:datastoreItem>
 </file>
 
-<file path=customXml/itemProps2.xml><?xml version="1.0" encoding="utf-8"?>
-<ds:datastoreItem xmlns:ds="http://schemas.openxmlformats.org/officeDocument/2006/customXml" ds:itemID="{99E4EAC9-33DC-4CF0-BA31-C98F61CE4785}">
-  <ds:schemaRefs>
-    <ds:schemaRef ds:uri="http://schemas.microsoft.com/sharepoint/v3/contenttype/forms"/>
-  </ds:schemaRefs>
-</ds:datastoreItem>
-</file>
-
 <file path=customXml/itemProps3.xml><?xml version="1.0" encoding="utf-8"?>
 <ds:datastoreItem xmlns:ds="http://schemas.openxmlformats.org/officeDocument/2006/customXml" ds:itemID="{8002A8ED-1331-4C1D-8649-743D7BE164DD}">
   <ds:schemaRefs>

</xml_diff>

<commit_message>
Update phase 2 docs
</commit_message>
<xml_diff>
--- a/Phase 2 Docs/Phase 2 - Presentation.pptx
+++ b/Phase 2 Docs/Phase 2 - Presentation.pptx
@@ -5,28 +5,27 @@
     <p:sldMasterId id="2147483648" r:id="rId4"/>
   </p:sldMasterIdLst>
   <p:notesMasterIdLst>
-    <p:notesMasterId r:id="rId21"/>
+    <p:notesMasterId r:id="rId20"/>
   </p:notesMasterIdLst>
   <p:handoutMasterIdLst>
-    <p:handoutMasterId r:id="rId22"/>
+    <p:handoutMasterId r:id="rId21"/>
   </p:handoutMasterIdLst>
   <p:sldIdLst>
     <p:sldId id="2448" r:id="rId5"/>
     <p:sldId id="259" r:id="rId6"/>
     <p:sldId id="2472" r:id="rId7"/>
-    <p:sldId id="2468" r:id="rId8"/>
-    <p:sldId id="2469" r:id="rId9"/>
-    <p:sldId id="2470" r:id="rId10"/>
-    <p:sldId id="2471" r:id="rId11"/>
-    <p:sldId id="2474" r:id="rId12"/>
-    <p:sldId id="2463" r:id="rId13"/>
+    <p:sldId id="2463" r:id="rId8"/>
+    <p:sldId id="2468" r:id="rId9"/>
+    <p:sldId id="2469" r:id="rId10"/>
+    <p:sldId id="2470" r:id="rId11"/>
+    <p:sldId id="2471" r:id="rId12"/>
+    <p:sldId id="2474" r:id="rId13"/>
     <p:sldId id="2466" r:id="rId14"/>
-    <p:sldId id="2464" r:id="rId15"/>
-    <p:sldId id="2451" r:id="rId16"/>
-    <p:sldId id="2467" r:id="rId17"/>
-    <p:sldId id="2473" r:id="rId18"/>
-    <p:sldId id="2453" r:id="rId19"/>
-    <p:sldId id="2436" r:id="rId20"/>
+    <p:sldId id="2467" r:id="rId15"/>
+    <p:sldId id="2473" r:id="rId16"/>
+    <p:sldId id="2464" r:id="rId17"/>
+    <p:sldId id="2453" r:id="rId18"/>
+    <p:sldId id="2436" r:id="rId19"/>
   </p:sldIdLst>
   <p:sldSz cx="12192000" cy="6858000"/>
   <p:notesSz cx="6858000" cy="9144000"/>
@@ -6015,881 +6014,6 @@
   <p:cSld>
     <p:spTree>
       <p:nvGrpSpPr>
-        <p:cNvPr id="1" name=""/>
-        <p:cNvGrpSpPr/>
-        <p:nvPr/>
-      </p:nvGrpSpPr>
-      <p:grpSpPr>
-        <a:xfrm>
-          <a:off x="0" y="0"/>
-          <a:ext cx="0" cy="0"/>
-          <a:chOff x="0" y="0"/>
-          <a:chExt cx="0" cy="0"/>
-        </a:xfrm>
-      </p:grpSpPr>
-      <p:sp>
-        <p:nvSpPr>
-          <p:cNvPr id="5" name="Text Placeholder 4">
-            <a:extLst>
-              <a:ext uri="{FF2B5EF4-FFF2-40B4-BE49-F238E27FC236}">
-                <a16:creationId xmlns:a16="http://schemas.microsoft.com/office/drawing/2014/main" id="{AF9B872F-6332-408E-9135-B871F0C90C00}"/>
-              </a:ext>
-            </a:extLst>
-          </p:cNvPr>
-          <p:cNvSpPr>
-            <a:spLocks noGrp="1"/>
-          </p:cNvSpPr>
-          <p:nvPr>
-            <p:ph type="body" idx="1"/>
-          </p:nvPr>
-        </p:nvSpPr>
-        <p:spPr>
-          <a:xfrm>
-            <a:off x="6169980" y="5940605"/>
-            <a:ext cx="6022019" cy="365125"/>
-          </a:xfrm>
-        </p:spPr>
-        <p:txBody>
-          <a:bodyPr/>
-          <a:lstStyle/>
-          <a:p>
-            <a:r>
-              <a:rPr lang="en-US" spc="300" dirty="0"/>
-              <a:t> </a:t>
-            </a:r>
-          </a:p>
-        </p:txBody>
-      </p:sp>
-      <p:sp>
-        <p:nvSpPr>
-          <p:cNvPr id="2" name="Slide Number Placeholder 1">
-            <a:extLst>
-              <a:ext uri="{FF2B5EF4-FFF2-40B4-BE49-F238E27FC236}">
-                <a16:creationId xmlns:a16="http://schemas.microsoft.com/office/drawing/2014/main" id="{948DD8A0-BD53-4DBF-949B-0D64D12DADA9}"/>
-              </a:ext>
-            </a:extLst>
-          </p:cNvPr>
-          <p:cNvSpPr>
-            <a:spLocks noGrp="1"/>
-          </p:cNvSpPr>
-          <p:nvPr>
-            <p:ph type="sldNum" sz="quarter" idx="12"/>
-          </p:nvPr>
-        </p:nvSpPr>
-        <p:spPr/>
-        <p:txBody>
-          <a:bodyPr/>
-          <a:lstStyle/>
-          <a:p>
-            <a:fld id="{8C2E478F-E849-4A8C-AF1F-CBCC78A7CBFA}" type="slidenum">
-              <a:rPr lang="en-US" smtClean="0"/>
-              <a:t>11</a:t>
-            </a:fld>
-            <a:endParaRPr lang="en-US" dirty="0"/>
-          </a:p>
-        </p:txBody>
-      </p:sp>
-      <p:pic>
-        <p:nvPicPr>
-          <p:cNvPr id="4" name="Picture Placeholder 5" descr="person staring at blueprints on a brick wall">
-            <a:extLst>
-              <a:ext uri="{FF2B5EF4-FFF2-40B4-BE49-F238E27FC236}">
-                <a16:creationId xmlns:a16="http://schemas.microsoft.com/office/drawing/2014/main" id="{A290E82F-CF8E-78AC-4042-A00C42CC919A}"/>
-              </a:ext>
-            </a:extLst>
-          </p:cNvPr>
-          <p:cNvPicPr>
-            <a:picLocks noChangeAspect="1"/>
-          </p:cNvPicPr>
-          <p:nvPr/>
-        </p:nvPicPr>
-        <p:blipFill rotWithShape="1">
-          <a:blip r:embed="rId2">
-            <a:extLst>
-              <a:ext uri="{BEBA8EAE-BF5A-486C-A8C5-ECC9F3942E4B}">
-                <a14:imgProps xmlns:a14="http://schemas.microsoft.com/office/drawing/2010/main">
-                  <a14:imgLayer r:embed="rId3">
-                    <a14:imgEffect>
-                      <a14:saturation sat="0"/>
-                    </a14:imgEffect>
-                  </a14:imgLayer>
-                </a14:imgProps>
-              </a:ext>
-            </a:extLst>
-          </a:blip>
-          <a:srcRect l="23552" t="1" r="23880" b="327"/>
-          <a:stretch/>
-        </p:blipFill>
-        <p:spPr>
-          <a:xfrm>
-            <a:off x="0" y="0"/>
-            <a:ext cx="5416550" cy="6858000"/>
-          </a:xfrm>
-          <a:prstGeom prst="rect">
-            <a:avLst/>
-          </a:prstGeom>
-        </p:spPr>
-      </p:pic>
-      <p:sp>
-        <p:nvSpPr>
-          <p:cNvPr id="10" name="Title 1">
-            <a:extLst>
-              <a:ext uri="{FF2B5EF4-FFF2-40B4-BE49-F238E27FC236}">
-                <a16:creationId xmlns:a16="http://schemas.microsoft.com/office/drawing/2014/main" id="{9A2FAB6D-1E67-AD6D-D1AB-C04147A1D343}"/>
-              </a:ext>
-            </a:extLst>
-          </p:cNvPr>
-          <p:cNvSpPr>
-            <a:spLocks noGrp="1"/>
-          </p:cNvSpPr>
-          <p:nvPr>
-            <p:ph type="title"/>
-          </p:nvPr>
-        </p:nvSpPr>
-        <p:spPr>
-          <a:xfrm>
-            <a:off x="6095999" y="612037"/>
-            <a:ext cx="5897218" cy="884238"/>
-          </a:xfrm>
-        </p:spPr>
-        <p:txBody>
-          <a:bodyPr/>
-          <a:lstStyle/>
-          <a:p>
-            <a:pPr>
-              <a:lnSpc>
-                <a:spcPct val="100000"/>
-              </a:lnSpc>
-              <a:spcBef>
-                <a:spcPts val="0"/>
-              </a:spcBef>
-            </a:pPr>
-            <a:r>
-              <a:rPr lang="en-US" sz="4200" dirty="0"/>
-              <a:t>x</a:t>
-            </a:r>
-          </a:p>
-        </p:txBody>
-      </p:sp>
-      <p:sp>
-        <p:nvSpPr>
-          <p:cNvPr id="11" name="Content Placeholder 13">
-            <a:extLst>
-              <a:ext uri="{FF2B5EF4-FFF2-40B4-BE49-F238E27FC236}">
-                <a16:creationId xmlns:a16="http://schemas.microsoft.com/office/drawing/2014/main" id="{5D13124E-A576-A643-0305-072644813EB5}"/>
-              </a:ext>
-            </a:extLst>
-          </p:cNvPr>
-          <p:cNvSpPr txBox="1">
-            <a:spLocks/>
-          </p:cNvSpPr>
-          <p:nvPr/>
-        </p:nvSpPr>
-        <p:spPr>
-          <a:xfrm>
-            <a:off x="6169980" y="1660945"/>
-            <a:ext cx="5595299" cy="4208346"/>
-          </a:xfrm>
-          <a:prstGeom prst="rect">
-            <a:avLst/>
-          </a:prstGeom>
-        </p:spPr>
-        <p:txBody>
-          <a:bodyPr vert="horz" lIns="91440" tIns="45720" rIns="91440" bIns="45720" rtlCol="0">
-            <a:normAutofit/>
-          </a:bodyPr>
-          <a:lstStyle>
-            <a:lvl1pPr marR="0" lvl="0" indent="0" fontAlgn="auto">
-              <a:lnSpc>
-                <a:spcPct val="100000"/>
-              </a:lnSpc>
-              <a:spcBef>
-                <a:spcPts val="1000"/>
-              </a:spcBef>
-              <a:spcAft>
-                <a:spcPts val="0"/>
-              </a:spcAft>
-              <a:buClrTx/>
-              <a:buSzTx/>
-              <a:buFont typeface="Arial" panose="020B0604020202020204" pitchFamily="34" charset="0"/>
-              <a:buNone/>
-              <a:tabLst/>
-              <a:defRPr sz="2000" spc="300">
-                <a:cs typeface="Biome Light" panose="020B0303030204020804" pitchFamily="34" charset="0"/>
-              </a:defRPr>
-            </a:lvl1pPr>
-            <a:lvl2pPr marL="685800" lvl="1" indent="-228600">
-              <a:lnSpc>
-                <a:spcPct val="150000"/>
-              </a:lnSpc>
-              <a:spcBef>
-                <a:spcPts val="500"/>
-              </a:spcBef>
-              <a:buFont typeface="Arial" panose="020B0604020202020204" pitchFamily="34" charset="0"/>
-              <a:buChar char="•"/>
-              <a:defRPr sz="2000"/>
-            </a:lvl2pPr>
-            <a:lvl3pPr marL="1143000" indent="-228600">
-              <a:lnSpc>
-                <a:spcPct val="150000"/>
-              </a:lnSpc>
-              <a:spcBef>
-                <a:spcPts val="500"/>
-              </a:spcBef>
-              <a:buFont typeface="Arial" panose="020B0604020202020204" pitchFamily="34" charset="0"/>
-              <a:buChar char="•"/>
-              <a:defRPr sz="1400"/>
-            </a:lvl3pPr>
-            <a:lvl4pPr marL="1600200" indent="-228600">
-              <a:lnSpc>
-                <a:spcPct val="150000"/>
-              </a:lnSpc>
-              <a:spcBef>
-                <a:spcPts val="500"/>
-              </a:spcBef>
-              <a:buFont typeface="Arial" panose="020B0604020202020204" pitchFamily="34" charset="0"/>
-              <a:buChar char="•"/>
-              <a:defRPr sz="1200"/>
-            </a:lvl4pPr>
-            <a:lvl5pPr marL="2057400" indent="-228600">
-              <a:lnSpc>
-                <a:spcPct val="150000"/>
-              </a:lnSpc>
-              <a:spcBef>
-                <a:spcPts val="500"/>
-              </a:spcBef>
-              <a:buFont typeface="Arial" panose="020B0604020202020204" pitchFamily="34" charset="0"/>
-              <a:buChar char="•"/>
-              <a:defRPr sz="1200"/>
-            </a:lvl5pPr>
-            <a:lvl6pPr marL="2514600" indent="-228600">
-              <a:lnSpc>
-                <a:spcPct val="90000"/>
-              </a:lnSpc>
-              <a:spcBef>
-                <a:spcPts val="500"/>
-              </a:spcBef>
-              <a:buFont typeface="Arial" panose="020B0604020202020204" pitchFamily="34" charset="0"/>
-              <a:buChar char="•"/>
-            </a:lvl6pPr>
-            <a:lvl7pPr marL="2971800" indent="-228600">
-              <a:lnSpc>
-                <a:spcPct val="90000"/>
-              </a:lnSpc>
-              <a:spcBef>
-                <a:spcPts val="500"/>
-              </a:spcBef>
-              <a:buFont typeface="Arial" panose="020B0604020202020204" pitchFamily="34" charset="0"/>
-              <a:buChar char="•"/>
-            </a:lvl7pPr>
-            <a:lvl8pPr marL="3429000" indent="-228600">
-              <a:lnSpc>
-                <a:spcPct val="90000"/>
-              </a:lnSpc>
-              <a:spcBef>
-                <a:spcPts val="500"/>
-              </a:spcBef>
-              <a:buFont typeface="Arial" panose="020B0604020202020204" pitchFamily="34" charset="0"/>
-              <a:buChar char="•"/>
-            </a:lvl8pPr>
-            <a:lvl9pPr marL="3886200" indent="-228600">
-              <a:lnSpc>
-                <a:spcPct val="90000"/>
-              </a:lnSpc>
-              <a:spcBef>
-                <a:spcPts val="500"/>
-              </a:spcBef>
-              <a:buFont typeface="Arial" panose="020B0604020202020204" pitchFamily="34" charset="0"/>
-              <a:buChar char="•"/>
-            </a:lvl9pPr>
-          </a:lstStyle>
-          <a:p>
-            <a:r>
-              <a:rPr lang="en-US" spc="0" dirty="0"/>
-              <a:t>CURRENTLY RESEARCHING</a:t>
-            </a:r>
-          </a:p>
-          <a:p>
-            <a:pPr>
-              <a:lnSpc>
-                <a:spcPct val="150000"/>
-              </a:lnSpc>
-            </a:pPr>
-            <a:r>
-              <a:rPr lang="en-US" spc="0" dirty="0">
-                <a:cs typeface="+mn-cs"/>
-              </a:rPr>
-              <a:t>We need an API for animal photo recognition, here’s what we are looking at possibly implementing:</a:t>
-            </a:r>
-          </a:p>
-          <a:p>
-            <a:pPr lvl="1"/>
-            <a:r>
-              <a:rPr lang="en-US" dirty="0"/>
-              <a:t>Google Login API</a:t>
-            </a:r>
-          </a:p>
-          <a:p>
-            <a:pPr lvl="2"/>
-            <a:r>
-              <a:rPr lang="en-US" dirty="0"/>
-              <a:t>Use Google Account to login to website</a:t>
-            </a:r>
-          </a:p>
-          <a:p>
-            <a:pPr lvl="1"/>
-            <a:r>
-              <a:rPr lang="en-US" dirty="0"/>
-              <a:t>Microsoft Azure AI API</a:t>
-            </a:r>
-          </a:p>
-          <a:p>
-            <a:pPr lvl="2"/>
-            <a:r>
-              <a:rPr lang="en-US" dirty="0"/>
-              <a:t>Uses Microsoft Azure AI to recognize image and return tag</a:t>
-            </a:r>
-          </a:p>
-          <a:p>
-            <a:endParaRPr lang="en-US" spc="0" dirty="0"/>
-          </a:p>
-        </p:txBody>
-      </p:sp>
-    </p:spTree>
-    <p:extLst>
-      <p:ext uri="{BB962C8B-B14F-4D97-AF65-F5344CB8AC3E}">
-        <p14:creationId xmlns:p14="http://schemas.microsoft.com/office/powerpoint/2010/main" val="440829756"/>
-      </p:ext>
-    </p:extLst>
-  </p:cSld>
-  <p:clrMapOvr>
-    <a:masterClrMapping/>
-  </p:clrMapOvr>
-</p:sld>
-</file>
-
-<file path=ppt/slides/slide12.xml><?xml version="1.0" encoding="utf-8"?>
-<p:sld xmlns:a="http://schemas.openxmlformats.org/drawingml/2006/main" xmlns:r="http://schemas.openxmlformats.org/officeDocument/2006/relationships" xmlns:p="http://schemas.openxmlformats.org/presentationml/2006/main">
-  <p:cSld>
-    <p:spTree>
-      <p:nvGrpSpPr>
-        <p:cNvPr id="1" name=""/>
-        <p:cNvGrpSpPr/>
-        <p:nvPr/>
-      </p:nvGrpSpPr>
-      <p:grpSpPr>
-        <a:xfrm>
-          <a:off x="0" y="0"/>
-          <a:ext cx="0" cy="0"/>
-          <a:chOff x="0" y="0"/>
-          <a:chExt cx="0" cy="0"/>
-        </a:xfrm>
-      </p:grpSpPr>
-      <p:sp>
-        <p:nvSpPr>
-          <p:cNvPr id="6" name="Slide Number Placeholder 5">
-            <a:extLst>
-              <a:ext uri="{FF2B5EF4-FFF2-40B4-BE49-F238E27FC236}">
-                <a16:creationId xmlns:a16="http://schemas.microsoft.com/office/drawing/2014/main" id="{FC6A5C12-E784-444E-B868-DE2AE85742BB}"/>
-              </a:ext>
-            </a:extLst>
-          </p:cNvPr>
-          <p:cNvSpPr>
-            <a:spLocks noGrp="1"/>
-          </p:cNvSpPr>
-          <p:nvPr>
-            <p:ph type="sldNum" sz="quarter" idx="12"/>
-          </p:nvPr>
-        </p:nvSpPr>
-        <p:spPr/>
-        <p:txBody>
-          <a:bodyPr/>
-          <a:lstStyle/>
-          <a:p>
-            <a:fld id="{8C2E478F-E849-4A8C-AF1F-CBCC78A7CBFA}" type="slidenum">
-              <a:rPr lang="en-US" smtClean="0"/>
-              <a:t>12</a:t>
-            </a:fld>
-            <a:endParaRPr lang="en-US" dirty="0"/>
-          </a:p>
-        </p:txBody>
-      </p:sp>
-      <p:sp>
-        <p:nvSpPr>
-          <p:cNvPr id="4" name="Title 2">
-            <a:extLst>
-              <a:ext uri="{FF2B5EF4-FFF2-40B4-BE49-F238E27FC236}">
-                <a16:creationId xmlns:a16="http://schemas.microsoft.com/office/drawing/2014/main" id="{2F8EB875-4267-9B7B-CA4D-2BA5B5FF6E4F}"/>
-              </a:ext>
-            </a:extLst>
-          </p:cNvPr>
-          <p:cNvSpPr txBox="1">
-            <a:spLocks/>
-          </p:cNvSpPr>
-          <p:nvPr/>
-        </p:nvSpPr>
-        <p:spPr>
-          <a:xfrm>
-            <a:off x="6362330" y="446291"/>
-            <a:ext cx="5630887" cy="1661297"/>
-          </a:xfrm>
-          <a:prstGeom prst="rect">
-            <a:avLst/>
-          </a:prstGeom>
-        </p:spPr>
-        <p:txBody>
-          <a:bodyPr vert="horz" lIns="91440" tIns="45720" rIns="91440" bIns="45720" rtlCol="0" anchor="t">
-            <a:normAutofit/>
-          </a:bodyPr>
-          <a:lstStyle>
-            <a:lvl1pPr algn="l" defTabSz="914400" rtl="0" eaLnBrk="1" latinLnBrk="0" hangingPunct="1">
-              <a:lnSpc>
-                <a:spcPct val="100000"/>
-              </a:lnSpc>
-              <a:spcBef>
-                <a:spcPct val="0"/>
-              </a:spcBef>
-              <a:buNone/>
-              <a:defRPr sz="6000" kern="1200" cap="all" spc="300" baseline="0">
-                <a:solidFill>
-                  <a:schemeClr val="tx1"/>
-                </a:solidFill>
-                <a:latin typeface="+mj-lt"/>
-                <a:ea typeface="+mj-ea"/>
-                <a:cs typeface="+mj-cs"/>
-              </a:defRPr>
-            </a:lvl1pPr>
-          </a:lstStyle>
-          <a:p>
-            <a:r>
-              <a:rPr lang="en-US" sz="4500" dirty="0"/>
-              <a:t>x</a:t>
-            </a:r>
-            <a:endParaRPr lang="en-US" sz="3500" dirty="0"/>
-          </a:p>
-        </p:txBody>
-      </p:sp>
-      <p:sp>
-        <p:nvSpPr>
-          <p:cNvPr id="2" name="Content Placeholder 8">
-            <a:extLst>
-              <a:ext uri="{FF2B5EF4-FFF2-40B4-BE49-F238E27FC236}">
-                <a16:creationId xmlns:a16="http://schemas.microsoft.com/office/drawing/2014/main" id="{F8BBD6BA-CA7D-1973-B283-4041FC25B422}"/>
-              </a:ext>
-            </a:extLst>
-          </p:cNvPr>
-          <p:cNvSpPr txBox="1">
-            <a:spLocks/>
-          </p:cNvSpPr>
-          <p:nvPr/>
-        </p:nvSpPr>
-        <p:spPr>
-          <a:xfrm>
-            <a:off x="6362330" y="2517621"/>
-            <a:ext cx="4516707" cy="3859127"/>
-          </a:xfrm>
-          <a:prstGeom prst="rect">
-            <a:avLst/>
-          </a:prstGeom>
-          <a:noFill/>
-        </p:spPr>
-        <p:txBody>
-          <a:bodyPr vert="horz" lIns="91440" tIns="45720" rIns="91440" bIns="45720" rtlCol="0" anchor="t">
-            <a:normAutofit/>
-          </a:bodyPr>
-          <a:lstStyle>
-            <a:lvl1pPr marL="0" indent="0" algn="ctr" defTabSz="914400" rtl="0" eaLnBrk="1" latinLnBrk="0" hangingPunct="1">
-              <a:lnSpc>
-                <a:spcPct val="100000"/>
-              </a:lnSpc>
-              <a:spcBef>
-                <a:spcPts val="1000"/>
-              </a:spcBef>
-              <a:buFont typeface="Arial" panose="020B0604020202020204" pitchFamily="34" charset="0"/>
-              <a:buNone/>
-              <a:defRPr sz="1400" kern="1200" cap="all" spc="600" baseline="0">
-                <a:solidFill>
-                  <a:schemeClr val="bg1"/>
-                </a:solidFill>
-                <a:latin typeface="+mn-lt"/>
-                <a:ea typeface="+mn-ea"/>
-                <a:cs typeface="+mn-cs"/>
-              </a:defRPr>
-            </a:lvl1pPr>
-            <a:lvl2pPr marL="457200" indent="0" algn="l" defTabSz="914400" rtl="0" eaLnBrk="1" latinLnBrk="0" hangingPunct="1">
-              <a:lnSpc>
-                <a:spcPct val="150000"/>
-              </a:lnSpc>
-              <a:spcBef>
-                <a:spcPts val="500"/>
-              </a:spcBef>
-              <a:buFont typeface="Arial" panose="020B0604020202020204" pitchFamily="34" charset="0"/>
-              <a:buNone/>
-              <a:defRPr sz="2000" kern="1200">
-                <a:solidFill>
-                  <a:schemeClr val="tx1">
-                    <a:tint val="75000"/>
-                  </a:schemeClr>
-                </a:solidFill>
-                <a:latin typeface="+mn-lt"/>
-                <a:ea typeface="+mn-ea"/>
-                <a:cs typeface="+mn-cs"/>
-              </a:defRPr>
-            </a:lvl2pPr>
-            <a:lvl3pPr marL="914400" indent="0" algn="l" defTabSz="914400" rtl="0" eaLnBrk="1" latinLnBrk="0" hangingPunct="1">
-              <a:lnSpc>
-                <a:spcPct val="150000"/>
-              </a:lnSpc>
-              <a:spcBef>
-                <a:spcPts val="500"/>
-              </a:spcBef>
-              <a:buFont typeface="Arial" panose="020B0604020202020204" pitchFamily="34" charset="0"/>
-              <a:buNone/>
-              <a:defRPr sz="1800" kern="1200">
-                <a:solidFill>
-                  <a:schemeClr val="tx1">
-                    <a:tint val="75000"/>
-                  </a:schemeClr>
-                </a:solidFill>
-                <a:latin typeface="+mn-lt"/>
-                <a:ea typeface="+mn-ea"/>
-                <a:cs typeface="+mn-cs"/>
-              </a:defRPr>
-            </a:lvl3pPr>
-            <a:lvl4pPr marL="1371600" indent="0" algn="l" defTabSz="914400" rtl="0" eaLnBrk="1" latinLnBrk="0" hangingPunct="1">
-              <a:lnSpc>
-                <a:spcPct val="150000"/>
-              </a:lnSpc>
-              <a:spcBef>
-                <a:spcPts val="500"/>
-              </a:spcBef>
-              <a:buFont typeface="Arial" panose="020B0604020202020204" pitchFamily="34" charset="0"/>
-              <a:buNone/>
-              <a:defRPr sz="1600" kern="1200">
-                <a:solidFill>
-                  <a:schemeClr val="tx1">
-                    <a:tint val="75000"/>
-                  </a:schemeClr>
-                </a:solidFill>
-                <a:latin typeface="+mn-lt"/>
-                <a:ea typeface="+mn-ea"/>
-                <a:cs typeface="+mn-cs"/>
-              </a:defRPr>
-            </a:lvl4pPr>
-            <a:lvl5pPr marL="1828800" indent="0" algn="l" defTabSz="914400" rtl="0" eaLnBrk="1" latinLnBrk="0" hangingPunct="1">
-              <a:lnSpc>
-                <a:spcPct val="150000"/>
-              </a:lnSpc>
-              <a:spcBef>
-                <a:spcPts val="500"/>
-              </a:spcBef>
-              <a:buFont typeface="Arial" panose="020B0604020202020204" pitchFamily="34" charset="0"/>
-              <a:buNone/>
-              <a:defRPr sz="1600" kern="1200">
-                <a:solidFill>
-                  <a:schemeClr val="tx1">
-                    <a:tint val="75000"/>
-                  </a:schemeClr>
-                </a:solidFill>
-                <a:latin typeface="+mn-lt"/>
-                <a:ea typeface="+mn-ea"/>
-                <a:cs typeface="+mn-cs"/>
-              </a:defRPr>
-            </a:lvl5pPr>
-            <a:lvl6pPr marL="2286000" indent="0" algn="l" defTabSz="914400" rtl="0" eaLnBrk="1" latinLnBrk="0" hangingPunct="1">
-              <a:lnSpc>
-                <a:spcPct val="90000"/>
-              </a:lnSpc>
-              <a:spcBef>
-                <a:spcPts val="500"/>
-              </a:spcBef>
-              <a:buFont typeface="Arial" panose="020B0604020202020204" pitchFamily="34" charset="0"/>
-              <a:buNone/>
-              <a:defRPr sz="1600" kern="1200">
-                <a:solidFill>
-                  <a:schemeClr val="tx1">
-                    <a:tint val="75000"/>
-                  </a:schemeClr>
-                </a:solidFill>
-                <a:latin typeface="+mn-lt"/>
-                <a:ea typeface="+mn-ea"/>
-                <a:cs typeface="+mn-cs"/>
-              </a:defRPr>
-            </a:lvl6pPr>
-            <a:lvl7pPr marL="2743200" indent="0" algn="l" defTabSz="914400" rtl="0" eaLnBrk="1" latinLnBrk="0" hangingPunct="1">
-              <a:lnSpc>
-                <a:spcPct val="90000"/>
-              </a:lnSpc>
-              <a:spcBef>
-                <a:spcPts val="500"/>
-              </a:spcBef>
-              <a:buFont typeface="Arial" panose="020B0604020202020204" pitchFamily="34" charset="0"/>
-              <a:buNone/>
-              <a:defRPr sz="1600" kern="1200">
-                <a:solidFill>
-                  <a:schemeClr val="tx1">
-                    <a:tint val="75000"/>
-                  </a:schemeClr>
-                </a:solidFill>
-                <a:latin typeface="+mn-lt"/>
-                <a:ea typeface="+mn-ea"/>
-                <a:cs typeface="+mn-cs"/>
-              </a:defRPr>
-            </a:lvl7pPr>
-            <a:lvl8pPr marL="3200400" indent="0" algn="l" defTabSz="914400" rtl="0" eaLnBrk="1" latinLnBrk="0" hangingPunct="1">
-              <a:lnSpc>
-                <a:spcPct val="90000"/>
-              </a:lnSpc>
-              <a:spcBef>
-                <a:spcPts val="500"/>
-              </a:spcBef>
-              <a:buFont typeface="Arial" panose="020B0604020202020204" pitchFamily="34" charset="0"/>
-              <a:buNone/>
-              <a:defRPr sz="1600" kern="1200">
-                <a:solidFill>
-                  <a:schemeClr val="tx1">
-                    <a:tint val="75000"/>
-                  </a:schemeClr>
-                </a:solidFill>
-                <a:latin typeface="+mn-lt"/>
-                <a:ea typeface="+mn-ea"/>
-                <a:cs typeface="+mn-cs"/>
-              </a:defRPr>
-            </a:lvl8pPr>
-            <a:lvl9pPr marL="3657600" indent="0" algn="l" defTabSz="914400" rtl="0" eaLnBrk="1" latinLnBrk="0" hangingPunct="1">
-              <a:lnSpc>
-                <a:spcPct val="90000"/>
-              </a:lnSpc>
-              <a:spcBef>
-                <a:spcPts val="500"/>
-              </a:spcBef>
-              <a:buFont typeface="Arial" panose="020B0604020202020204" pitchFamily="34" charset="0"/>
-              <a:buNone/>
-              <a:defRPr sz="1600" kern="1200">
-                <a:solidFill>
-                  <a:schemeClr val="tx1">
-                    <a:tint val="75000"/>
-                  </a:schemeClr>
-                </a:solidFill>
-                <a:latin typeface="+mn-lt"/>
-                <a:ea typeface="+mn-ea"/>
-                <a:cs typeface="+mn-cs"/>
-              </a:defRPr>
-            </a:lvl9pPr>
-          </a:lstStyle>
-          <a:p>
-            <a:pPr algn="l">
-              <a:lnSpc>
-                <a:spcPct val="120000"/>
-              </a:lnSpc>
-              <a:spcBef>
-                <a:spcPts val="0"/>
-              </a:spcBef>
-            </a:pPr>
-            <a:r>
-              <a:rPr lang="en-US" sz="2400" cap="none" spc="0" dirty="0">
-                <a:solidFill>
-                  <a:sysClr val="windowText" lastClr="000000"/>
-                </a:solidFill>
-                <a:effectLst/>
-              </a:rPr>
-              <a:t>After a client uploads a picture of their pet, our image recognition will be able to determine what kind of animal it is, then recommend names based off this information and a couple of other factors such as the animal’s coloring.</a:t>
-            </a:r>
-          </a:p>
-        </p:txBody>
-      </p:sp>
-      <p:sp>
-        <p:nvSpPr>
-          <p:cNvPr id="7" name="Picture Placeholder 6">
-            <a:extLst>
-              <a:ext uri="{FF2B5EF4-FFF2-40B4-BE49-F238E27FC236}">
-                <a16:creationId xmlns:a16="http://schemas.microsoft.com/office/drawing/2014/main" id="{BC79F0CB-D8A3-C42E-9E9A-ABCD333E1E55}"/>
-              </a:ext>
-            </a:extLst>
-          </p:cNvPr>
-          <p:cNvSpPr>
-            <a:spLocks noGrp="1"/>
-          </p:cNvSpPr>
-          <p:nvPr>
-            <p:ph type="pic" sz="quarter" idx="13"/>
-          </p:nvPr>
-        </p:nvSpPr>
-        <p:spPr/>
-        <p:txBody>
-          <a:bodyPr/>
-          <a:lstStyle/>
-          <a:p>
-            <a:endParaRPr lang="en-US"/>
-          </a:p>
-        </p:txBody>
-      </p:sp>
-      <p:pic>
-        <p:nvPicPr>
-          <p:cNvPr id="13" name="Picture Placeholder 12" descr="close up of computer on top of table against a brick wall">
-            <a:extLst>
-              <a:ext uri="{FF2B5EF4-FFF2-40B4-BE49-F238E27FC236}">
-                <a16:creationId xmlns:a16="http://schemas.microsoft.com/office/drawing/2014/main" id="{90BB9493-60B4-4B89-89CE-E1F8BF6C4D12}"/>
-              </a:ext>
-            </a:extLst>
-          </p:cNvPr>
-          <p:cNvPicPr>
-            <a:picLocks noChangeAspect="1"/>
-          </p:cNvPicPr>
-          <p:nvPr/>
-        </p:nvPicPr>
-        <p:blipFill rotWithShape="1">
-          <a:blip r:embed="rId2" cstate="email">
-            <a:extLst>
-              <a:ext uri="{BEBA8EAE-BF5A-486C-A8C5-ECC9F3942E4B}">
-                <a14:imgProps xmlns:a14="http://schemas.microsoft.com/office/drawing/2010/main">
-                  <a14:imgLayer r:embed="rId3">
-                    <a14:imgEffect>
-                      <a14:saturation sat="0"/>
-                    </a14:imgEffect>
-                  </a14:imgLayer>
-                </a14:imgProps>
-              </a:ext>
-              <a:ext uri="{28A0092B-C50C-407E-A947-70E740481C1C}">
-                <a14:useLocalDpi xmlns:a14="http://schemas.microsoft.com/office/drawing/2010/main"/>
-              </a:ext>
-            </a:extLst>
-          </a:blip>
-          <a:srcRect l="20370" r="20370"/>
-          <a:stretch/>
-        </p:blipFill>
-        <p:spPr>
-          <a:xfrm>
-            <a:off x="0" y="-9922"/>
-            <a:ext cx="6096000" cy="6867922"/>
-          </a:xfrm>
-          <a:custGeom>
-            <a:avLst/>
-            <a:gdLst>
-              <a:gd name="connsiteX0" fmla="*/ 0 w 6096000"/>
-              <a:gd name="connsiteY0" fmla="*/ 0 h 6858000"/>
-              <a:gd name="connsiteX1" fmla="*/ 6096000 w 6096000"/>
-              <a:gd name="connsiteY1" fmla="*/ 0 h 6858000"/>
-              <a:gd name="connsiteX2" fmla="*/ 6096000 w 6096000"/>
-              <a:gd name="connsiteY2" fmla="*/ 6858000 h 6858000"/>
-              <a:gd name="connsiteX3" fmla="*/ 0 w 6096000"/>
-              <a:gd name="connsiteY3" fmla="*/ 6858000 h 6858000"/>
-              <a:gd name="connsiteX4" fmla="*/ 0 w 6096000"/>
-              <a:gd name="connsiteY4" fmla="*/ 0 h 6858000"/>
-              <a:gd name="connsiteX0" fmla="*/ 0 w 6096000"/>
-              <a:gd name="connsiteY0" fmla="*/ 0 h 6858000"/>
-              <a:gd name="connsiteX1" fmla="*/ 6096000 w 6096000"/>
-              <a:gd name="connsiteY1" fmla="*/ 0 h 6858000"/>
-              <a:gd name="connsiteX2" fmla="*/ 4242487 w 6096000"/>
-              <a:gd name="connsiteY2" fmla="*/ 6833286 h 6858000"/>
-              <a:gd name="connsiteX3" fmla="*/ 0 w 6096000"/>
-              <a:gd name="connsiteY3" fmla="*/ 6858000 h 6858000"/>
-              <a:gd name="connsiteX4" fmla="*/ 0 w 6096000"/>
-              <a:gd name="connsiteY4" fmla="*/ 0 h 6858000"/>
-              <a:gd name="connsiteX0" fmla="*/ 0 w 6096000"/>
-              <a:gd name="connsiteY0" fmla="*/ 0 h 6867922"/>
-              <a:gd name="connsiteX1" fmla="*/ 6096000 w 6096000"/>
-              <a:gd name="connsiteY1" fmla="*/ 0 h 6867922"/>
-              <a:gd name="connsiteX2" fmla="*/ 4228633 w 6096000"/>
-              <a:gd name="connsiteY2" fmla="*/ 6867922 h 6867922"/>
-              <a:gd name="connsiteX3" fmla="*/ 0 w 6096000"/>
-              <a:gd name="connsiteY3" fmla="*/ 6858000 h 6867922"/>
-              <a:gd name="connsiteX4" fmla="*/ 0 w 6096000"/>
-              <a:gd name="connsiteY4" fmla="*/ 0 h 6867922"/>
-            </a:gdLst>
-            <a:ahLst/>
-            <a:cxnLst>
-              <a:cxn ang="0">
-                <a:pos x="connsiteX0" y="connsiteY0"/>
-              </a:cxn>
-              <a:cxn ang="0">
-                <a:pos x="connsiteX1" y="connsiteY1"/>
-              </a:cxn>
-              <a:cxn ang="0">
-                <a:pos x="connsiteX2" y="connsiteY2"/>
-              </a:cxn>
-              <a:cxn ang="0">
-                <a:pos x="connsiteX3" y="connsiteY3"/>
-              </a:cxn>
-              <a:cxn ang="0">
-                <a:pos x="connsiteX4" y="connsiteY4"/>
-              </a:cxn>
-            </a:cxnLst>
-            <a:rect l="l" t="t" r="r" b="b"/>
-            <a:pathLst>
-              <a:path w="6096000" h="6867922">
-                <a:moveTo>
-                  <a:pt x="0" y="0"/>
-                </a:moveTo>
-                <a:lnTo>
-                  <a:pt x="6096000" y="0"/>
-                </a:lnTo>
-                <a:lnTo>
-                  <a:pt x="4228633" y="6867922"/>
-                </a:lnTo>
-                <a:lnTo>
-                  <a:pt x="0" y="6858000"/>
-                </a:lnTo>
-                <a:lnTo>
-                  <a:pt x="0" y="0"/>
-                </a:lnTo>
-                <a:close/>
-              </a:path>
-            </a:pathLst>
-          </a:custGeom>
-          <a:effectLst/>
-        </p:spPr>
-      </p:pic>
-      <p:sp>
-        <p:nvSpPr>
-          <p:cNvPr id="8" name="Text Placeholder 4">
-            <a:extLst>
-              <a:ext uri="{FF2B5EF4-FFF2-40B4-BE49-F238E27FC236}">
-                <a16:creationId xmlns:a16="http://schemas.microsoft.com/office/drawing/2014/main" id="{8A616E72-8E0A-185C-53F1-14BBDFB16F39}"/>
-              </a:ext>
-            </a:extLst>
-          </p:cNvPr>
-          <p:cNvSpPr>
-            <a:spLocks noGrp="1"/>
-          </p:cNvSpPr>
-          <p:nvPr>
-            <p:ph type="body" idx="1"/>
-          </p:nvPr>
-        </p:nvSpPr>
-        <p:spPr>
-          <a:xfrm>
-            <a:off x="6362331" y="1860457"/>
-            <a:ext cx="5829669" cy="365125"/>
-          </a:xfrm>
-        </p:spPr>
-        <p:txBody>
-          <a:bodyPr/>
-          <a:lstStyle/>
-          <a:p>
-            <a:r>
-              <a:rPr lang="en-US" spc="300" dirty="0"/>
-              <a:t> </a:t>
-            </a:r>
-          </a:p>
-        </p:txBody>
-      </p:sp>
-    </p:spTree>
-    <p:extLst>
-      <p:ext uri="{BB962C8B-B14F-4D97-AF65-F5344CB8AC3E}">
-        <p14:creationId xmlns:p14="http://schemas.microsoft.com/office/powerpoint/2010/main" val="2944765398"/>
-      </p:ext>
-    </p:extLst>
-  </p:cSld>
-  <p:clrMapOvr>
-    <a:masterClrMapping/>
-  </p:clrMapOvr>
-</p:sld>
-</file>
-
-<file path=ppt/slides/slide13.xml><?xml version="1.0" encoding="utf-8"?>
-<p:sld xmlns:a="http://schemas.openxmlformats.org/drawingml/2006/main" xmlns:r="http://schemas.openxmlformats.org/officeDocument/2006/relationships" xmlns:p="http://schemas.openxmlformats.org/presentationml/2006/main">
-  <p:cSld>
-    <p:spTree>
-      <p:nvGrpSpPr>
         <p:cNvPr id="1" name="">
           <a:extLst>
             <a:ext uri="{FF2B5EF4-FFF2-40B4-BE49-F238E27FC236}">
@@ -7041,7 +6165,7 @@
           <a:p>
             <a:fld id="{8C2E478F-E849-4A8C-AF1F-CBCC78A7CBFA}" type="slidenum">
               <a:rPr lang="en-US" smtClean="0"/>
-              <a:t>13</a:t>
+              <a:t>11</a:t>
             </a:fld>
             <a:endParaRPr lang="en-US" dirty="0"/>
           </a:p>
@@ -7334,7 +6458,7 @@
 </p:sld>
 </file>
 
-<file path=ppt/slides/slide14.xml><?xml version="1.0" encoding="utf-8"?>
+<file path=ppt/slides/slide12.xml><?xml version="1.0" encoding="utf-8"?>
 <p:sld xmlns:a="http://schemas.openxmlformats.org/drawingml/2006/main" xmlns:r="http://schemas.openxmlformats.org/officeDocument/2006/relationships" xmlns:p="http://schemas.openxmlformats.org/presentationml/2006/main">
   <p:cSld>
     <p:spTree>
@@ -7490,7 +6614,7 @@
           <a:p>
             <a:fld id="{8C2E478F-E849-4A8C-AF1F-CBCC78A7CBFA}" type="slidenum">
               <a:rPr lang="en-US" smtClean="0"/>
-              <a:t>14</a:t>
+              <a:t>12</a:t>
             </a:fld>
             <a:endParaRPr lang="en-US" dirty="0"/>
           </a:p>
@@ -7726,7 +6850,345 @@
 </p:sld>
 </file>
 
-<file path=ppt/slides/slide15.xml><?xml version="1.0" encoding="utf-8"?>
+<file path=ppt/slides/slide13.xml><?xml version="1.0" encoding="utf-8"?>
+<p:sld xmlns:a="http://schemas.openxmlformats.org/drawingml/2006/main" xmlns:r="http://schemas.openxmlformats.org/officeDocument/2006/relationships" xmlns:p="http://schemas.openxmlformats.org/presentationml/2006/main">
+  <p:cSld>
+    <p:spTree>
+      <p:nvGrpSpPr>
+        <p:cNvPr id="1" name=""/>
+        <p:cNvGrpSpPr/>
+        <p:nvPr/>
+      </p:nvGrpSpPr>
+      <p:grpSpPr>
+        <a:xfrm>
+          <a:off x="0" y="0"/>
+          <a:ext cx="0" cy="0"/>
+          <a:chOff x="0" y="0"/>
+          <a:chExt cx="0" cy="0"/>
+        </a:xfrm>
+      </p:grpSpPr>
+      <p:sp>
+        <p:nvSpPr>
+          <p:cNvPr id="5" name="Text Placeholder 4">
+            <a:extLst>
+              <a:ext uri="{FF2B5EF4-FFF2-40B4-BE49-F238E27FC236}">
+                <a16:creationId xmlns:a16="http://schemas.microsoft.com/office/drawing/2014/main" id="{AF9B872F-6332-408E-9135-B871F0C90C00}"/>
+              </a:ext>
+            </a:extLst>
+          </p:cNvPr>
+          <p:cNvSpPr>
+            <a:spLocks noGrp="1"/>
+          </p:cNvSpPr>
+          <p:nvPr>
+            <p:ph type="body" idx="1"/>
+          </p:nvPr>
+        </p:nvSpPr>
+        <p:spPr>
+          <a:xfrm>
+            <a:off x="6169980" y="5940605"/>
+            <a:ext cx="6022019" cy="365125"/>
+          </a:xfrm>
+        </p:spPr>
+        <p:txBody>
+          <a:bodyPr/>
+          <a:lstStyle/>
+          <a:p>
+            <a:r>
+              <a:rPr lang="en-US" spc="300" dirty="0"/>
+              <a:t> </a:t>
+            </a:r>
+          </a:p>
+        </p:txBody>
+      </p:sp>
+      <p:sp>
+        <p:nvSpPr>
+          <p:cNvPr id="2" name="Slide Number Placeholder 1">
+            <a:extLst>
+              <a:ext uri="{FF2B5EF4-FFF2-40B4-BE49-F238E27FC236}">
+                <a16:creationId xmlns:a16="http://schemas.microsoft.com/office/drawing/2014/main" id="{948DD8A0-BD53-4DBF-949B-0D64D12DADA9}"/>
+              </a:ext>
+            </a:extLst>
+          </p:cNvPr>
+          <p:cNvSpPr>
+            <a:spLocks noGrp="1"/>
+          </p:cNvSpPr>
+          <p:nvPr>
+            <p:ph type="sldNum" sz="quarter" idx="12"/>
+          </p:nvPr>
+        </p:nvSpPr>
+        <p:spPr/>
+        <p:txBody>
+          <a:bodyPr/>
+          <a:lstStyle/>
+          <a:p>
+            <a:fld id="{8C2E478F-E849-4A8C-AF1F-CBCC78A7CBFA}" type="slidenum">
+              <a:rPr lang="en-US" smtClean="0"/>
+              <a:t>13</a:t>
+            </a:fld>
+            <a:endParaRPr lang="en-US" dirty="0"/>
+          </a:p>
+        </p:txBody>
+      </p:sp>
+      <p:pic>
+        <p:nvPicPr>
+          <p:cNvPr id="4" name="Picture Placeholder 5" descr="person staring at blueprints on a brick wall">
+            <a:extLst>
+              <a:ext uri="{FF2B5EF4-FFF2-40B4-BE49-F238E27FC236}">
+                <a16:creationId xmlns:a16="http://schemas.microsoft.com/office/drawing/2014/main" id="{A290E82F-CF8E-78AC-4042-A00C42CC919A}"/>
+              </a:ext>
+            </a:extLst>
+          </p:cNvPr>
+          <p:cNvPicPr>
+            <a:picLocks noChangeAspect="1"/>
+          </p:cNvPicPr>
+          <p:nvPr/>
+        </p:nvPicPr>
+        <p:blipFill rotWithShape="1">
+          <a:blip r:embed="rId2">
+            <a:extLst>
+              <a:ext uri="{BEBA8EAE-BF5A-486C-A8C5-ECC9F3942E4B}">
+                <a14:imgProps xmlns:a14="http://schemas.microsoft.com/office/drawing/2010/main">
+                  <a14:imgLayer r:embed="rId3">
+                    <a14:imgEffect>
+                      <a14:saturation sat="0"/>
+                    </a14:imgEffect>
+                  </a14:imgLayer>
+                </a14:imgProps>
+              </a:ext>
+            </a:extLst>
+          </a:blip>
+          <a:srcRect l="23552" t="1" r="23880" b="327"/>
+          <a:stretch/>
+        </p:blipFill>
+        <p:spPr>
+          <a:xfrm>
+            <a:off x="0" y="0"/>
+            <a:ext cx="5416550" cy="6858000"/>
+          </a:xfrm>
+          <a:prstGeom prst="rect">
+            <a:avLst/>
+          </a:prstGeom>
+        </p:spPr>
+      </p:pic>
+      <p:sp>
+        <p:nvSpPr>
+          <p:cNvPr id="10" name="Title 1">
+            <a:extLst>
+              <a:ext uri="{FF2B5EF4-FFF2-40B4-BE49-F238E27FC236}">
+                <a16:creationId xmlns:a16="http://schemas.microsoft.com/office/drawing/2014/main" id="{9A2FAB6D-1E67-AD6D-D1AB-C04147A1D343}"/>
+              </a:ext>
+            </a:extLst>
+          </p:cNvPr>
+          <p:cNvSpPr>
+            <a:spLocks noGrp="1"/>
+          </p:cNvSpPr>
+          <p:nvPr>
+            <p:ph type="title"/>
+          </p:nvPr>
+        </p:nvSpPr>
+        <p:spPr>
+          <a:xfrm>
+            <a:off x="6095999" y="612037"/>
+            <a:ext cx="5897218" cy="884238"/>
+          </a:xfrm>
+        </p:spPr>
+        <p:txBody>
+          <a:bodyPr/>
+          <a:lstStyle/>
+          <a:p>
+            <a:pPr>
+              <a:lnSpc>
+                <a:spcPct val="100000"/>
+              </a:lnSpc>
+              <a:spcBef>
+                <a:spcPts val="0"/>
+              </a:spcBef>
+            </a:pPr>
+            <a:r>
+              <a:rPr lang="en-US" sz="3600" dirty="0"/>
+              <a:t>CURRENTLY RESEARCHING</a:t>
+            </a:r>
+          </a:p>
+        </p:txBody>
+      </p:sp>
+      <p:sp>
+        <p:nvSpPr>
+          <p:cNvPr id="11" name="Content Placeholder 13">
+            <a:extLst>
+              <a:ext uri="{FF2B5EF4-FFF2-40B4-BE49-F238E27FC236}">
+                <a16:creationId xmlns:a16="http://schemas.microsoft.com/office/drawing/2014/main" id="{5D13124E-A576-A643-0305-072644813EB5}"/>
+              </a:ext>
+            </a:extLst>
+          </p:cNvPr>
+          <p:cNvSpPr txBox="1">
+            <a:spLocks/>
+          </p:cNvSpPr>
+          <p:nvPr/>
+        </p:nvSpPr>
+        <p:spPr>
+          <a:xfrm>
+            <a:off x="6169980" y="1660945"/>
+            <a:ext cx="5595299" cy="4208346"/>
+          </a:xfrm>
+          <a:prstGeom prst="rect">
+            <a:avLst/>
+          </a:prstGeom>
+        </p:spPr>
+        <p:txBody>
+          <a:bodyPr vert="horz" lIns="91440" tIns="45720" rIns="91440" bIns="45720" rtlCol="0">
+            <a:normAutofit/>
+          </a:bodyPr>
+          <a:lstStyle>
+            <a:lvl1pPr marR="0" lvl="0" indent="0" fontAlgn="auto">
+              <a:lnSpc>
+                <a:spcPct val="100000"/>
+              </a:lnSpc>
+              <a:spcBef>
+                <a:spcPts val="1000"/>
+              </a:spcBef>
+              <a:spcAft>
+                <a:spcPts val="0"/>
+              </a:spcAft>
+              <a:buClrTx/>
+              <a:buSzTx/>
+              <a:buFont typeface="Arial" panose="020B0604020202020204" pitchFamily="34" charset="0"/>
+              <a:buNone/>
+              <a:tabLst/>
+              <a:defRPr sz="2000" spc="300">
+                <a:cs typeface="Biome Light" panose="020B0303030204020804" pitchFamily="34" charset="0"/>
+              </a:defRPr>
+            </a:lvl1pPr>
+            <a:lvl2pPr marL="685800" lvl="1" indent="-228600">
+              <a:lnSpc>
+                <a:spcPct val="150000"/>
+              </a:lnSpc>
+              <a:spcBef>
+                <a:spcPts val="500"/>
+              </a:spcBef>
+              <a:buFont typeface="Arial" panose="020B0604020202020204" pitchFamily="34" charset="0"/>
+              <a:buChar char="•"/>
+              <a:defRPr sz="2000"/>
+            </a:lvl2pPr>
+            <a:lvl3pPr marL="1143000" indent="-228600">
+              <a:lnSpc>
+                <a:spcPct val="150000"/>
+              </a:lnSpc>
+              <a:spcBef>
+                <a:spcPts val="500"/>
+              </a:spcBef>
+              <a:buFont typeface="Arial" panose="020B0604020202020204" pitchFamily="34" charset="0"/>
+              <a:buChar char="•"/>
+              <a:defRPr sz="1400"/>
+            </a:lvl3pPr>
+            <a:lvl4pPr marL="1600200" indent="-228600">
+              <a:lnSpc>
+                <a:spcPct val="150000"/>
+              </a:lnSpc>
+              <a:spcBef>
+                <a:spcPts val="500"/>
+              </a:spcBef>
+              <a:buFont typeface="Arial" panose="020B0604020202020204" pitchFamily="34" charset="0"/>
+              <a:buChar char="•"/>
+              <a:defRPr sz="1200"/>
+            </a:lvl4pPr>
+            <a:lvl5pPr marL="2057400" indent="-228600">
+              <a:lnSpc>
+                <a:spcPct val="150000"/>
+              </a:lnSpc>
+              <a:spcBef>
+                <a:spcPts val="500"/>
+              </a:spcBef>
+              <a:buFont typeface="Arial" panose="020B0604020202020204" pitchFamily="34" charset="0"/>
+              <a:buChar char="•"/>
+              <a:defRPr sz="1200"/>
+            </a:lvl5pPr>
+            <a:lvl6pPr marL="2514600" indent="-228600">
+              <a:lnSpc>
+                <a:spcPct val="90000"/>
+              </a:lnSpc>
+              <a:spcBef>
+                <a:spcPts val="500"/>
+              </a:spcBef>
+              <a:buFont typeface="Arial" panose="020B0604020202020204" pitchFamily="34" charset="0"/>
+              <a:buChar char="•"/>
+            </a:lvl6pPr>
+            <a:lvl7pPr marL="2971800" indent="-228600">
+              <a:lnSpc>
+                <a:spcPct val="90000"/>
+              </a:lnSpc>
+              <a:spcBef>
+                <a:spcPts val="500"/>
+              </a:spcBef>
+              <a:buFont typeface="Arial" panose="020B0604020202020204" pitchFamily="34" charset="0"/>
+              <a:buChar char="•"/>
+            </a:lvl7pPr>
+            <a:lvl8pPr marL="3429000" indent="-228600">
+              <a:lnSpc>
+                <a:spcPct val="90000"/>
+              </a:lnSpc>
+              <a:spcBef>
+                <a:spcPts val="500"/>
+              </a:spcBef>
+              <a:buFont typeface="Arial" panose="020B0604020202020204" pitchFamily="34" charset="0"/>
+              <a:buChar char="•"/>
+            </a:lvl8pPr>
+            <a:lvl9pPr marL="3886200" indent="-228600">
+              <a:lnSpc>
+                <a:spcPct val="90000"/>
+              </a:lnSpc>
+              <a:spcBef>
+                <a:spcPts val="500"/>
+              </a:spcBef>
+              <a:buFont typeface="Arial" panose="020B0604020202020204" pitchFamily="34" charset="0"/>
+              <a:buChar char="•"/>
+            </a:lvl9pPr>
+          </a:lstStyle>
+          <a:p>
+            <a:pPr>
+              <a:lnSpc>
+                <a:spcPct val="150000"/>
+              </a:lnSpc>
+            </a:pPr>
+            <a:r>
+              <a:rPr lang="en-US" spc="0" dirty="0">
+                <a:cs typeface="+mn-cs"/>
+              </a:rPr>
+              <a:t>We need an API for animal photo recognition, here’s what we are looking at possibly implementing:</a:t>
+            </a:r>
+          </a:p>
+          <a:p>
+            <a:pPr lvl="1"/>
+            <a:r>
+              <a:rPr lang="en-US" dirty="0"/>
+              <a:t>Microsoft Azure AI API</a:t>
+            </a:r>
+          </a:p>
+          <a:p>
+            <a:pPr lvl="2"/>
+            <a:r>
+              <a:rPr lang="en-US" dirty="0"/>
+              <a:t>Uses Microsoft Azure AI to recognize image and return tag</a:t>
+            </a:r>
+          </a:p>
+          <a:p>
+            <a:endParaRPr lang="en-US" spc="0" dirty="0"/>
+          </a:p>
+        </p:txBody>
+      </p:sp>
+    </p:spTree>
+    <p:extLst>
+      <p:ext uri="{BB962C8B-B14F-4D97-AF65-F5344CB8AC3E}">
+        <p14:creationId xmlns:p14="http://schemas.microsoft.com/office/powerpoint/2010/main" val="440829756"/>
+      </p:ext>
+    </p:extLst>
+  </p:cSld>
+  <p:clrMapOvr>
+    <a:masterClrMapping/>
+  </p:clrMapOvr>
+</p:sld>
+</file>
+
+<file path=ppt/slides/slide14.xml><?xml version="1.0" encoding="utf-8"?>
 <p:sld xmlns:a="http://schemas.openxmlformats.org/drawingml/2006/main" xmlns:r="http://schemas.openxmlformats.org/officeDocument/2006/relationships" xmlns:p="http://schemas.openxmlformats.org/presentationml/2006/main">
   <p:cSld>
     <p:spTree>
@@ -8685,7 +8147,7 @@
           <a:p>
             <a:fld id="{8C2E478F-E849-4A8C-AF1F-CBCC78A7CBFA}" type="slidenum">
               <a:rPr lang="en-US" smtClean="0"/>
-              <a:t>15</a:t>
+              <a:t>14</a:t>
             </a:fld>
             <a:endParaRPr lang="en-US" dirty="0"/>
           </a:p>
@@ -8704,7 +8166,7 @@
 </p:sld>
 </file>
 
-<file path=ppt/slides/slide16.xml><?xml version="1.0" encoding="utf-8"?>
+<file path=ppt/slides/slide15.xml><?xml version="1.0" encoding="utf-8"?>
 <p:sld xmlns:a="http://schemas.openxmlformats.org/drawingml/2006/main" xmlns:r="http://schemas.openxmlformats.org/officeDocument/2006/relationships" xmlns:p="http://schemas.openxmlformats.org/presentationml/2006/main">
   <p:cSld>
     <p:bg>
@@ -9470,6 +8932,498 @@
           <a:chExt cx="0" cy="0"/>
         </a:xfrm>
       </p:grpSpPr>
+      <p:sp>
+        <p:nvSpPr>
+          <p:cNvPr id="3" name="Title 2">
+            <a:extLst>
+              <a:ext uri="{FF2B5EF4-FFF2-40B4-BE49-F238E27FC236}">
+                <a16:creationId xmlns:a16="http://schemas.microsoft.com/office/drawing/2014/main" id="{1D24B42B-925B-494C-A986-BD85E8117E1E}"/>
+              </a:ext>
+            </a:extLst>
+          </p:cNvPr>
+          <p:cNvSpPr>
+            <a:spLocks noGrp="1"/>
+          </p:cNvSpPr>
+          <p:nvPr>
+            <p:ph type="title"/>
+          </p:nvPr>
+        </p:nvSpPr>
+        <p:spPr>
+          <a:xfrm>
+            <a:off x="6362331" y="401907"/>
+            <a:ext cx="5251450" cy="1661297"/>
+          </a:xfrm>
+        </p:spPr>
+        <p:txBody>
+          <a:bodyPr anchor="t">
+            <a:normAutofit/>
+          </a:bodyPr>
+          <a:lstStyle/>
+          <a:p>
+            <a:r>
+              <a:rPr lang="en-US" dirty="0"/>
+              <a:t>Overview</a:t>
+            </a:r>
+          </a:p>
+        </p:txBody>
+      </p:sp>
+      <p:sp>
+        <p:nvSpPr>
+          <p:cNvPr id="5" name="Text Placeholder 4">
+            <a:extLst>
+              <a:ext uri="{FF2B5EF4-FFF2-40B4-BE49-F238E27FC236}">
+                <a16:creationId xmlns:a16="http://schemas.microsoft.com/office/drawing/2014/main" id="{AF9B872F-6332-408E-9135-B871F0C90C00}"/>
+              </a:ext>
+            </a:extLst>
+          </p:cNvPr>
+          <p:cNvSpPr>
+            <a:spLocks noGrp="1"/>
+          </p:cNvSpPr>
+          <p:nvPr>
+            <p:ph type="body" idx="1"/>
+          </p:nvPr>
+        </p:nvSpPr>
+        <p:spPr>
+          <a:xfrm>
+            <a:off x="6362329" y="1822370"/>
+            <a:ext cx="5829669" cy="365125"/>
+          </a:xfrm>
+        </p:spPr>
+        <p:txBody>
+          <a:bodyPr/>
+          <a:lstStyle/>
+          <a:p>
+            <a:r>
+              <a:rPr lang="en-US" spc="300" dirty="0"/>
+              <a:t> </a:t>
+            </a:r>
+          </a:p>
+        </p:txBody>
+      </p:sp>
+      <p:sp>
+        <p:nvSpPr>
+          <p:cNvPr id="2" name="Slide Number Placeholder 1">
+            <a:extLst>
+              <a:ext uri="{FF2B5EF4-FFF2-40B4-BE49-F238E27FC236}">
+                <a16:creationId xmlns:a16="http://schemas.microsoft.com/office/drawing/2014/main" id="{948DD8A0-BD53-4DBF-949B-0D64D12DADA9}"/>
+              </a:ext>
+            </a:extLst>
+          </p:cNvPr>
+          <p:cNvSpPr>
+            <a:spLocks noGrp="1"/>
+          </p:cNvSpPr>
+          <p:nvPr>
+            <p:ph type="sldNum" sz="quarter" idx="12"/>
+          </p:nvPr>
+        </p:nvSpPr>
+        <p:spPr/>
+        <p:txBody>
+          <a:bodyPr/>
+          <a:lstStyle/>
+          <a:p>
+            <a:fld id="{8C2E478F-E849-4A8C-AF1F-CBCC78A7CBFA}" type="slidenum">
+              <a:rPr lang="en-US" smtClean="0"/>
+              <a:t>4</a:t>
+            </a:fld>
+            <a:endParaRPr lang="en-US" dirty="0"/>
+          </a:p>
+        </p:txBody>
+      </p:sp>
+      <p:sp>
+        <p:nvSpPr>
+          <p:cNvPr id="6" name="Content Placeholder 8">
+            <a:extLst>
+              <a:ext uri="{FF2B5EF4-FFF2-40B4-BE49-F238E27FC236}">
+                <a16:creationId xmlns:a16="http://schemas.microsoft.com/office/drawing/2014/main" id="{3B4F2E0F-78BC-2FE8-4808-2A26179B55EA}"/>
+              </a:ext>
+            </a:extLst>
+          </p:cNvPr>
+          <p:cNvSpPr txBox="1">
+            <a:spLocks/>
+          </p:cNvSpPr>
+          <p:nvPr/>
+        </p:nvSpPr>
+        <p:spPr>
+          <a:xfrm>
+            <a:off x="6362330" y="2432483"/>
+            <a:ext cx="5517781" cy="3764132"/>
+          </a:xfrm>
+          <a:prstGeom prst="rect">
+            <a:avLst/>
+          </a:prstGeom>
+          <a:noFill/>
+        </p:spPr>
+        <p:txBody>
+          <a:bodyPr vert="horz" lIns="91440" tIns="45720" rIns="91440" bIns="45720" rtlCol="0" anchor="t">
+            <a:normAutofit fontScale="92500" lnSpcReduction="10000"/>
+          </a:bodyPr>
+          <a:lstStyle>
+            <a:defPPr>
+              <a:defRPr lang="en-US"/>
+            </a:defPPr>
+            <a:lvl1pPr indent="0">
+              <a:lnSpc>
+                <a:spcPct val="120000"/>
+              </a:lnSpc>
+              <a:spcBef>
+                <a:spcPts val="0"/>
+              </a:spcBef>
+              <a:buFont typeface="Arial" panose="020B0604020202020204" pitchFamily="34" charset="0"/>
+              <a:buNone/>
+              <a:defRPr sz="2400" cap="none" spc="0" baseline="0">
+                <a:solidFill>
+                  <a:sysClr val="windowText" lastClr="000000"/>
+                </a:solidFill>
+                <a:effectLst/>
+              </a:defRPr>
+            </a:lvl1pPr>
+            <a:lvl2pPr indent="0">
+              <a:lnSpc>
+                <a:spcPct val="150000"/>
+              </a:lnSpc>
+              <a:spcBef>
+                <a:spcPts val="500"/>
+              </a:spcBef>
+              <a:buFont typeface="Arial" panose="020B0604020202020204" pitchFamily="34" charset="0"/>
+              <a:buNone/>
+              <a:defRPr sz="2000">
+                <a:solidFill>
+                  <a:schemeClr val="tx1">
+                    <a:tint val="75000"/>
+                  </a:schemeClr>
+                </a:solidFill>
+              </a:defRPr>
+            </a:lvl2pPr>
+            <a:lvl3pPr indent="0">
+              <a:lnSpc>
+                <a:spcPct val="150000"/>
+              </a:lnSpc>
+              <a:spcBef>
+                <a:spcPts val="500"/>
+              </a:spcBef>
+              <a:buFont typeface="Arial" panose="020B0604020202020204" pitchFamily="34" charset="0"/>
+              <a:buNone/>
+              <a:defRPr>
+                <a:solidFill>
+                  <a:schemeClr val="tx1">
+                    <a:tint val="75000"/>
+                  </a:schemeClr>
+                </a:solidFill>
+              </a:defRPr>
+            </a:lvl3pPr>
+            <a:lvl4pPr indent="0">
+              <a:lnSpc>
+                <a:spcPct val="150000"/>
+              </a:lnSpc>
+              <a:spcBef>
+                <a:spcPts val="500"/>
+              </a:spcBef>
+              <a:buFont typeface="Arial" panose="020B0604020202020204" pitchFamily="34" charset="0"/>
+              <a:buNone/>
+              <a:defRPr sz="1600">
+                <a:solidFill>
+                  <a:schemeClr val="tx1">
+                    <a:tint val="75000"/>
+                  </a:schemeClr>
+                </a:solidFill>
+              </a:defRPr>
+            </a:lvl4pPr>
+            <a:lvl5pPr indent="0">
+              <a:lnSpc>
+                <a:spcPct val="150000"/>
+              </a:lnSpc>
+              <a:spcBef>
+                <a:spcPts val="500"/>
+              </a:spcBef>
+              <a:buFont typeface="Arial" panose="020B0604020202020204" pitchFamily="34" charset="0"/>
+              <a:buNone/>
+              <a:defRPr sz="1600">
+                <a:solidFill>
+                  <a:schemeClr val="tx1">
+                    <a:tint val="75000"/>
+                  </a:schemeClr>
+                </a:solidFill>
+              </a:defRPr>
+            </a:lvl5pPr>
+            <a:lvl6pPr indent="0">
+              <a:lnSpc>
+                <a:spcPct val="90000"/>
+              </a:lnSpc>
+              <a:spcBef>
+                <a:spcPts val="500"/>
+              </a:spcBef>
+              <a:buFont typeface="Arial" panose="020B0604020202020204" pitchFamily="34" charset="0"/>
+              <a:buNone/>
+              <a:defRPr sz="1600">
+                <a:solidFill>
+                  <a:schemeClr val="tx1">
+                    <a:tint val="75000"/>
+                  </a:schemeClr>
+                </a:solidFill>
+              </a:defRPr>
+            </a:lvl6pPr>
+            <a:lvl7pPr indent="0">
+              <a:lnSpc>
+                <a:spcPct val="90000"/>
+              </a:lnSpc>
+              <a:spcBef>
+                <a:spcPts val="500"/>
+              </a:spcBef>
+              <a:buFont typeface="Arial" panose="020B0604020202020204" pitchFamily="34" charset="0"/>
+              <a:buNone/>
+              <a:defRPr sz="1600">
+                <a:solidFill>
+                  <a:schemeClr val="tx1">
+                    <a:tint val="75000"/>
+                  </a:schemeClr>
+                </a:solidFill>
+              </a:defRPr>
+            </a:lvl7pPr>
+            <a:lvl8pPr indent="0">
+              <a:lnSpc>
+                <a:spcPct val="90000"/>
+              </a:lnSpc>
+              <a:spcBef>
+                <a:spcPts val="500"/>
+              </a:spcBef>
+              <a:buFont typeface="Arial" panose="020B0604020202020204" pitchFamily="34" charset="0"/>
+              <a:buNone/>
+              <a:defRPr sz="1600">
+                <a:solidFill>
+                  <a:schemeClr val="tx1">
+                    <a:tint val="75000"/>
+                  </a:schemeClr>
+                </a:solidFill>
+              </a:defRPr>
+            </a:lvl8pPr>
+            <a:lvl9pPr indent="0">
+              <a:lnSpc>
+                <a:spcPct val="90000"/>
+              </a:lnSpc>
+              <a:spcBef>
+                <a:spcPts val="500"/>
+              </a:spcBef>
+              <a:buFont typeface="Arial" panose="020B0604020202020204" pitchFamily="34" charset="0"/>
+              <a:buNone/>
+              <a:defRPr sz="1600">
+                <a:solidFill>
+                  <a:schemeClr val="tx1">
+                    <a:tint val="75000"/>
+                  </a:schemeClr>
+                </a:solidFill>
+              </a:defRPr>
+            </a:lvl9pPr>
+          </a:lstStyle>
+          <a:p>
+            <a:pPr marL="342900" indent="-342900">
+              <a:spcBef>
+                <a:spcPts val="1200"/>
+              </a:spcBef>
+              <a:buFont typeface="Arial" panose="020B0604020202020204" pitchFamily="34" charset="0"/>
+              <a:buChar char="•"/>
+            </a:pPr>
+            <a:r>
+              <a:rPr lang="en-US" dirty="0"/>
+              <a:t>Landing page with account creation</a:t>
+            </a:r>
+          </a:p>
+          <a:p>
+            <a:pPr marL="342900" indent="-342900">
+              <a:spcBef>
+                <a:spcPts val="1200"/>
+              </a:spcBef>
+              <a:buFont typeface="Arial" panose="020B0604020202020204" pitchFamily="34" charset="0"/>
+              <a:buChar char="•"/>
+            </a:pPr>
+            <a:r>
+              <a:rPr lang="en-US" dirty="0"/>
+              <a:t>Picture upload screen</a:t>
+            </a:r>
+          </a:p>
+          <a:p>
+            <a:pPr marL="342900" indent="-342900">
+              <a:spcBef>
+                <a:spcPts val="1200"/>
+              </a:spcBef>
+              <a:buFont typeface="Arial" panose="020B0604020202020204" pitchFamily="34" charset="0"/>
+              <a:buChar char="•"/>
+            </a:pPr>
+            <a:r>
+              <a:rPr lang="en-US" dirty="0"/>
+              <a:t>Picture recognition response</a:t>
+            </a:r>
+          </a:p>
+          <a:p>
+            <a:pPr marL="342900" indent="-342900">
+              <a:spcBef>
+                <a:spcPts val="1200"/>
+              </a:spcBef>
+              <a:buFont typeface="Arial" panose="020B0604020202020204" pitchFamily="34" charset="0"/>
+              <a:buChar char="•"/>
+            </a:pPr>
+            <a:r>
+              <a:rPr lang="en-US" dirty="0"/>
+              <a:t>Name suggestions from designated databases based on the animal and obvious features</a:t>
+            </a:r>
+          </a:p>
+          <a:p>
+            <a:pPr marL="342900" indent="-342900">
+              <a:spcBef>
+                <a:spcPts val="1200"/>
+              </a:spcBef>
+              <a:buFont typeface="Arial" panose="020B0604020202020204" pitchFamily="34" charset="0"/>
+              <a:buChar char="•"/>
+            </a:pPr>
+            <a:r>
+              <a:rPr lang="en-US" dirty="0"/>
+              <a:t>Ability to save favorite names to account database</a:t>
+            </a:r>
+          </a:p>
+        </p:txBody>
+      </p:sp>
+      <p:pic>
+        <p:nvPicPr>
+          <p:cNvPr id="4" name="Picture Placeholder 7" descr="close up of computer code">
+            <a:extLst>
+              <a:ext uri="{FF2B5EF4-FFF2-40B4-BE49-F238E27FC236}">
+                <a16:creationId xmlns:a16="http://schemas.microsoft.com/office/drawing/2014/main" id="{EFC42499-7A07-6EF5-2A4A-AD93E002BC94}"/>
+              </a:ext>
+            </a:extLst>
+          </p:cNvPr>
+          <p:cNvPicPr>
+            <a:picLocks noChangeAspect="1"/>
+          </p:cNvPicPr>
+          <p:nvPr/>
+        </p:nvPicPr>
+        <p:blipFill rotWithShape="1">
+          <a:blip r:embed="rId2">
+            <a:extLst>
+              <a:ext uri="{BEBA8EAE-BF5A-486C-A8C5-ECC9F3942E4B}">
+                <a14:imgProps xmlns:a14="http://schemas.microsoft.com/office/drawing/2010/main">
+                  <a14:imgLayer r:embed="rId3">
+                    <a14:imgEffect>
+                      <a14:saturation sat="0"/>
+                    </a14:imgEffect>
+                  </a14:imgLayer>
+                </a14:imgProps>
+              </a:ext>
+            </a:extLst>
+          </a:blip>
+          <a:srcRect l="20370" r="20370"/>
+          <a:stretch/>
+        </p:blipFill>
+        <p:spPr>
+          <a:xfrm>
+            <a:off x="0" y="0"/>
+            <a:ext cx="6096000" cy="6867922"/>
+          </a:xfrm>
+          <a:custGeom>
+            <a:avLst/>
+            <a:gdLst>
+              <a:gd name="connsiteX0" fmla="*/ 0 w 6096000"/>
+              <a:gd name="connsiteY0" fmla="*/ 0 h 6858000"/>
+              <a:gd name="connsiteX1" fmla="*/ 6096000 w 6096000"/>
+              <a:gd name="connsiteY1" fmla="*/ 0 h 6858000"/>
+              <a:gd name="connsiteX2" fmla="*/ 6096000 w 6096000"/>
+              <a:gd name="connsiteY2" fmla="*/ 6858000 h 6858000"/>
+              <a:gd name="connsiteX3" fmla="*/ 0 w 6096000"/>
+              <a:gd name="connsiteY3" fmla="*/ 6858000 h 6858000"/>
+              <a:gd name="connsiteX4" fmla="*/ 0 w 6096000"/>
+              <a:gd name="connsiteY4" fmla="*/ 0 h 6858000"/>
+              <a:gd name="connsiteX0" fmla="*/ 0 w 6096000"/>
+              <a:gd name="connsiteY0" fmla="*/ 0 h 6858000"/>
+              <a:gd name="connsiteX1" fmla="*/ 6096000 w 6096000"/>
+              <a:gd name="connsiteY1" fmla="*/ 0 h 6858000"/>
+              <a:gd name="connsiteX2" fmla="*/ 4242487 w 6096000"/>
+              <a:gd name="connsiteY2" fmla="*/ 6833286 h 6858000"/>
+              <a:gd name="connsiteX3" fmla="*/ 0 w 6096000"/>
+              <a:gd name="connsiteY3" fmla="*/ 6858000 h 6858000"/>
+              <a:gd name="connsiteX4" fmla="*/ 0 w 6096000"/>
+              <a:gd name="connsiteY4" fmla="*/ 0 h 6858000"/>
+              <a:gd name="connsiteX0" fmla="*/ 0 w 6096000"/>
+              <a:gd name="connsiteY0" fmla="*/ 0 h 6867922"/>
+              <a:gd name="connsiteX1" fmla="*/ 6096000 w 6096000"/>
+              <a:gd name="connsiteY1" fmla="*/ 0 h 6867922"/>
+              <a:gd name="connsiteX2" fmla="*/ 4228633 w 6096000"/>
+              <a:gd name="connsiteY2" fmla="*/ 6867922 h 6867922"/>
+              <a:gd name="connsiteX3" fmla="*/ 0 w 6096000"/>
+              <a:gd name="connsiteY3" fmla="*/ 6858000 h 6867922"/>
+              <a:gd name="connsiteX4" fmla="*/ 0 w 6096000"/>
+              <a:gd name="connsiteY4" fmla="*/ 0 h 6867922"/>
+            </a:gdLst>
+            <a:ahLst/>
+            <a:cxnLst>
+              <a:cxn ang="0">
+                <a:pos x="connsiteX0" y="connsiteY0"/>
+              </a:cxn>
+              <a:cxn ang="0">
+                <a:pos x="connsiteX1" y="connsiteY1"/>
+              </a:cxn>
+              <a:cxn ang="0">
+                <a:pos x="connsiteX2" y="connsiteY2"/>
+              </a:cxn>
+              <a:cxn ang="0">
+                <a:pos x="connsiteX3" y="connsiteY3"/>
+              </a:cxn>
+              <a:cxn ang="0">
+                <a:pos x="connsiteX4" y="connsiteY4"/>
+              </a:cxn>
+            </a:cxnLst>
+            <a:rect l="l" t="t" r="r" b="b"/>
+            <a:pathLst>
+              <a:path w="6096000" h="6867922">
+                <a:moveTo>
+                  <a:pt x="0" y="0"/>
+                </a:moveTo>
+                <a:lnTo>
+                  <a:pt x="6096000" y="0"/>
+                </a:lnTo>
+                <a:lnTo>
+                  <a:pt x="4228633" y="6867922"/>
+                </a:lnTo>
+                <a:lnTo>
+                  <a:pt x="0" y="6858000"/>
+                </a:lnTo>
+                <a:lnTo>
+                  <a:pt x="0" y="0"/>
+                </a:lnTo>
+                <a:close/>
+              </a:path>
+            </a:pathLst>
+          </a:custGeom>
+          <a:effectLst/>
+        </p:spPr>
+      </p:pic>
+    </p:spTree>
+    <p:extLst>
+      <p:ext uri="{BB962C8B-B14F-4D97-AF65-F5344CB8AC3E}">
+        <p14:creationId xmlns:p14="http://schemas.microsoft.com/office/powerpoint/2010/main" val="4094892012"/>
+      </p:ext>
+    </p:extLst>
+  </p:cSld>
+  <p:clrMapOvr>
+    <a:masterClrMapping/>
+  </p:clrMapOvr>
+</p:sld>
+</file>
+
+<file path=ppt/slides/slide5.xml><?xml version="1.0" encoding="utf-8"?>
+<p:sld xmlns:a="http://schemas.openxmlformats.org/drawingml/2006/main" xmlns:r="http://schemas.openxmlformats.org/officeDocument/2006/relationships" xmlns:p="http://schemas.openxmlformats.org/presentationml/2006/main">
+  <p:cSld>
+    <p:spTree>
+      <p:nvGrpSpPr>
+        <p:cNvPr id="1" name=""/>
+        <p:cNvGrpSpPr/>
+        <p:nvPr/>
+      </p:nvGrpSpPr>
+      <p:grpSpPr>
+        <a:xfrm>
+          <a:off x="0" y="0"/>
+          <a:ext cx="0" cy="0"/>
+          <a:chOff x="0" y="0"/>
+          <a:chExt cx="0" cy="0"/>
+        </a:xfrm>
+      </p:grpSpPr>
       <p:pic>
         <p:nvPicPr>
           <p:cNvPr id="3" name="Picture Placeholder 2" descr="A screenshot of a computer&#10;&#10;Description automatically generated">
@@ -9521,7 +9475,7 @@
           <a:p>
             <a:fld id="{819D3A82-D293-4907-9B25-3B6254918E46}" type="slidenum">
               <a:rPr lang="en-US" smtClean="0"/>
-              <a:t>4</a:t>
+              <a:t>5</a:t>
             </a:fld>
             <a:endParaRPr lang="en-US"/>
           </a:p>
@@ -9611,7 +9565,7 @@
 </p:sld>
 </file>
 
-<file path=ppt/slides/slide5.xml><?xml version="1.0" encoding="utf-8"?>
+<file path=ppt/slides/slide6.xml><?xml version="1.0" encoding="utf-8"?>
 <p:sld xmlns:a="http://schemas.openxmlformats.org/drawingml/2006/main" xmlns:r="http://schemas.openxmlformats.org/officeDocument/2006/relationships" xmlns:p="http://schemas.openxmlformats.org/presentationml/2006/main">
   <p:cSld>
     <p:spTree>
@@ -9682,7 +9636,7 @@
           <a:p>
             <a:fld id="{819D3A82-D293-4907-9B25-3B6254918E46}" type="slidenum">
               <a:rPr lang="en-US" smtClean="0"/>
-              <a:t>5</a:t>
+              <a:t>6</a:t>
             </a:fld>
             <a:endParaRPr lang="en-US"/>
           </a:p>
@@ -9775,7 +9729,7 @@
 </p:sld>
 </file>
 
-<file path=ppt/slides/slide6.xml><?xml version="1.0" encoding="utf-8"?>
+<file path=ppt/slides/slide7.xml><?xml version="1.0" encoding="utf-8"?>
 <p:sld xmlns:a="http://schemas.openxmlformats.org/drawingml/2006/main" xmlns:r="http://schemas.openxmlformats.org/officeDocument/2006/relationships" xmlns:p="http://schemas.openxmlformats.org/presentationml/2006/main">
   <p:cSld>
     <p:spTree>
@@ -9846,7 +9800,7 @@
           <a:p>
             <a:fld id="{819D3A82-D293-4907-9B25-3B6254918E46}" type="slidenum">
               <a:rPr lang="en-US" smtClean="0"/>
-              <a:t>6</a:t>
+              <a:t>7</a:t>
             </a:fld>
             <a:endParaRPr lang="en-US"/>
           </a:p>
@@ -9936,7 +9890,7 @@
 </p:sld>
 </file>
 
-<file path=ppt/slides/slide7.xml><?xml version="1.0" encoding="utf-8"?>
+<file path=ppt/slides/slide8.xml><?xml version="1.0" encoding="utf-8"?>
 <p:sld xmlns:a="http://schemas.openxmlformats.org/drawingml/2006/main" xmlns:r="http://schemas.openxmlformats.org/officeDocument/2006/relationships" xmlns:p="http://schemas.openxmlformats.org/presentationml/2006/main">
   <p:cSld>
     <p:spTree>
@@ -10013,7 +9967,7 @@
           <a:p>
             <a:fld id="{819D3A82-D293-4907-9B25-3B6254918E46}" type="slidenum">
               <a:rPr lang="en-US" smtClean="0"/>
-              <a:t>7</a:t>
+              <a:t>8</a:t>
             </a:fld>
             <a:endParaRPr lang="en-US"/>
           </a:p>
@@ -10593,7 +10547,7 @@
 </p:sld>
 </file>
 
-<file path=ppt/slides/slide8.xml><?xml version="1.0" encoding="utf-8"?>
+<file path=ppt/slides/slide9.xml><?xml version="1.0" encoding="utf-8"?>
 <p:sld xmlns:a="http://schemas.openxmlformats.org/drawingml/2006/main" xmlns:r="http://schemas.openxmlformats.org/officeDocument/2006/relationships" xmlns:p="http://schemas.openxmlformats.org/presentationml/2006/main">
   <p:cSld>
     <p:spTree>
@@ -10667,7 +10621,7 @@
           <a:p>
             <a:fld id="{819D3A82-D293-4907-9B25-3B6254918E46}" type="slidenum">
               <a:rPr lang="en-US" smtClean="0"/>
-              <a:t>8</a:t>
+              <a:t>9</a:t>
             </a:fld>
             <a:endParaRPr lang="en-US"/>
           </a:p>
@@ -10763,499 +10717,6 @@
     <p:extLst>
       <p:ext uri="{BB962C8B-B14F-4D97-AF65-F5344CB8AC3E}">
         <p14:creationId xmlns:p14="http://schemas.microsoft.com/office/powerpoint/2010/main" val="2894545000"/>
-      </p:ext>
-    </p:extLst>
-  </p:cSld>
-  <p:clrMapOvr>
-    <a:masterClrMapping/>
-  </p:clrMapOvr>
-</p:sld>
-</file>
-
-<file path=ppt/slides/slide9.xml><?xml version="1.0" encoding="utf-8"?>
-<p:sld xmlns:a="http://schemas.openxmlformats.org/drawingml/2006/main" xmlns:r="http://schemas.openxmlformats.org/officeDocument/2006/relationships" xmlns:p="http://schemas.openxmlformats.org/presentationml/2006/main">
-  <p:cSld>
-    <p:spTree>
-      <p:nvGrpSpPr>
-        <p:cNvPr id="1" name=""/>
-        <p:cNvGrpSpPr/>
-        <p:nvPr/>
-      </p:nvGrpSpPr>
-      <p:grpSpPr>
-        <a:xfrm>
-          <a:off x="0" y="0"/>
-          <a:ext cx="0" cy="0"/>
-          <a:chOff x="0" y="0"/>
-          <a:chExt cx="0" cy="0"/>
-        </a:xfrm>
-      </p:grpSpPr>
-      <p:sp>
-        <p:nvSpPr>
-          <p:cNvPr id="3" name="Title 2">
-            <a:extLst>
-              <a:ext uri="{FF2B5EF4-FFF2-40B4-BE49-F238E27FC236}">
-                <a16:creationId xmlns:a16="http://schemas.microsoft.com/office/drawing/2014/main" id="{1D24B42B-925B-494C-A986-BD85E8117E1E}"/>
-              </a:ext>
-            </a:extLst>
-          </p:cNvPr>
-          <p:cNvSpPr>
-            <a:spLocks noGrp="1"/>
-          </p:cNvSpPr>
-          <p:nvPr>
-            <p:ph type="title"/>
-          </p:nvPr>
-        </p:nvSpPr>
-        <p:spPr>
-          <a:xfrm>
-            <a:off x="6362331" y="401907"/>
-            <a:ext cx="5251450" cy="1661297"/>
-          </a:xfrm>
-        </p:spPr>
-        <p:txBody>
-          <a:bodyPr anchor="t">
-            <a:normAutofit/>
-          </a:bodyPr>
-          <a:lstStyle/>
-          <a:p>
-            <a:r>
-              <a:rPr lang="en-US" sz="4200" dirty="0"/>
-              <a:t>x</a:t>
-            </a:r>
-            <a:endParaRPr lang="en-US" dirty="0"/>
-          </a:p>
-        </p:txBody>
-      </p:sp>
-      <p:sp>
-        <p:nvSpPr>
-          <p:cNvPr id="5" name="Text Placeholder 4">
-            <a:extLst>
-              <a:ext uri="{FF2B5EF4-FFF2-40B4-BE49-F238E27FC236}">
-                <a16:creationId xmlns:a16="http://schemas.microsoft.com/office/drawing/2014/main" id="{AF9B872F-6332-408E-9135-B871F0C90C00}"/>
-              </a:ext>
-            </a:extLst>
-          </p:cNvPr>
-          <p:cNvSpPr>
-            <a:spLocks noGrp="1"/>
-          </p:cNvSpPr>
-          <p:nvPr>
-            <p:ph type="body" idx="1"/>
-          </p:nvPr>
-        </p:nvSpPr>
-        <p:spPr>
-          <a:xfrm>
-            <a:off x="6362329" y="1822370"/>
-            <a:ext cx="5829669" cy="365125"/>
-          </a:xfrm>
-        </p:spPr>
-        <p:txBody>
-          <a:bodyPr/>
-          <a:lstStyle/>
-          <a:p>
-            <a:r>
-              <a:rPr lang="en-US" spc="300" dirty="0"/>
-              <a:t> </a:t>
-            </a:r>
-          </a:p>
-        </p:txBody>
-      </p:sp>
-      <p:sp>
-        <p:nvSpPr>
-          <p:cNvPr id="2" name="Slide Number Placeholder 1">
-            <a:extLst>
-              <a:ext uri="{FF2B5EF4-FFF2-40B4-BE49-F238E27FC236}">
-                <a16:creationId xmlns:a16="http://schemas.microsoft.com/office/drawing/2014/main" id="{948DD8A0-BD53-4DBF-949B-0D64D12DADA9}"/>
-              </a:ext>
-            </a:extLst>
-          </p:cNvPr>
-          <p:cNvSpPr>
-            <a:spLocks noGrp="1"/>
-          </p:cNvSpPr>
-          <p:nvPr>
-            <p:ph type="sldNum" sz="quarter" idx="12"/>
-          </p:nvPr>
-        </p:nvSpPr>
-        <p:spPr/>
-        <p:txBody>
-          <a:bodyPr/>
-          <a:lstStyle/>
-          <a:p>
-            <a:fld id="{8C2E478F-E849-4A8C-AF1F-CBCC78A7CBFA}" type="slidenum">
-              <a:rPr lang="en-US" smtClean="0"/>
-              <a:t>9</a:t>
-            </a:fld>
-            <a:endParaRPr lang="en-US" dirty="0"/>
-          </a:p>
-        </p:txBody>
-      </p:sp>
-      <p:sp>
-        <p:nvSpPr>
-          <p:cNvPr id="6" name="Content Placeholder 8">
-            <a:extLst>
-              <a:ext uri="{FF2B5EF4-FFF2-40B4-BE49-F238E27FC236}">
-                <a16:creationId xmlns:a16="http://schemas.microsoft.com/office/drawing/2014/main" id="{3B4F2E0F-78BC-2FE8-4808-2A26179B55EA}"/>
-              </a:ext>
-            </a:extLst>
-          </p:cNvPr>
-          <p:cNvSpPr txBox="1">
-            <a:spLocks/>
-          </p:cNvSpPr>
-          <p:nvPr/>
-        </p:nvSpPr>
-        <p:spPr>
-          <a:xfrm>
-            <a:off x="6362330" y="2432483"/>
-            <a:ext cx="5517781" cy="3764132"/>
-          </a:xfrm>
-          <a:prstGeom prst="rect">
-            <a:avLst/>
-          </a:prstGeom>
-          <a:noFill/>
-        </p:spPr>
-        <p:txBody>
-          <a:bodyPr vert="horz" lIns="91440" tIns="45720" rIns="91440" bIns="45720" rtlCol="0" anchor="t">
-            <a:normAutofit fontScale="92500" lnSpcReduction="10000"/>
-          </a:bodyPr>
-          <a:lstStyle>
-            <a:defPPr>
-              <a:defRPr lang="en-US"/>
-            </a:defPPr>
-            <a:lvl1pPr indent="0">
-              <a:lnSpc>
-                <a:spcPct val="120000"/>
-              </a:lnSpc>
-              <a:spcBef>
-                <a:spcPts val="0"/>
-              </a:spcBef>
-              <a:buFont typeface="Arial" panose="020B0604020202020204" pitchFamily="34" charset="0"/>
-              <a:buNone/>
-              <a:defRPr sz="2400" cap="none" spc="0" baseline="0">
-                <a:solidFill>
-                  <a:sysClr val="windowText" lastClr="000000"/>
-                </a:solidFill>
-                <a:effectLst/>
-              </a:defRPr>
-            </a:lvl1pPr>
-            <a:lvl2pPr indent="0">
-              <a:lnSpc>
-                <a:spcPct val="150000"/>
-              </a:lnSpc>
-              <a:spcBef>
-                <a:spcPts val="500"/>
-              </a:spcBef>
-              <a:buFont typeface="Arial" panose="020B0604020202020204" pitchFamily="34" charset="0"/>
-              <a:buNone/>
-              <a:defRPr sz="2000">
-                <a:solidFill>
-                  <a:schemeClr val="tx1">
-                    <a:tint val="75000"/>
-                  </a:schemeClr>
-                </a:solidFill>
-              </a:defRPr>
-            </a:lvl2pPr>
-            <a:lvl3pPr indent="0">
-              <a:lnSpc>
-                <a:spcPct val="150000"/>
-              </a:lnSpc>
-              <a:spcBef>
-                <a:spcPts val="500"/>
-              </a:spcBef>
-              <a:buFont typeface="Arial" panose="020B0604020202020204" pitchFamily="34" charset="0"/>
-              <a:buNone/>
-              <a:defRPr>
-                <a:solidFill>
-                  <a:schemeClr val="tx1">
-                    <a:tint val="75000"/>
-                  </a:schemeClr>
-                </a:solidFill>
-              </a:defRPr>
-            </a:lvl3pPr>
-            <a:lvl4pPr indent="0">
-              <a:lnSpc>
-                <a:spcPct val="150000"/>
-              </a:lnSpc>
-              <a:spcBef>
-                <a:spcPts val="500"/>
-              </a:spcBef>
-              <a:buFont typeface="Arial" panose="020B0604020202020204" pitchFamily="34" charset="0"/>
-              <a:buNone/>
-              <a:defRPr sz="1600">
-                <a:solidFill>
-                  <a:schemeClr val="tx1">
-                    <a:tint val="75000"/>
-                  </a:schemeClr>
-                </a:solidFill>
-              </a:defRPr>
-            </a:lvl4pPr>
-            <a:lvl5pPr indent="0">
-              <a:lnSpc>
-                <a:spcPct val="150000"/>
-              </a:lnSpc>
-              <a:spcBef>
-                <a:spcPts val="500"/>
-              </a:spcBef>
-              <a:buFont typeface="Arial" panose="020B0604020202020204" pitchFamily="34" charset="0"/>
-              <a:buNone/>
-              <a:defRPr sz="1600">
-                <a:solidFill>
-                  <a:schemeClr val="tx1">
-                    <a:tint val="75000"/>
-                  </a:schemeClr>
-                </a:solidFill>
-              </a:defRPr>
-            </a:lvl5pPr>
-            <a:lvl6pPr indent="0">
-              <a:lnSpc>
-                <a:spcPct val="90000"/>
-              </a:lnSpc>
-              <a:spcBef>
-                <a:spcPts val="500"/>
-              </a:spcBef>
-              <a:buFont typeface="Arial" panose="020B0604020202020204" pitchFamily="34" charset="0"/>
-              <a:buNone/>
-              <a:defRPr sz="1600">
-                <a:solidFill>
-                  <a:schemeClr val="tx1">
-                    <a:tint val="75000"/>
-                  </a:schemeClr>
-                </a:solidFill>
-              </a:defRPr>
-            </a:lvl6pPr>
-            <a:lvl7pPr indent="0">
-              <a:lnSpc>
-                <a:spcPct val="90000"/>
-              </a:lnSpc>
-              <a:spcBef>
-                <a:spcPts val="500"/>
-              </a:spcBef>
-              <a:buFont typeface="Arial" panose="020B0604020202020204" pitchFamily="34" charset="0"/>
-              <a:buNone/>
-              <a:defRPr sz="1600">
-                <a:solidFill>
-                  <a:schemeClr val="tx1">
-                    <a:tint val="75000"/>
-                  </a:schemeClr>
-                </a:solidFill>
-              </a:defRPr>
-            </a:lvl7pPr>
-            <a:lvl8pPr indent="0">
-              <a:lnSpc>
-                <a:spcPct val="90000"/>
-              </a:lnSpc>
-              <a:spcBef>
-                <a:spcPts val="500"/>
-              </a:spcBef>
-              <a:buFont typeface="Arial" panose="020B0604020202020204" pitchFamily="34" charset="0"/>
-              <a:buNone/>
-              <a:defRPr sz="1600">
-                <a:solidFill>
-                  <a:schemeClr val="tx1">
-                    <a:tint val="75000"/>
-                  </a:schemeClr>
-                </a:solidFill>
-              </a:defRPr>
-            </a:lvl8pPr>
-            <a:lvl9pPr indent="0">
-              <a:lnSpc>
-                <a:spcPct val="90000"/>
-              </a:lnSpc>
-              <a:spcBef>
-                <a:spcPts val="500"/>
-              </a:spcBef>
-              <a:buFont typeface="Arial" panose="020B0604020202020204" pitchFamily="34" charset="0"/>
-              <a:buNone/>
-              <a:defRPr sz="1600">
-                <a:solidFill>
-                  <a:schemeClr val="tx1">
-                    <a:tint val="75000"/>
-                  </a:schemeClr>
-                </a:solidFill>
-              </a:defRPr>
-            </a:lvl9pPr>
-          </a:lstStyle>
-          <a:p>
-            <a:pPr marL="342900" indent="-342900">
-              <a:spcBef>
-                <a:spcPts val="1200"/>
-              </a:spcBef>
-              <a:buFont typeface="Arial" panose="020B0604020202020204" pitchFamily="34" charset="0"/>
-              <a:buChar char="•"/>
-            </a:pPr>
-            <a:r>
-              <a:rPr lang="en-US" dirty="0"/>
-              <a:t>Landing page with account creation</a:t>
-            </a:r>
-          </a:p>
-          <a:p>
-            <a:pPr marL="342900" indent="-342900">
-              <a:spcBef>
-                <a:spcPts val="1200"/>
-              </a:spcBef>
-              <a:buFont typeface="Arial" panose="020B0604020202020204" pitchFamily="34" charset="0"/>
-              <a:buChar char="•"/>
-            </a:pPr>
-            <a:r>
-              <a:rPr lang="en-US" dirty="0"/>
-              <a:t>Picture upload screen</a:t>
-            </a:r>
-          </a:p>
-          <a:p>
-            <a:pPr marL="342900" indent="-342900">
-              <a:spcBef>
-                <a:spcPts val="1200"/>
-              </a:spcBef>
-              <a:buFont typeface="Arial" panose="020B0604020202020204" pitchFamily="34" charset="0"/>
-              <a:buChar char="•"/>
-            </a:pPr>
-            <a:r>
-              <a:rPr lang="en-US" dirty="0"/>
-              <a:t>Picture recognition response</a:t>
-            </a:r>
-          </a:p>
-          <a:p>
-            <a:pPr marL="342900" indent="-342900">
-              <a:spcBef>
-                <a:spcPts val="1200"/>
-              </a:spcBef>
-              <a:buFont typeface="Arial" panose="020B0604020202020204" pitchFamily="34" charset="0"/>
-              <a:buChar char="•"/>
-            </a:pPr>
-            <a:r>
-              <a:rPr lang="en-US" dirty="0"/>
-              <a:t>Name suggestions from designated databases based on the animal and obvious features</a:t>
-            </a:r>
-          </a:p>
-          <a:p>
-            <a:pPr marL="342900" indent="-342900">
-              <a:spcBef>
-                <a:spcPts val="1200"/>
-              </a:spcBef>
-              <a:buFont typeface="Arial" panose="020B0604020202020204" pitchFamily="34" charset="0"/>
-              <a:buChar char="•"/>
-            </a:pPr>
-            <a:r>
-              <a:rPr lang="en-US" dirty="0"/>
-              <a:t>Ability to save favorite names to account database</a:t>
-            </a:r>
-          </a:p>
-        </p:txBody>
-      </p:sp>
-      <p:pic>
-        <p:nvPicPr>
-          <p:cNvPr id="4" name="Picture Placeholder 7" descr="close up of computer code">
-            <a:extLst>
-              <a:ext uri="{FF2B5EF4-FFF2-40B4-BE49-F238E27FC236}">
-                <a16:creationId xmlns:a16="http://schemas.microsoft.com/office/drawing/2014/main" id="{EFC42499-7A07-6EF5-2A4A-AD93E002BC94}"/>
-              </a:ext>
-            </a:extLst>
-          </p:cNvPr>
-          <p:cNvPicPr>
-            <a:picLocks noChangeAspect="1"/>
-          </p:cNvPicPr>
-          <p:nvPr/>
-        </p:nvPicPr>
-        <p:blipFill rotWithShape="1">
-          <a:blip r:embed="rId2">
-            <a:extLst>
-              <a:ext uri="{BEBA8EAE-BF5A-486C-A8C5-ECC9F3942E4B}">
-                <a14:imgProps xmlns:a14="http://schemas.microsoft.com/office/drawing/2010/main">
-                  <a14:imgLayer r:embed="rId3">
-                    <a14:imgEffect>
-                      <a14:saturation sat="0"/>
-                    </a14:imgEffect>
-                  </a14:imgLayer>
-                </a14:imgProps>
-              </a:ext>
-            </a:extLst>
-          </a:blip>
-          <a:srcRect l="20370" r="20370"/>
-          <a:stretch/>
-        </p:blipFill>
-        <p:spPr>
-          <a:xfrm>
-            <a:off x="0" y="0"/>
-            <a:ext cx="6096000" cy="6867922"/>
-          </a:xfrm>
-          <a:custGeom>
-            <a:avLst/>
-            <a:gdLst>
-              <a:gd name="connsiteX0" fmla="*/ 0 w 6096000"/>
-              <a:gd name="connsiteY0" fmla="*/ 0 h 6858000"/>
-              <a:gd name="connsiteX1" fmla="*/ 6096000 w 6096000"/>
-              <a:gd name="connsiteY1" fmla="*/ 0 h 6858000"/>
-              <a:gd name="connsiteX2" fmla="*/ 6096000 w 6096000"/>
-              <a:gd name="connsiteY2" fmla="*/ 6858000 h 6858000"/>
-              <a:gd name="connsiteX3" fmla="*/ 0 w 6096000"/>
-              <a:gd name="connsiteY3" fmla="*/ 6858000 h 6858000"/>
-              <a:gd name="connsiteX4" fmla="*/ 0 w 6096000"/>
-              <a:gd name="connsiteY4" fmla="*/ 0 h 6858000"/>
-              <a:gd name="connsiteX0" fmla="*/ 0 w 6096000"/>
-              <a:gd name="connsiteY0" fmla="*/ 0 h 6858000"/>
-              <a:gd name="connsiteX1" fmla="*/ 6096000 w 6096000"/>
-              <a:gd name="connsiteY1" fmla="*/ 0 h 6858000"/>
-              <a:gd name="connsiteX2" fmla="*/ 4242487 w 6096000"/>
-              <a:gd name="connsiteY2" fmla="*/ 6833286 h 6858000"/>
-              <a:gd name="connsiteX3" fmla="*/ 0 w 6096000"/>
-              <a:gd name="connsiteY3" fmla="*/ 6858000 h 6858000"/>
-              <a:gd name="connsiteX4" fmla="*/ 0 w 6096000"/>
-              <a:gd name="connsiteY4" fmla="*/ 0 h 6858000"/>
-              <a:gd name="connsiteX0" fmla="*/ 0 w 6096000"/>
-              <a:gd name="connsiteY0" fmla="*/ 0 h 6867922"/>
-              <a:gd name="connsiteX1" fmla="*/ 6096000 w 6096000"/>
-              <a:gd name="connsiteY1" fmla="*/ 0 h 6867922"/>
-              <a:gd name="connsiteX2" fmla="*/ 4228633 w 6096000"/>
-              <a:gd name="connsiteY2" fmla="*/ 6867922 h 6867922"/>
-              <a:gd name="connsiteX3" fmla="*/ 0 w 6096000"/>
-              <a:gd name="connsiteY3" fmla="*/ 6858000 h 6867922"/>
-              <a:gd name="connsiteX4" fmla="*/ 0 w 6096000"/>
-              <a:gd name="connsiteY4" fmla="*/ 0 h 6867922"/>
-            </a:gdLst>
-            <a:ahLst/>
-            <a:cxnLst>
-              <a:cxn ang="0">
-                <a:pos x="connsiteX0" y="connsiteY0"/>
-              </a:cxn>
-              <a:cxn ang="0">
-                <a:pos x="connsiteX1" y="connsiteY1"/>
-              </a:cxn>
-              <a:cxn ang="0">
-                <a:pos x="connsiteX2" y="connsiteY2"/>
-              </a:cxn>
-              <a:cxn ang="0">
-                <a:pos x="connsiteX3" y="connsiteY3"/>
-              </a:cxn>
-              <a:cxn ang="0">
-                <a:pos x="connsiteX4" y="connsiteY4"/>
-              </a:cxn>
-            </a:cxnLst>
-            <a:rect l="l" t="t" r="r" b="b"/>
-            <a:pathLst>
-              <a:path w="6096000" h="6867922">
-                <a:moveTo>
-                  <a:pt x="0" y="0"/>
-                </a:moveTo>
-                <a:lnTo>
-                  <a:pt x="6096000" y="0"/>
-                </a:lnTo>
-                <a:lnTo>
-                  <a:pt x="4228633" y="6867922"/>
-                </a:lnTo>
-                <a:lnTo>
-                  <a:pt x="0" y="6858000"/>
-                </a:lnTo>
-                <a:lnTo>
-                  <a:pt x="0" y="0"/>
-                </a:lnTo>
-                <a:close/>
-              </a:path>
-            </a:pathLst>
-          </a:custGeom>
-          <a:effectLst/>
-        </p:spPr>
-      </p:pic>
-    </p:spTree>
-    <p:extLst>
-      <p:ext uri="{BB962C8B-B14F-4D97-AF65-F5344CB8AC3E}">
-        <p14:creationId xmlns:p14="http://schemas.microsoft.com/office/powerpoint/2010/main" val="4094892012"/>
       </p:ext>
     </p:extLst>
   </p:cSld>
@@ -12151,12 +11612,23 @@
 </file>
 
 <file path=customXml/item1.xml><?xml version="1.0" encoding="utf-8"?>
-<?mso-contentType ?>
-<FormTemplates xmlns="http://schemas.microsoft.com/sharepoint/v3/contenttype/forms">
-  <Display>DocumentLibraryForm</Display>
-  <Edit>DocumentLibraryForm</Edit>
-  <New>DocumentLibraryForm</New>
-</FormTemplates>
+<p:properties xmlns:p="http://schemas.microsoft.com/office/2006/metadata/properties" xmlns:xsi="http://www.w3.org/2001/XMLSchema-instance" xmlns:pc="http://schemas.microsoft.com/office/infopath/2007/PartnerControls">
+  <documentManagement>
+    <Status xmlns="71af3243-3dd4-4a8d-8c0d-dd76da1f02a5">Not started</Status>
+    <MediaServiceKeyPoints xmlns="71af3243-3dd4-4a8d-8c0d-dd76da1f02a5" xsi:nil="true"/>
+    <_ip_UnifiedCompliancePolicyUIAction xmlns="http://schemas.microsoft.com/sharepoint/v3" xsi:nil="true"/>
+    <Image xmlns="71af3243-3dd4-4a8d-8c0d-dd76da1f02a5">
+      <Url xsi:nil="true"/>
+      <Description xsi:nil="true"/>
+    </Image>
+    <Background xmlns="71af3243-3dd4-4a8d-8c0d-dd76da1f02a5">false</Background>
+    <_ip_UnifiedCompliancePolicyProperties xmlns="http://schemas.microsoft.com/sharepoint/v3" xsi:nil="true"/>
+    <ImageTagsTaxHTField xmlns="71af3243-3dd4-4a8d-8c0d-dd76da1f02a5">
+      <Terms xmlns="http://schemas.microsoft.com/office/infopath/2007/PartnerControls"/>
+    </ImageTagsTaxHTField>
+    <TaxCatchAll xmlns="230e9df3-be65-4c73-a93b-d1236ebd677e" xsi:nil="true"/>
+  </documentManagement>
+</p:properties>
 </file>
 
 <file path=customXml/item2.xml><?xml version="1.0" encoding="utf-8"?>
@@ -12472,29 +11944,22 @@
 </file>
 
 <file path=customXml/item3.xml><?xml version="1.0" encoding="utf-8"?>
-<p:properties xmlns:p="http://schemas.microsoft.com/office/2006/metadata/properties" xmlns:xsi="http://www.w3.org/2001/XMLSchema-instance" xmlns:pc="http://schemas.microsoft.com/office/infopath/2007/PartnerControls">
-  <documentManagement>
-    <Status xmlns="71af3243-3dd4-4a8d-8c0d-dd76da1f02a5">Not started</Status>
-    <MediaServiceKeyPoints xmlns="71af3243-3dd4-4a8d-8c0d-dd76da1f02a5" xsi:nil="true"/>
-    <_ip_UnifiedCompliancePolicyUIAction xmlns="http://schemas.microsoft.com/sharepoint/v3" xsi:nil="true"/>
-    <Image xmlns="71af3243-3dd4-4a8d-8c0d-dd76da1f02a5">
-      <Url xsi:nil="true"/>
-      <Description xsi:nil="true"/>
-    </Image>
-    <Background xmlns="71af3243-3dd4-4a8d-8c0d-dd76da1f02a5">false</Background>
-    <_ip_UnifiedCompliancePolicyProperties xmlns="http://schemas.microsoft.com/sharepoint/v3" xsi:nil="true"/>
-    <ImageTagsTaxHTField xmlns="71af3243-3dd4-4a8d-8c0d-dd76da1f02a5">
-      <Terms xmlns="http://schemas.microsoft.com/office/infopath/2007/PartnerControls"/>
-    </ImageTagsTaxHTField>
-    <TaxCatchAll xmlns="230e9df3-be65-4c73-a93b-d1236ebd677e" xsi:nil="true"/>
-  </documentManagement>
-</p:properties>
+<?mso-contentType ?>
+<FormTemplates xmlns="http://schemas.microsoft.com/sharepoint/v3/contenttype/forms">
+  <Display>DocumentLibraryForm</Display>
+  <Edit>DocumentLibraryForm</Edit>
+  <New>DocumentLibraryForm</New>
+</FormTemplates>
 </file>
 
 <file path=customXml/itemProps1.xml><?xml version="1.0" encoding="utf-8"?>
-<ds:datastoreItem xmlns:ds="http://schemas.openxmlformats.org/officeDocument/2006/customXml" ds:itemID="{99E4EAC9-33DC-4CF0-BA31-C98F61CE4785}">
+<ds:datastoreItem xmlns:ds="http://schemas.openxmlformats.org/officeDocument/2006/customXml" ds:itemID="{8002A8ED-1331-4C1D-8649-743D7BE164DD}">
   <ds:schemaRefs>
-    <ds:schemaRef ds:uri="http://schemas.microsoft.com/sharepoint/v3/contenttype/forms"/>
+    <ds:schemaRef ds:uri="http://schemas.microsoft.com/office/2006/metadata/properties"/>
+    <ds:schemaRef ds:uri="http://schemas.microsoft.com/office/infopath/2007/PartnerControls"/>
+    <ds:schemaRef ds:uri="71af3243-3dd4-4a8d-8c0d-dd76da1f02a5"/>
+    <ds:schemaRef ds:uri="http://schemas.microsoft.com/sharepoint/v3"/>
+    <ds:schemaRef ds:uri="230e9df3-be65-4c73-a93b-d1236ebd677e"/>
   </ds:schemaRefs>
 </ds:datastoreItem>
 </file>
@@ -12521,13 +11986,9 @@
 </file>
 
 <file path=customXml/itemProps3.xml><?xml version="1.0" encoding="utf-8"?>
-<ds:datastoreItem xmlns:ds="http://schemas.openxmlformats.org/officeDocument/2006/customXml" ds:itemID="{8002A8ED-1331-4C1D-8649-743D7BE164DD}">
+<ds:datastoreItem xmlns:ds="http://schemas.openxmlformats.org/officeDocument/2006/customXml" ds:itemID="{99E4EAC9-33DC-4CF0-BA31-C98F61CE4785}">
   <ds:schemaRefs>
-    <ds:schemaRef ds:uri="http://schemas.microsoft.com/office/2006/metadata/properties"/>
-    <ds:schemaRef ds:uri="http://schemas.microsoft.com/office/infopath/2007/PartnerControls"/>
-    <ds:schemaRef ds:uri="71af3243-3dd4-4a8d-8c0d-dd76da1f02a5"/>
-    <ds:schemaRef ds:uri="http://schemas.microsoft.com/sharepoint/v3"/>
-    <ds:schemaRef ds:uri="230e9df3-be65-4c73-a93b-d1236ebd677e"/>
+    <ds:schemaRef ds:uri="http://schemas.microsoft.com/sharepoint/v3/contenttype/forms"/>
   </ds:schemaRefs>
 </ds:datastoreItem>
 </file>

</xml_diff>

<commit_message>
Updated Phase 2 docs
</commit_message>
<xml_diff>
--- a/Phase 2 Docs/Phase 2 - Presentation.pptx
+++ b/Phase 2 Docs/Phase 2 - Presentation.pptx
@@ -245,7 +245,7 @@
           <a:p>
             <a:fld id="{966D5B4E-BF3E-3B45-A4BA-D6C3B92870D7}" type="datetimeFigureOut">
               <a:rPr lang="en-US" smtClean="0"/>
-              <a:t>3/5/2024</a:t>
+              <a:t>3/6/2024</a:t>
             </a:fld>
             <a:endParaRPr lang="en-US" dirty="0"/>
           </a:p>
@@ -656,7 +656,7 @@
           <a:p>
             <a:fld id="{F5A8621B-8C8E-49BA-8772-41D0FE75A082}" type="datetimeFigureOut">
               <a:rPr lang="en-US" smtClean="0"/>
-              <a:t>3/5/2024</a:t>
+              <a:t>3/6/2024</a:t>
             </a:fld>
             <a:endParaRPr lang="en-US" dirty="0"/>
           </a:p>
@@ -5531,9 +5531,10 @@
           <a:lstStyle/>
           <a:p>
             <a:r>
-              <a:rPr lang="en-US" dirty="0"/>
-              <a:t>2.7.2004</a:t>
-            </a:r>
+              <a:rPr lang="en-US"/>
+              <a:t>3.6.2004</a:t>
+            </a:r>
+            <a:endParaRPr lang="en-US" dirty="0"/>
           </a:p>
         </p:txBody>
       </p:sp>
@@ -8368,14 +8369,7 @@
             </a:pPr>
             <a:r>
               <a:rPr lang="en-US" sz="4000" dirty="0"/>
-              <a:t>Catch phrase</a:t>
-            </a:r>
-            <a:br>
-              <a:rPr lang="en-US" sz="4000" dirty="0"/>
-            </a:br>
-            <a:r>
-              <a:rPr lang="en-US" sz="4000" dirty="0"/>
-              <a:t>(in matt’s code)</a:t>
+              <a:t>“We’re not to blame for your pet’s bad name”</a:t>
             </a:r>
           </a:p>
         </p:txBody>
@@ -8466,7 +8460,7 @@
         </p:spPr>
         <p:txBody>
           <a:bodyPr>
-            <a:normAutofit/>
+            <a:normAutofit fontScale="92500" lnSpcReduction="10000"/>
           </a:bodyPr>
           <a:lstStyle/>
           <a:p>
@@ -8477,7 +8471,7 @@
               <a:buNone/>
             </a:pPr>
             <a:r>
-              <a:rPr lang="en-US" sz="2400" cap="small" spc="50" dirty="0">
+              <a:rPr lang="en-US" sz="2800" cap="small" spc="50" dirty="0">
                 <a:cs typeface="Biome Light" panose="020B0303030204020804" pitchFamily="34" charset="0"/>
               </a:rPr>
               <a:t>Would you like help picking a name for your pet? </a:t>
@@ -8491,7 +8485,7 @@
               <a:buNone/>
             </a:pPr>
             <a:r>
-              <a:rPr lang="en-US" sz="2400" cap="small" spc="50" dirty="0">
+              <a:rPr lang="en-US" sz="2800" cap="small" spc="50" dirty="0">
                 <a:cs typeface="Biome Light" panose="020B0303030204020804" pitchFamily="34" charset="0"/>
               </a:rPr>
               <a:t>Simply upload a picture and we’ll recommend a few different names for you!</a:t>
@@ -8501,13 +8495,13 @@
             <a:pPr marL="0" indent="0">
               <a:buNone/>
             </a:pPr>
-            <a:endParaRPr lang="en-US" sz="2400" cap="small" spc="50" dirty="0"/>
+            <a:endParaRPr lang="en-US" sz="2800" cap="small" spc="50" dirty="0"/>
           </a:p>
           <a:p>
             <a:pPr marL="0" indent="0">
               <a:buNone/>
             </a:pPr>
-            <a:endParaRPr lang="en-US" sz="2400" cap="small" spc="50" dirty="0"/>
+            <a:endParaRPr lang="en-US" sz="2800" cap="small" spc="50" dirty="0"/>
           </a:p>
         </p:txBody>
       </p:sp>
@@ -11612,23 +11606,12 @@
 </file>
 
 <file path=customXml/item1.xml><?xml version="1.0" encoding="utf-8"?>
-<p:properties xmlns:p="http://schemas.microsoft.com/office/2006/metadata/properties" xmlns:xsi="http://www.w3.org/2001/XMLSchema-instance" xmlns:pc="http://schemas.microsoft.com/office/infopath/2007/PartnerControls">
-  <documentManagement>
-    <Status xmlns="71af3243-3dd4-4a8d-8c0d-dd76da1f02a5">Not started</Status>
-    <MediaServiceKeyPoints xmlns="71af3243-3dd4-4a8d-8c0d-dd76da1f02a5" xsi:nil="true"/>
-    <_ip_UnifiedCompliancePolicyUIAction xmlns="http://schemas.microsoft.com/sharepoint/v3" xsi:nil="true"/>
-    <Image xmlns="71af3243-3dd4-4a8d-8c0d-dd76da1f02a5">
-      <Url xsi:nil="true"/>
-      <Description xsi:nil="true"/>
-    </Image>
-    <Background xmlns="71af3243-3dd4-4a8d-8c0d-dd76da1f02a5">false</Background>
-    <_ip_UnifiedCompliancePolicyProperties xmlns="http://schemas.microsoft.com/sharepoint/v3" xsi:nil="true"/>
-    <ImageTagsTaxHTField xmlns="71af3243-3dd4-4a8d-8c0d-dd76da1f02a5">
-      <Terms xmlns="http://schemas.microsoft.com/office/infopath/2007/PartnerControls"/>
-    </ImageTagsTaxHTField>
-    <TaxCatchAll xmlns="230e9df3-be65-4c73-a93b-d1236ebd677e" xsi:nil="true"/>
-  </documentManagement>
-</p:properties>
+<?mso-contentType ?>
+<FormTemplates xmlns="http://schemas.microsoft.com/sharepoint/v3/contenttype/forms">
+  <Display>DocumentLibraryForm</Display>
+  <Edit>DocumentLibraryForm</Edit>
+  <New>DocumentLibraryForm</New>
+</FormTemplates>
 </file>
 
 <file path=customXml/item2.xml><?xml version="1.0" encoding="utf-8"?>
@@ -11944,22 +11927,29 @@
 </file>
 
 <file path=customXml/item3.xml><?xml version="1.0" encoding="utf-8"?>
-<?mso-contentType ?>
-<FormTemplates xmlns="http://schemas.microsoft.com/sharepoint/v3/contenttype/forms">
-  <Display>DocumentLibraryForm</Display>
-  <Edit>DocumentLibraryForm</Edit>
-  <New>DocumentLibraryForm</New>
-</FormTemplates>
+<p:properties xmlns:p="http://schemas.microsoft.com/office/2006/metadata/properties" xmlns:xsi="http://www.w3.org/2001/XMLSchema-instance" xmlns:pc="http://schemas.microsoft.com/office/infopath/2007/PartnerControls">
+  <documentManagement>
+    <Status xmlns="71af3243-3dd4-4a8d-8c0d-dd76da1f02a5">Not started</Status>
+    <MediaServiceKeyPoints xmlns="71af3243-3dd4-4a8d-8c0d-dd76da1f02a5" xsi:nil="true"/>
+    <_ip_UnifiedCompliancePolicyUIAction xmlns="http://schemas.microsoft.com/sharepoint/v3" xsi:nil="true"/>
+    <Image xmlns="71af3243-3dd4-4a8d-8c0d-dd76da1f02a5">
+      <Url xsi:nil="true"/>
+      <Description xsi:nil="true"/>
+    </Image>
+    <Background xmlns="71af3243-3dd4-4a8d-8c0d-dd76da1f02a5">false</Background>
+    <_ip_UnifiedCompliancePolicyProperties xmlns="http://schemas.microsoft.com/sharepoint/v3" xsi:nil="true"/>
+    <ImageTagsTaxHTField xmlns="71af3243-3dd4-4a8d-8c0d-dd76da1f02a5">
+      <Terms xmlns="http://schemas.microsoft.com/office/infopath/2007/PartnerControls"/>
+    </ImageTagsTaxHTField>
+    <TaxCatchAll xmlns="230e9df3-be65-4c73-a93b-d1236ebd677e" xsi:nil="true"/>
+  </documentManagement>
+</p:properties>
 </file>
 
 <file path=customXml/itemProps1.xml><?xml version="1.0" encoding="utf-8"?>
-<ds:datastoreItem xmlns:ds="http://schemas.openxmlformats.org/officeDocument/2006/customXml" ds:itemID="{8002A8ED-1331-4C1D-8649-743D7BE164DD}">
+<ds:datastoreItem xmlns:ds="http://schemas.openxmlformats.org/officeDocument/2006/customXml" ds:itemID="{99E4EAC9-33DC-4CF0-BA31-C98F61CE4785}">
   <ds:schemaRefs>
-    <ds:schemaRef ds:uri="http://schemas.microsoft.com/office/2006/metadata/properties"/>
-    <ds:schemaRef ds:uri="http://schemas.microsoft.com/office/infopath/2007/PartnerControls"/>
-    <ds:schemaRef ds:uri="71af3243-3dd4-4a8d-8c0d-dd76da1f02a5"/>
-    <ds:schemaRef ds:uri="http://schemas.microsoft.com/sharepoint/v3"/>
-    <ds:schemaRef ds:uri="230e9df3-be65-4c73-a93b-d1236ebd677e"/>
+    <ds:schemaRef ds:uri="http://schemas.microsoft.com/sharepoint/v3/contenttype/forms"/>
   </ds:schemaRefs>
 </ds:datastoreItem>
 </file>
@@ -11986,9 +11976,13 @@
 </file>
 
 <file path=customXml/itemProps3.xml><?xml version="1.0" encoding="utf-8"?>
-<ds:datastoreItem xmlns:ds="http://schemas.openxmlformats.org/officeDocument/2006/customXml" ds:itemID="{99E4EAC9-33DC-4CF0-BA31-C98F61CE4785}">
+<ds:datastoreItem xmlns:ds="http://schemas.openxmlformats.org/officeDocument/2006/customXml" ds:itemID="{8002A8ED-1331-4C1D-8649-743D7BE164DD}">
   <ds:schemaRefs>
-    <ds:schemaRef ds:uri="http://schemas.microsoft.com/sharepoint/v3/contenttype/forms"/>
+    <ds:schemaRef ds:uri="http://schemas.microsoft.com/office/2006/metadata/properties"/>
+    <ds:schemaRef ds:uri="http://schemas.microsoft.com/office/infopath/2007/PartnerControls"/>
+    <ds:schemaRef ds:uri="71af3243-3dd4-4a8d-8c0d-dd76da1f02a5"/>
+    <ds:schemaRef ds:uri="http://schemas.microsoft.com/sharepoint/v3"/>
+    <ds:schemaRef ds:uri="230e9df3-be65-4c73-a93b-d1236ebd677e"/>
   </ds:schemaRefs>
 </ds:datastoreItem>
 </file>

</xml_diff>

<commit_message>
Updated Phase 2 docs, Added Phase 3 docs
</commit_message>
<xml_diff>
--- a/Phase 2 Docs/Phase 2 - Presentation.pptx
+++ b/Phase 2 Docs/Phase 2 - Presentation.pptx
@@ -5,10 +5,10 @@
     <p:sldMasterId id="2147483648" r:id="rId4"/>
   </p:sldMasterIdLst>
   <p:notesMasterIdLst>
-    <p:notesMasterId r:id="rId20"/>
+    <p:notesMasterId r:id="rId21"/>
   </p:notesMasterIdLst>
   <p:handoutMasterIdLst>
-    <p:handoutMasterId r:id="rId21"/>
+    <p:handoutMasterId r:id="rId22"/>
   </p:handoutMasterIdLst>
   <p:sldIdLst>
     <p:sldId id="2448" r:id="rId5"/>
@@ -25,7 +25,8 @@
     <p:sldId id="2473" r:id="rId16"/>
     <p:sldId id="2464" r:id="rId17"/>
     <p:sldId id="2453" r:id="rId18"/>
-    <p:sldId id="2436" r:id="rId19"/>
+    <p:sldId id="2475" r:id="rId19"/>
+    <p:sldId id="2436" r:id="rId20"/>
   </p:sldIdLst>
   <p:sldSz cx="12192000" cy="6858000"/>
   <p:notesSz cx="6858000" cy="9144000"/>
@@ -149,6 +150,575 @@
     </p:ext>
   </p:extLst>
 </p:presentation>
+</file>
+
+<file path=ppt/charts/chart1.xml><?xml version="1.0" encoding="utf-8"?>
+<c:chartSpace xmlns:c="http://schemas.openxmlformats.org/drawingml/2006/chart" xmlns:a="http://schemas.openxmlformats.org/drawingml/2006/main" xmlns:r="http://schemas.openxmlformats.org/officeDocument/2006/relationships" xmlns:c16r2="http://schemas.microsoft.com/office/drawing/2015/06/chart">
+  <c:date1904 val="0"/>
+  <c:lang val="en-US"/>
+  <c:roundedCorners val="0"/>
+  <mc:AlternateContent xmlns:mc="http://schemas.openxmlformats.org/markup-compatibility/2006">
+    <mc:Choice xmlns:c14="http://schemas.microsoft.com/office/drawing/2007/8/2/chart" Requires="c14">
+      <c14:style val="118"/>
+    </mc:Choice>
+    <mc:Fallback>
+      <c:style val="18"/>
+    </mc:Fallback>
+  </mc:AlternateContent>
+  <c:chart>
+    <c:title>
+      <c:tx>
+        <c:rich>
+          <a:bodyPr/>
+          <a:lstStyle/>
+          <a:p>
+            <a:pPr>
+              <a:defRPr/>
+            </a:pPr>
+            <a:r>
+              <a:rPr lang="en-US"/>
+              <a:t>Gantt Chart</a:t>
+            </a:r>
+            <a:endParaRPr lang="en-US" baseline="0"/>
+          </a:p>
+        </c:rich>
+      </c:tx>
+      <c:layout>
+        <c:manualLayout>
+          <c:xMode val="edge"/>
+          <c:yMode val="edge"/>
+          <c:x val="0.344222805482648"/>
+          <c:y val="9.5238095238095195E-3"/>
+        </c:manualLayout>
+      </c:layout>
+      <c:overlay val="0"/>
+    </c:title>
+    <c:autoTitleDeleted val="0"/>
+    <c:plotArea>
+      <c:layout/>
+      <c:barChart>
+        <c:barDir val="bar"/>
+        <c:grouping val="stacked"/>
+        <c:varyColors val="0"/>
+        <c:ser>
+          <c:idx val="0"/>
+          <c:order val="0"/>
+          <c:tx>
+            <c:strRef>
+              <c:f>Sheet1!$C$5:$C$13</c:f>
+              <c:strCache>
+                <c:ptCount val="9"/>
+                <c:pt idx="0">
+                  <c:v>1/28/2024</c:v>
+                </c:pt>
+                <c:pt idx="1">
+                  <c:v>2/4/2024</c:v>
+                </c:pt>
+                <c:pt idx="2">
+                  <c:v>2/6/2024</c:v>
+                </c:pt>
+                <c:pt idx="3">
+                  <c:v>2/8/2024</c:v>
+                </c:pt>
+                <c:pt idx="4">
+                  <c:v>3/5/2024</c:v>
+                </c:pt>
+                <c:pt idx="5">
+                  <c:v>3/7/2024</c:v>
+                </c:pt>
+                <c:pt idx="6">
+                  <c:v>4/9/2024</c:v>
+                </c:pt>
+                <c:pt idx="7">
+                  <c:v>4/11/2024</c:v>
+                </c:pt>
+                <c:pt idx="8">
+                  <c:v>4/30/2024</c:v>
+                </c:pt>
+              </c:strCache>
+            </c:strRef>
+          </c:tx>
+          <c:spPr>
+            <a:noFill/>
+            <a:ln>
+              <a:noFill/>
+            </a:ln>
+            <a:effectLst/>
+          </c:spPr>
+          <c:invertIfNegative val="0"/>
+          <c:cat>
+            <c:strRef>
+              <c:f>Sheet1!$B$5:$B$13</c:f>
+              <c:strCache>
+                <c:ptCount val="9"/>
+                <c:pt idx="0">
+                  <c:v>Team assembled</c:v>
+                </c:pt>
+                <c:pt idx="1">
+                  <c:v>Ideas exchanged</c:v>
+                </c:pt>
+                <c:pt idx="2">
+                  <c:v>Phase 1 due</c:v>
+                </c:pt>
+                <c:pt idx="3">
+                  <c:v>Front End development</c:v>
+                </c:pt>
+                <c:pt idx="4">
+                  <c:v>Phase 2 due</c:v>
+                </c:pt>
+                <c:pt idx="5">
+                  <c:v>Back End development</c:v>
+                </c:pt>
+                <c:pt idx="6">
+                  <c:v>Phase 3 due</c:v>
+                </c:pt>
+                <c:pt idx="7">
+                  <c:v>Testing and adjustment</c:v>
+                </c:pt>
+                <c:pt idx="8">
+                  <c:v>Phase 4 Due</c:v>
+                </c:pt>
+              </c:strCache>
+            </c:strRef>
+          </c:cat>
+          <c:val>
+            <c:numRef>
+              <c:f>Sheet1!$C$5:$C$13</c:f>
+              <c:numCache>
+                <c:formatCode>m/d/yyyy</c:formatCode>
+                <c:ptCount val="9"/>
+                <c:pt idx="0">
+                  <c:v>45319</c:v>
+                </c:pt>
+                <c:pt idx="1">
+                  <c:v>45326</c:v>
+                </c:pt>
+                <c:pt idx="2">
+                  <c:v>45328</c:v>
+                </c:pt>
+                <c:pt idx="3">
+                  <c:v>45330</c:v>
+                </c:pt>
+                <c:pt idx="4">
+                  <c:v>45356</c:v>
+                </c:pt>
+                <c:pt idx="5">
+                  <c:v>45358</c:v>
+                </c:pt>
+                <c:pt idx="6">
+                  <c:v>45391</c:v>
+                </c:pt>
+                <c:pt idx="7">
+                  <c:v>45393</c:v>
+                </c:pt>
+                <c:pt idx="8">
+                  <c:v>45412</c:v>
+                </c:pt>
+              </c:numCache>
+            </c:numRef>
+          </c:val>
+          <c:extLst>
+            <c:ext xmlns:c16="http://schemas.microsoft.com/office/drawing/2014/chart" uri="{C3380CC4-5D6E-409C-BE32-E72D297353CC}">
+              <c16:uniqueId val="{00000000-2AF7-4A31-948B-2F40004294E9}"/>
+            </c:ext>
+          </c:extLst>
+        </c:ser>
+        <c:ser>
+          <c:idx val="1"/>
+          <c:order val="1"/>
+          <c:tx>
+            <c:strRef>
+              <c:f>Sheet1!$E$4</c:f>
+              <c:strCache>
+                <c:ptCount val="1"/>
+                <c:pt idx="0">
+                  <c:v>Duration (days)</c:v>
+                </c:pt>
+              </c:strCache>
+            </c:strRef>
+          </c:tx>
+          <c:invertIfNegative val="0"/>
+          <c:dPt>
+            <c:idx val="0"/>
+            <c:invertIfNegative val="0"/>
+            <c:bubble3D val="0"/>
+            <c:spPr>
+              <a:solidFill>
+                <a:srgbClr val="008000"/>
+              </a:solidFill>
+            </c:spPr>
+            <c:extLst>
+              <c:ext xmlns:c16="http://schemas.microsoft.com/office/drawing/2014/chart" uri="{C3380CC4-5D6E-409C-BE32-E72D297353CC}">
+                <c16:uniqueId val="{00000002-2AF7-4A31-948B-2F40004294E9}"/>
+              </c:ext>
+            </c:extLst>
+          </c:dPt>
+          <c:dPt>
+            <c:idx val="1"/>
+            <c:invertIfNegative val="0"/>
+            <c:bubble3D val="0"/>
+            <c:spPr>
+              <a:solidFill>
+                <a:srgbClr val="008000"/>
+              </a:solidFill>
+            </c:spPr>
+            <c:extLst>
+              <c:ext xmlns:c16="http://schemas.microsoft.com/office/drawing/2014/chart" uri="{C3380CC4-5D6E-409C-BE32-E72D297353CC}">
+                <c16:uniqueId val="{00000004-2AF7-4A31-948B-2F40004294E9}"/>
+              </c:ext>
+            </c:extLst>
+          </c:dPt>
+          <c:dPt>
+            <c:idx val="2"/>
+            <c:invertIfNegative val="0"/>
+            <c:bubble3D val="0"/>
+            <c:spPr>
+              <a:solidFill>
+                <a:srgbClr val="008000"/>
+              </a:solidFill>
+            </c:spPr>
+            <c:extLst>
+              <c:ext xmlns:c16="http://schemas.microsoft.com/office/drawing/2014/chart" uri="{C3380CC4-5D6E-409C-BE32-E72D297353CC}">
+                <c16:uniqueId val="{00000006-2AF7-4A31-948B-2F40004294E9}"/>
+              </c:ext>
+            </c:extLst>
+          </c:dPt>
+          <c:dPt>
+            <c:idx val="3"/>
+            <c:invertIfNegative val="0"/>
+            <c:bubble3D val="0"/>
+            <c:spPr>
+              <a:solidFill>
+                <a:srgbClr val="C00000"/>
+              </a:solidFill>
+            </c:spPr>
+            <c:extLst>
+              <c:ext xmlns:c16="http://schemas.microsoft.com/office/drawing/2014/chart" uri="{C3380CC4-5D6E-409C-BE32-E72D297353CC}">
+                <c16:uniqueId val="{00000008-2AF7-4A31-948B-2F40004294E9}"/>
+              </c:ext>
+            </c:extLst>
+          </c:dPt>
+          <c:dPt>
+            <c:idx val="4"/>
+            <c:invertIfNegative val="0"/>
+            <c:bubble3D val="0"/>
+            <c:spPr>
+              <a:solidFill>
+                <a:srgbClr val="C00000"/>
+              </a:solidFill>
+            </c:spPr>
+            <c:extLst>
+              <c:ext xmlns:c16="http://schemas.microsoft.com/office/drawing/2014/chart" uri="{C3380CC4-5D6E-409C-BE32-E72D297353CC}">
+                <c16:uniqueId val="{0000000A-2AF7-4A31-948B-2F40004294E9}"/>
+              </c:ext>
+            </c:extLst>
+          </c:dPt>
+          <c:dPt>
+            <c:idx val="5"/>
+            <c:invertIfNegative val="0"/>
+            <c:bubble3D val="0"/>
+            <c:spPr>
+              <a:solidFill>
+                <a:srgbClr val="3366FF"/>
+              </a:solidFill>
+            </c:spPr>
+            <c:extLst>
+              <c:ext xmlns:c16="http://schemas.microsoft.com/office/drawing/2014/chart" uri="{C3380CC4-5D6E-409C-BE32-E72D297353CC}">
+                <c16:uniqueId val="{0000000C-2AF7-4A31-948B-2F40004294E9}"/>
+              </c:ext>
+            </c:extLst>
+          </c:dPt>
+          <c:dPt>
+            <c:idx val="6"/>
+            <c:invertIfNegative val="0"/>
+            <c:bubble3D val="0"/>
+            <c:spPr>
+              <a:solidFill>
+                <a:srgbClr val="3366FF"/>
+              </a:solidFill>
+            </c:spPr>
+            <c:extLst>
+              <c:ext xmlns:c16="http://schemas.microsoft.com/office/drawing/2014/chart" uri="{C3380CC4-5D6E-409C-BE32-E72D297353CC}">
+                <c16:uniqueId val="{0000000E-2AF7-4A31-948B-2F40004294E9}"/>
+              </c:ext>
+            </c:extLst>
+          </c:dPt>
+          <c:dPt>
+            <c:idx val="7"/>
+            <c:invertIfNegative val="0"/>
+            <c:bubble3D val="0"/>
+            <c:spPr>
+              <a:solidFill>
+                <a:srgbClr val="7030A0"/>
+              </a:solidFill>
+            </c:spPr>
+            <c:extLst>
+              <c:ext xmlns:c16="http://schemas.microsoft.com/office/drawing/2014/chart" uri="{C3380CC4-5D6E-409C-BE32-E72D297353CC}">
+                <c16:uniqueId val="{00000010-2AF7-4A31-948B-2F40004294E9}"/>
+              </c:ext>
+            </c:extLst>
+          </c:dPt>
+          <c:dPt>
+            <c:idx val="8"/>
+            <c:invertIfNegative val="0"/>
+            <c:bubble3D val="0"/>
+            <c:spPr>
+              <a:solidFill>
+                <a:srgbClr val="7030A0"/>
+              </a:solidFill>
+            </c:spPr>
+            <c:extLst>
+              <c:ext xmlns:c16="http://schemas.microsoft.com/office/drawing/2014/chart" uri="{C3380CC4-5D6E-409C-BE32-E72D297353CC}">
+                <c16:uniqueId val="{00000012-2AF7-4A31-948B-2F40004294E9}"/>
+              </c:ext>
+            </c:extLst>
+          </c:dPt>
+          <c:dPt>
+            <c:idx val="9"/>
+            <c:invertIfNegative val="0"/>
+            <c:bubble3D val="0"/>
+            <c:spPr>
+              <a:solidFill>
+                <a:srgbClr val="FF0000"/>
+              </a:solidFill>
+            </c:spPr>
+            <c:extLst>
+              <c:ext xmlns:c16="http://schemas.microsoft.com/office/drawing/2014/chart" uri="{C3380CC4-5D6E-409C-BE32-E72D297353CC}">
+                <c16:uniqueId val="{00000014-2AF7-4A31-948B-2F40004294E9}"/>
+              </c:ext>
+            </c:extLst>
+          </c:dPt>
+          <c:dPt>
+            <c:idx val="10"/>
+            <c:invertIfNegative val="0"/>
+            <c:bubble3D val="0"/>
+            <c:spPr>
+              <a:solidFill>
+                <a:srgbClr val="FF0000"/>
+              </a:solidFill>
+            </c:spPr>
+            <c:extLst>
+              <c:ext xmlns:c16="http://schemas.microsoft.com/office/drawing/2014/chart" uri="{C3380CC4-5D6E-409C-BE32-E72D297353CC}">
+                <c16:uniqueId val="{00000016-2AF7-4A31-948B-2F40004294E9}"/>
+              </c:ext>
+            </c:extLst>
+          </c:dPt>
+          <c:dPt>
+            <c:idx val="11"/>
+            <c:invertIfNegative val="0"/>
+            <c:bubble3D val="0"/>
+            <c:spPr>
+              <a:solidFill>
+                <a:srgbClr val="FF0000"/>
+              </a:solidFill>
+            </c:spPr>
+            <c:extLst>
+              <c:ext xmlns:c16="http://schemas.microsoft.com/office/drawing/2014/chart" uri="{C3380CC4-5D6E-409C-BE32-E72D297353CC}">
+                <c16:uniqueId val="{00000018-2AF7-4A31-948B-2F40004294E9}"/>
+              </c:ext>
+            </c:extLst>
+          </c:dPt>
+          <c:dPt>
+            <c:idx val="12"/>
+            <c:invertIfNegative val="0"/>
+            <c:bubble3D val="0"/>
+            <c:spPr>
+              <a:solidFill>
+                <a:srgbClr val="FF0000"/>
+              </a:solidFill>
+            </c:spPr>
+            <c:extLst>
+              <c:ext xmlns:c16="http://schemas.microsoft.com/office/drawing/2014/chart" uri="{C3380CC4-5D6E-409C-BE32-E72D297353CC}">
+                <c16:uniqueId val="{0000001A-2AF7-4A31-948B-2F40004294E9}"/>
+              </c:ext>
+            </c:extLst>
+          </c:dPt>
+          <c:dPt>
+            <c:idx val="13"/>
+            <c:invertIfNegative val="0"/>
+            <c:bubble3D val="0"/>
+            <c:spPr>
+              <a:solidFill>
+                <a:srgbClr val="660066"/>
+              </a:solidFill>
+            </c:spPr>
+            <c:extLst>
+              <c:ext xmlns:c16="http://schemas.microsoft.com/office/drawing/2014/chart" uri="{C3380CC4-5D6E-409C-BE32-E72D297353CC}">
+                <c16:uniqueId val="{0000001C-2AF7-4A31-948B-2F40004294E9}"/>
+              </c:ext>
+            </c:extLst>
+          </c:dPt>
+          <c:dPt>
+            <c:idx val="14"/>
+            <c:invertIfNegative val="0"/>
+            <c:bubble3D val="0"/>
+            <c:spPr>
+              <a:solidFill>
+                <a:srgbClr val="660066"/>
+              </a:solidFill>
+            </c:spPr>
+            <c:extLst>
+              <c:ext xmlns:c16="http://schemas.microsoft.com/office/drawing/2014/chart" uri="{C3380CC4-5D6E-409C-BE32-E72D297353CC}">
+                <c16:uniqueId val="{0000001E-2AF7-4A31-948B-2F40004294E9}"/>
+              </c:ext>
+            </c:extLst>
+          </c:dPt>
+          <c:dPt>
+            <c:idx val="15"/>
+            <c:invertIfNegative val="0"/>
+            <c:bubble3D val="0"/>
+            <c:spPr>
+              <a:solidFill>
+                <a:srgbClr val="660066"/>
+              </a:solidFill>
+            </c:spPr>
+            <c:extLst>
+              <c:ext xmlns:c16="http://schemas.microsoft.com/office/drawing/2014/chart" uri="{C3380CC4-5D6E-409C-BE32-E72D297353CC}">
+                <c16:uniqueId val="{00000020-2AF7-4A31-948B-2F40004294E9}"/>
+              </c:ext>
+            </c:extLst>
+          </c:dPt>
+          <c:cat>
+            <c:strRef>
+              <c:f>Sheet1!$B$5:$B$13</c:f>
+              <c:strCache>
+                <c:ptCount val="9"/>
+                <c:pt idx="0">
+                  <c:v>Team assembled</c:v>
+                </c:pt>
+                <c:pt idx="1">
+                  <c:v>Ideas exchanged</c:v>
+                </c:pt>
+                <c:pt idx="2">
+                  <c:v>Phase 1 due</c:v>
+                </c:pt>
+                <c:pt idx="3">
+                  <c:v>Front End development</c:v>
+                </c:pt>
+                <c:pt idx="4">
+                  <c:v>Phase 2 due</c:v>
+                </c:pt>
+                <c:pt idx="5">
+                  <c:v>Back End development</c:v>
+                </c:pt>
+                <c:pt idx="6">
+                  <c:v>Phase 3 due</c:v>
+                </c:pt>
+                <c:pt idx="7">
+                  <c:v>Testing and adjustment</c:v>
+                </c:pt>
+                <c:pt idx="8">
+                  <c:v>Phase 4 Due</c:v>
+                </c:pt>
+              </c:strCache>
+            </c:strRef>
+          </c:cat>
+          <c:val>
+            <c:numRef>
+              <c:f>Sheet1!$E$5:$E$13</c:f>
+              <c:numCache>
+                <c:formatCode>General</c:formatCode>
+                <c:ptCount val="9"/>
+                <c:pt idx="0">
+                  <c:v>3</c:v>
+                </c:pt>
+                <c:pt idx="1">
+                  <c:v>2</c:v>
+                </c:pt>
+                <c:pt idx="2">
+                  <c:v>1</c:v>
+                </c:pt>
+                <c:pt idx="3">
+                  <c:v>26</c:v>
+                </c:pt>
+                <c:pt idx="4">
+                  <c:v>1</c:v>
+                </c:pt>
+                <c:pt idx="5">
+                  <c:v>33</c:v>
+                </c:pt>
+                <c:pt idx="6">
+                  <c:v>1</c:v>
+                </c:pt>
+                <c:pt idx="7">
+                  <c:v>19</c:v>
+                </c:pt>
+                <c:pt idx="8">
+                  <c:v>1</c:v>
+                </c:pt>
+              </c:numCache>
+            </c:numRef>
+          </c:val>
+          <c:extLst>
+            <c:ext xmlns:c16="http://schemas.microsoft.com/office/drawing/2014/chart" uri="{C3380CC4-5D6E-409C-BE32-E72D297353CC}">
+              <c16:uniqueId val="{00000021-2AF7-4A31-948B-2F40004294E9}"/>
+            </c:ext>
+          </c:extLst>
+        </c:ser>
+        <c:dLbls>
+          <c:showLegendKey val="0"/>
+          <c:showVal val="0"/>
+          <c:showCatName val="0"/>
+          <c:showSerName val="0"/>
+          <c:showPercent val="0"/>
+          <c:showBubbleSize val="0"/>
+        </c:dLbls>
+        <c:gapWidth val="100"/>
+        <c:overlap val="100"/>
+        <c:axId val="163390400"/>
+        <c:axId val="164523240"/>
+      </c:barChart>
+      <c:catAx>
+        <c:axId val="163390400"/>
+        <c:scaling>
+          <c:orientation val="maxMin"/>
+        </c:scaling>
+        <c:delete val="0"/>
+        <c:axPos val="l"/>
+        <c:numFmt formatCode="General" sourceLinked="0"/>
+        <c:majorTickMark val="out"/>
+        <c:minorTickMark val="none"/>
+        <c:tickLblPos val="nextTo"/>
+        <c:crossAx val="164523240"/>
+        <c:crosses val="autoZero"/>
+        <c:auto val="1"/>
+        <c:lblAlgn val="ctr"/>
+        <c:lblOffset val="100"/>
+        <c:noMultiLvlLbl val="0"/>
+      </c:catAx>
+      <c:valAx>
+        <c:axId val="164523240"/>
+        <c:scaling>
+          <c:orientation val="minMax"/>
+          <c:min val="45320"/>
+        </c:scaling>
+        <c:delete val="0"/>
+        <c:axPos val="t"/>
+        <c:majorGridlines/>
+        <c:numFmt formatCode="m/d/yyyy" sourceLinked="1"/>
+        <c:majorTickMark val="out"/>
+        <c:minorTickMark val="none"/>
+        <c:tickLblPos val="nextTo"/>
+        <c:crossAx val="163390400"/>
+        <c:crosses val="autoZero"/>
+        <c:crossBetween val="between"/>
+        <c:majorUnit val="10"/>
+      </c:valAx>
+      <c:spPr>
+        <a:noFill/>
+        <a:ln w="25400">
+          <a:noFill/>
+        </a:ln>
+      </c:spPr>
+    </c:plotArea>
+    <c:plotVisOnly val="1"/>
+    <c:dispBlanksAs val="gap"/>
+    <c:showDLblsOverMax val="0"/>
+  </c:chart>
+  <c:externalData r:id="rId1">
+    <c:autoUpdate val="0"/>
+  </c:externalData>
+</c:chartSpace>
 </file>
 
 <file path=ppt/handoutMasters/handoutMaster1.xml><?xml version="1.0" encoding="utf-8"?>
@@ -8168,6 +8738,89 @@
 </file>
 
 <file path=ppt/slides/slide15.xml><?xml version="1.0" encoding="utf-8"?>
+<p:sld xmlns:a="http://schemas.openxmlformats.org/drawingml/2006/main" xmlns:r="http://schemas.openxmlformats.org/officeDocument/2006/relationships" xmlns:p="http://schemas.openxmlformats.org/presentationml/2006/main">
+  <p:cSld>
+    <p:spTree>
+      <p:nvGrpSpPr>
+        <p:cNvPr id="1" name=""/>
+        <p:cNvGrpSpPr/>
+        <p:nvPr/>
+      </p:nvGrpSpPr>
+      <p:grpSpPr>
+        <a:xfrm>
+          <a:off x="0" y="0"/>
+          <a:ext cx="0" cy="0"/>
+          <a:chOff x="0" y="0"/>
+          <a:chExt cx="0" cy="0"/>
+        </a:xfrm>
+      </p:grpSpPr>
+      <p:sp>
+        <p:nvSpPr>
+          <p:cNvPr id="3" name="Slide Number Placeholder 2">
+            <a:extLst>
+              <a:ext uri="{FF2B5EF4-FFF2-40B4-BE49-F238E27FC236}">
+                <a16:creationId xmlns:a16="http://schemas.microsoft.com/office/drawing/2014/main" id="{7047F152-9C69-D2E1-7D70-567B845DF878}"/>
+              </a:ext>
+            </a:extLst>
+          </p:cNvPr>
+          <p:cNvSpPr>
+            <a:spLocks noGrp="1"/>
+          </p:cNvSpPr>
+          <p:nvPr>
+            <p:ph type="sldNum" sz="quarter" idx="11"/>
+          </p:nvPr>
+        </p:nvSpPr>
+        <p:spPr/>
+        <p:txBody>
+          <a:bodyPr/>
+          <a:lstStyle/>
+          <a:p>
+            <a:fld id="{8C2E478F-E849-4A8C-AF1F-CBCC78A7CBFA}" type="slidenum">
+              <a:rPr lang="en-US" smtClean="0"/>
+              <a:t>15</a:t>
+            </a:fld>
+            <a:endParaRPr lang="en-US" dirty="0"/>
+          </a:p>
+        </p:txBody>
+      </p:sp>
+      <p:graphicFrame>
+        <p:nvGraphicFramePr>
+          <p:cNvPr id="4" name="Chart 3">
+            <a:extLst>
+              <a:ext uri="{FF2B5EF4-FFF2-40B4-BE49-F238E27FC236}">
+                <a16:creationId xmlns:a16="http://schemas.microsoft.com/office/drawing/2014/main" id="{00000000-0008-0000-0000-000003000000}"/>
+              </a:ext>
+            </a:extLst>
+          </p:cNvPr>
+          <p:cNvGraphicFramePr>
+            <a:graphicFrameLocks/>
+          </p:cNvGraphicFramePr>
+          <p:nvPr/>
+        </p:nvGraphicFramePr>
+        <p:xfrm>
+          <a:off x="1412613" y="1044239"/>
+          <a:ext cx="9366773" cy="4769522"/>
+        </p:xfrm>
+        <a:graphic>
+          <a:graphicData uri="http://schemas.openxmlformats.org/drawingml/2006/chart">
+            <c:chart xmlns:c="http://schemas.openxmlformats.org/drawingml/2006/chart" xmlns:r="http://schemas.openxmlformats.org/officeDocument/2006/relationships" r:id="rId2"/>
+          </a:graphicData>
+        </a:graphic>
+      </p:graphicFrame>
+    </p:spTree>
+    <p:extLst>
+      <p:ext uri="{BB962C8B-B14F-4D97-AF65-F5344CB8AC3E}">
+        <p14:creationId xmlns:p14="http://schemas.microsoft.com/office/powerpoint/2010/main" val="4233392628"/>
+      </p:ext>
+    </p:extLst>
+  </p:cSld>
+  <p:clrMapOvr>
+    <a:masterClrMapping/>
+  </p:clrMapOvr>
+</p:sld>
+</file>
+
+<file path=ppt/slides/slide16.xml><?xml version="1.0" encoding="utf-8"?>
 <p:sld xmlns:a="http://schemas.openxmlformats.org/drawingml/2006/main" xmlns:r="http://schemas.openxmlformats.org/officeDocument/2006/relationships" xmlns:p="http://schemas.openxmlformats.org/presentationml/2006/main">
   <p:cSld>
     <p:bg>
@@ -11606,12 +12259,23 @@
 </file>
 
 <file path=customXml/item1.xml><?xml version="1.0" encoding="utf-8"?>
-<?mso-contentType ?>
-<FormTemplates xmlns="http://schemas.microsoft.com/sharepoint/v3/contenttype/forms">
-  <Display>DocumentLibraryForm</Display>
-  <Edit>DocumentLibraryForm</Edit>
-  <New>DocumentLibraryForm</New>
-</FormTemplates>
+<p:properties xmlns:p="http://schemas.microsoft.com/office/2006/metadata/properties" xmlns:xsi="http://www.w3.org/2001/XMLSchema-instance" xmlns:pc="http://schemas.microsoft.com/office/infopath/2007/PartnerControls">
+  <documentManagement>
+    <Status xmlns="71af3243-3dd4-4a8d-8c0d-dd76da1f02a5">Not started</Status>
+    <MediaServiceKeyPoints xmlns="71af3243-3dd4-4a8d-8c0d-dd76da1f02a5" xsi:nil="true"/>
+    <_ip_UnifiedCompliancePolicyUIAction xmlns="http://schemas.microsoft.com/sharepoint/v3" xsi:nil="true"/>
+    <Image xmlns="71af3243-3dd4-4a8d-8c0d-dd76da1f02a5">
+      <Url xsi:nil="true"/>
+      <Description xsi:nil="true"/>
+    </Image>
+    <Background xmlns="71af3243-3dd4-4a8d-8c0d-dd76da1f02a5">false</Background>
+    <_ip_UnifiedCompliancePolicyProperties xmlns="http://schemas.microsoft.com/sharepoint/v3" xsi:nil="true"/>
+    <ImageTagsTaxHTField xmlns="71af3243-3dd4-4a8d-8c0d-dd76da1f02a5">
+      <Terms xmlns="http://schemas.microsoft.com/office/infopath/2007/PartnerControls"/>
+    </ImageTagsTaxHTField>
+    <TaxCatchAll xmlns="230e9df3-be65-4c73-a93b-d1236ebd677e" xsi:nil="true"/>
+  </documentManagement>
+</p:properties>
 </file>
 
 <file path=customXml/item2.xml><?xml version="1.0" encoding="utf-8"?>
@@ -11927,29 +12591,22 @@
 </file>
 
 <file path=customXml/item3.xml><?xml version="1.0" encoding="utf-8"?>
-<p:properties xmlns:p="http://schemas.microsoft.com/office/2006/metadata/properties" xmlns:xsi="http://www.w3.org/2001/XMLSchema-instance" xmlns:pc="http://schemas.microsoft.com/office/infopath/2007/PartnerControls">
-  <documentManagement>
-    <Status xmlns="71af3243-3dd4-4a8d-8c0d-dd76da1f02a5">Not started</Status>
-    <MediaServiceKeyPoints xmlns="71af3243-3dd4-4a8d-8c0d-dd76da1f02a5" xsi:nil="true"/>
-    <_ip_UnifiedCompliancePolicyUIAction xmlns="http://schemas.microsoft.com/sharepoint/v3" xsi:nil="true"/>
-    <Image xmlns="71af3243-3dd4-4a8d-8c0d-dd76da1f02a5">
-      <Url xsi:nil="true"/>
-      <Description xsi:nil="true"/>
-    </Image>
-    <Background xmlns="71af3243-3dd4-4a8d-8c0d-dd76da1f02a5">false</Background>
-    <_ip_UnifiedCompliancePolicyProperties xmlns="http://schemas.microsoft.com/sharepoint/v3" xsi:nil="true"/>
-    <ImageTagsTaxHTField xmlns="71af3243-3dd4-4a8d-8c0d-dd76da1f02a5">
-      <Terms xmlns="http://schemas.microsoft.com/office/infopath/2007/PartnerControls"/>
-    </ImageTagsTaxHTField>
-    <TaxCatchAll xmlns="230e9df3-be65-4c73-a93b-d1236ebd677e" xsi:nil="true"/>
-  </documentManagement>
-</p:properties>
+<?mso-contentType ?>
+<FormTemplates xmlns="http://schemas.microsoft.com/sharepoint/v3/contenttype/forms">
+  <Display>DocumentLibraryForm</Display>
+  <Edit>DocumentLibraryForm</Edit>
+  <New>DocumentLibraryForm</New>
+</FormTemplates>
 </file>
 
 <file path=customXml/itemProps1.xml><?xml version="1.0" encoding="utf-8"?>
-<ds:datastoreItem xmlns:ds="http://schemas.openxmlformats.org/officeDocument/2006/customXml" ds:itemID="{99E4EAC9-33DC-4CF0-BA31-C98F61CE4785}">
+<ds:datastoreItem xmlns:ds="http://schemas.openxmlformats.org/officeDocument/2006/customXml" ds:itemID="{8002A8ED-1331-4C1D-8649-743D7BE164DD}">
   <ds:schemaRefs>
-    <ds:schemaRef ds:uri="http://schemas.microsoft.com/sharepoint/v3/contenttype/forms"/>
+    <ds:schemaRef ds:uri="http://schemas.microsoft.com/office/2006/metadata/properties"/>
+    <ds:schemaRef ds:uri="http://schemas.microsoft.com/office/infopath/2007/PartnerControls"/>
+    <ds:schemaRef ds:uri="71af3243-3dd4-4a8d-8c0d-dd76da1f02a5"/>
+    <ds:schemaRef ds:uri="http://schemas.microsoft.com/sharepoint/v3"/>
+    <ds:schemaRef ds:uri="230e9df3-be65-4c73-a93b-d1236ebd677e"/>
   </ds:schemaRefs>
 </ds:datastoreItem>
 </file>
@@ -11976,13 +12633,9 @@
 </file>
 
 <file path=customXml/itemProps3.xml><?xml version="1.0" encoding="utf-8"?>
-<ds:datastoreItem xmlns:ds="http://schemas.openxmlformats.org/officeDocument/2006/customXml" ds:itemID="{8002A8ED-1331-4C1D-8649-743D7BE164DD}">
+<ds:datastoreItem xmlns:ds="http://schemas.openxmlformats.org/officeDocument/2006/customXml" ds:itemID="{99E4EAC9-33DC-4CF0-BA31-C98F61CE4785}">
   <ds:schemaRefs>
-    <ds:schemaRef ds:uri="http://schemas.microsoft.com/office/2006/metadata/properties"/>
-    <ds:schemaRef ds:uri="http://schemas.microsoft.com/office/infopath/2007/PartnerControls"/>
-    <ds:schemaRef ds:uri="71af3243-3dd4-4a8d-8c0d-dd76da1f02a5"/>
-    <ds:schemaRef ds:uri="http://schemas.microsoft.com/sharepoint/v3"/>
-    <ds:schemaRef ds:uri="230e9df3-be65-4c73-a93b-d1236ebd677e"/>
+    <ds:schemaRef ds:uri="http://schemas.microsoft.com/sharepoint/v3/contenttype/forms"/>
   </ds:schemaRefs>
 </ds:datastoreItem>
 </file>

</xml_diff>